<commit_message>
Fixed up the presentation a bit, added background image for filler slide.
</commit_message>
<xml_diff>
--- a/generated_ppts/bhajans.pptx
+++ b/generated_ppts/bhajans.pptx
@@ -7,6 +7,14 @@
   <p:sldIdLst>
     <p:sldId r:id="rId7" id="256"/>
     <p:sldId r:id="rId8" id="257"/>
+    <p:sldId r:id="rId9" id="258"/>
+    <p:sldId r:id="rId10" id="259"/>
+    <p:sldId r:id="rId11" id="260"/>
+    <p:sldId r:id="rId12" id="261"/>
+    <p:sldId r:id="rId13" id="262"/>
+    <p:sldId r:id="rId14" id="263"/>
+    <p:sldId r:id="rId15" id="264"/>
+    <p:sldId r:id="rId16" id="265"/>
   </p:sldIdLst>
   <p:sldSz cx="9144000" cy="6858000" type="screen4x3"/>
   <p:notesSz cx="6858000" cy="9144000"/>
@@ -3166,6 +3174,193 @@
 </p:sld>
 </file>
 
+<file path=ppt/slides/slide10.xml><?xml version="1.0" encoding="utf-8"?>
+<p:sld xmlns:a="http://schemas.openxmlformats.org/drawingml/2006/main" xmlns:p="http://schemas.openxmlformats.org/presentationml/2006/main" xmlns:r="http://schemas.openxmlformats.org/officeDocument/2006/relationships">
+  <p:cSld>
+    <p:spTree>
+      <p:nvGrpSpPr>
+        <p:cNvPr id="1" name=""/>
+        <p:cNvGrpSpPr/>
+        <p:nvPr/>
+      </p:nvGrpSpPr>
+      <p:grpSpPr/>
+      <p:sp>
+        <p:nvSpPr>
+          <p:cNvPr id="2" name="Title 1"/>
+          <p:cNvSpPr>
+            <a:spLocks noGrp="1"/>
+          </p:cNvSpPr>
+          <p:nvPr>
+            <p:ph type="title"/>
+          </p:nvPr>
+        </p:nvSpPr>
+        <p:spPr/>
+        <p:txBody>
+          <a:bodyPr/>
+          <a:lstStyle/>
+          <a:p>
+            <a:r>
+              <a:t>Vibhuti Mantra</a:t>
+            </a:r>
+          </a:p>
+        </p:txBody>
+      </p:sp>
+      <p:sp>
+        <p:nvSpPr>
+          <p:cNvPr id="3" name="TextBox 2"/>
+          <p:cNvSpPr txBox="1"/>
+          <p:nvPr/>
+        </p:nvSpPr>
+        <p:spPr>
+          <a:xfrm>
+            <a:off x="457200" y="1371600"/>
+            <a:ext cx="8229600" cy="5029200"/>
+          </a:xfrm>
+          <a:prstGeom prst="rect">
+            <a:avLst/>
+          </a:prstGeom>
+          <a:noFill/>
+        </p:spPr>
+        <p:txBody>
+          <a:bodyPr wrap="none">
+            <a:normAutofit/>
+          </a:bodyPr>
+          <a:lstStyle/>
+          <a:p/>
+          <a:p>
+            <a:pPr algn="ctr"/>
+            <a:r>
+              <a:rPr sz="2600" b="0">
+                <a:solidFill>
+                  <a:srgbClr val="000000"/>
+                </a:solidFill>
+              </a:rPr>
+              <a:t>Paramam Pavithram Baba Vibhuthim
+Paramam Vichitram Leela Vibhuthim
+Paramartha Ishtartha Moksha Pradhanam
+Baba Vibhuthim Idam Asrayami
+Sacred Holy and Supreme is Baba's Vibhuthi
+ Pouring Forth in brilliant stream, this play of
+Vibhuthi
+So auspicious is its might, it grants liberation
+Baba's Vibhuthi, its power protects me</a:t>
+            </a:r>
+          </a:p>
+        </p:txBody>
+      </p:sp>
+      <p:sp>
+        <p:nvSpPr>
+          <p:cNvPr id="4" name="TextBox 3"/>
+          <p:cNvSpPr txBox="1"/>
+          <p:nvPr/>
+        </p:nvSpPr>
+        <p:spPr>
+          <a:xfrm>
+            <a:off x="457200" y="5943600"/>
+            <a:ext cx="914400" cy="685800"/>
+          </a:xfrm>
+          <a:prstGeom prst="rect">
+            <a:avLst/>
+          </a:prstGeom>
+          <a:noFill/>
+        </p:spPr>
+        <p:txBody>
+          <a:bodyPr wrap="none">
+            <a:normAutofit/>
+          </a:bodyPr>
+          <a:lstStyle/>
+          <a:p/>
+          <a:p>
+            <a:pPr algn="ctr"/>
+            <a:r>
+              <a:rPr sz="1600" b="0">
+                <a:solidFill>
+                  <a:srgbClr val="000000"/>
+                </a:solidFill>
+              </a:rPr>
+              <a:t>E</a:t>
+            </a:r>
+          </a:p>
+        </p:txBody>
+      </p:sp>
+      <p:sp>
+        <p:nvSpPr>
+          <p:cNvPr id="5" name="TextBox 4"/>
+          <p:cNvSpPr txBox="1"/>
+          <p:nvPr/>
+        </p:nvSpPr>
+        <p:spPr>
+          <a:xfrm>
+            <a:off x="2286000" y="5943600"/>
+            <a:ext cx="3657600" cy="685800"/>
+          </a:xfrm>
+          <a:prstGeom prst="rect">
+            <a:avLst/>
+          </a:prstGeom>
+          <a:noFill/>
+        </p:spPr>
+        <p:txBody>
+          <a:bodyPr wrap="none">
+            <a:normAutofit/>
+          </a:bodyPr>
+          <a:lstStyle/>
+          <a:p/>
+          <a:p>
+            <a:pPr algn="ctr"/>
+            <a:r>
+              <a:rPr sz="1600" b="0">
+                <a:solidFill>
+                  <a:srgbClr val="000000"/>
+                </a:solidFill>
+              </a:rPr>
+              <a:t/>
+            </a:r>
+          </a:p>
+        </p:txBody>
+      </p:sp>
+      <p:sp>
+        <p:nvSpPr>
+          <p:cNvPr id="6" name="TextBox 5"/>
+          <p:cNvSpPr txBox="1"/>
+          <p:nvPr/>
+        </p:nvSpPr>
+        <p:spPr>
+          <a:xfrm>
+            <a:off x="7315200" y="5943600"/>
+            <a:ext cx="914400" cy="685800"/>
+          </a:xfrm>
+          <a:prstGeom prst="rect">
+            <a:avLst/>
+          </a:prstGeom>
+          <a:noFill/>
+        </p:spPr>
+        <p:txBody>
+          <a:bodyPr wrap="none">
+            <a:normAutofit/>
+          </a:bodyPr>
+          <a:lstStyle/>
+          <a:p/>
+          <a:p>
+            <a:pPr algn="ctr"/>
+            <a:r>
+              <a:rPr sz="1600" b="0">
+                <a:solidFill>
+                  <a:srgbClr val="000000"/>
+                </a:solidFill>
+              </a:rPr>
+              <a:t/>
+            </a:r>
+          </a:p>
+        </p:txBody>
+      </p:sp>
+    </p:spTree>
+  </p:cSld>
+  <p:clrMapOvr>
+    <a:masterClrMapping/>
+  </p:clrMapOvr>
+</p:sld>
+</file>
+
 <file path=ppt/slides/slide2.xml><?xml version="1.0" encoding="utf-8"?>
 <p:sld xmlns:a="http://schemas.openxmlformats.org/drawingml/2006/main" xmlns:p="http://schemas.openxmlformats.org/presentationml/2006/main" xmlns:r="http://schemas.openxmlformats.org/officeDocument/2006/relationships">
   <p:cSld>
@@ -3192,7 +3387,7 @@
           <a:lstStyle/>
           <a:p>
             <a:r>
-              <a:t>Vibhuti Mantra</a:t>
+              <a:t>Aajanubahum Aravindha Nethram</a:t>
             </a:r>
           </a:p>
         </p:txBody>
@@ -3205,7 +3400,7 @@
         </p:nvSpPr>
         <p:spPr>
           <a:xfrm>
-            <a:off x="457200" y="914400"/>
+            <a:off x="457200" y="1371600"/>
             <a:ext cx="8229600" cy="5029200"/>
           </a:xfrm>
           <a:prstGeom prst="rect">
@@ -3222,20 +3417,15 @@
           <a:p>
             <a:pPr algn="ctr"/>
             <a:r>
-              <a:rPr sz="2800" b="0">
+              <a:rPr sz="2600" b="0">
                 <a:solidFill>
                   <a:srgbClr val="000000"/>
                 </a:solidFill>
               </a:rPr>
-              <a:t>Paramam Pavithram Baba Vibhuthim
-Paramam Vichitram Leela Vibhuthim
-Paramartha Ishtartha Moksha Pradhanam
-Baba Vibhuthim Idam Asrayami
-Sacred Holy and Supreme is Baba's Vibhuthi
- Pouring Forth in brilliant stream, this play of
-Vibhuthi
-So auspicious is its might, it grants liberation
-Baba's Vibhuthi, its power protects me</a:t>
+              <a:t>Aajanubahum Aravindha Nethram
+Athmabhi Ramam Manasa Smarami (2)
+Bhoolokha Vaikunta Parthi Nivasam
+Prabhu Sai Ramam Manasa Smarami (2)</a:t>
             </a:r>
           </a:p>
         </p:txBody>
@@ -3305,7 +3495,7 @@
                   <a:srgbClr val="000000"/>
                 </a:solidFill>
               </a:rPr>
-              <a:t/>
+              <a:t>Sai Center</a:t>
             </a:r>
           </a:p>
         </p:txBody>
@@ -3341,6 +3531,1017 @@
                 </a:solidFill>
               </a:rPr>
               <a:t/>
+            </a:r>
+          </a:p>
+        </p:txBody>
+      </p:sp>
+    </p:spTree>
+  </p:cSld>
+  <p:clrMapOvr>
+    <a:masterClrMapping/>
+  </p:clrMapOvr>
+</p:sld>
+</file>
+
+<file path=ppt/slides/slide3.xml><?xml version="1.0" encoding="utf-8"?>
+<p:sld xmlns:a="http://schemas.openxmlformats.org/drawingml/2006/main" xmlns:p="http://schemas.openxmlformats.org/presentationml/2006/main" xmlns:r="http://schemas.openxmlformats.org/officeDocument/2006/relationships">
+  <p:cSld>
+    <p:spTree>
+      <p:nvGrpSpPr>
+        <p:cNvPr id="1" name=""/>
+        <p:cNvGrpSpPr/>
+        <p:nvPr/>
+      </p:nvGrpSpPr>
+      <p:grpSpPr/>
+      <p:pic>
+        <p:nvPicPr>
+          <p:cNvPr id="2" name="Picture 1" descr="filler.jpg"/>
+          <p:cNvPicPr>
+            <a:picLocks noChangeAspect="1"/>
+          </p:cNvPicPr>
+          <p:nvPr/>
+        </p:nvPicPr>
+        <p:blipFill>
+          <a:blip r:embed="rId2"/>
+          <a:stretch>
+            <a:fillRect/>
+          </a:stretch>
+        </p:blipFill>
+        <p:spPr>
+          <a:xfrm>
+            <a:off x="0" y="0"/>
+            <a:ext cx="9144000" cy="6858000"/>
+          </a:xfrm>
+          <a:prstGeom prst="rect">
+            <a:avLst/>
+          </a:prstGeom>
+        </p:spPr>
+      </p:pic>
+    </p:spTree>
+  </p:cSld>
+  <p:clrMapOvr>
+    <a:masterClrMapping/>
+  </p:clrMapOvr>
+</p:sld>
+</file>
+
+<file path=ppt/slides/slide4.xml><?xml version="1.0" encoding="utf-8"?>
+<p:sld xmlns:a="http://schemas.openxmlformats.org/drawingml/2006/main" xmlns:p="http://schemas.openxmlformats.org/presentationml/2006/main" xmlns:r="http://schemas.openxmlformats.org/officeDocument/2006/relationships">
+  <p:cSld>
+    <p:spTree>
+      <p:nvGrpSpPr>
+        <p:cNvPr id="1" name=""/>
+        <p:cNvGrpSpPr/>
+        <p:nvPr/>
+      </p:nvGrpSpPr>
+      <p:grpSpPr/>
+      <p:pic>
+        <p:nvPicPr>
+          <p:cNvPr id="2" name="Picture 1" descr="filler.jpg"/>
+          <p:cNvPicPr>
+            <a:picLocks noChangeAspect="1"/>
+          </p:cNvPicPr>
+          <p:nvPr/>
+        </p:nvPicPr>
+        <p:blipFill>
+          <a:blip r:embed="rId2"/>
+          <a:stretch>
+            <a:fillRect/>
+          </a:stretch>
+        </p:blipFill>
+        <p:spPr>
+          <a:xfrm>
+            <a:off x="0" y="0"/>
+            <a:ext cx="9144000" cy="6858000"/>
+          </a:xfrm>
+          <a:prstGeom prst="rect">
+            <a:avLst/>
+          </a:prstGeom>
+        </p:spPr>
+      </p:pic>
+    </p:spTree>
+  </p:cSld>
+  <p:clrMapOvr>
+    <a:masterClrMapping/>
+  </p:clrMapOvr>
+</p:sld>
+</file>
+
+<file path=ppt/slides/slide5.xml><?xml version="1.0" encoding="utf-8"?>
+<p:sld xmlns:a="http://schemas.openxmlformats.org/drawingml/2006/main" xmlns:p="http://schemas.openxmlformats.org/presentationml/2006/main" xmlns:r="http://schemas.openxmlformats.org/officeDocument/2006/relationships">
+  <p:cSld>
+    <p:spTree>
+      <p:nvGrpSpPr>
+        <p:cNvPr id="1" name=""/>
+        <p:cNvGrpSpPr/>
+        <p:nvPr/>
+      </p:nvGrpSpPr>
+      <p:grpSpPr/>
+      <p:sp>
+        <p:nvSpPr>
+          <p:cNvPr id="2" name="Title 1"/>
+          <p:cNvSpPr>
+            <a:spLocks noGrp="1"/>
+          </p:cNvSpPr>
+          <p:nvPr>
+            <p:ph type="title"/>
+          </p:nvPr>
+        </p:nvSpPr>
+        <p:spPr/>
+        <p:txBody>
+          <a:bodyPr/>
+          <a:lstStyle/>
+          <a:p>
+            <a:r>
+              <a:t>Aao Aao Sai Pyare</a:t>
+            </a:r>
+          </a:p>
+        </p:txBody>
+      </p:sp>
+      <p:sp>
+        <p:nvSpPr>
+          <p:cNvPr id="3" name="TextBox 2"/>
+          <p:cNvSpPr txBox="1"/>
+          <p:nvPr/>
+        </p:nvSpPr>
+        <p:spPr>
+          <a:xfrm>
+            <a:off x="457200" y="1371600"/>
+            <a:ext cx="8229600" cy="5029200"/>
+          </a:xfrm>
+          <a:prstGeom prst="rect">
+            <a:avLst/>
+          </a:prstGeom>
+          <a:noFill/>
+        </p:spPr>
+        <p:txBody>
+          <a:bodyPr wrap="none">
+            <a:normAutofit/>
+          </a:bodyPr>
+          <a:lstStyle/>
+          <a:p/>
+          <a:p>
+            <a:pPr algn="ctr"/>
+            <a:r>
+              <a:rPr sz="2600" b="0">
+                <a:solidFill>
+                  <a:srgbClr val="000000"/>
+                </a:solidFill>
+              </a:rPr>
+              <a:t>Aao Aao Sai Pyare
+Kirtan Karü Maï Sai Thumhare
+Aao Aao Sai Pyare
+Thum Ho Mere Nayanö Ke Tare
+Darshan Do Jivan Ke Sahare (2)</a:t>
+            </a:r>
+          </a:p>
+        </p:txBody>
+      </p:sp>
+      <p:sp>
+        <p:nvSpPr>
+          <p:cNvPr id="4" name="TextBox 3"/>
+          <p:cNvSpPr txBox="1"/>
+          <p:nvPr/>
+        </p:nvSpPr>
+        <p:spPr>
+          <a:xfrm>
+            <a:off x="457200" y="5943600"/>
+            <a:ext cx="914400" cy="685800"/>
+          </a:xfrm>
+          <a:prstGeom prst="rect">
+            <a:avLst/>
+          </a:prstGeom>
+          <a:noFill/>
+        </p:spPr>
+        <p:txBody>
+          <a:bodyPr wrap="none">
+            <a:normAutofit/>
+          </a:bodyPr>
+          <a:lstStyle/>
+          <a:p/>
+          <a:p>
+            <a:pPr algn="ctr"/>
+            <a:r>
+              <a:rPr sz="1600" b="0">
+                <a:solidFill>
+                  <a:srgbClr val="000000"/>
+                </a:solidFill>
+              </a:rPr>
+              <a:t>B</a:t>
+            </a:r>
+          </a:p>
+        </p:txBody>
+      </p:sp>
+      <p:sp>
+        <p:nvSpPr>
+          <p:cNvPr id="5" name="TextBox 4"/>
+          <p:cNvSpPr txBox="1"/>
+          <p:nvPr/>
+        </p:nvSpPr>
+        <p:spPr>
+          <a:xfrm>
+            <a:off x="2286000" y="5943600"/>
+            <a:ext cx="3657600" cy="685800"/>
+          </a:xfrm>
+          <a:prstGeom prst="rect">
+            <a:avLst/>
+          </a:prstGeom>
+          <a:noFill/>
+        </p:spPr>
+        <p:txBody>
+          <a:bodyPr wrap="none">
+            <a:normAutofit/>
+          </a:bodyPr>
+          <a:lstStyle/>
+          <a:p/>
+          <a:p>
+            <a:pPr algn="ctr"/>
+            <a:r>
+              <a:rPr sz="1600" b="0">
+                <a:solidFill>
+                  <a:srgbClr val="000000"/>
+                </a:solidFill>
+              </a:rPr>
+              <a:t>Aao Pyare Nayan Hamare Sai Hamare Aao</a:t>
+            </a:r>
+          </a:p>
+        </p:txBody>
+      </p:sp>
+      <p:sp>
+        <p:nvSpPr>
+          <p:cNvPr id="6" name="TextBox 5"/>
+          <p:cNvSpPr txBox="1"/>
+          <p:nvPr/>
+        </p:nvSpPr>
+        <p:spPr>
+          <a:xfrm>
+            <a:off x="7315200" y="5943600"/>
+            <a:ext cx="914400" cy="685800"/>
+          </a:xfrm>
+          <a:prstGeom prst="rect">
+            <a:avLst/>
+          </a:prstGeom>
+          <a:noFill/>
+        </p:spPr>
+        <p:txBody>
+          <a:bodyPr wrap="none">
+            <a:normAutofit/>
+          </a:bodyPr>
+          <a:lstStyle/>
+          <a:p/>
+          <a:p>
+            <a:pPr algn="ctr"/>
+            <a:r>
+              <a:rPr sz="1600" b="0">
+                <a:solidFill>
+                  <a:srgbClr val="000000"/>
+                </a:solidFill>
+              </a:rPr>
+              <a:t>C</a:t>
+            </a:r>
+          </a:p>
+        </p:txBody>
+      </p:sp>
+    </p:spTree>
+  </p:cSld>
+  <p:clrMapOvr>
+    <a:masterClrMapping/>
+  </p:clrMapOvr>
+</p:sld>
+</file>
+
+<file path=ppt/slides/slide6.xml><?xml version="1.0" encoding="utf-8"?>
+<p:sld xmlns:a="http://schemas.openxmlformats.org/drawingml/2006/main" xmlns:p="http://schemas.openxmlformats.org/presentationml/2006/main" xmlns:r="http://schemas.openxmlformats.org/officeDocument/2006/relationships">
+  <p:cSld>
+    <p:spTree>
+      <p:nvGrpSpPr>
+        <p:cNvPr id="1" name=""/>
+        <p:cNvGrpSpPr/>
+        <p:nvPr/>
+      </p:nvGrpSpPr>
+      <p:grpSpPr/>
+      <p:sp>
+        <p:nvSpPr>
+          <p:cNvPr id="2" name="Title 1"/>
+          <p:cNvSpPr>
+            <a:spLocks noGrp="1"/>
+          </p:cNvSpPr>
+          <p:nvPr>
+            <p:ph type="title"/>
+          </p:nvPr>
+        </p:nvSpPr>
+        <p:spPr/>
+        <p:txBody>
+          <a:bodyPr/>
+          <a:lstStyle/>
+          <a:p>
+            <a:r>
+              <a:t>Aao Pyare Nayan Hamare Sai Hamare Aao</a:t>
+            </a:r>
+          </a:p>
+        </p:txBody>
+      </p:sp>
+      <p:sp>
+        <p:nvSpPr>
+          <p:cNvPr id="3" name="TextBox 2"/>
+          <p:cNvSpPr txBox="1"/>
+          <p:nvPr/>
+        </p:nvSpPr>
+        <p:spPr>
+          <a:xfrm>
+            <a:off x="457200" y="1371600"/>
+            <a:ext cx="8229600" cy="5029200"/>
+          </a:xfrm>
+          <a:prstGeom prst="rect">
+            <a:avLst/>
+          </a:prstGeom>
+          <a:noFill/>
+        </p:spPr>
+        <p:txBody>
+          <a:bodyPr wrap="none">
+            <a:normAutofit/>
+          </a:bodyPr>
+          <a:lstStyle/>
+          <a:p/>
+          <a:p>
+            <a:pPr algn="ctr"/>
+            <a:r>
+              <a:rPr sz="2600" b="0">
+                <a:solidFill>
+                  <a:srgbClr val="000000"/>
+                </a:solidFill>
+              </a:rPr>
+              <a:t>Aao Pyare Nayan Hamare Sai Hamare Aao
+Thum Bin Koi Nahi Rakhvale
+Thum Bin Kaun Sahare (Baba) (2)
+Aao Sai Pyare
+Sai Hamare Aao (3)</a:t>
+            </a:r>
+          </a:p>
+        </p:txBody>
+      </p:sp>
+      <p:sp>
+        <p:nvSpPr>
+          <p:cNvPr id="4" name="TextBox 3"/>
+          <p:cNvSpPr txBox="1"/>
+          <p:nvPr/>
+        </p:nvSpPr>
+        <p:spPr>
+          <a:xfrm>
+            <a:off x="457200" y="5943600"/>
+            <a:ext cx="914400" cy="685800"/>
+          </a:xfrm>
+          <a:prstGeom prst="rect">
+            <a:avLst/>
+          </a:prstGeom>
+          <a:noFill/>
+        </p:spPr>
+        <p:txBody>
+          <a:bodyPr wrap="none">
+            <a:normAutofit/>
+          </a:bodyPr>
+          <a:lstStyle/>
+          <a:p/>
+          <a:p>
+            <a:pPr algn="ctr"/>
+            <a:r>
+              <a:rPr sz="1600" b="0">
+                <a:solidFill>
+                  <a:srgbClr val="000000"/>
+                </a:solidFill>
+              </a:rPr>
+              <a:t>C</a:t>
+            </a:r>
+          </a:p>
+        </p:txBody>
+      </p:sp>
+      <p:sp>
+        <p:nvSpPr>
+          <p:cNvPr id="5" name="TextBox 4"/>
+          <p:cNvSpPr txBox="1"/>
+          <p:nvPr/>
+        </p:nvSpPr>
+        <p:spPr>
+          <a:xfrm>
+            <a:off x="2286000" y="5943600"/>
+            <a:ext cx="3657600" cy="685800"/>
+          </a:xfrm>
+          <a:prstGeom prst="rect">
+            <a:avLst/>
+          </a:prstGeom>
+          <a:noFill/>
+        </p:spPr>
+        <p:txBody>
+          <a:bodyPr wrap="none">
+            <a:normAutofit/>
+          </a:bodyPr>
+          <a:lstStyle/>
+          <a:p/>
+          <a:p>
+            <a:pPr algn="ctr"/>
+            <a:r>
+              <a:rPr sz="1600" b="0">
+                <a:solidFill>
+                  <a:srgbClr val="000000"/>
+                </a:solidFill>
+              </a:rPr>
+              <a:t>Aarti</a:t>
+            </a:r>
+          </a:p>
+        </p:txBody>
+      </p:sp>
+      <p:sp>
+        <p:nvSpPr>
+          <p:cNvPr id="6" name="TextBox 5"/>
+          <p:cNvSpPr txBox="1"/>
+          <p:nvPr/>
+        </p:nvSpPr>
+        <p:spPr>
+          <a:xfrm>
+            <a:off x="7315200" y="5943600"/>
+            <a:ext cx="914400" cy="685800"/>
+          </a:xfrm>
+          <a:prstGeom prst="rect">
+            <a:avLst/>
+          </a:prstGeom>
+          <a:noFill/>
+        </p:spPr>
+        <p:txBody>
+          <a:bodyPr wrap="none">
+            <a:normAutofit/>
+          </a:bodyPr>
+          <a:lstStyle/>
+          <a:p/>
+          <a:p>
+            <a:pPr algn="ctr"/>
+            <a:r>
+              <a:rPr sz="1600" b="0">
+                <a:solidFill>
+                  <a:srgbClr val="000000"/>
+                </a:solidFill>
+              </a:rPr>
+              <a:t>Dd</a:t>
+            </a:r>
+          </a:p>
+        </p:txBody>
+      </p:sp>
+    </p:spTree>
+  </p:cSld>
+  <p:clrMapOvr>
+    <a:masterClrMapping/>
+  </p:clrMapOvr>
+</p:sld>
+</file>
+
+<file path=ppt/slides/slide7.xml><?xml version="1.0" encoding="utf-8"?>
+<p:sld xmlns:a="http://schemas.openxmlformats.org/drawingml/2006/main" xmlns:p="http://schemas.openxmlformats.org/presentationml/2006/main" xmlns:r="http://schemas.openxmlformats.org/officeDocument/2006/relationships">
+  <p:cSld>
+    <p:spTree>
+      <p:nvGrpSpPr>
+        <p:cNvPr id="1" name=""/>
+        <p:cNvGrpSpPr/>
+        <p:nvPr/>
+      </p:nvGrpSpPr>
+      <p:grpSpPr/>
+      <p:sp>
+        <p:nvSpPr>
+          <p:cNvPr id="2" name="Title 1"/>
+          <p:cNvSpPr>
+            <a:spLocks noGrp="1"/>
+          </p:cNvSpPr>
+          <p:nvPr>
+            <p:ph type="title"/>
+          </p:nvPr>
+        </p:nvSpPr>
+        <p:spPr/>
+        <p:txBody>
+          <a:bodyPr/>
+          <a:lstStyle/>
+          <a:p>
+            <a:r>
+              <a:t>Aarti</a:t>
+            </a:r>
+          </a:p>
+        </p:txBody>
+      </p:sp>
+      <p:sp>
+        <p:nvSpPr>
+          <p:cNvPr id="3" name="TextBox 2"/>
+          <p:cNvSpPr txBox="1"/>
+          <p:nvPr/>
+        </p:nvSpPr>
+        <p:spPr>
+          <a:xfrm>
+            <a:off x="457200" y="1371600"/>
+            <a:ext cx="8229600" cy="5029200"/>
+          </a:xfrm>
+          <a:prstGeom prst="rect">
+            <a:avLst/>
+          </a:prstGeom>
+          <a:noFill/>
+        </p:spPr>
+        <p:txBody>
+          <a:bodyPr wrap="none">
+            <a:normAutofit/>
+          </a:bodyPr>
+          <a:lstStyle/>
+          <a:p/>
+          <a:p>
+            <a:pPr algn="ctr"/>
+            <a:r>
+              <a:rPr sz="2600" b="0">
+                <a:solidFill>
+                  <a:srgbClr val="000000"/>
+                </a:solidFill>
+              </a:rPr>
+              <a:t>Om Jai Jagadish Hare Swami Sathya Sai Hare
+Bhaktajana Samrakshaka Bhaktajana Samrakshak
+Parthimaheshwara Om Jai Jagadish Hare
+Shashivadana Shreekara Sarva Pranapathe
+Swami Sarva Pranapathe
+Aashrita Kalpalatheeka
+Aashrita Kalpalatheeka
+Aapathbaandhava
+Om Jai Jagadish Hare
+</a:t>
+            </a:r>
+          </a:p>
+        </p:txBody>
+      </p:sp>
+      <p:sp>
+        <p:nvSpPr>
+          <p:cNvPr id="4" name="TextBox 3"/>
+          <p:cNvSpPr txBox="1"/>
+          <p:nvPr/>
+        </p:nvSpPr>
+        <p:spPr>
+          <a:xfrm>
+            <a:off x="457200" y="5943600"/>
+            <a:ext cx="914400" cy="685800"/>
+          </a:xfrm>
+          <a:prstGeom prst="rect">
+            <a:avLst/>
+          </a:prstGeom>
+          <a:noFill/>
+        </p:spPr>
+        <p:txBody>
+          <a:bodyPr wrap="none">
+            <a:normAutofit/>
+          </a:bodyPr>
+          <a:lstStyle/>
+          <a:p/>
+          <a:p>
+            <a:pPr algn="ctr"/>
+            <a:r>
+              <a:rPr sz="1600" b="0">
+                <a:solidFill>
+                  <a:srgbClr val="000000"/>
+                </a:solidFill>
+              </a:rPr>
+              <a:t>Dd</a:t>
+            </a:r>
+          </a:p>
+        </p:txBody>
+      </p:sp>
+      <p:sp>
+        <p:nvSpPr>
+          <p:cNvPr id="5" name="TextBox 4"/>
+          <p:cNvSpPr txBox="1"/>
+          <p:nvPr/>
+        </p:nvSpPr>
+        <p:spPr>
+          <a:xfrm>
+            <a:off x="2286000" y="5943600"/>
+            <a:ext cx="3657600" cy="685800"/>
+          </a:xfrm>
+          <a:prstGeom prst="rect">
+            <a:avLst/>
+          </a:prstGeom>
+          <a:noFill/>
+        </p:spPr>
+        <p:txBody>
+          <a:bodyPr wrap="none">
+            <a:normAutofit/>
+          </a:bodyPr>
+          <a:lstStyle/>
+          <a:p/>
+          <a:p>
+            <a:pPr algn="ctr"/>
+            <a:r>
+              <a:rPr sz="1600" b="0">
+                <a:solidFill>
+                  <a:srgbClr val="000000"/>
+                </a:solidFill>
+              </a:rPr>
+              <a:t>Continued</a:t>
+            </a:r>
+          </a:p>
+        </p:txBody>
+      </p:sp>
+      <p:sp>
+        <p:nvSpPr>
+          <p:cNvPr id="6" name="TextBox 5"/>
+          <p:cNvSpPr txBox="1"/>
+          <p:nvPr/>
+        </p:nvSpPr>
+        <p:spPr>
+          <a:xfrm>
+            <a:off x="7315200" y="5943600"/>
+            <a:ext cx="914400" cy="685800"/>
+          </a:xfrm>
+          <a:prstGeom prst="rect">
+            <a:avLst/>
+          </a:prstGeom>
+          <a:noFill/>
+        </p:spPr>
+        <p:txBody>
+          <a:bodyPr wrap="none">
+            <a:normAutofit/>
+          </a:bodyPr>
+          <a:lstStyle/>
+          <a:p/>
+          <a:p>
+            <a:pPr algn="ctr"/>
+            <a:r>
+              <a:rPr sz="1600" b="0">
+                <a:solidFill>
+                  <a:srgbClr val="000000"/>
+                </a:solidFill>
+              </a:rPr>
+              <a:t/>
+            </a:r>
+          </a:p>
+        </p:txBody>
+      </p:sp>
+    </p:spTree>
+  </p:cSld>
+  <p:clrMapOvr>
+    <a:masterClrMapping/>
+  </p:clrMapOvr>
+</p:sld>
+</file>
+
+<file path=ppt/slides/slide8.xml><?xml version="1.0" encoding="utf-8"?>
+<p:sld xmlns:a="http://schemas.openxmlformats.org/drawingml/2006/main" xmlns:p="http://schemas.openxmlformats.org/presentationml/2006/main" xmlns:r="http://schemas.openxmlformats.org/officeDocument/2006/relationships">
+  <p:cSld>
+    <p:spTree>
+      <p:nvGrpSpPr>
+        <p:cNvPr id="1" name=""/>
+        <p:cNvGrpSpPr/>
+        <p:nvPr/>
+      </p:nvGrpSpPr>
+      <p:grpSpPr/>
+      <p:sp>
+        <p:nvSpPr>
+          <p:cNvPr id="2" name="Title 1"/>
+          <p:cNvSpPr>
+            <a:spLocks noGrp="1"/>
+          </p:cNvSpPr>
+          <p:nvPr>
+            <p:ph type="title"/>
+          </p:nvPr>
+        </p:nvSpPr>
+        <p:spPr/>
+        <p:txBody>
+          <a:bodyPr/>
+          <a:lstStyle/>
+          <a:p>
+            <a:r>
+              <a:t>Aarti</a:t>
+            </a:r>
+          </a:p>
+        </p:txBody>
+      </p:sp>
+      <p:sp>
+        <p:nvSpPr>
+          <p:cNvPr id="3" name="TextBox 2"/>
+          <p:cNvSpPr txBox="1"/>
+          <p:nvPr/>
+        </p:nvSpPr>
+        <p:spPr>
+          <a:xfrm>
+            <a:off x="457200" y="1371600"/>
+            <a:ext cx="8229600" cy="5029200"/>
+          </a:xfrm>
+          <a:prstGeom prst="rect">
+            <a:avLst/>
+          </a:prstGeom>
+          <a:noFill/>
+        </p:spPr>
+        <p:txBody>
+          <a:bodyPr wrap="none">
+            <a:normAutofit/>
+          </a:bodyPr>
+          <a:lstStyle/>
+          <a:p/>
+          <a:p>
+            <a:pPr algn="ctr"/>
+            <a:r>
+              <a:rPr sz="2600" b="0">
+                <a:solidFill>
+                  <a:srgbClr val="000000"/>
+                </a:solidFill>
+              </a:rPr>
+              <a:t>Mata Pita Guru Daivamu Mariyanthayu Neeve
+Swami Mariyanthayu Neeve
+Nadabrahma Jagannatha
+Nadabrahma Jagannatha
+Nagendrashayana
+Om Jai Jagadish Hare
+Omkara Rupa Om Jai Shiva Sai Mahadeva
+Sathya Sai Mahadeva
+Mangala Aarti Anduko
+Mangala Aarti Anduko</a:t>
+            </a:r>
+          </a:p>
+        </p:txBody>
+      </p:sp>
+      <p:sp>
+        <p:nvSpPr>
+          <p:cNvPr id="4" name="TextBox 3"/>
+          <p:cNvSpPr txBox="1"/>
+          <p:nvPr/>
+        </p:nvSpPr>
+        <p:spPr>
+          <a:xfrm>
+            <a:off x="457200" y="5943600"/>
+            <a:ext cx="914400" cy="685800"/>
+          </a:xfrm>
+          <a:prstGeom prst="rect">
+            <a:avLst/>
+          </a:prstGeom>
+          <a:noFill/>
+        </p:spPr>
+        <p:txBody>
+          <a:bodyPr wrap="none">
+            <a:normAutofit/>
+          </a:bodyPr>
+          <a:lstStyle/>
+          <a:p/>
+          <a:p>
+            <a:pPr algn="ctr"/>
+            <a:r>
+              <a:rPr sz="1600" b="0">
+                <a:solidFill>
+                  <a:srgbClr val="000000"/>
+                </a:solidFill>
+              </a:rPr>
+              <a:t>Dd</a:t>
+            </a:r>
+          </a:p>
+        </p:txBody>
+      </p:sp>
+      <p:sp>
+        <p:nvSpPr>
+          <p:cNvPr id="5" name="TextBox 4"/>
+          <p:cNvSpPr txBox="1"/>
+          <p:nvPr/>
+        </p:nvSpPr>
+        <p:spPr>
+          <a:xfrm>
+            <a:off x="2286000" y="5943600"/>
+            <a:ext cx="3657600" cy="685800"/>
+          </a:xfrm>
+          <a:prstGeom prst="rect">
+            <a:avLst/>
+          </a:prstGeom>
+          <a:noFill/>
+        </p:spPr>
+        <p:txBody>
+          <a:bodyPr wrap="none">
+            <a:normAutofit/>
+          </a:bodyPr>
+          <a:lstStyle/>
+          <a:p/>
+          <a:p>
+            <a:pPr algn="ctr"/>
+            <a:r>
+              <a:rPr sz="1600" b="0">
+                <a:solidFill>
+                  <a:srgbClr val="000000"/>
+                </a:solidFill>
+              </a:rPr>
+              <a:t>Continued</a:t>
+            </a:r>
+          </a:p>
+        </p:txBody>
+      </p:sp>
+      <p:sp>
+        <p:nvSpPr>
+          <p:cNvPr id="6" name="TextBox 5"/>
+          <p:cNvSpPr txBox="1"/>
+          <p:nvPr/>
+        </p:nvSpPr>
+        <p:spPr>
+          <a:xfrm>
+            <a:off x="7315200" y="5943600"/>
+            <a:ext cx="914400" cy="685800"/>
+          </a:xfrm>
+          <a:prstGeom prst="rect">
+            <a:avLst/>
+          </a:prstGeom>
+          <a:noFill/>
+        </p:spPr>
+        <p:txBody>
+          <a:bodyPr wrap="none">
+            <a:normAutofit/>
+          </a:bodyPr>
+          <a:lstStyle/>
+          <a:p/>
+          <a:p>
+            <a:pPr algn="ctr"/>
+            <a:r>
+              <a:rPr sz="1600" b="0">
+                <a:solidFill>
+                  <a:srgbClr val="000000"/>
+                </a:solidFill>
+              </a:rPr>
+              <a:t/>
+            </a:r>
+          </a:p>
+        </p:txBody>
+      </p:sp>
+    </p:spTree>
+  </p:cSld>
+  <p:clrMapOvr>
+    <a:masterClrMapping/>
+  </p:clrMapOvr>
+</p:sld>
+</file>
+
+<file path=ppt/slides/slide9.xml><?xml version="1.0" encoding="utf-8"?>
+<p:sld xmlns:a="http://schemas.openxmlformats.org/drawingml/2006/main" xmlns:p="http://schemas.openxmlformats.org/presentationml/2006/main" xmlns:r="http://schemas.openxmlformats.org/officeDocument/2006/relationships">
+  <p:cSld>
+    <p:spTree>
+      <p:nvGrpSpPr>
+        <p:cNvPr id="1" name=""/>
+        <p:cNvGrpSpPr/>
+        <p:nvPr/>
+      </p:nvGrpSpPr>
+      <p:grpSpPr/>
+      <p:sp>
+        <p:nvSpPr>
+          <p:cNvPr id="2" name="Title 1"/>
+          <p:cNvSpPr>
+            <a:spLocks noGrp="1"/>
+          </p:cNvSpPr>
+          <p:nvPr>
+            <p:ph type="title"/>
+          </p:nvPr>
+        </p:nvSpPr>
+        <p:spPr/>
+        <p:txBody>
+          <a:bodyPr/>
+          <a:lstStyle/>
+          <a:p>
+            <a:r>
+              <a:t>Aarti</a:t>
+            </a:r>
+          </a:p>
+        </p:txBody>
+      </p:sp>
+      <p:sp>
+        <p:nvSpPr>
+          <p:cNvPr id="3" name="TextBox 2"/>
+          <p:cNvSpPr txBox="1"/>
+          <p:nvPr/>
+        </p:nvSpPr>
+        <p:spPr>
+          <a:xfrm>
+            <a:off x="457200" y="1371600"/>
+            <a:ext cx="8229600" cy="5029200"/>
+          </a:xfrm>
+          <a:prstGeom prst="rect">
+            <a:avLst/>
+          </a:prstGeom>
+          <a:noFill/>
+        </p:spPr>
+        <p:txBody>
+          <a:bodyPr wrap="none">
+            <a:normAutofit/>
+          </a:bodyPr>
+          <a:lstStyle/>
+          <a:p/>
+          <a:p>
+            <a:pPr algn="ctr"/>
+            <a:r>
+              <a:rPr sz="2600" b="0">
+                <a:solidFill>
+                  <a:srgbClr val="000000"/>
+                </a:solidFill>
+              </a:rPr>
+              <a:t>Mandaragiridhari
+Om Jai Jagadish Hare
+Narayana Narayana Om Sathya
+Narayana Narayana Narayana Om
+Narayana Narayana Om Sathya
+Narayana Narayana Om Sathya
+Om Jai Satguru Deva</a:t>
+            </a:r>
+          </a:p>
+        </p:txBody>
+      </p:sp>
+      <p:sp>
+        <p:nvSpPr>
+          <p:cNvPr id="4" name="TextBox 3"/>
+          <p:cNvSpPr txBox="1"/>
+          <p:nvPr/>
+        </p:nvSpPr>
+        <p:spPr>
+          <a:xfrm>
+            <a:off x="457200" y="5943600"/>
+            <a:ext cx="914400" cy="685800"/>
+          </a:xfrm>
+          <a:prstGeom prst="rect">
+            <a:avLst/>
+          </a:prstGeom>
+          <a:noFill/>
+        </p:spPr>
+        <p:txBody>
+          <a:bodyPr wrap="none">
+            <a:normAutofit/>
+          </a:bodyPr>
+          <a:lstStyle/>
+          <a:p/>
+          <a:p>
+            <a:pPr algn="ctr"/>
+            <a:r>
+              <a:rPr sz="1600" b="0">
+                <a:solidFill>
+                  <a:srgbClr val="000000"/>
+                </a:solidFill>
+              </a:rPr>
+              <a:t>Dd</a:t>
+            </a:r>
+          </a:p>
+        </p:txBody>
+      </p:sp>
+      <p:sp>
+        <p:nvSpPr>
+          <p:cNvPr id="5" name="TextBox 4"/>
+          <p:cNvSpPr txBox="1"/>
+          <p:nvPr/>
+        </p:nvSpPr>
+        <p:spPr>
+          <a:xfrm>
+            <a:off x="2286000" y="5943600"/>
+            <a:ext cx="3657600" cy="685800"/>
+          </a:xfrm>
+          <a:prstGeom prst="rect">
+            <a:avLst/>
+          </a:prstGeom>
+          <a:noFill/>
+        </p:spPr>
+        <p:txBody>
+          <a:bodyPr wrap="none">
+            <a:normAutofit/>
+          </a:bodyPr>
+          <a:lstStyle/>
+          <a:p/>
+          <a:p>
+            <a:pPr algn="ctr"/>
+            <a:r>
+              <a:rPr sz="1600" b="0">
+                <a:solidFill>
+                  <a:srgbClr val="000000"/>
+                </a:solidFill>
+              </a:rPr>
+              <a:t>Vibhuti Mantra</a:t>
+            </a:r>
+          </a:p>
+        </p:txBody>
+      </p:sp>
+      <p:sp>
+        <p:nvSpPr>
+          <p:cNvPr id="6" name="TextBox 5"/>
+          <p:cNvSpPr txBox="1"/>
+          <p:nvPr/>
+        </p:nvSpPr>
+        <p:spPr>
+          <a:xfrm>
+            <a:off x="7315200" y="5943600"/>
+            <a:ext cx="914400" cy="685800"/>
+          </a:xfrm>
+          <a:prstGeom prst="rect">
+            <a:avLst/>
+          </a:prstGeom>
+          <a:noFill/>
+        </p:spPr>
+        <p:txBody>
+          <a:bodyPr wrap="none">
+            <a:normAutofit/>
+          </a:bodyPr>
+          <a:lstStyle/>
+          <a:p/>
+          <a:p>
+            <a:pPr algn="ctr"/>
+            <a:r>
+              <a:rPr sz="1600" b="0">
+                <a:solidFill>
+                  <a:srgbClr val="000000"/>
+                </a:solidFill>
+              </a:rPr>
+              <a:t>E</a:t>
             </a:r>
           </a:p>
         </p:txBody>

</xml_diff>

<commit_message>
Support for user defined page breaks. Randomly selected backgrounds for slides.
</commit_message>
<xml_diff>
--- a/generated_ppts/bhajans.pptx
+++ b/generated_ppts/bhajans.pptx
@@ -15,6 +15,13 @@
     <p:sldId r:id="rId14" id="263"/>
     <p:sldId r:id="rId15" id="264"/>
     <p:sldId r:id="rId16" id="265"/>
+    <p:sldId r:id="rId17" id="266"/>
+    <p:sldId r:id="rId18" id="267"/>
+    <p:sldId r:id="rId19" id="268"/>
+    <p:sldId r:id="rId20" id="269"/>
+    <p:sldId r:id="rId21" id="270"/>
+    <p:sldId r:id="rId22" id="271"/>
+    <p:sldId r:id="rId23" id="272"/>
   </p:sldIdLst>
   <p:sldSz cx="9144000" cy="6858000" type="screen4x3"/>
   <p:notesSz cx="6858000" cy="9144000"/>
@@ -3161,7 +3168,7 @@
                   <a:srgbClr val="FFFF0F"/>
                 </a:solidFill>
               </a:rPr>
-              <a:t>August 21, 2016</a:t>
+              <a:t>September 11, 2016</a:t>
             </a:r>
           </a:p>
         </p:txBody>
@@ -3184,27 +3191,30 @@
         <p:nvPr/>
       </p:nvGrpSpPr>
       <p:grpSpPr/>
-      <p:sp>
-        <p:nvSpPr>
-          <p:cNvPr id="2" name="Title 1"/>
-          <p:cNvSpPr>
-            <a:spLocks noGrp="1"/>
-          </p:cNvSpPr>
-          <p:nvPr>
-            <p:ph type="title"/>
-          </p:nvPr>
-        </p:nvSpPr>
-        <p:spPr/>
-        <p:txBody>
-          <a:bodyPr/>
-          <a:lstStyle/>
-          <a:p>
-            <a:r>
-              <a:t>Vibhuti Mantra</a:t>
-            </a:r>
-          </a:p>
-        </p:txBody>
-      </p:sp>
+      <p:pic>
+        <p:nvPicPr>
+          <p:cNvPr id="2" name="Picture 1" descr="image1.gif"/>
+          <p:cNvPicPr>
+            <a:picLocks noChangeAspect="1"/>
+          </p:cNvPicPr>
+          <p:nvPr/>
+        </p:nvPicPr>
+        <p:blipFill>
+          <a:blip r:embed="rId2"/>
+          <a:stretch>
+            <a:fillRect/>
+          </a:stretch>
+        </p:blipFill>
+        <p:spPr>
+          <a:xfrm>
+            <a:off x="0" y="0"/>
+            <a:ext cx="9144000" cy="6858000"/>
+          </a:xfrm>
+          <a:prstGeom prst="rect">
+            <a:avLst/>
+          </a:prstGeom>
+        </p:spPr>
+      </p:pic>
       <p:sp>
         <p:nvSpPr>
           <p:cNvPr id="3" name="TextBox 2"/>
@@ -3213,7 +3223,42 @@
         </p:nvSpPr>
         <p:spPr>
           <a:xfrm>
-            <a:off x="457200" y="1371600"/>
+            <a:off x="457200" y="228600"/>
+            <a:ext cx="8229600" cy="914400"/>
+          </a:xfrm>
+          <a:prstGeom prst="rect">
+            <a:avLst/>
+          </a:prstGeom>
+          <a:noFill/>
+        </p:spPr>
+        <p:txBody>
+          <a:bodyPr wrap="none">
+            <a:normAutofit/>
+          </a:bodyPr>
+          <a:lstStyle/>
+          <a:p/>
+          <a:p>
+            <a:pPr algn="ctr"/>
+            <a:r>
+              <a:rPr sz="3600" b="0">
+                <a:solidFill>
+                  <a:srgbClr val="FFFFFF"/>
+                </a:solidFill>
+              </a:rPr>
+              <a:t>Madhurashtakam</a:t>
+            </a:r>
+          </a:p>
+        </p:txBody>
+      </p:sp>
+      <p:sp>
+        <p:nvSpPr>
+          <p:cNvPr id="4" name="TextBox 3"/>
+          <p:cNvSpPr txBox="1"/>
+          <p:nvPr/>
+        </p:nvSpPr>
+        <p:spPr>
+          <a:xfrm>
+            <a:off x="457200" y="1143000"/>
             <a:ext cx="8229600" cy="5029200"/>
           </a:xfrm>
           <a:prstGeom prst="rect">
@@ -3230,27 +3275,22 @@
           <a:p>
             <a:pPr algn="ctr"/>
             <a:r>
-              <a:rPr sz="2600" b="0">
-                <a:solidFill>
-                  <a:srgbClr val="000000"/>
-                </a:solidFill>
-              </a:rPr>
-              <a:t>Paramam Pavithram Baba Vibhuthim
-Paramam Vichitram Leela Vibhuthim
-Paramartha Ishtartha Moksha Pradhanam
-Baba Vibhuthim Idam Asrayami
-Sacred Holy and Supreme is Baba's Vibhuthi
- Pouring Forth in brilliant stream, this play of
-Vibhuthi
-So auspicious is its might, it grants liberation
-Baba's Vibhuthi, its power protects me</a:t>
-            </a:r>
-          </a:p>
-        </p:txBody>
-      </p:sp>
-      <p:sp>
-        <p:nvSpPr>
-          <p:cNvPr id="4" name="TextBox 3"/>
+              <a:rPr sz="3200" b="0">
+                <a:solidFill>
+                  <a:srgbClr val="FFFFFF"/>
+                </a:solidFill>
+              </a:rPr>
+              <a:t>Gopii Madhuraa Liilaa Madhuraa 
+Yuktam Madhuram Muktam Madhuram |
+Drssttam Madhuram Shissttam Madhuram 
+Madhura-Adhipaterakhilam Madhuram ||1||</a:t>
+            </a:r>
+          </a:p>
+        </p:txBody>
+      </p:sp>
+      <p:sp>
+        <p:nvSpPr>
+          <p:cNvPr id="5" name="TextBox 4"/>
           <p:cNvSpPr txBox="1"/>
           <p:nvPr/>
         </p:nvSpPr>
@@ -3271,21 +3311,21 @@
           <a:lstStyle/>
           <a:p/>
           <a:p>
-            <a:pPr algn="ctr"/>
+            <a:pPr algn="l"/>
             <a:r>
               <a:rPr sz="1600" b="0">
                 <a:solidFill>
-                  <a:srgbClr val="000000"/>
-                </a:solidFill>
-              </a:rPr>
-              <a:t>E</a:t>
-            </a:r>
-          </a:p>
-        </p:txBody>
-      </p:sp>
-      <p:sp>
-        <p:nvSpPr>
-          <p:cNvPr id="5" name="TextBox 4"/>
+                  <a:srgbClr val="FFFFFF"/>
+                </a:solidFill>
+              </a:rPr>
+              <a:t>B</a:t>
+            </a:r>
+          </a:p>
+        </p:txBody>
+      </p:sp>
+      <p:sp>
+        <p:nvSpPr>
+          <p:cNvPr id="6" name="TextBox 5"/>
           <p:cNvSpPr txBox="1"/>
           <p:nvPr/>
         </p:nvSpPr>
@@ -3310,17 +3350,17 @@
             <a:r>
               <a:rPr sz="1600" b="0">
                 <a:solidFill>
-                  <a:srgbClr val="000000"/>
-                </a:solidFill>
-              </a:rPr>
-              <a:t/>
-            </a:r>
-          </a:p>
-        </p:txBody>
-      </p:sp>
-      <p:sp>
-        <p:nvSpPr>
-          <p:cNvPr id="6" name="TextBox 5"/>
+                  <a:srgbClr val="FFFFFF"/>
+                </a:solidFill>
+              </a:rPr>
+              <a:t>Continued</a:t>
+            </a:r>
+          </a:p>
+        </p:txBody>
+      </p:sp>
+      <p:sp>
+        <p:nvSpPr>
+          <p:cNvPr id="7" name="TextBox 6"/>
           <p:cNvSpPr txBox="1"/>
           <p:nvPr/>
         </p:nvSpPr>
@@ -3341,11 +3381,1383 @@
           <a:lstStyle/>
           <a:p/>
           <a:p>
+            <a:pPr algn="r"/>
+            <a:r>
+              <a:rPr sz="1600" b="0">
+                <a:solidFill>
+                  <a:srgbClr val="FFFFFF"/>
+                </a:solidFill>
+              </a:rPr>
+              <a:t/>
+            </a:r>
+          </a:p>
+        </p:txBody>
+      </p:sp>
+    </p:spTree>
+  </p:cSld>
+  <p:clrMapOvr>
+    <a:masterClrMapping/>
+  </p:clrMapOvr>
+</p:sld>
+</file>
+
+<file path=ppt/slides/slide11.xml><?xml version="1.0" encoding="utf-8"?>
+<p:sld xmlns:a="http://schemas.openxmlformats.org/drawingml/2006/main" xmlns:p="http://schemas.openxmlformats.org/presentationml/2006/main" xmlns:r="http://schemas.openxmlformats.org/officeDocument/2006/relationships">
+  <p:cSld>
+    <p:spTree>
+      <p:nvGrpSpPr>
+        <p:cNvPr id="1" name=""/>
+        <p:cNvGrpSpPr/>
+        <p:nvPr/>
+      </p:nvGrpSpPr>
+      <p:grpSpPr/>
+      <p:pic>
+        <p:nvPicPr>
+          <p:cNvPr id="2" name="Picture 1" descr="image1.gif"/>
+          <p:cNvPicPr>
+            <a:picLocks noChangeAspect="1"/>
+          </p:cNvPicPr>
+          <p:nvPr/>
+        </p:nvPicPr>
+        <p:blipFill>
+          <a:blip r:embed="rId2"/>
+          <a:stretch>
+            <a:fillRect/>
+          </a:stretch>
+        </p:blipFill>
+        <p:spPr>
+          <a:xfrm>
+            <a:off x="0" y="0"/>
+            <a:ext cx="9144000" cy="6858000"/>
+          </a:xfrm>
+          <a:prstGeom prst="rect">
+            <a:avLst/>
+          </a:prstGeom>
+        </p:spPr>
+      </p:pic>
+      <p:sp>
+        <p:nvSpPr>
+          <p:cNvPr id="3" name="TextBox 2"/>
+          <p:cNvSpPr txBox="1"/>
+          <p:nvPr/>
+        </p:nvSpPr>
+        <p:spPr>
+          <a:xfrm>
+            <a:off x="457200" y="228600"/>
+            <a:ext cx="8229600" cy="914400"/>
+          </a:xfrm>
+          <a:prstGeom prst="rect">
+            <a:avLst/>
+          </a:prstGeom>
+          <a:noFill/>
+        </p:spPr>
+        <p:txBody>
+          <a:bodyPr wrap="none">
+            <a:normAutofit/>
+          </a:bodyPr>
+          <a:lstStyle/>
+          <a:p/>
+          <a:p>
             <a:pPr algn="ctr"/>
             <a:r>
+              <a:rPr sz="3600" b="0">
+                <a:solidFill>
+                  <a:srgbClr val="FFFFFF"/>
+                </a:solidFill>
+              </a:rPr>
+              <a:t>Madhurashtakam</a:t>
+            </a:r>
+          </a:p>
+        </p:txBody>
+      </p:sp>
+      <p:sp>
+        <p:nvSpPr>
+          <p:cNvPr id="4" name="TextBox 3"/>
+          <p:cNvSpPr txBox="1"/>
+          <p:nvPr/>
+        </p:nvSpPr>
+        <p:spPr>
+          <a:xfrm>
+            <a:off x="457200" y="1143000"/>
+            <a:ext cx="8229600" cy="5029200"/>
+          </a:xfrm>
+          <a:prstGeom prst="rect">
+            <a:avLst/>
+          </a:prstGeom>
+          <a:noFill/>
+        </p:spPr>
+        <p:txBody>
+          <a:bodyPr wrap="none">
+            <a:normAutofit/>
+          </a:bodyPr>
+          <a:lstStyle/>
+          <a:p/>
+          <a:p>
+            <a:pPr algn="ctr"/>
+            <a:r>
+              <a:rPr sz="3200" b="0">
+                <a:solidFill>
+                  <a:srgbClr val="FFFFFF"/>
+                </a:solidFill>
+              </a:rPr>
+              <a:t>Gopaa Madhuraa Gaavo Madhuraa 
+Yassttir-Madhuraa Srssttir-Madhuraa |
+Dalitam Madhuram Phalitam Madhuram 
+Madhura-Adhipaterakhilam Madhuram ||4||</a:t>
+            </a:r>
+          </a:p>
+        </p:txBody>
+      </p:sp>
+      <p:sp>
+        <p:nvSpPr>
+          <p:cNvPr id="5" name="TextBox 4"/>
+          <p:cNvSpPr txBox="1"/>
+          <p:nvPr/>
+        </p:nvSpPr>
+        <p:spPr>
+          <a:xfrm>
+            <a:off x="457200" y="5943600"/>
+            <a:ext cx="914400" cy="685800"/>
+          </a:xfrm>
+          <a:prstGeom prst="rect">
+            <a:avLst/>
+          </a:prstGeom>
+          <a:noFill/>
+        </p:spPr>
+        <p:txBody>
+          <a:bodyPr wrap="none">
+            <a:normAutofit/>
+          </a:bodyPr>
+          <a:lstStyle/>
+          <a:p/>
+          <a:p>
+            <a:pPr algn="l"/>
+            <a:r>
               <a:rPr sz="1600" b="0">
                 <a:solidFill>
-                  <a:srgbClr val="000000"/>
+                  <a:srgbClr val="FFFFFF"/>
+                </a:solidFill>
+              </a:rPr>
+              <a:t>B</a:t>
+            </a:r>
+          </a:p>
+        </p:txBody>
+      </p:sp>
+      <p:sp>
+        <p:nvSpPr>
+          <p:cNvPr id="6" name="TextBox 5"/>
+          <p:cNvSpPr txBox="1"/>
+          <p:nvPr/>
+        </p:nvSpPr>
+        <p:spPr>
+          <a:xfrm>
+            <a:off x="2286000" y="5943600"/>
+            <a:ext cx="3657600" cy="685800"/>
+          </a:xfrm>
+          <a:prstGeom prst="rect">
+            <a:avLst/>
+          </a:prstGeom>
+          <a:noFill/>
+        </p:spPr>
+        <p:txBody>
+          <a:bodyPr wrap="none">
+            <a:normAutofit/>
+          </a:bodyPr>
+          <a:lstStyle/>
+          <a:p/>
+          <a:p>
+            <a:pPr algn="ctr"/>
+            <a:r>
+              <a:rPr sz="1600" b="0">
+                <a:solidFill>
+                  <a:srgbClr val="FFFFFF"/>
+                </a:solidFill>
+              </a:rPr>
+              <a:t/>
+            </a:r>
+          </a:p>
+        </p:txBody>
+      </p:sp>
+      <p:sp>
+        <p:nvSpPr>
+          <p:cNvPr id="7" name="TextBox 6"/>
+          <p:cNvSpPr txBox="1"/>
+          <p:nvPr/>
+        </p:nvSpPr>
+        <p:spPr>
+          <a:xfrm>
+            <a:off x="7315200" y="5943600"/>
+            <a:ext cx="914400" cy="685800"/>
+          </a:xfrm>
+          <a:prstGeom prst="rect">
+            <a:avLst/>
+          </a:prstGeom>
+          <a:noFill/>
+        </p:spPr>
+        <p:txBody>
+          <a:bodyPr wrap="none">
+            <a:normAutofit/>
+          </a:bodyPr>
+          <a:lstStyle/>
+          <a:p/>
+          <a:p>
+            <a:pPr algn="r"/>
+            <a:r>
+              <a:rPr sz="1600" b="0">
+                <a:solidFill>
+                  <a:srgbClr val="FFFFFF"/>
+                </a:solidFill>
+              </a:rPr>
+              <a:t/>
+            </a:r>
+          </a:p>
+        </p:txBody>
+      </p:sp>
+    </p:spTree>
+  </p:cSld>
+  <p:clrMapOvr>
+    <a:masterClrMapping/>
+  </p:clrMapOvr>
+</p:sld>
+</file>
+
+<file path=ppt/slides/slide12.xml><?xml version="1.0" encoding="utf-8"?>
+<p:sld xmlns:a="http://schemas.openxmlformats.org/drawingml/2006/main" xmlns:p="http://schemas.openxmlformats.org/presentationml/2006/main" xmlns:r="http://schemas.openxmlformats.org/officeDocument/2006/relationships">
+  <p:cSld>
+    <p:spTree>
+      <p:nvGrpSpPr>
+        <p:cNvPr id="1" name=""/>
+        <p:cNvGrpSpPr/>
+        <p:nvPr/>
+      </p:nvGrpSpPr>
+      <p:grpSpPr/>
+      <p:pic>
+        <p:nvPicPr>
+          <p:cNvPr id="2" name="Picture 1" descr="title_slide.jpg"/>
+          <p:cNvPicPr>
+            <a:picLocks noChangeAspect="1"/>
+          </p:cNvPicPr>
+          <p:nvPr/>
+        </p:nvPicPr>
+        <p:blipFill>
+          <a:blip r:embed="rId2"/>
+          <a:stretch>
+            <a:fillRect/>
+          </a:stretch>
+        </p:blipFill>
+        <p:spPr>
+          <a:xfrm>
+            <a:off x="0" y="0"/>
+            <a:ext cx="9144000" cy="6858000"/>
+          </a:xfrm>
+          <a:prstGeom prst="rect">
+            <a:avLst/>
+          </a:prstGeom>
+        </p:spPr>
+      </p:pic>
+    </p:spTree>
+  </p:cSld>
+  <p:clrMapOvr>
+    <a:masterClrMapping/>
+  </p:clrMapOvr>
+</p:sld>
+</file>
+
+<file path=ppt/slides/slide13.xml><?xml version="1.0" encoding="utf-8"?>
+<p:sld xmlns:a="http://schemas.openxmlformats.org/drawingml/2006/main" xmlns:p="http://schemas.openxmlformats.org/presentationml/2006/main" xmlns:r="http://schemas.openxmlformats.org/officeDocument/2006/relationships">
+  <p:cSld>
+    <p:spTree>
+      <p:nvGrpSpPr>
+        <p:cNvPr id="1" name=""/>
+        <p:cNvGrpSpPr/>
+        <p:nvPr/>
+      </p:nvGrpSpPr>
+      <p:grpSpPr/>
+      <p:pic>
+        <p:nvPicPr>
+          <p:cNvPr id="2" name="Picture 1" descr="image1.gif"/>
+          <p:cNvPicPr>
+            <a:picLocks noChangeAspect="1"/>
+          </p:cNvPicPr>
+          <p:nvPr/>
+        </p:nvPicPr>
+        <p:blipFill>
+          <a:blip r:embed="rId2"/>
+          <a:stretch>
+            <a:fillRect/>
+          </a:stretch>
+        </p:blipFill>
+        <p:spPr>
+          <a:xfrm>
+            <a:off x="0" y="0"/>
+            <a:ext cx="9144000" cy="6858000"/>
+          </a:xfrm>
+          <a:prstGeom prst="rect">
+            <a:avLst/>
+          </a:prstGeom>
+        </p:spPr>
+      </p:pic>
+      <p:sp>
+        <p:nvSpPr>
+          <p:cNvPr id="3" name="TextBox 2"/>
+          <p:cNvSpPr txBox="1"/>
+          <p:nvPr/>
+        </p:nvSpPr>
+        <p:spPr>
+          <a:xfrm>
+            <a:off x="457200" y="228600"/>
+            <a:ext cx="8229600" cy="914400"/>
+          </a:xfrm>
+          <a:prstGeom prst="rect">
+            <a:avLst/>
+          </a:prstGeom>
+          <a:noFill/>
+        </p:spPr>
+        <p:txBody>
+          <a:bodyPr wrap="none">
+            <a:normAutofit/>
+          </a:bodyPr>
+          <a:lstStyle/>
+          <a:p/>
+          <a:p>
+            <a:pPr algn="ctr"/>
+            <a:r>
+              <a:rPr sz="3600" b="0">
+                <a:solidFill>
+                  <a:srgbClr val="FFFFFF"/>
+                </a:solidFill>
+              </a:rPr>
+              <a:t>Aarti</a:t>
+            </a:r>
+          </a:p>
+        </p:txBody>
+      </p:sp>
+      <p:sp>
+        <p:nvSpPr>
+          <p:cNvPr id="4" name="TextBox 3"/>
+          <p:cNvSpPr txBox="1"/>
+          <p:nvPr/>
+        </p:nvSpPr>
+        <p:spPr>
+          <a:xfrm>
+            <a:off x="457200" y="1143000"/>
+            <a:ext cx="8229600" cy="5029200"/>
+          </a:xfrm>
+          <a:prstGeom prst="rect">
+            <a:avLst/>
+          </a:prstGeom>
+          <a:noFill/>
+        </p:spPr>
+        <p:txBody>
+          <a:bodyPr wrap="none">
+            <a:normAutofit/>
+          </a:bodyPr>
+          <a:lstStyle/>
+          <a:p/>
+          <a:p>
+            <a:pPr algn="ctr"/>
+            <a:r>
+              <a:rPr sz="3200" b="0">
+                <a:solidFill>
+                  <a:srgbClr val="FFFFFF"/>
+                </a:solidFill>
+              </a:rPr>
+              <a:t>Om Jaya Jagadheesa Harey
+Swami Sathya Sai Harey
+Bhaktha Jana Samrakshaka 
+Bhaktha Jana Samrakshaka 
+Parthi Maheshwara
+Om Jaya Jagadheesa Harey</a:t>
+            </a:r>
+          </a:p>
+        </p:txBody>
+      </p:sp>
+      <p:sp>
+        <p:nvSpPr>
+          <p:cNvPr id="5" name="TextBox 4"/>
+          <p:cNvSpPr txBox="1"/>
+          <p:nvPr/>
+        </p:nvSpPr>
+        <p:spPr>
+          <a:xfrm>
+            <a:off x="457200" y="5943600"/>
+            <a:ext cx="914400" cy="685800"/>
+          </a:xfrm>
+          <a:prstGeom prst="rect">
+            <a:avLst/>
+          </a:prstGeom>
+          <a:noFill/>
+        </p:spPr>
+        <p:txBody>
+          <a:bodyPr wrap="none">
+            <a:normAutofit/>
+          </a:bodyPr>
+          <a:lstStyle/>
+          <a:p/>
+          <a:p>
+            <a:pPr algn="l"/>
+            <a:r>
+              <a:rPr sz="1600" b="0">
+                <a:solidFill>
+                  <a:srgbClr val="FFFFFF"/>
+                </a:solidFill>
+              </a:rPr>
+              <a:t>A</a:t>
+            </a:r>
+          </a:p>
+        </p:txBody>
+      </p:sp>
+      <p:sp>
+        <p:nvSpPr>
+          <p:cNvPr id="6" name="TextBox 5"/>
+          <p:cNvSpPr txBox="1"/>
+          <p:nvPr/>
+        </p:nvSpPr>
+        <p:spPr>
+          <a:xfrm>
+            <a:off x="2286000" y="5943600"/>
+            <a:ext cx="3657600" cy="685800"/>
+          </a:xfrm>
+          <a:prstGeom prst="rect">
+            <a:avLst/>
+          </a:prstGeom>
+          <a:noFill/>
+        </p:spPr>
+        <p:txBody>
+          <a:bodyPr wrap="none">
+            <a:normAutofit/>
+          </a:bodyPr>
+          <a:lstStyle/>
+          <a:p/>
+          <a:p>
+            <a:pPr algn="ctr"/>
+            <a:r>
+              <a:rPr sz="1600" b="0">
+                <a:solidFill>
+                  <a:srgbClr val="FFFFFF"/>
+                </a:solidFill>
+              </a:rPr>
+              <a:t>Continued</a:t>
+            </a:r>
+          </a:p>
+        </p:txBody>
+      </p:sp>
+      <p:sp>
+        <p:nvSpPr>
+          <p:cNvPr id="7" name="TextBox 6"/>
+          <p:cNvSpPr txBox="1"/>
+          <p:nvPr/>
+        </p:nvSpPr>
+        <p:spPr>
+          <a:xfrm>
+            <a:off x="7315200" y="5943600"/>
+            <a:ext cx="914400" cy="685800"/>
+          </a:xfrm>
+          <a:prstGeom prst="rect">
+            <a:avLst/>
+          </a:prstGeom>
+          <a:noFill/>
+        </p:spPr>
+        <p:txBody>
+          <a:bodyPr wrap="none">
+            <a:normAutofit/>
+          </a:bodyPr>
+          <a:lstStyle/>
+          <a:p/>
+          <a:p>
+            <a:pPr algn="r"/>
+            <a:r>
+              <a:rPr sz="1600" b="0">
+                <a:solidFill>
+                  <a:srgbClr val="FFFFFF"/>
+                </a:solidFill>
+              </a:rPr>
+              <a:t/>
+            </a:r>
+          </a:p>
+        </p:txBody>
+      </p:sp>
+    </p:spTree>
+  </p:cSld>
+  <p:clrMapOvr>
+    <a:masterClrMapping/>
+  </p:clrMapOvr>
+</p:sld>
+</file>
+
+<file path=ppt/slides/slide14.xml><?xml version="1.0" encoding="utf-8"?>
+<p:sld xmlns:a="http://schemas.openxmlformats.org/drawingml/2006/main" xmlns:p="http://schemas.openxmlformats.org/presentationml/2006/main" xmlns:r="http://schemas.openxmlformats.org/officeDocument/2006/relationships">
+  <p:cSld>
+    <p:spTree>
+      <p:nvGrpSpPr>
+        <p:cNvPr id="1" name=""/>
+        <p:cNvGrpSpPr/>
+        <p:nvPr/>
+      </p:nvGrpSpPr>
+      <p:grpSpPr/>
+      <p:pic>
+        <p:nvPicPr>
+          <p:cNvPr id="2" name="Picture 1" descr="image1.gif"/>
+          <p:cNvPicPr>
+            <a:picLocks noChangeAspect="1"/>
+          </p:cNvPicPr>
+          <p:nvPr/>
+        </p:nvPicPr>
+        <p:blipFill>
+          <a:blip r:embed="rId2"/>
+          <a:stretch>
+            <a:fillRect/>
+          </a:stretch>
+        </p:blipFill>
+        <p:spPr>
+          <a:xfrm>
+            <a:off x="0" y="0"/>
+            <a:ext cx="9144000" cy="6858000"/>
+          </a:xfrm>
+          <a:prstGeom prst="rect">
+            <a:avLst/>
+          </a:prstGeom>
+        </p:spPr>
+      </p:pic>
+      <p:sp>
+        <p:nvSpPr>
+          <p:cNvPr id="3" name="TextBox 2"/>
+          <p:cNvSpPr txBox="1"/>
+          <p:nvPr/>
+        </p:nvSpPr>
+        <p:spPr>
+          <a:xfrm>
+            <a:off x="457200" y="228600"/>
+            <a:ext cx="8229600" cy="914400"/>
+          </a:xfrm>
+          <a:prstGeom prst="rect">
+            <a:avLst/>
+          </a:prstGeom>
+          <a:noFill/>
+        </p:spPr>
+        <p:txBody>
+          <a:bodyPr wrap="none">
+            <a:normAutofit/>
+          </a:bodyPr>
+          <a:lstStyle/>
+          <a:p/>
+          <a:p>
+            <a:pPr algn="ctr"/>
+            <a:r>
+              <a:rPr sz="3600" b="0">
+                <a:solidFill>
+                  <a:srgbClr val="FFFFFF"/>
+                </a:solidFill>
+              </a:rPr>
+              <a:t>Aarti</a:t>
+            </a:r>
+          </a:p>
+        </p:txBody>
+      </p:sp>
+      <p:sp>
+        <p:nvSpPr>
+          <p:cNvPr id="4" name="TextBox 3"/>
+          <p:cNvSpPr txBox="1"/>
+          <p:nvPr/>
+        </p:nvSpPr>
+        <p:spPr>
+          <a:xfrm>
+            <a:off x="457200" y="1143000"/>
+            <a:ext cx="8229600" cy="5029200"/>
+          </a:xfrm>
+          <a:prstGeom prst="rect">
+            <a:avLst/>
+          </a:prstGeom>
+          <a:noFill/>
+        </p:spPr>
+        <p:txBody>
+          <a:bodyPr wrap="none">
+            <a:normAutofit/>
+          </a:bodyPr>
+          <a:lstStyle/>
+          <a:p/>
+          <a:p>
+            <a:pPr algn="ctr"/>
+            <a:r>
+              <a:rPr sz="3200" b="0">
+                <a:solidFill>
+                  <a:srgbClr val="FFFFFF"/>
+                </a:solidFill>
+              </a:rPr>
+              <a:t>Sashi Vadhana Sree Karaa Sarva Praana Pathey,
+Swami Sarva Praana Pathey
+Aasritha Kalpa Latheeka 
+Aasritha Kalpa Latheeka 
+Aapadh Baandhavaa
+Om Jaya Jagadheesa Harey</a:t>
+            </a:r>
+          </a:p>
+        </p:txBody>
+      </p:sp>
+      <p:sp>
+        <p:nvSpPr>
+          <p:cNvPr id="5" name="TextBox 4"/>
+          <p:cNvSpPr txBox="1"/>
+          <p:nvPr/>
+        </p:nvSpPr>
+        <p:spPr>
+          <a:xfrm>
+            <a:off x="457200" y="5943600"/>
+            <a:ext cx="914400" cy="685800"/>
+          </a:xfrm>
+          <a:prstGeom prst="rect">
+            <a:avLst/>
+          </a:prstGeom>
+          <a:noFill/>
+        </p:spPr>
+        <p:txBody>
+          <a:bodyPr wrap="none">
+            <a:normAutofit/>
+          </a:bodyPr>
+          <a:lstStyle/>
+          <a:p/>
+          <a:p>
+            <a:pPr algn="l"/>
+            <a:r>
+              <a:rPr sz="1600" b="0">
+                <a:solidFill>
+                  <a:srgbClr val="FFFFFF"/>
+                </a:solidFill>
+              </a:rPr>
+              <a:t>A</a:t>
+            </a:r>
+          </a:p>
+        </p:txBody>
+      </p:sp>
+      <p:sp>
+        <p:nvSpPr>
+          <p:cNvPr id="6" name="TextBox 5"/>
+          <p:cNvSpPr txBox="1"/>
+          <p:nvPr/>
+        </p:nvSpPr>
+        <p:spPr>
+          <a:xfrm>
+            <a:off x="2286000" y="5943600"/>
+            <a:ext cx="3657600" cy="685800"/>
+          </a:xfrm>
+          <a:prstGeom prst="rect">
+            <a:avLst/>
+          </a:prstGeom>
+          <a:noFill/>
+        </p:spPr>
+        <p:txBody>
+          <a:bodyPr wrap="none">
+            <a:normAutofit/>
+          </a:bodyPr>
+          <a:lstStyle/>
+          <a:p/>
+          <a:p>
+            <a:pPr algn="ctr"/>
+            <a:r>
+              <a:rPr sz="1600" b="0">
+                <a:solidFill>
+                  <a:srgbClr val="FFFFFF"/>
+                </a:solidFill>
+              </a:rPr>
+              <a:t>Continued</a:t>
+            </a:r>
+          </a:p>
+        </p:txBody>
+      </p:sp>
+      <p:sp>
+        <p:nvSpPr>
+          <p:cNvPr id="7" name="TextBox 6"/>
+          <p:cNvSpPr txBox="1"/>
+          <p:nvPr/>
+        </p:nvSpPr>
+        <p:spPr>
+          <a:xfrm>
+            <a:off x="7315200" y="5943600"/>
+            <a:ext cx="914400" cy="685800"/>
+          </a:xfrm>
+          <a:prstGeom prst="rect">
+            <a:avLst/>
+          </a:prstGeom>
+          <a:noFill/>
+        </p:spPr>
+        <p:txBody>
+          <a:bodyPr wrap="none">
+            <a:normAutofit/>
+          </a:bodyPr>
+          <a:lstStyle/>
+          <a:p/>
+          <a:p>
+            <a:pPr algn="r"/>
+            <a:r>
+              <a:rPr sz="1600" b="0">
+                <a:solidFill>
+                  <a:srgbClr val="FFFFFF"/>
+                </a:solidFill>
+              </a:rPr>
+              <a:t/>
+            </a:r>
+          </a:p>
+        </p:txBody>
+      </p:sp>
+    </p:spTree>
+  </p:cSld>
+  <p:clrMapOvr>
+    <a:masterClrMapping/>
+  </p:clrMapOvr>
+</p:sld>
+</file>
+
+<file path=ppt/slides/slide15.xml><?xml version="1.0" encoding="utf-8"?>
+<p:sld xmlns:a="http://schemas.openxmlformats.org/drawingml/2006/main" xmlns:p="http://schemas.openxmlformats.org/presentationml/2006/main" xmlns:r="http://schemas.openxmlformats.org/officeDocument/2006/relationships">
+  <p:cSld>
+    <p:spTree>
+      <p:nvGrpSpPr>
+        <p:cNvPr id="1" name=""/>
+        <p:cNvGrpSpPr/>
+        <p:nvPr/>
+      </p:nvGrpSpPr>
+      <p:grpSpPr/>
+      <p:pic>
+        <p:nvPicPr>
+          <p:cNvPr id="2" name="Picture 1" descr="image1.gif"/>
+          <p:cNvPicPr>
+            <a:picLocks noChangeAspect="1"/>
+          </p:cNvPicPr>
+          <p:nvPr/>
+        </p:nvPicPr>
+        <p:blipFill>
+          <a:blip r:embed="rId2"/>
+          <a:stretch>
+            <a:fillRect/>
+          </a:stretch>
+        </p:blipFill>
+        <p:spPr>
+          <a:xfrm>
+            <a:off x="0" y="0"/>
+            <a:ext cx="9144000" cy="6858000"/>
+          </a:xfrm>
+          <a:prstGeom prst="rect">
+            <a:avLst/>
+          </a:prstGeom>
+        </p:spPr>
+      </p:pic>
+      <p:sp>
+        <p:nvSpPr>
+          <p:cNvPr id="3" name="TextBox 2"/>
+          <p:cNvSpPr txBox="1"/>
+          <p:nvPr/>
+        </p:nvSpPr>
+        <p:spPr>
+          <a:xfrm>
+            <a:off x="457200" y="228600"/>
+            <a:ext cx="8229600" cy="914400"/>
+          </a:xfrm>
+          <a:prstGeom prst="rect">
+            <a:avLst/>
+          </a:prstGeom>
+          <a:noFill/>
+        </p:spPr>
+        <p:txBody>
+          <a:bodyPr wrap="none">
+            <a:normAutofit/>
+          </a:bodyPr>
+          <a:lstStyle/>
+          <a:p/>
+          <a:p>
+            <a:pPr algn="ctr"/>
+            <a:r>
+              <a:rPr sz="3600" b="0">
+                <a:solidFill>
+                  <a:srgbClr val="FFFFFF"/>
+                </a:solidFill>
+              </a:rPr>
+              <a:t>Aarti</a:t>
+            </a:r>
+          </a:p>
+        </p:txBody>
+      </p:sp>
+      <p:sp>
+        <p:nvSpPr>
+          <p:cNvPr id="4" name="TextBox 3"/>
+          <p:cNvSpPr txBox="1"/>
+          <p:nvPr/>
+        </p:nvSpPr>
+        <p:spPr>
+          <a:xfrm>
+            <a:off x="457200" y="1143000"/>
+            <a:ext cx="8229600" cy="5029200"/>
+          </a:xfrm>
+          <a:prstGeom prst="rect">
+            <a:avLst/>
+          </a:prstGeom>
+          <a:noFill/>
+        </p:spPr>
+        <p:txBody>
+          <a:bodyPr wrap="none">
+            <a:normAutofit/>
+          </a:bodyPr>
+          <a:lstStyle/>
+          <a:p/>
+          <a:p>
+            <a:pPr algn="ctr"/>
+            <a:r>
+              <a:rPr sz="3200" b="0">
+                <a:solidFill>
+                  <a:srgbClr val="FFFFFF"/>
+                </a:solidFill>
+              </a:rPr>
+              <a:t>Maatha Pitha Guru Dhaivamu Mari Anthayu Neevey
+Swami Mari Anthayu Neevey
+Naadha Brahma Jagan Naatha 
+Naadha Brahma Jagan Naatha
+Naagendra Shayanaa
+Om Jaya Jagadheesa Harey</a:t>
+            </a:r>
+          </a:p>
+        </p:txBody>
+      </p:sp>
+      <p:sp>
+        <p:nvSpPr>
+          <p:cNvPr id="5" name="TextBox 4"/>
+          <p:cNvSpPr txBox="1"/>
+          <p:nvPr/>
+        </p:nvSpPr>
+        <p:spPr>
+          <a:xfrm>
+            <a:off x="457200" y="5943600"/>
+            <a:ext cx="914400" cy="685800"/>
+          </a:xfrm>
+          <a:prstGeom prst="rect">
+            <a:avLst/>
+          </a:prstGeom>
+          <a:noFill/>
+        </p:spPr>
+        <p:txBody>
+          <a:bodyPr wrap="none">
+            <a:normAutofit/>
+          </a:bodyPr>
+          <a:lstStyle/>
+          <a:p/>
+          <a:p>
+            <a:pPr algn="l"/>
+            <a:r>
+              <a:rPr sz="1600" b="0">
+                <a:solidFill>
+                  <a:srgbClr val="FFFFFF"/>
+                </a:solidFill>
+              </a:rPr>
+              <a:t>A</a:t>
+            </a:r>
+          </a:p>
+        </p:txBody>
+      </p:sp>
+      <p:sp>
+        <p:nvSpPr>
+          <p:cNvPr id="6" name="TextBox 5"/>
+          <p:cNvSpPr txBox="1"/>
+          <p:nvPr/>
+        </p:nvSpPr>
+        <p:spPr>
+          <a:xfrm>
+            <a:off x="2286000" y="5943600"/>
+            <a:ext cx="3657600" cy="685800"/>
+          </a:xfrm>
+          <a:prstGeom prst="rect">
+            <a:avLst/>
+          </a:prstGeom>
+          <a:noFill/>
+        </p:spPr>
+        <p:txBody>
+          <a:bodyPr wrap="none">
+            <a:normAutofit/>
+          </a:bodyPr>
+          <a:lstStyle/>
+          <a:p/>
+          <a:p>
+            <a:pPr algn="ctr"/>
+            <a:r>
+              <a:rPr sz="1600" b="0">
+                <a:solidFill>
+                  <a:srgbClr val="FFFFFF"/>
+                </a:solidFill>
+              </a:rPr>
+              <a:t>Continued</a:t>
+            </a:r>
+          </a:p>
+        </p:txBody>
+      </p:sp>
+      <p:sp>
+        <p:nvSpPr>
+          <p:cNvPr id="7" name="TextBox 6"/>
+          <p:cNvSpPr txBox="1"/>
+          <p:nvPr/>
+        </p:nvSpPr>
+        <p:spPr>
+          <a:xfrm>
+            <a:off x="7315200" y="5943600"/>
+            <a:ext cx="914400" cy="685800"/>
+          </a:xfrm>
+          <a:prstGeom prst="rect">
+            <a:avLst/>
+          </a:prstGeom>
+          <a:noFill/>
+        </p:spPr>
+        <p:txBody>
+          <a:bodyPr wrap="none">
+            <a:normAutofit/>
+          </a:bodyPr>
+          <a:lstStyle/>
+          <a:p/>
+          <a:p>
+            <a:pPr algn="r"/>
+            <a:r>
+              <a:rPr sz="1600" b="0">
+                <a:solidFill>
+                  <a:srgbClr val="FFFFFF"/>
+                </a:solidFill>
+              </a:rPr>
+              <a:t/>
+            </a:r>
+          </a:p>
+        </p:txBody>
+      </p:sp>
+    </p:spTree>
+  </p:cSld>
+  <p:clrMapOvr>
+    <a:masterClrMapping/>
+  </p:clrMapOvr>
+</p:sld>
+</file>
+
+<file path=ppt/slides/slide16.xml><?xml version="1.0" encoding="utf-8"?>
+<p:sld xmlns:a="http://schemas.openxmlformats.org/drawingml/2006/main" xmlns:p="http://schemas.openxmlformats.org/presentationml/2006/main" xmlns:r="http://schemas.openxmlformats.org/officeDocument/2006/relationships">
+  <p:cSld>
+    <p:spTree>
+      <p:nvGrpSpPr>
+        <p:cNvPr id="1" name=""/>
+        <p:cNvGrpSpPr/>
+        <p:nvPr/>
+      </p:nvGrpSpPr>
+      <p:grpSpPr/>
+      <p:pic>
+        <p:nvPicPr>
+          <p:cNvPr id="2" name="Picture 1" descr="image1.gif"/>
+          <p:cNvPicPr>
+            <a:picLocks noChangeAspect="1"/>
+          </p:cNvPicPr>
+          <p:nvPr/>
+        </p:nvPicPr>
+        <p:blipFill>
+          <a:blip r:embed="rId2"/>
+          <a:stretch>
+            <a:fillRect/>
+          </a:stretch>
+        </p:blipFill>
+        <p:spPr>
+          <a:xfrm>
+            <a:off x="0" y="0"/>
+            <a:ext cx="9144000" cy="6858000"/>
+          </a:xfrm>
+          <a:prstGeom prst="rect">
+            <a:avLst/>
+          </a:prstGeom>
+        </p:spPr>
+      </p:pic>
+      <p:sp>
+        <p:nvSpPr>
+          <p:cNvPr id="3" name="TextBox 2"/>
+          <p:cNvSpPr txBox="1"/>
+          <p:nvPr/>
+        </p:nvSpPr>
+        <p:spPr>
+          <a:xfrm>
+            <a:off x="457200" y="228600"/>
+            <a:ext cx="8229600" cy="914400"/>
+          </a:xfrm>
+          <a:prstGeom prst="rect">
+            <a:avLst/>
+          </a:prstGeom>
+          <a:noFill/>
+        </p:spPr>
+        <p:txBody>
+          <a:bodyPr wrap="none">
+            <a:normAutofit/>
+          </a:bodyPr>
+          <a:lstStyle/>
+          <a:p/>
+          <a:p>
+            <a:pPr algn="ctr"/>
+            <a:r>
+              <a:rPr sz="3600" b="0">
+                <a:solidFill>
+                  <a:srgbClr val="FFFFFF"/>
+                </a:solidFill>
+              </a:rPr>
+              <a:t>Aarti</a:t>
+            </a:r>
+          </a:p>
+        </p:txBody>
+      </p:sp>
+      <p:sp>
+        <p:nvSpPr>
+          <p:cNvPr id="4" name="TextBox 3"/>
+          <p:cNvSpPr txBox="1"/>
+          <p:nvPr/>
+        </p:nvSpPr>
+        <p:spPr>
+          <a:xfrm>
+            <a:off x="457200" y="1143000"/>
+            <a:ext cx="8229600" cy="5029200"/>
+          </a:xfrm>
+          <a:prstGeom prst="rect">
+            <a:avLst/>
+          </a:prstGeom>
+          <a:noFill/>
+        </p:spPr>
+        <p:txBody>
+          <a:bodyPr wrap="none">
+            <a:normAutofit/>
+          </a:bodyPr>
+          <a:lstStyle/>
+          <a:p/>
+          <a:p>
+            <a:pPr algn="ctr"/>
+            <a:r>
+              <a:rPr sz="3200" b="0">
+                <a:solidFill>
+                  <a:srgbClr val="FFFFFF"/>
+                </a:solidFill>
+              </a:rPr>
+              <a:t>Omkaara Roopa Ojaswi Om Saayi Mahadeva 
+Sathya Saayi Mahadeva
+Mangala Aarathi Anduko 
+Mangala Aarathi Anduko 
+Mandhara Giridhari
+Om Jaya Jagadheesa Harey</a:t>
+            </a:r>
+          </a:p>
+        </p:txBody>
+      </p:sp>
+      <p:sp>
+        <p:nvSpPr>
+          <p:cNvPr id="5" name="TextBox 4"/>
+          <p:cNvSpPr txBox="1"/>
+          <p:nvPr/>
+        </p:nvSpPr>
+        <p:spPr>
+          <a:xfrm>
+            <a:off x="457200" y="5943600"/>
+            <a:ext cx="914400" cy="685800"/>
+          </a:xfrm>
+          <a:prstGeom prst="rect">
+            <a:avLst/>
+          </a:prstGeom>
+          <a:noFill/>
+        </p:spPr>
+        <p:txBody>
+          <a:bodyPr wrap="none">
+            <a:normAutofit/>
+          </a:bodyPr>
+          <a:lstStyle/>
+          <a:p/>
+          <a:p>
+            <a:pPr algn="l"/>
+            <a:r>
+              <a:rPr sz="1600" b="0">
+                <a:solidFill>
+                  <a:srgbClr val="FFFFFF"/>
+                </a:solidFill>
+              </a:rPr>
+              <a:t>A</a:t>
+            </a:r>
+          </a:p>
+        </p:txBody>
+      </p:sp>
+      <p:sp>
+        <p:nvSpPr>
+          <p:cNvPr id="6" name="TextBox 5"/>
+          <p:cNvSpPr txBox="1"/>
+          <p:nvPr/>
+        </p:nvSpPr>
+        <p:spPr>
+          <a:xfrm>
+            <a:off x="2286000" y="5943600"/>
+            <a:ext cx="3657600" cy="685800"/>
+          </a:xfrm>
+          <a:prstGeom prst="rect">
+            <a:avLst/>
+          </a:prstGeom>
+          <a:noFill/>
+        </p:spPr>
+        <p:txBody>
+          <a:bodyPr wrap="none">
+            <a:normAutofit/>
+          </a:bodyPr>
+          <a:lstStyle/>
+          <a:p/>
+          <a:p>
+            <a:pPr algn="ctr"/>
+            <a:r>
+              <a:rPr sz="1600" b="0">
+                <a:solidFill>
+                  <a:srgbClr val="FFFFFF"/>
+                </a:solidFill>
+              </a:rPr>
+              <a:t>Continued</a:t>
+            </a:r>
+          </a:p>
+        </p:txBody>
+      </p:sp>
+      <p:sp>
+        <p:nvSpPr>
+          <p:cNvPr id="7" name="TextBox 6"/>
+          <p:cNvSpPr txBox="1"/>
+          <p:nvPr/>
+        </p:nvSpPr>
+        <p:spPr>
+          <a:xfrm>
+            <a:off x="7315200" y="5943600"/>
+            <a:ext cx="914400" cy="685800"/>
+          </a:xfrm>
+          <a:prstGeom prst="rect">
+            <a:avLst/>
+          </a:prstGeom>
+          <a:noFill/>
+        </p:spPr>
+        <p:txBody>
+          <a:bodyPr wrap="none">
+            <a:normAutofit/>
+          </a:bodyPr>
+          <a:lstStyle/>
+          <a:p/>
+          <a:p>
+            <a:pPr algn="r"/>
+            <a:r>
+              <a:rPr sz="1600" b="0">
+                <a:solidFill>
+                  <a:srgbClr val="FFFFFF"/>
+                </a:solidFill>
+              </a:rPr>
+              <a:t/>
+            </a:r>
+          </a:p>
+        </p:txBody>
+      </p:sp>
+    </p:spTree>
+  </p:cSld>
+  <p:clrMapOvr>
+    <a:masterClrMapping/>
+  </p:clrMapOvr>
+</p:sld>
+</file>
+
+<file path=ppt/slides/slide17.xml><?xml version="1.0" encoding="utf-8"?>
+<p:sld xmlns:a="http://schemas.openxmlformats.org/drawingml/2006/main" xmlns:p="http://schemas.openxmlformats.org/presentationml/2006/main" xmlns:r="http://schemas.openxmlformats.org/officeDocument/2006/relationships">
+  <p:cSld>
+    <p:spTree>
+      <p:nvGrpSpPr>
+        <p:cNvPr id="1" name=""/>
+        <p:cNvGrpSpPr/>
+        <p:nvPr/>
+      </p:nvGrpSpPr>
+      <p:grpSpPr/>
+      <p:pic>
+        <p:nvPicPr>
+          <p:cNvPr id="2" name="Picture 1" descr="image1.gif"/>
+          <p:cNvPicPr>
+            <a:picLocks noChangeAspect="1"/>
+          </p:cNvPicPr>
+          <p:nvPr/>
+        </p:nvPicPr>
+        <p:blipFill>
+          <a:blip r:embed="rId2"/>
+          <a:stretch>
+            <a:fillRect/>
+          </a:stretch>
+        </p:blipFill>
+        <p:spPr>
+          <a:xfrm>
+            <a:off x="0" y="0"/>
+            <a:ext cx="9144000" cy="6858000"/>
+          </a:xfrm>
+          <a:prstGeom prst="rect">
+            <a:avLst/>
+          </a:prstGeom>
+        </p:spPr>
+      </p:pic>
+      <p:sp>
+        <p:nvSpPr>
+          <p:cNvPr id="3" name="TextBox 2"/>
+          <p:cNvSpPr txBox="1"/>
+          <p:nvPr/>
+        </p:nvSpPr>
+        <p:spPr>
+          <a:xfrm>
+            <a:off x="457200" y="228600"/>
+            <a:ext cx="8229600" cy="914400"/>
+          </a:xfrm>
+          <a:prstGeom prst="rect">
+            <a:avLst/>
+          </a:prstGeom>
+          <a:noFill/>
+        </p:spPr>
+        <p:txBody>
+          <a:bodyPr wrap="none">
+            <a:normAutofit/>
+          </a:bodyPr>
+          <a:lstStyle/>
+          <a:p/>
+          <a:p>
+            <a:pPr algn="ctr"/>
+            <a:r>
+              <a:rPr sz="3600" b="0">
+                <a:solidFill>
+                  <a:srgbClr val="FFFFFF"/>
+                </a:solidFill>
+              </a:rPr>
+              <a:t>Aarti</a:t>
+            </a:r>
+          </a:p>
+        </p:txBody>
+      </p:sp>
+      <p:sp>
+        <p:nvSpPr>
+          <p:cNvPr id="4" name="TextBox 3"/>
+          <p:cNvSpPr txBox="1"/>
+          <p:nvPr/>
+        </p:nvSpPr>
+        <p:spPr>
+          <a:xfrm>
+            <a:off x="457200" y="1143000"/>
+            <a:ext cx="8229600" cy="5029200"/>
+          </a:xfrm>
+          <a:prstGeom prst="rect">
+            <a:avLst/>
+          </a:prstGeom>
+          <a:noFill/>
+        </p:spPr>
+        <p:txBody>
+          <a:bodyPr wrap="none">
+            <a:normAutofit/>
+          </a:bodyPr>
+          <a:lstStyle/>
+          <a:p/>
+          <a:p>
+            <a:pPr algn="ctr"/>
+            <a:r>
+              <a:rPr sz="3200" b="0">
+                <a:solidFill>
+                  <a:srgbClr val="FFFFFF"/>
+                </a:solidFill>
+              </a:rPr>
+              <a:t>Narayana Narayana Om 
+Sathya Narayana Narayana Narayana Om
+Narayana Narayana Om 
+Sathya Narayana Narayana Om 
+Sathya Narayana Narayana Om || 3 ||
+Om Jai Sad Guru Devaa</a:t>
+            </a:r>
+          </a:p>
+        </p:txBody>
+      </p:sp>
+      <p:sp>
+        <p:nvSpPr>
+          <p:cNvPr id="5" name="TextBox 4"/>
+          <p:cNvSpPr txBox="1"/>
+          <p:nvPr/>
+        </p:nvSpPr>
+        <p:spPr>
+          <a:xfrm>
+            <a:off x="457200" y="5943600"/>
+            <a:ext cx="914400" cy="685800"/>
+          </a:xfrm>
+          <a:prstGeom prst="rect">
+            <a:avLst/>
+          </a:prstGeom>
+          <a:noFill/>
+        </p:spPr>
+        <p:txBody>
+          <a:bodyPr wrap="none">
+            <a:normAutofit/>
+          </a:bodyPr>
+          <a:lstStyle/>
+          <a:p/>
+          <a:p>
+            <a:pPr algn="l"/>
+            <a:r>
+              <a:rPr sz="1600" b="0">
+                <a:solidFill>
+                  <a:srgbClr val="FFFFFF"/>
+                </a:solidFill>
+              </a:rPr>
+              <a:t>A</a:t>
+            </a:r>
+          </a:p>
+        </p:txBody>
+      </p:sp>
+      <p:sp>
+        <p:nvSpPr>
+          <p:cNvPr id="6" name="TextBox 5"/>
+          <p:cNvSpPr txBox="1"/>
+          <p:nvPr/>
+        </p:nvSpPr>
+        <p:spPr>
+          <a:xfrm>
+            <a:off x="2286000" y="5943600"/>
+            <a:ext cx="3657600" cy="685800"/>
+          </a:xfrm>
+          <a:prstGeom prst="rect">
+            <a:avLst/>
+          </a:prstGeom>
+          <a:noFill/>
+        </p:spPr>
+        <p:txBody>
+          <a:bodyPr wrap="none">
+            <a:normAutofit/>
+          </a:bodyPr>
+          <a:lstStyle/>
+          <a:p/>
+          <a:p>
+            <a:pPr algn="ctr"/>
+            <a:r>
+              <a:rPr sz="1600" b="0">
+                <a:solidFill>
+                  <a:srgbClr val="FFFFFF"/>
+                </a:solidFill>
+              </a:rPr>
+              <a:t/>
+            </a:r>
+          </a:p>
+        </p:txBody>
+      </p:sp>
+      <p:sp>
+        <p:nvSpPr>
+          <p:cNvPr id="7" name="TextBox 6"/>
+          <p:cNvSpPr txBox="1"/>
+          <p:nvPr/>
+        </p:nvSpPr>
+        <p:spPr>
+          <a:xfrm>
+            <a:off x="7315200" y="5943600"/>
+            <a:ext cx="914400" cy="685800"/>
+          </a:xfrm>
+          <a:prstGeom prst="rect">
+            <a:avLst/>
+          </a:prstGeom>
+          <a:noFill/>
+        </p:spPr>
+        <p:txBody>
+          <a:bodyPr wrap="none">
+            <a:normAutofit/>
+          </a:bodyPr>
+          <a:lstStyle/>
+          <a:p/>
+          <a:p>
+            <a:pPr algn="r"/>
+            <a:r>
+              <a:rPr sz="1600" b="0">
+                <a:solidFill>
+                  <a:srgbClr val="FFFFFF"/>
                 </a:solidFill>
               </a:rPr>
               <a:t/>
@@ -3371,27 +4783,30 @@
         <p:nvPr/>
       </p:nvGrpSpPr>
       <p:grpSpPr/>
-      <p:sp>
-        <p:nvSpPr>
-          <p:cNvPr id="2" name="Title 1"/>
-          <p:cNvSpPr>
-            <a:spLocks noGrp="1"/>
-          </p:cNvSpPr>
-          <p:nvPr>
-            <p:ph type="title"/>
-          </p:nvPr>
-        </p:nvSpPr>
-        <p:spPr/>
-        <p:txBody>
-          <a:bodyPr/>
-          <a:lstStyle/>
-          <a:p>
-            <a:r>
-              <a:t>Aajanubahum Aravindha Nethram</a:t>
-            </a:r>
-          </a:p>
-        </p:txBody>
-      </p:sp>
+      <p:pic>
+        <p:nvPicPr>
+          <p:cNvPr id="2" name="Picture 1" descr="image2.gif"/>
+          <p:cNvPicPr>
+            <a:picLocks noChangeAspect="1"/>
+          </p:cNvPicPr>
+          <p:nvPr/>
+        </p:nvPicPr>
+        <p:blipFill>
+          <a:blip r:embed="rId2"/>
+          <a:stretch>
+            <a:fillRect/>
+          </a:stretch>
+        </p:blipFill>
+        <p:spPr>
+          <a:xfrm>
+            <a:off x="0" y="0"/>
+            <a:ext cx="9144000" cy="6858000"/>
+          </a:xfrm>
+          <a:prstGeom prst="rect">
+            <a:avLst/>
+          </a:prstGeom>
+        </p:spPr>
+      </p:pic>
       <p:sp>
         <p:nvSpPr>
           <p:cNvPr id="3" name="TextBox 2"/>
@@ -3400,7 +4815,42 @@
         </p:nvSpPr>
         <p:spPr>
           <a:xfrm>
-            <a:off x="457200" y="1371600"/>
+            <a:off x="457200" y="228600"/>
+            <a:ext cx="8229600" cy="914400"/>
+          </a:xfrm>
+          <a:prstGeom prst="rect">
+            <a:avLst/>
+          </a:prstGeom>
+          <a:noFill/>
+        </p:spPr>
+        <p:txBody>
+          <a:bodyPr wrap="none">
+            <a:normAutofit/>
+          </a:bodyPr>
+          <a:lstStyle/>
+          <a:p/>
+          <a:p>
+            <a:pPr algn="ctr"/>
+            <a:r>
+              <a:rPr sz="3600" b="0">
+                <a:solidFill>
+                  <a:srgbClr val="FFFFFF"/>
+                </a:solidFill>
+              </a:rPr>
+              <a:t>Akhanda Jyothi Jalao Sai Man Mandir Me</a:t>
+            </a:r>
+          </a:p>
+        </p:txBody>
+      </p:sp>
+      <p:sp>
+        <p:nvSpPr>
+          <p:cNvPr id="4" name="TextBox 3"/>
+          <p:cNvSpPr txBox="1"/>
+          <p:nvPr/>
+        </p:nvSpPr>
+        <p:spPr>
+          <a:xfrm>
+            <a:off x="457200" y="1143000"/>
             <a:ext cx="8229600" cy="5029200"/>
           </a:xfrm>
           <a:prstGeom prst="rect">
@@ -3417,22 +4867,24 @@
           <a:p>
             <a:pPr algn="ctr"/>
             <a:r>
-              <a:rPr sz="2600" b="0">
-                <a:solidFill>
-                  <a:srgbClr val="000000"/>
-                </a:solidFill>
-              </a:rPr>
-              <a:t>Aajanubahum Aravindha Nethram
-Athmabhi Ramam Manasa Smarami (2)
-Bhoolokha Vaikunta Parthi Nivasam
-Prabhu Sai Ramam Manasa Smarami (2)</a:t>
-            </a:r>
-          </a:p>
-        </p:txBody>
-      </p:sp>
-      <p:sp>
-        <p:nvSpPr>
-          <p:cNvPr id="4" name="TextBox 3"/>
+              <a:rPr sz="3200" b="0">
+                <a:solidFill>
+                  <a:srgbClr val="FFFFFF"/>
+                </a:solidFill>
+              </a:rPr>
+              <a:t>Akhanda Jyothi Jalao Sai Man Mandir Me
+Akhanda Jyothi Jalao (2)
+Koti Surya Sama Theja Swaroopa
+Sai Thum Ho Divya Swaroopa
+Akhanda Jyothi Jalao (2)
+Divya Jyothi Gnana Jyothi Prema Jyothi Jalao</a:t>
+            </a:r>
+          </a:p>
+        </p:txBody>
+      </p:sp>
+      <p:sp>
+        <p:nvSpPr>
+          <p:cNvPr id="5" name="TextBox 4"/>
           <p:cNvSpPr txBox="1"/>
           <p:nvPr/>
         </p:nvSpPr>
@@ -3453,21 +4905,21 @@
           <a:lstStyle/>
           <a:p/>
           <a:p>
-            <a:pPr algn="ctr"/>
+            <a:pPr algn="l"/>
             <a:r>
               <a:rPr sz="1600" b="0">
                 <a:solidFill>
-                  <a:srgbClr val="000000"/>
-                </a:solidFill>
-              </a:rPr>
-              <a:t>A</a:t>
-            </a:r>
-          </a:p>
-        </p:txBody>
-      </p:sp>
-      <p:sp>
-        <p:nvSpPr>
-          <p:cNvPr id="5" name="TextBox 4"/>
+                  <a:srgbClr val="FFFFFF"/>
+                </a:solidFill>
+              </a:rPr>
+              <a:t>V</a:t>
+            </a:r>
+          </a:p>
+        </p:txBody>
+      </p:sp>
+      <p:sp>
+        <p:nvSpPr>
+          <p:cNvPr id="6" name="TextBox 5"/>
           <p:cNvSpPr txBox="1"/>
           <p:nvPr/>
         </p:nvSpPr>
@@ -3492,17 +4944,17 @@
             <a:r>
               <a:rPr sz="1600" b="0">
                 <a:solidFill>
-                  <a:srgbClr val="000000"/>
-                </a:solidFill>
-              </a:rPr>
-              <a:t>Sai Center</a:t>
-            </a:r>
-          </a:p>
-        </p:txBody>
-      </p:sp>
-      <p:sp>
-        <p:nvSpPr>
-          <p:cNvPr id="6" name="TextBox 5"/>
+                  <a:srgbClr val="FFFFFF"/>
+                </a:solidFill>
+              </a:rPr>
+              <a:t/>
+            </a:r>
+          </a:p>
+        </p:txBody>
+      </p:sp>
+      <p:sp>
+        <p:nvSpPr>
+          <p:cNvPr id="7" name="TextBox 6"/>
           <p:cNvSpPr txBox="1"/>
           <p:nvPr/>
         </p:nvSpPr>
@@ -3523,11 +4975,11 @@
           <a:lstStyle/>
           <a:p/>
           <a:p>
-            <a:pPr algn="ctr"/>
+            <a:pPr algn="r"/>
             <a:r>
               <a:rPr sz="1600" b="0">
                 <a:solidFill>
-                  <a:srgbClr val="000000"/>
+                  <a:srgbClr val="FFFFFF"/>
                 </a:solidFill>
               </a:rPr>
               <a:t/>
@@ -3555,7 +5007,7 @@
       <p:grpSpPr/>
       <p:pic>
         <p:nvPicPr>
-          <p:cNvPr id="2" name="Picture 1" descr="filler.jpg"/>
+          <p:cNvPr id="2" name="Picture 1" descr="title_slide.jpg"/>
           <p:cNvPicPr>
             <a:picLocks noChangeAspect="1"/>
           </p:cNvPicPr>
@@ -3597,7 +5049,7 @@
       <p:grpSpPr/>
       <p:pic>
         <p:nvPicPr>
-          <p:cNvPr id="2" name="Picture 1" descr="filler.jpg"/>
+          <p:cNvPr id="2" name="Picture 1" descr="image1.gif"/>
           <p:cNvPicPr>
             <a:picLocks noChangeAspect="1"/>
           </p:cNvPicPr>
@@ -3619,6 +5071,184 @@
           </a:prstGeom>
         </p:spPr>
       </p:pic>
+      <p:sp>
+        <p:nvSpPr>
+          <p:cNvPr id="3" name="TextBox 2"/>
+          <p:cNvSpPr txBox="1"/>
+          <p:nvPr/>
+        </p:nvSpPr>
+        <p:spPr>
+          <a:xfrm>
+            <a:off x="457200" y="228600"/>
+            <a:ext cx="8229600" cy="914400"/>
+          </a:xfrm>
+          <a:prstGeom prst="rect">
+            <a:avLst/>
+          </a:prstGeom>
+          <a:noFill/>
+        </p:spPr>
+        <p:txBody>
+          <a:bodyPr wrap="none">
+            <a:normAutofit/>
+          </a:bodyPr>
+          <a:lstStyle/>
+          <a:p/>
+          <a:p>
+            <a:pPr algn="ctr"/>
+            <a:r>
+              <a:rPr sz="3600" b="0">
+                <a:solidFill>
+                  <a:srgbClr val="FFFFFF"/>
+                </a:solidFill>
+              </a:rPr>
+              <a:t>Madhurashtakam</a:t>
+            </a:r>
+          </a:p>
+        </p:txBody>
+      </p:sp>
+      <p:sp>
+        <p:nvSpPr>
+          <p:cNvPr id="4" name="TextBox 3"/>
+          <p:cNvSpPr txBox="1"/>
+          <p:nvPr/>
+        </p:nvSpPr>
+        <p:spPr>
+          <a:xfrm>
+            <a:off x="457200" y="1143000"/>
+            <a:ext cx="8229600" cy="5029200"/>
+          </a:xfrm>
+          <a:prstGeom prst="rect">
+            <a:avLst/>
+          </a:prstGeom>
+          <a:noFill/>
+        </p:spPr>
+        <p:txBody>
+          <a:bodyPr wrap="none">
+            <a:normAutofit/>
+          </a:bodyPr>
+          <a:lstStyle/>
+          <a:p/>
+          <a:p>
+            <a:pPr algn="ctr"/>
+            <a:r>
+              <a:rPr sz="3200" b="0">
+                <a:solidFill>
+                  <a:srgbClr val="FFFFFF"/>
+                </a:solidFill>
+              </a:rPr>
+              <a:t>Adharam Madhuram Vadanam Madhuram 
+Nayanam Madhuram Hasitam Madhuram |
+Hrdayam Madhuram Gamanam Madhuram 
+Madhura-Adhipater-Akhilam Madhuram ||2||</a:t>
+            </a:r>
+          </a:p>
+        </p:txBody>
+      </p:sp>
+      <p:sp>
+        <p:nvSpPr>
+          <p:cNvPr id="5" name="TextBox 4"/>
+          <p:cNvSpPr txBox="1"/>
+          <p:nvPr/>
+        </p:nvSpPr>
+        <p:spPr>
+          <a:xfrm>
+            <a:off x="457200" y="5943600"/>
+            <a:ext cx="914400" cy="685800"/>
+          </a:xfrm>
+          <a:prstGeom prst="rect">
+            <a:avLst/>
+          </a:prstGeom>
+          <a:noFill/>
+        </p:spPr>
+        <p:txBody>
+          <a:bodyPr wrap="none">
+            <a:normAutofit/>
+          </a:bodyPr>
+          <a:lstStyle/>
+          <a:p/>
+          <a:p>
+            <a:pPr algn="l"/>
+            <a:r>
+              <a:rPr sz="1600" b="0">
+                <a:solidFill>
+                  <a:srgbClr val="FFFFFF"/>
+                </a:solidFill>
+              </a:rPr>
+              <a:t>B</a:t>
+            </a:r>
+          </a:p>
+        </p:txBody>
+      </p:sp>
+      <p:sp>
+        <p:nvSpPr>
+          <p:cNvPr id="6" name="TextBox 5"/>
+          <p:cNvSpPr txBox="1"/>
+          <p:nvPr/>
+        </p:nvSpPr>
+        <p:spPr>
+          <a:xfrm>
+            <a:off x="2286000" y="5943600"/>
+            <a:ext cx="3657600" cy="685800"/>
+          </a:xfrm>
+          <a:prstGeom prst="rect">
+            <a:avLst/>
+          </a:prstGeom>
+          <a:noFill/>
+        </p:spPr>
+        <p:txBody>
+          <a:bodyPr wrap="none">
+            <a:normAutofit/>
+          </a:bodyPr>
+          <a:lstStyle/>
+          <a:p/>
+          <a:p>
+            <a:pPr algn="ctr"/>
+            <a:r>
+              <a:rPr sz="1600" b="0">
+                <a:solidFill>
+                  <a:srgbClr val="FFFFFF"/>
+                </a:solidFill>
+              </a:rPr>
+              <a:t>Continued</a:t>
+            </a:r>
+          </a:p>
+        </p:txBody>
+      </p:sp>
+      <p:sp>
+        <p:nvSpPr>
+          <p:cNvPr id="7" name="TextBox 6"/>
+          <p:cNvSpPr txBox="1"/>
+          <p:nvPr/>
+        </p:nvSpPr>
+        <p:spPr>
+          <a:xfrm>
+            <a:off x="7315200" y="5943600"/>
+            <a:ext cx="914400" cy="685800"/>
+          </a:xfrm>
+          <a:prstGeom prst="rect">
+            <a:avLst/>
+          </a:prstGeom>
+          <a:noFill/>
+        </p:spPr>
+        <p:txBody>
+          <a:bodyPr wrap="none">
+            <a:normAutofit/>
+          </a:bodyPr>
+          <a:lstStyle/>
+          <a:p/>
+          <a:p>
+            <a:pPr algn="r"/>
+            <a:r>
+              <a:rPr sz="1600" b="0">
+                <a:solidFill>
+                  <a:srgbClr val="FFFFFF"/>
+                </a:solidFill>
+              </a:rPr>
+              <a:t/>
+            </a:r>
+          </a:p>
+        </p:txBody>
+      </p:sp>
     </p:spTree>
   </p:cSld>
   <p:clrMapOvr>
@@ -3637,27 +5267,30 @@
         <p:nvPr/>
       </p:nvGrpSpPr>
       <p:grpSpPr/>
-      <p:sp>
-        <p:nvSpPr>
-          <p:cNvPr id="2" name="Title 1"/>
-          <p:cNvSpPr>
-            <a:spLocks noGrp="1"/>
-          </p:cNvSpPr>
-          <p:nvPr>
-            <p:ph type="title"/>
-          </p:nvPr>
-        </p:nvSpPr>
-        <p:spPr/>
-        <p:txBody>
-          <a:bodyPr/>
-          <a:lstStyle/>
-          <a:p>
-            <a:r>
-              <a:t>Aao Aao Sai Pyare</a:t>
-            </a:r>
-          </a:p>
-        </p:txBody>
-      </p:sp>
+      <p:pic>
+        <p:nvPicPr>
+          <p:cNvPr id="2" name="Picture 1" descr="image1.gif"/>
+          <p:cNvPicPr>
+            <a:picLocks noChangeAspect="1"/>
+          </p:cNvPicPr>
+          <p:nvPr/>
+        </p:nvPicPr>
+        <p:blipFill>
+          <a:blip r:embed="rId2"/>
+          <a:stretch>
+            <a:fillRect/>
+          </a:stretch>
+        </p:blipFill>
+        <p:spPr>
+          <a:xfrm>
+            <a:off x="0" y="0"/>
+            <a:ext cx="9144000" cy="6858000"/>
+          </a:xfrm>
+          <a:prstGeom prst="rect">
+            <a:avLst/>
+          </a:prstGeom>
+        </p:spPr>
+      </p:pic>
       <p:sp>
         <p:nvSpPr>
           <p:cNvPr id="3" name="TextBox 2"/>
@@ -3666,7 +5299,42 @@
         </p:nvSpPr>
         <p:spPr>
           <a:xfrm>
-            <a:off x="457200" y="1371600"/>
+            <a:off x="457200" y="228600"/>
+            <a:ext cx="8229600" cy="914400"/>
+          </a:xfrm>
+          <a:prstGeom prst="rect">
+            <a:avLst/>
+          </a:prstGeom>
+          <a:noFill/>
+        </p:spPr>
+        <p:txBody>
+          <a:bodyPr wrap="none">
+            <a:normAutofit/>
+          </a:bodyPr>
+          <a:lstStyle/>
+          <a:p/>
+          <a:p>
+            <a:pPr algn="ctr"/>
+            <a:r>
+              <a:rPr sz="3600" b="0">
+                <a:solidFill>
+                  <a:srgbClr val="FFFFFF"/>
+                </a:solidFill>
+              </a:rPr>
+              <a:t>Madhurashtakam</a:t>
+            </a:r>
+          </a:p>
+        </p:txBody>
+      </p:sp>
+      <p:sp>
+        <p:nvSpPr>
+          <p:cNvPr id="4" name="TextBox 3"/>
+          <p:cNvSpPr txBox="1"/>
+          <p:nvPr/>
+        </p:nvSpPr>
+        <p:spPr>
+          <a:xfrm>
+            <a:off x="457200" y="1143000"/>
             <a:ext cx="8229600" cy="5029200"/>
           </a:xfrm>
           <a:prstGeom prst="rect">
@@ -3683,23 +5351,22 @@
           <a:p>
             <a:pPr algn="ctr"/>
             <a:r>
-              <a:rPr sz="2600" b="0">
-                <a:solidFill>
-                  <a:srgbClr val="000000"/>
-                </a:solidFill>
-              </a:rPr>
-              <a:t>Aao Aao Sai Pyare
-Kirtan Karü Maï Sai Thumhare
-Aao Aao Sai Pyare
-Thum Ho Mere Nayanö Ke Tare
-Darshan Do Jivan Ke Sahare (2)</a:t>
-            </a:r>
-          </a:p>
-        </p:txBody>
-      </p:sp>
-      <p:sp>
-        <p:nvSpPr>
-          <p:cNvPr id="4" name="TextBox 3"/>
+              <a:rPr sz="3200" b="0">
+                <a:solidFill>
+                  <a:srgbClr val="FFFFFF"/>
+                </a:solidFill>
+              </a:rPr>
+              <a:t>Vacanam Madhuram Caritam Madhuram 
+Vasanam Madhuram Valitam Madhuram |
+Calitam Madhuram Bhramitam Madhuram
+Madhura-Adhipater-Akhilam Madhuram ||2||</a:t>
+            </a:r>
+          </a:p>
+        </p:txBody>
+      </p:sp>
+      <p:sp>
+        <p:nvSpPr>
+          <p:cNvPr id="5" name="TextBox 4"/>
           <p:cNvSpPr txBox="1"/>
           <p:nvPr/>
         </p:nvSpPr>
@@ -3720,11 +5387,11 @@
           <a:lstStyle/>
           <a:p/>
           <a:p>
-            <a:pPr algn="ctr"/>
+            <a:pPr algn="l"/>
             <a:r>
               <a:rPr sz="1600" b="0">
                 <a:solidFill>
-                  <a:srgbClr val="000000"/>
+                  <a:srgbClr val="FFFFFF"/>
                 </a:solidFill>
               </a:rPr>
               <a:t>B</a:t>
@@ -3734,7 +5401,7 @@
       </p:sp>
       <p:sp>
         <p:nvSpPr>
-          <p:cNvPr id="5" name="TextBox 4"/>
+          <p:cNvPr id="6" name="TextBox 5"/>
           <p:cNvSpPr txBox="1"/>
           <p:nvPr/>
         </p:nvSpPr>
@@ -3759,17 +5426,17 @@
             <a:r>
               <a:rPr sz="1600" b="0">
                 <a:solidFill>
-                  <a:srgbClr val="000000"/>
-                </a:solidFill>
-              </a:rPr>
-              <a:t>Aao Pyare Nayan Hamare Sai Hamare Aao</a:t>
-            </a:r>
-          </a:p>
-        </p:txBody>
-      </p:sp>
-      <p:sp>
-        <p:nvSpPr>
-          <p:cNvPr id="6" name="TextBox 5"/>
+                  <a:srgbClr val="FFFFFF"/>
+                </a:solidFill>
+              </a:rPr>
+              <a:t>Continued</a:t>
+            </a:r>
+          </a:p>
+        </p:txBody>
+      </p:sp>
+      <p:sp>
+        <p:nvSpPr>
+          <p:cNvPr id="7" name="TextBox 6"/>
           <p:cNvSpPr txBox="1"/>
           <p:nvPr/>
         </p:nvSpPr>
@@ -3790,14 +5457,14 @@
           <a:lstStyle/>
           <a:p/>
           <a:p>
-            <a:pPr algn="ctr"/>
+            <a:pPr algn="r"/>
             <a:r>
               <a:rPr sz="1600" b="0">
                 <a:solidFill>
-                  <a:srgbClr val="000000"/>
-                </a:solidFill>
-              </a:rPr>
-              <a:t>C</a:t>
+                  <a:srgbClr val="FFFFFF"/>
+                </a:solidFill>
+              </a:rPr>
+              <a:t/>
             </a:r>
           </a:p>
         </p:txBody>
@@ -3820,27 +5487,30 @@
         <p:nvPr/>
       </p:nvGrpSpPr>
       <p:grpSpPr/>
-      <p:sp>
-        <p:nvSpPr>
-          <p:cNvPr id="2" name="Title 1"/>
-          <p:cNvSpPr>
-            <a:spLocks noGrp="1"/>
-          </p:cNvSpPr>
-          <p:nvPr>
-            <p:ph type="title"/>
-          </p:nvPr>
-        </p:nvSpPr>
-        <p:spPr/>
-        <p:txBody>
-          <a:bodyPr/>
-          <a:lstStyle/>
-          <a:p>
-            <a:r>
-              <a:t>Aao Pyare Nayan Hamare Sai Hamare Aao</a:t>
-            </a:r>
-          </a:p>
-        </p:txBody>
-      </p:sp>
+      <p:pic>
+        <p:nvPicPr>
+          <p:cNvPr id="2" name="Picture 1" descr="image1.gif"/>
+          <p:cNvPicPr>
+            <a:picLocks noChangeAspect="1"/>
+          </p:cNvPicPr>
+          <p:nvPr/>
+        </p:nvPicPr>
+        <p:blipFill>
+          <a:blip r:embed="rId2"/>
+          <a:stretch>
+            <a:fillRect/>
+          </a:stretch>
+        </p:blipFill>
+        <p:spPr>
+          <a:xfrm>
+            <a:off x="0" y="0"/>
+            <a:ext cx="9144000" cy="6858000"/>
+          </a:xfrm>
+          <a:prstGeom prst="rect">
+            <a:avLst/>
+          </a:prstGeom>
+        </p:spPr>
+      </p:pic>
       <p:sp>
         <p:nvSpPr>
           <p:cNvPr id="3" name="TextBox 2"/>
@@ -3849,7 +5519,42 @@
         </p:nvSpPr>
         <p:spPr>
           <a:xfrm>
-            <a:off x="457200" y="1371600"/>
+            <a:off x="457200" y="228600"/>
+            <a:ext cx="8229600" cy="914400"/>
+          </a:xfrm>
+          <a:prstGeom prst="rect">
+            <a:avLst/>
+          </a:prstGeom>
+          <a:noFill/>
+        </p:spPr>
+        <p:txBody>
+          <a:bodyPr wrap="none">
+            <a:normAutofit/>
+          </a:bodyPr>
+          <a:lstStyle/>
+          <a:p/>
+          <a:p>
+            <a:pPr algn="ctr"/>
+            <a:r>
+              <a:rPr sz="3600" b="0">
+                <a:solidFill>
+                  <a:srgbClr val="FFFFFF"/>
+                </a:solidFill>
+              </a:rPr>
+              <a:t>Madhurashtakam</a:t>
+            </a:r>
+          </a:p>
+        </p:txBody>
+      </p:sp>
+      <p:sp>
+        <p:nvSpPr>
+          <p:cNvPr id="4" name="TextBox 3"/>
+          <p:cNvSpPr txBox="1"/>
+          <p:nvPr/>
+        </p:nvSpPr>
+        <p:spPr>
+          <a:xfrm>
+            <a:off x="457200" y="1143000"/>
             <a:ext cx="8229600" cy="5029200"/>
           </a:xfrm>
           <a:prstGeom prst="rect">
@@ -3866,23 +5571,22 @@
           <a:p>
             <a:pPr algn="ctr"/>
             <a:r>
-              <a:rPr sz="2600" b="0">
-                <a:solidFill>
-                  <a:srgbClr val="000000"/>
-                </a:solidFill>
-              </a:rPr>
-              <a:t>Aao Pyare Nayan Hamare Sai Hamare Aao
-Thum Bin Koi Nahi Rakhvale
-Thum Bin Kaun Sahare (Baba) (2)
-Aao Sai Pyare
-Sai Hamare Aao (3)</a:t>
-            </a:r>
-          </a:p>
-        </p:txBody>
-      </p:sp>
-      <p:sp>
-        <p:nvSpPr>
-          <p:cNvPr id="4" name="TextBox 3"/>
+              <a:rPr sz="3200" b="0">
+                <a:solidFill>
+                  <a:srgbClr val="FFFFFF"/>
+                </a:solidFill>
+              </a:rPr>
+              <a:t>Vennur-Madhuro Rennur-Madhurah 
+Paannir-Madhurah Paadau Madhurau |
+Nrtyam Madhuram Sakhyam Madhuram 
+Madhura-Adhipater-Akhilam Madhuram ||1||</a:t>
+            </a:r>
+          </a:p>
+        </p:txBody>
+      </p:sp>
+      <p:sp>
+        <p:nvSpPr>
+          <p:cNvPr id="5" name="TextBox 4"/>
           <p:cNvSpPr txBox="1"/>
           <p:nvPr/>
         </p:nvSpPr>
@@ -3903,21 +5607,21 @@
           <a:lstStyle/>
           <a:p/>
           <a:p>
-            <a:pPr algn="ctr"/>
+            <a:pPr algn="l"/>
             <a:r>
               <a:rPr sz="1600" b="0">
                 <a:solidFill>
-                  <a:srgbClr val="000000"/>
-                </a:solidFill>
-              </a:rPr>
-              <a:t>C</a:t>
-            </a:r>
-          </a:p>
-        </p:txBody>
-      </p:sp>
-      <p:sp>
-        <p:nvSpPr>
-          <p:cNvPr id="5" name="TextBox 4"/>
+                  <a:srgbClr val="FFFFFF"/>
+                </a:solidFill>
+              </a:rPr>
+              <a:t>B</a:t>
+            </a:r>
+          </a:p>
+        </p:txBody>
+      </p:sp>
+      <p:sp>
+        <p:nvSpPr>
+          <p:cNvPr id="6" name="TextBox 5"/>
           <p:cNvSpPr txBox="1"/>
           <p:nvPr/>
         </p:nvSpPr>
@@ -3942,17 +5646,17 @@
             <a:r>
               <a:rPr sz="1600" b="0">
                 <a:solidFill>
-                  <a:srgbClr val="000000"/>
-                </a:solidFill>
-              </a:rPr>
-              <a:t>Aarti</a:t>
-            </a:r>
-          </a:p>
-        </p:txBody>
-      </p:sp>
-      <p:sp>
-        <p:nvSpPr>
-          <p:cNvPr id="6" name="TextBox 5"/>
+                  <a:srgbClr val="FFFFFF"/>
+                </a:solidFill>
+              </a:rPr>
+              <a:t>Continued</a:t>
+            </a:r>
+          </a:p>
+        </p:txBody>
+      </p:sp>
+      <p:sp>
+        <p:nvSpPr>
+          <p:cNvPr id="7" name="TextBox 6"/>
           <p:cNvSpPr txBox="1"/>
           <p:nvPr/>
         </p:nvSpPr>
@@ -3973,14 +5677,14 @@
           <a:lstStyle/>
           <a:p/>
           <a:p>
-            <a:pPr algn="ctr"/>
+            <a:pPr algn="r"/>
             <a:r>
               <a:rPr sz="1600" b="0">
                 <a:solidFill>
-                  <a:srgbClr val="000000"/>
-                </a:solidFill>
-              </a:rPr>
-              <a:t>Dd</a:t>
+                  <a:srgbClr val="FFFFFF"/>
+                </a:solidFill>
+              </a:rPr>
+              <a:t/>
             </a:r>
           </a:p>
         </p:txBody>
@@ -4003,27 +5707,30 @@
         <p:nvPr/>
       </p:nvGrpSpPr>
       <p:grpSpPr/>
-      <p:sp>
-        <p:nvSpPr>
-          <p:cNvPr id="2" name="Title 1"/>
-          <p:cNvSpPr>
-            <a:spLocks noGrp="1"/>
-          </p:cNvSpPr>
-          <p:nvPr>
-            <p:ph type="title"/>
-          </p:nvPr>
-        </p:nvSpPr>
-        <p:spPr/>
-        <p:txBody>
-          <a:bodyPr/>
-          <a:lstStyle/>
-          <a:p>
-            <a:r>
-              <a:t>Aarti</a:t>
-            </a:r>
-          </a:p>
-        </p:txBody>
-      </p:sp>
+      <p:pic>
+        <p:nvPicPr>
+          <p:cNvPr id="2" name="Picture 1" descr="image1.gif"/>
+          <p:cNvPicPr>
+            <a:picLocks noChangeAspect="1"/>
+          </p:cNvPicPr>
+          <p:nvPr/>
+        </p:nvPicPr>
+        <p:blipFill>
+          <a:blip r:embed="rId2"/>
+          <a:stretch>
+            <a:fillRect/>
+          </a:stretch>
+        </p:blipFill>
+        <p:spPr>
+          <a:xfrm>
+            <a:off x="0" y="0"/>
+            <a:ext cx="9144000" cy="6858000"/>
+          </a:xfrm>
+          <a:prstGeom prst="rect">
+            <a:avLst/>
+          </a:prstGeom>
+        </p:spPr>
+      </p:pic>
       <p:sp>
         <p:nvSpPr>
           <p:cNvPr id="3" name="TextBox 2"/>
@@ -4032,7 +5739,42 @@
         </p:nvSpPr>
         <p:spPr>
           <a:xfrm>
-            <a:off x="457200" y="1371600"/>
+            <a:off x="457200" y="228600"/>
+            <a:ext cx="8229600" cy="914400"/>
+          </a:xfrm>
+          <a:prstGeom prst="rect">
+            <a:avLst/>
+          </a:prstGeom>
+          <a:noFill/>
+        </p:spPr>
+        <p:txBody>
+          <a:bodyPr wrap="none">
+            <a:normAutofit/>
+          </a:bodyPr>
+          <a:lstStyle/>
+          <a:p/>
+          <a:p>
+            <a:pPr algn="ctr"/>
+            <a:r>
+              <a:rPr sz="3600" b="0">
+                <a:solidFill>
+                  <a:srgbClr val="FFFFFF"/>
+                </a:solidFill>
+              </a:rPr>
+              <a:t>Madhurashtakam</a:t>
+            </a:r>
+          </a:p>
+        </p:txBody>
+      </p:sp>
+      <p:sp>
+        <p:nvSpPr>
+          <p:cNvPr id="4" name="TextBox 3"/>
+          <p:cNvSpPr txBox="1"/>
+          <p:nvPr/>
+        </p:nvSpPr>
+        <p:spPr>
+          <a:xfrm>
+            <a:off x="457200" y="1143000"/>
             <a:ext cx="8229600" cy="5029200"/>
           </a:xfrm>
           <a:prstGeom prst="rect">
@@ -4049,28 +5791,22 @@
           <a:p>
             <a:pPr algn="ctr"/>
             <a:r>
-              <a:rPr sz="2600" b="0">
-                <a:solidFill>
-                  <a:srgbClr val="000000"/>
-                </a:solidFill>
-              </a:rPr>
-              <a:t>Om Jai Jagadish Hare Swami Sathya Sai Hare
-Bhaktajana Samrakshaka Bhaktajana Samrakshak
-Parthimaheshwara Om Jai Jagadish Hare
-Shashivadana Shreekara Sarva Pranapathe
-Swami Sarva Pranapathe
-Aashrita Kalpalatheeka
-Aashrita Kalpalatheeka
-Aapathbaandhava
-Om Jai Jagadish Hare
-</a:t>
-            </a:r>
-          </a:p>
-        </p:txBody>
-      </p:sp>
-      <p:sp>
-        <p:nvSpPr>
-          <p:cNvPr id="4" name="TextBox 3"/>
+              <a:rPr sz="3200" b="0">
+                <a:solidFill>
+                  <a:srgbClr val="FFFFFF"/>
+                </a:solidFill>
+              </a:rPr>
+              <a:t>Giitam Madhuram Piitam Madhuram 
+Bhuktam Madhuram Suptam Madhuram |
+Ruupam Madhuram Tilakam Madhuram
+Madhura-Adhipater-Akhilam Madhuram ||2||</a:t>
+            </a:r>
+          </a:p>
+        </p:txBody>
+      </p:sp>
+      <p:sp>
+        <p:nvSpPr>
+          <p:cNvPr id="5" name="TextBox 4"/>
           <p:cNvSpPr txBox="1"/>
           <p:nvPr/>
         </p:nvSpPr>
@@ -4091,21 +5827,21 @@
           <a:lstStyle/>
           <a:p/>
           <a:p>
-            <a:pPr algn="ctr"/>
+            <a:pPr algn="l"/>
             <a:r>
               <a:rPr sz="1600" b="0">
                 <a:solidFill>
-                  <a:srgbClr val="000000"/>
-                </a:solidFill>
-              </a:rPr>
-              <a:t>Dd</a:t>
-            </a:r>
-          </a:p>
-        </p:txBody>
-      </p:sp>
-      <p:sp>
-        <p:nvSpPr>
-          <p:cNvPr id="5" name="TextBox 4"/>
+                  <a:srgbClr val="FFFFFF"/>
+                </a:solidFill>
+              </a:rPr>
+              <a:t>B</a:t>
+            </a:r>
+          </a:p>
+        </p:txBody>
+      </p:sp>
+      <p:sp>
+        <p:nvSpPr>
+          <p:cNvPr id="6" name="TextBox 5"/>
           <p:cNvSpPr txBox="1"/>
           <p:nvPr/>
         </p:nvSpPr>
@@ -4130,7 +5866,7 @@
             <a:r>
               <a:rPr sz="1600" b="0">
                 <a:solidFill>
-                  <a:srgbClr val="000000"/>
+                  <a:srgbClr val="FFFFFF"/>
                 </a:solidFill>
               </a:rPr>
               <a:t>Continued</a:t>
@@ -4140,7 +5876,7 @@
       </p:sp>
       <p:sp>
         <p:nvSpPr>
-          <p:cNvPr id="6" name="TextBox 5"/>
+          <p:cNvPr id="7" name="TextBox 6"/>
           <p:cNvSpPr txBox="1"/>
           <p:nvPr/>
         </p:nvSpPr>
@@ -4161,11 +5897,11 @@
           <a:lstStyle/>
           <a:p/>
           <a:p>
-            <a:pPr algn="ctr"/>
+            <a:pPr algn="r"/>
             <a:r>
               <a:rPr sz="1600" b="0">
                 <a:solidFill>
-                  <a:srgbClr val="000000"/>
+                  <a:srgbClr val="FFFFFF"/>
                 </a:solidFill>
               </a:rPr>
               <a:t/>
@@ -4191,27 +5927,30 @@
         <p:nvPr/>
       </p:nvGrpSpPr>
       <p:grpSpPr/>
-      <p:sp>
-        <p:nvSpPr>
-          <p:cNvPr id="2" name="Title 1"/>
-          <p:cNvSpPr>
-            <a:spLocks noGrp="1"/>
-          </p:cNvSpPr>
-          <p:nvPr>
-            <p:ph type="title"/>
-          </p:nvPr>
-        </p:nvSpPr>
-        <p:spPr/>
-        <p:txBody>
-          <a:bodyPr/>
-          <a:lstStyle/>
-          <a:p>
-            <a:r>
-              <a:t>Aarti</a:t>
-            </a:r>
-          </a:p>
-        </p:txBody>
-      </p:sp>
+      <p:pic>
+        <p:nvPicPr>
+          <p:cNvPr id="2" name="Picture 1" descr="image1.gif"/>
+          <p:cNvPicPr>
+            <a:picLocks noChangeAspect="1"/>
+          </p:cNvPicPr>
+          <p:nvPr/>
+        </p:nvPicPr>
+        <p:blipFill>
+          <a:blip r:embed="rId2"/>
+          <a:stretch>
+            <a:fillRect/>
+          </a:stretch>
+        </p:blipFill>
+        <p:spPr>
+          <a:xfrm>
+            <a:off x="0" y="0"/>
+            <a:ext cx="9144000" cy="6858000"/>
+          </a:xfrm>
+          <a:prstGeom prst="rect">
+            <a:avLst/>
+          </a:prstGeom>
+        </p:spPr>
+      </p:pic>
       <p:sp>
         <p:nvSpPr>
           <p:cNvPr id="3" name="TextBox 2"/>
@@ -4220,7 +5959,42 @@
         </p:nvSpPr>
         <p:spPr>
           <a:xfrm>
-            <a:off x="457200" y="1371600"/>
+            <a:off x="457200" y="228600"/>
+            <a:ext cx="8229600" cy="914400"/>
+          </a:xfrm>
+          <a:prstGeom prst="rect">
+            <a:avLst/>
+          </a:prstGeom>
+          <a:noFill/>
+        </p:spPr>
+        <p:txBody>
+          <a:bodyPr wrap="none">
+            <a:normAutofit/>
+          </a:bodyPr>
+          <a:lstStyle/>
+          <a:p/>
+          <a:p>
+            <a:pPr algn="ctr"/>
+            <a:r>
+              <a:rPr sz="3600" b="0">
+                <a:solidFill>
+                  <a:srgbClr val="FFFFFF"/>
+                </a:solidFill>
+              </a:rPr>
+              <a:t>Madhurashtakam</a:t>
+            </a:r>
+          </a:p>
+        </p:txBody>
+      </p:sp>
+      <p:sp>
+        <p:nvSpPr>
+          <p:cNvPr id="4" name="TextBox 3"/>
+          <p:cNvSpPr txBox="1"/>
+          <p:nvPr/>
+        </p:nvSpPr>
+        <p:spPr>
+          <a:xfrm>
+            <a:off x="457200" y="1143000"/>
             <a:ext cx="8229600" cy="5029200"/>
           </a:xfrm>
           <a:prstGeom prst="rect">
@@ -4237,28 +6011,22 @@
           <a:p>
             <a:pPr algn="ctr"/>
             <a:r>
-              <a:rPr sz="2600" b="0">
-                <a:solidFill>
-                  <a:srgbClr val="000000"/>
-                </a:solidFill>
-              </a:rPr>
-              <a:t>Mata Pita Guru Daivamu Mariyanthayu Neeve
-Swami Mariyanthayu Neeve
-Nadabrahma Jagannatha
-Nadabrahma Jagannatha
-Nagendrashayana
-Om Jai Jagadish Hare
-Omkara Rupa Om Jai Shiva Sai Mahadeva
-Sathya Sai Mahadeva
-Mangala Aarti Anduko
-Mangala Aarti Anduko</a:t>
-            </a:r>
-          </a:p>
-        </p:txBody>
-      </p:sp>
-      <p:sp>
-        <p:nvSpPr>
-          <p:cNvPr id="4" name="TextBox 3"/>
+              <a:rPr sz="3200" b="0">
+                <a:solidFill>
+                  <a:srgbClr val="FFFFFF"/>
+                </a:solidFill>
+              </a:rPr>
+              <a:t>Karannam Madhuram Tarannam Madhuram 
+Harannam Madhuram Smarannam Madhuram |
+Vamitam Madhuram Shamitam Madhuram 
+Madhura-Adhipater-Akhilam Madhuram ||2||</a:t>
+            </a:r>
+          </a:p>
+        </p:txBody>
+      </p:sp>
+      <p:sp>
+        <p:nvSpPr>
+          <p:cNvPr id="5" name="TextBox 4"/>
           <p:cNvSpPr txBox="1"/>
           <p:nvPr/>
         </p:nvSpPr>
@@ -4279,21 +6047,21 @@
           <a:lstStyle/>
           <a:p/>
           <a:p>
-            <a:pPr algn="ctr"/>
+            <a:pPr algn="l"/>
             <a:r>
               <a:rPr sz="1600" b="0">
                 <a:solidFill>
-                  <a:srgbClr val="000000"/>
-                </a:solidFill>
-              </a:rPr>
-              <a:t>Dd</a:t>
-            </a:r>
-          </a:p>
-        </p:txBody>
-      </p:sp>
-      <p:sp>
-        <p:nvSpPr>
-          <p:cNvPr id="5" name="TextBox 4"/>
+                  <a:srgbClr val="FFFFFF"/>
+                </a:solidFill>
+              </a:rPr>
+              <a:t>B</a:t>
+            </a:r>
+          </a:p>
+        </p:txBody>
+      </p:sp>
+      <p:sp>
+        <p:nvSpPr>
+          <p:cNvPr id="6" name="TextBox 5"/>
           <p:cNvSpPr txBox="1"/>
           <p:nvPr/>
         </p:nvSpPr>
@@ -4318,7 +6086,7 @@
             <a:r>
               <a:rPr sz="1600" b="0">
                 <a:solidFill>
-                  <a:srgbClr val="000000"/>
+                  <a:srgbClr val="FFFFFF"/>
                 </a:solidFill>
               </a:rPr>
               <a:t>Continued</a:t>
@@ -4328,7 +6096,7 @@
       </p:sp>
       <p:sp>
         <p:nvSpPr>
-          <p:cNvPr id="6" name="TextBox 5"/>
+          <p:cNvPr id="7" name="TextBox 6"/>
           <p:cNvSpPr txBox="1"/>
           <p:nvPr/>
         </p:nvSpPr>
@@ -4349,11 +6117,11 @@
           <a:lstStyle/>
           <a:p/>
           <a:p>
-            <a:pPr algn="ctr"/>
+            <a:pPr algn="r"/>
             <a:r>
               <a:rPr sz="1600" b="0">
                 <a:solidFill>
-                  <a:srgbClr val="000000"/>
+                  <a:srgbClr val="FFFFFF"/>
                 </a:solidFill>
               </a:rPr>
               <a:t/>
@@ -4379,27 +6147,30 @@
         <p:nvPr/>
       </p:nvGrpSpPr>
       <p:grpSpPr/>
-      <p:sp>
-        <p:nvSpPr>
-          <p:cNvPr id="2" name="Title 1"/>
-          <p:cNvSpPr>
-            <a:spLocks noGrp="1"/>
-          </p:cNvSpPr>
-          <p:nvPr>
-            <p:ph type="title"/>
-          </p:nvPr>
-        </p:nvSpPr>
-        <p:spPr/>
-        <p:txBody>
-          <a:bodyPr/>
-          <a:lstStyle/>
-          <a:p>
-            <a:r>
-              <a:t>Aarti</a:t>
-            </a:r>
-          </a:p>
-        </p:txBody>
-      </p:sp>
+      <p:pic>
+        <p:nvPicPr>
+          <p:cNvPr id="2" name="Picture 1" descr="image1.gif"/>
+          <p:cNvPicPr>
+            <a:picLocks noChangeAspect="1"/>
+          </p:cNvPicPr>
+          <p:nvPr/>
+        </p:nvPicPr>
+        <p:blipFill>
+          <a:blip r:embed="rId2"/>
+          <a:stretch>
+            <a:fillRect/>
+          </a:stretch>
+        </p:blipFill>
+        <p:spPr>
+          <a:xfrm>
+            <a:off x="0" y="0"/>
+            <a:ext cx="9144000" cy="6858000"/>
+          </a:xfrm>
+          <a:prstGeom prst="rect">
+            <a:avLst/>
+          </a:prstGeom>
+        </p:spPr>
+      </p:pic>
       <p:sp>
         <p:nvSpPr>
           <p:cNvPr id="3" name="TextBox 2"/>
@@ -4408,7 +6179,42 @@
         </p:nvSpPr>
         <p:spPr>
           <a:xfrm>
-            <a:off x="457200" y="1371600"/>
+            <a:off x="457200" y="228600"/>
+            <a:ext cx="8229600" cy="914400"/>
+          </a:xfrm>
+          <a:prstGeom prst="rect">
+            <a:avLst/>
+          </a:prstGeom>
+          <a:noFill/>
+        </p:spPr>
+        <p:txBody>
+          <a:bodyPr wrap="none">
+            <a:normAutofit/>
+          </a:bodyPr>
+          <a:lstStyle/>
+          <a:p/>
+          <a:p>
+            <a:pPr algn="ctr"/>
+            <a:r>
+              <a:rPr sz="3600" b="0">
+                <a:solidFill>
+                  <a:srgbClr val="FFFFFF"/>
+                </a:solidFill>
+              </a:rPr>
+              <a:t>Madhurashtakam</a:t>
+            </a:r>
+          </a:p>
+        </p:txBody>
+      </p:sp>
+      <p:sp>
+        <p:nvSpPr>
+          <p:cNvPr id="4" name="TextBox 3"/>
+          <p:cNvSpPr txBox="1"/>
+          <p:nvPr/>
+        </p:nvSpPr>
+        <p:spPr>
+          <a:xfrm>
+            <a:off x="457200" y="1143000"/>
             <a:ext cx="8229600" cy="5029200"/>
           </a:xfrm>
           <a:prstGeom prst="rect">
@@ -4425,25 +6231,22 @@
           <a:p>
             <a:pPr algn="ctr"/>
             <a:r>
-              <a:rPr sz="2600" b="0">
-                <a:solidFill>
-                  <a:srgbClr val="000000"/>
-                </a:solidFill>
-              </a:rPr>
-              <a:t>Mandaragiridhari
-Om Jai Jagadish Hare
-Narayana Narayana Om Sathya
-Narayana Narayana Narayana Om
-Narayana Narayana Om Sathya
-Narayana Narayana Om Sathya
-Om Jai Satguru Deva</a:t>
-            </a:r>
-          </a:p>
-        </p:txBody>
-      </p:sp>
-      <p:sp>
-        <p:nvSpPr>
-          <p:cNvPr id="4" name="TextBox 3"/>
+              <a:rPr sz="3200" b="0">
+                <a:solidFill>
+                  <a:srgbClr val="FFFFFF"/>
+                </a:solidFill>
+              </a:rPr>
+              <a:t>Gun.Jaa Madhuraa Maalaa Madhuraa
+Yamunaa Madhuraa Viicii Madhuraa |
+Salilam Madhuram Kamalam Madhuram 
+Madhura-Adhipater Akhilam Madhuram ||2||</a:t>
+            </a:r>
+          </a:p>
+        </p:txBody>
+      </p:sp>
+      <p:sp>
+        <p:nvSpPr>
+          <p:cNvPr id="5" name="TextBox 4"/>
           <p:cNvSpPr txBox="1"/>
           <p:nvPr/>
         </p:nvSpPr>
@@ -4464,21 +6267,21 @@
           <a:lstStyle/>
           <a:p/>
           <a:p>
-            <a:pPr algn="ctr"/>
+            <a:pPr algn="l"/>
             <a:r>
               <a:rPr sz="1600" b="0">
                 <a:solidFill>
-                  <a:srgbClr val="000000"/>
-                </a:solidFill>
-              </a:rPr>
-              <a:t>Dd</a:t>
-            </a:r>
-          </a:p>
-        </p:txBody>
-      </p:sp>
-      <p:sp>
-        <p:nvSpPr>
-          <p:cNvPr id="5" name="TextBox 4"/>
+                  <a:srgbClr val="FFFFFF"/>
+                </a:solidFill>
+              </a:rPr>
+              <a:t>B</a:t>
+            </a:r>
+          </a:p>
+        </p:txBody>
+      </p:sp>
+      <p:sp>
+        <p:nvSpPr>
+          <p:cNvPr id="6" name="TextBox 5"/>
           <p:cNvSpPr txBox="1"/>
           <p:nvPr/>
         </p:nvSpPr>
@@ -4503,17 +6306,17 @@
             <a:r>
               <a:rPr sz="1600" b="0">
                 <a:solidFill>
-                  <a:srgbClr val="000000"/>
-                </a:solidFill>
-              </a:rPr>
-              <a:t>Vibhuti Mantra</a:t>
-            </a:r>
-          </a:p>
-        </p:txBody>
-      </p:sp>
-      <p:sp>
-        <p:nvSpPr>
-          <p:cNvPr id="6" name="TextBox 5"/>
+                  <a:srgbClr val="FFFFFF"/>
+                </a:solidFill>
+              </a:rPr>
+              <a:t>Continued</a:t>
+            </a:r>
+          </a:p>
+        </p:txBody>
+      </p:sp>
+      <p:sp>
+        <p:nvSpPr>
+          <p:cNvPr id="7" name="TextBox 6"/>
           <p:cNvSpPr txBox="1"/>
           <p:nvPr/>
         </p:nvSpPr>
@@ -4534,14 +6337,14 @@
           <a:lstStyle/>
           <a:p/>
           <a:p>
-            <a:pPr algn="ctr"/>
+            <a:pPr algn="r"/>
             <a:r>
               <a:rPr sz="1600" b="0">
                 <a:solidFill>
-                  <a:srgbClr val="000000"/>
-                </a:solidFill>
-              </a:rPr>
-              <a:t>E</a:t>
+                  <a:srgbClr val="FFFFFF"/>
+                </a:solidFill>
+              </a:rPr>
+              <a:t/>
             </a:r>
           </a:p>
         </p:txBody>

</xml_diff>

<commit_message>
Fixed a bug where position was being sorted as a string instead of int
Titles longer than 35 characters are now split into two lines
</commit_message>
<xml_diff>
--- a/generated_ppts/bhajans.pptx
+++ b/generated_ppts/bhajans.pptx
@@ -7,6 +7,18 @@
   <p:sldIdLst>
     <p:sldId r:id="rId7" id="256"/>
     <p:sldId r:id="rId8" id="257"/>
+    <p:sldId r:id="rId9" id="258"/>
+    <p:sldId r:id="rId10" id="259"/>
+    <p:sldId r:id="rId11" id="260"/>
+    <p:sldId r:id="rId12" id="261"/>
+    <p:sldId r:id="rId13" id="262"/>
+    <p:sldId r:id="rId14" id="263"/>
+    <p:sldId r:id="rId15" id="264"/>
+    <p:sldId r:id="rId16" id="265"/>
+    <p:sldId r:id="rId17" id="266"/>
+    <p:sldId r:id="rId18" id="267"/>
+    <p:sldId r:id="rId19" id="268"/>
+    <p:sldId r:id="rId20" id="269"/>
   </p:sldIdLst>
   <p:sldSz cx="9144000" cy="6858000" type="screen4x3"/>
   <p:notesSz cx="6858000" cy="9144000"/>
@@ -3138,12 +3150,14 @@
           <a:p>
             <a:pPr algn="ctr"/>
             <a:r>
-              <a:rPr sz="4400" b="1">
-                <a:solidFill>
-                  <a:srgbClr val="FFFFFF"/>
-                </a:solidFill>
-              </a:rPr>
-              <a:t>Central London \n Sai Center</a:t>
+              <a:rPr sz="5400" b="1">
+                <a:solidFill>
+                  <a:srgbClr val="FFFFFF"/>
+                </a:solidFill>
+              </a:rPr>
+              <a:t>Central London 
+ Sai Center
+</a:t>
             </a:r>
             <a:r>
               <a:rPr sz="3200" b="1">
@@ -3151,7 +3165,1099 @@
                   <a:srgbClr val="FFFF0F"/>
                 </a:solidFill>
               </a:rPr>
-              <a:t>September 27, 2016</a:t>
+              <a:t>October 09, 2016</a:t>
+            </a:r>
+          </a:p>
+        </p:txBody>
+      </p:sp>
+    </p:spTree>
+  </p:cSld>
+  <p:clrMapOvr>
+    <a:masterClrMapping/>
+  </p:clrMapOvr>
+</p:sld>
+</file>
+
+<file path=ppt/slides/slide10.xml><?xml version="1.0" encoding="utf-8"?>
+<p:sld xmlns:a="http://schemas.openxmlformats.org/drawingml/2006/main" xmlns:p="http://schemas.openxmlformats.org/presentationml/2006/main" xmlns:r="http://schemas.openxmlformats.org/officeDocument/2006/relationships">
+  <p:cSld>
+    <p:spTree>
+      <p:nvGrpSpPr>
+        <p:cNvPr id="1" name=""/>
+        <p:cNvGrpSpPr/>
+        <p:nvPr/>
+      </p:nvGrpSpPr>
+      <p:grpSpPr/>
+      <p:pic>
+        <p:nvPicPr>
+          <p:cNvPr id="2" name="Picture 1" descr="title_slide.jpg"/>
+          <p:cNvPicPr>
+            <a:picLocks noChangeAspect="1"/>
+          </p:cNvPicPr>
+          <p:nvPr/>
+        </p:nvPicPr>
+        <p:blipFill>
+          <a:blip r:embed="rId2"/>
+          <a:stretch>
+            <a:fillRect/>
+          </a:stretch>
+        </p:blipFill>
+        <p:spPr>
+          <a:xfrm>
+            <a:off x="0" y="0"/>
+            <a:ext cx="9144000" cy="6858000"/>
+          </a:xfrm>
+          <a:prstGeom prst="rect">
+            <a:avLst/>
+          </a:prstGeom>
+        </p:spPr>
+      </p:pic>
+      <p:sp>
+        <p:nvSpPr>
+          <p:cNvPr id="3" name="TextBox 2"/>
+          <p:cNvSpPr txBox="1"/>
+          <p:nvPr/>
+        </p:nvSpPr>
+        <p:spPr>
+          <a:xfrm>
+            <a:off x="457200" y="182880"/>
+            <a:ext cx="8229600" cy="960120"/>
+          </a:xfrm>
+          <a:prstGeom prst="rect">
+            <a:avLst/>
+          </a:prstGeom>
+          <a:noFill/>
+        </p:spPr>
+        <p:txBody>
+          <a:bodyPr wrap="none">
+            <a:normAutofit/>
+          </a:bodyPr>
+          <a:lstStyle/>
+          <a:p/>
+          <a:p>
+            <a:pPr algn="l"/>
+            <a:r>
+              <a:rPr sz="3600" b="0">
+                <a:solidFill>
+                  <a:srgbClr val="FFFFFF"/>
+                </a:solidFill>
+              </a:rPr>
+              <a:t/>
+            </a:r>
+          </a:p>
+        </p:txBody>
+      </p:sp>
+      <p:sp>
+        <p:nvSpPr>
+          <p:cNvPr id="4" name="TextBox 3"/>
+          <p:cNvSpPr txBox="1"/>
+          <p:nvPr/>
+        </p:nvSpPr>
+        <p:spPr>
+          <a:xfrm>
+            <a:off x="457200" y="1143000"/>
+            <a:ext cx="8229600" cy="5029200"/>
+          </a:xfrm>
+          <a:prstGeom prst="rect">
+            <a:avLst/>
+          </a:prstGeom>
+          <a:noFill/>
+        </p:spPr>
+        <p:txBody>
+          <a:bodyPr wrap="none">
+            <a:normAutofit/>
+          </a:bodyPr>
+          <a:lstStyle/>
+          <a:p/>
+          <a:p>
+            <a:pPr algn="l"/>
+            <a:r>
+              <a:rPr sz="3200" b="0">
+                <a:solidFill>
+                  <a:srgbClr val="FFFFFF"/>
+                </a:solidFill>
+              </a:rPr>
+              <a:t/>
+            </a:r>
+          </a:p>
+        </p:txBody>
+      </p:sp>
+      <p:sp>
+        <p:nvSpPr>
+          <p:cNvPr id="5" name="TextBox 4"/>
+          <p:cNvSpPr txBox="1"/>
+          <p:nvPr/>
+        </p:nvSpPr>
+        <p:spPr>
+          <a:xfrm>
+            <a:off x="457200" y="5943600"/>
+            <a:ext cx="914400" cy="685800"/>
+          </a:xfrm>
+          <a:prstGeom prst="rect">
+            <a:avLst/>
+          </a:prstGeom>
+          <a:noFill/>
+        </p:spPr>
+        <p:txBody>
+          <a:bodyPr wrap="none">
+            <a:normAutofit/>
+          </a:bodyPr>
+          <a:lstStyle/>
+          <a:p/>
+          <a:p>
+            <a:pPr algn="l"/>
+            <a:r>
+              <a:rPr sz="1600" b="0">
+                <a:solidFill>
+                  <a:srgbClr val="FFFFFF"/>
+                </a:solidFill>
+              </a:rPr>
+              <a:t/>
+            </a:r>
+          </a:p>
+        </p:txBody>
+      </p:sp>
+      <p:sp>
+        <p:nvSpPr>
+          <p:cNvPr id="6" name="TextBox 5"/>
+          <p:cNvSpPr txBox="1"/>
+          <p:nvPr/>
+        </p:nvSpPr>
+        <p:spPr>
+          <a:xfrm>
+            <a:off x="2286000" y="5943600"/>
+            <a:ext cx="3657600" cy="685800"/>
+          </a:xfrm>
+          <a:prstGeom prst="rect">
+            <a:avLst/>
+          </a:prstGeom>
+          <a:noFill/>
+        </p:spPr>
+        <p:txBody>
+          <a:bodyPr wrap="none">
+            <a:normAutofit/>
+          </a:bodyPr>
+          <a:lstStyle/>
+          <a:p/>
+          <a:p>
+            <a:pPr algn="ctr"/>
+            <a:r>
+              <a:rPr sz="1600" b="0">
+                <a:solidFill>
+                  <a:srgbClr val="FFFFFF"/>
+                </a:solidFill>
+              </a:rPr>
+              <a:t/>
+            </a:r>
+          </a:p>
+        </p:txBody>
+      </p:sp>
+      <p:sp>
+        <p:nvSpPr>
+          <p:cNvPr id="7" name="TextBox 6"/>
+          <p:cNvSpPr txBox="1"/>
+          <p:nvPr/>
+        </p:nvSpPr>
+        <p:spPr>
+          <a:xfrm>
+            <a:off x="7315200" y="5943600"/>
+            <a:ext cx="914400" cy="685800"/>
+          </a:xfrm>
+          <a:prstGeom prst="rect">
+            <a:avLst/>
+          </a:prstGeom>
+          <a:noFill/>
+        </p:spPr>
+        <p:txBody>
+          <a:bodyPr wrap="none">
+            <a:normAutofit/>
+          </a:bodyPr>
+          <a:lstStyle/>
+          <a:p/>
+          <a:p>
+            <a:pPr algn="r"/>
+            <a:r>
+              <a:rPr sz="1600" b="0">
+                <a:solidFill>
+                  <a:srgbClr val="FFFFFF"/>
+                </a:solidFill>
+              </a:rPr>
+              <a:t/>
+            </a:r>
+          </a:p>
+        </p:txBody>
+      </p:sp>
+    </p:spTree>
+  </p:cSld>
+  <p:clrMapOvr>
+    <a:masterClrMapping/>
+  </p:clrMapOvr>
+</p:sld>
+</file>
+
+<file path=ppt/slides/slide11.xml><?xml version="1.0" encoding="utf-8"?>
+<p:sld xmlns:a="http://schemas.openxmlformats.org/drawingml/2006/main" xmlns:p="http://schemas.openxmlformats.org/presentationml/2006/main" xmlns:r="http://schemas.openxmlformats.org/officeDocument/2006/relationships">
+  <p:cSld>
+    <p:spTree>
+      <p:nvGrpSpPr>
+        <p:cNvPr id="1" name=""/>
+        <p:cNvGrpSpPr/>
+        <p:nvPr/>
+      </p:nvGrpSpPr>
+      <p:grpSpPr/>
+      <p:pic>
+        <p:nvPicPr>
+          <p:cNvPr id="2" name="Picture 1" descr="title_slide.jpg"/>
+          <p:cNvPicPr>
+            <a:picLocks noChangeAspect="1"/>
+          </p:cNvPicPr>
+          <p:nvPr/>
+        </p:nvPicPr>
+        <p:blipFill>
+          <a:blip r:embed="rId2"/>
+          <a:stretch>
+            <a:fillRect/>
+          </a:stretch>
+        </p:blipFill>
+        <p:spPr>
+          <a:xfrm>
+            <a:off x="0" y="0"/>
+            <a:ext cx="9144000" cy="6858000"/>
+          </a:xfrm>
+          <a:prstGeom prst="rect">
+            <a:avLst/>
+          </a:prstGeom>
+        </p:spPr>
+      </p:pic>
+      <p:sp>
+        <p:nvSpPr>
+          <p:cNvPr id="3" name="TextBox 2"/>
+          <p:cNvSpPr txBox="1"/>
+          <p:nvPr/>
+        </p:nvSpPr>
+        <p:spPr>
+          <a:xfrm>
+            <a:off x="457200" y="182880"/>
+            <a:ext cx="8229600" cy="960120"/>
+          </a:xfrm>
+          <a:prstGeom prst="rect">
+            <a:avLst/>
+          </a:prstGeom>
+          <a:noFill/>
+        </p:spPr>
+        <p:txBody>
+          <a:bodyPr wrap="none">
+            <a:normAutofit/>
+          </a:bodyPr>
+          <a:lstStyle/>
+          <a:p/>
+          <a:p>
+            <a:pPr algn="l"/>
+            <a:r>
+              <a:rPr sz="3600" b="0">
+                <a:solidFill>
+                  <a:srgbClr val="FFFFFF"/>
+                </a:solidFill>
+              </a:rPr>
+              <a:t/>
+            </a:r>
+          </a:p>
+        </p:txBody>
+      </p:sp>
+      <p:sp>
+        <p:nvSpPr>
+          <p:cNvPr id="4" name="TextBox 3"/>
+          <p:cNvSpPr txBox="1"/>
+          <p:nvPr/>
+        </p:nvSpPr>
+        <p:spPr>
+          <a:xfrm>
+            <a:off x="457200" y="1143000"/>
+            <a:ext cx="8229600" cy="5029200"/>
+          </a:xfrm>
+          <a:prstGeom prst="rect">
+            <a:avLst/>
+          </a:prstGeom>
+          <a:noFill/>
+        </p:spPr>
+        <p:txBody>
+          <a:bodyPr wrap="none">
+            <a:normAutofit/>
+          </a:bodyPr>
+          <a:lstStyle/>
+          <a:p/>
+          <a:p>
+            <a:pPr algn="l"/>
+            <a:r>
+              <a:rPr sz="3200" b="0">
+                <a:solidFill>
+                  <a:srgbClr val="FFFFFF"/>
+                </a:solidFill>
+              </a:rPr>
+              <a:t/>
+            </a:r>
+          </a:p>
+        </p:txBody>
+      </p:sp>
+      <p:sp>
+        <p:nvSpPr>
+          <p:cNvPr id="5" name="TextBox 4"/>
+          <p:cNvSpPr txBox="1"/>
+          <p:nvPr/>
+        </p:nvSpPr>
+        <p:spPr>
+          <a:xfrm>
+            <a:off x="457200" y="5943600"/>
+            <a:ext cx="914400" cy="685800"/>
+          </a:xfrm>
+          <a:prstGeom prst="rect">
+            <a:avLst/>
+          </a:prstGeom>
+          <a:noFill/>
+        </p:spPr>
+        <p:txBody>
+          <a:bodyPr wrap="none">
+            <a:normAutofit/>
+          </a:bodyPr>
+          <a:lstStyle/>
+          <a:p/>
+          <a:p>
+            <a:pPr algn="l"/>
+            <a:r>
+              <a:rPr sz="1600" b="0">
+                <a:solidFill>
+                  <a:srgbClr val="FFFFFF"/>
+                </a:solidFill>
+              </a:rPr>
+              <a:t/>
+            </a:r>
+          </a:p>
+        </p:txBody>
+      </p:sp>
+      <p:sp>
+        <p:nvSpPr>
+          <p:cNvPr id="6" name="TextBox 5"/>
+          <p:cNvSpPr txBox="1"/>
+          <p:nvPr/>
+        </p:nvSpPr>
+        <p:spPr>
+          <a:xfrm>
+            <a:off x="2286000" y="5943600"/>
+            <a:ext cx="3657600" cy="685800"/>
+          </a:xfrm>
+          <a:prstGeom prst="rect">
+            <a:avLst/>
+          </a:prstGeom>
+          <a:noFill/>
+        </p:spPr>
+        <p:txBody>
+          <a:bodyPr wrap="none">
+            <a:normAutofit/>
+          </a:bodyPr>
+          <a:lstStyle/>
+          <a:p/>
+          <a:p>
+            <a:pPr algn="ctr"/>
+            <a:r>
+              <a:rPr sz="1600" b="0">
+                <a:solidFill>
+                  <a:srgbClr val="FFFFFF"/>
+                </a:solidFill>
+              </a:rPr>
+              <a:t>Harey Rama Harey Rama Rama Rama Harey Harey</a:t>
+            </a:r>
+          </a:p>
+        </p:txBody>
+      </p:sp>
+      <p:sp>
+        <p:nvSpPr>
+          <p:cNvPr id="7" name="TextBox 6"/>
+          <p:cNvSpPr txBox="1"/>
+          <p:nvPr/>
+        </p:nvSpPr>
+        <p:spPr>
+          <a:xfrm>
+            <a:off x="7315200" y="5943600"/>
+            <a:ext cx="914400" cy="685800"/>
+          </a:xfrm>
+          <a:prstGeom prst="rect">
+            <a:avLst/>
+          </a:prstGeom>
+          <a:noFill/>
+        </p:spPr>
+        <p:txBody>
+          <a:bodyPr wrap="none">
+            <a:normAutofit/>
+          </a:bodyPr>
+          <a:lstStyle/>
+          <a:p/>
+          <a:p>
+            <a:pPr algn="r"/>
+            <a:r>
+              <a:rPr sz="1600" b="0">
+                <a:solidFill>
+                  <a:srgbClr val="FFFFFF"/>
+                </a:solidFill>
+              </a:rPr>
+              <a:t/>
+            </a:r>
+          </a:p>
+        </p:txBody>
+      </p:sp>
+    </p:spTree>
+  </p:cSld>
+  <p:clrMapOvr>
+    <a:masterClrMapping/>
+  </p:clrMapOvr>
+</p:sld>
+</file>
+
+<file path=ppt/slides/slide12.xml><?xml version="1.0" encoding="utf-8"?>
+<p:sld xmlns:a="http://schemas.openxmlformats.org/drawingml/2006/main" xmlns:p="http://schemas.openxmlformats.org/presentationml/2006/main" xmlns:r="http://schemas.openxmlformats.org/officeDocument/2006/relationships">
+  <p:cSld>
+    <p:spTree>
+      <p:nvGrpSpPr>
+        <p:cNvPr id="1" name=""/>
+        <p:cNvGrpSpPr/>
+        <p:nvPr/>
+      </p:nvGrpSpPr>
+      <p:grpSpPr/>
+      <p:pic>
+        <p:nvPicPr>
+          <p:cNvPr id="2" name="Picture 1" descr="image1.gif"/>
+          <p:cNvPicPr>
+            <a:picLocks noChangeAspect="1"/>
+          </p:cNvPicPr>
+          <p:nvPr/>
+        </p:nvPicPr>
+        <p:blipFill>
+          <a:blip r:embed="rId2"/>
+          <a:stretch>
+            <a:fillRect/>
+          </a:stretch>
+        </p:blipFill>
+        <p:spPr>
+          <a:xfrm>
+            <a:off x="0" y="0"/>
+            <a:ext cx="9144000" cy="6858000"/>
+          </a:xfrm>
+          <a:prstGeom prst="rect">
+            <a:avLst/>
+          </a:prstGeom>
+        </p:spPr>
+      </p:pic>
+      <p:sp>
+        <p:nvSpPr>
+          <p:cNvPr id="3" name="TextBox 2"/>
+          <p:cNvSpPr txBox="1"/>
+          <p:nvPr/>
+        </p:nvSpPr>
+        <p:spPr>
+          <a:xfrm>
+            <a:off x="457200" y="182880"/>
+            <a:ext cx="8229600" cy="960120"/>
+          </a:xfrm>
+          <a:prstGeom prst="rect">
+            <a:avLst/>
+          </a:prstGeom>
+          <a:noFill/>
+        </p:spPr>
+        <p:txBody>
+          <a:bodyPr wrap="none">
+            <a:normAutofit/>
+          </a:bodyPr>
+          <a:lstStyle/>
+          <a:p/>
+          <a:p>
+            <a:pPr algn="l"/>
+            <a:r>
+              <a:rPr sz="3600" b="0">
+                <a:solidFill>
+                  <a:srgbClr val="FFFFFF"/>
+                </a:solidFill>
+              </a:rPr>
+              <a:t>Harey Rama Harey Rama Rama Rama
+Harey Harey</a:t>
+            </a:r>
+          </a:p>
+        </p:txBody>
+      </p:sp>
+      <p:sp>
+        <p:nvSpPr>
+          <p:cNvPr id="4" name="TextBox 3"/>
+          <p:cNvSpPr txBox="1"/>
+          <p:nvPr/>
+        </p:nvSpPr>
+        <p:spPr>
+          <a:xfrm>
+            <a:off x="457200" y="1143000"/>
+            <a:ext cx="8229600" cy="5029200"/>
+          </a:xfrm>
+          <a:prstGeom prst="rect">
+            <a:avLst/>
+          </a:prstGeom>
+          <a:noFill/>
+        </p:spPr>
+        <p:txBody>
+          <a:bodyPr wrap="none">
+            <a:normAutofit/>
+          </a:bodyPr>
+          <a:lstStyle/>
+          <a:p/>
+          <a:p>
+            <a:pPr algn="l"/>
+            <a:r>
+              <a:rPr sz="3200" b="0">
+                <a:solidFill>
+                  <a:srgbClr val="FFFFFF"/>
+                </a:solidFill>
+              </a:rPr>
+              <a:t>Harey Rama Harey Rama Rama Rama Harey Harey
+Harey Krishna Harey Krishna Krishna Krishna Harey
+Harey
+Satsangathwey Nithsangathwam Nithsangathwey
+Nirmohathwam
+Nirmohatwey Nischala Thatwam Nischala Thatwey
+Jeevan Mukti</a:t>
+            </a:r>
+          </a:p>
+        </p:txBody>
+      </p:sp>
+      <p:sp>
+        <p:nvSpPr>
+          <p:cNvPr id="5" name="TextBox 4"/>
+          <p:cNvSpPr txBox="1"/>
+          <p:nvPr/>
+        </p:nvSpPr>
+        <p:spPr>
+          <a:xfrm>
+            <a:off x="457200" y="5943600"/>
+            <a:ext cx="914400" cy="685800"/>
+          </a:xfrm>
+          <a:prstGeom prst="rect">
+            <a:avLst/>
+          </a:prstGeom>
+          <a:noFill/>
+        </p:spPr>
+        <p:txBody>
+          <a:bodyPr wrap="none">
+            <a:normAutofit/>
+          </a:bodyPr>
+          <a:lstStyle/>
+          <a:p/>
+          <a:p>
+            <a:pPr algn="l"/>
+            <a:r>
+              <a:rPr sz="1600" b="0">
+                <a:solidFill>
+                  <a:srgbClr val="FFFFFF"/>
+                </a:solidFill>
+              </a:rPr>
+              <a:t/>
+            </a:r>
+          </a:p>
+        </p:txBody>
+      </p:sp>
+      <p:sp>
+        <p:nvSpPr>
+          <p:cNvPr id="6" name="TextBox 5"/>
+          <p:cNvSpPr txBox="1"/>
+          <p:nvPr/>
+        </p:nvSpPr>
+        <p:spPr>
+          <a:xfrm>
+            <a:off x="2286000" y="5943600"/>
+            <a:ext cx="3657600" cy="685800"/>
+          </a:xfrm>
+          <a:prstGeom prst="rect">
+            <a:avLst/>
+          </a:prstGeom>
+          <a:noFill/>
+        </p:spPr>
+        <p:txBody>
+          <a:bodyPr wrap="none">
+            <a:normAutofit/>
+          </a:bodyPr>
+          <a:lstStyle/>
+          <a:p/>
+          <a:p>
+            <a:pPr algn="ctr"/>
+            <a:r>
+              <a:rPr sz="1600" b="0">
+                <a:solidFill>
+                  <a:srgbClr val="FFFFFF"/>
+                </a:solidFill>
+              </a:rPr>
+              <a:t/>
+            </a:r>
+          </a:p>
+        </p:txBody>
+      </p:sp>
+      <p:sp>
+        <p:nvSpPr>
+          <p:cNvPr id="7" name="TextBox 6"/>
+          <p:cNvSpPr txBox="1"/>
+          <p:nvPr/>
+        </p:nvSpPr>
+        <p:spPr>
+          <a:xfrm>
+            <a:off x="7315200" y="5943600"/>
+            <a:ext cx="914400" cy="685800"/>
+          </a:xfrm>
+          <a:prstGeom prst="rect">
+            <a:avLst/>
+          </a:prstGeom>
+          <a:noFill/>
+        </p:spPr>
+        <p:txBody>
+          <a:bodyPr wrap="none">
+            <a:normAutofit/>
+          </a:bodyPr>
+          <a:lstStyle/>
+          <a:p/>
+          <a:p>
+            <a:pPr algn="r"/>
+            <a:r>
+              <a:rPr sz="1600" b="0">
+                <a:solidFill>
+                  <a:srgbClr val="FFFFFF"/>
+                </a:solidFill>
+              </a:rPr>
+              <a:t/>
+            </a:r>
+          </a:p>
+        </p:txBody>
+      </p:sp>
+    </p:spTree>
+  </p:cSld>
+  <p:clrMapOvr>
+    <a:masterClrMapping/>
+  </p:clrMapOvr>
+</p:sld>
+</file>
+
+<file path=ppt/slides/slide13.xml><?xml version="1.0" encoding="utf-8"?>
+<p:sld xmlns:a="http://schemas.openxmlformats.org/drawingml/2006/main" xmlns:p="http://schemas.openxmlformats.org/presentationml/2006/main" xmlns:r="http://schemas.openxmlformats.org/officeDocument/2006/relationships">
+  <p:cSld>
+    <p:spTree>
+      <p:nvGrpSpPr>
+        <p:cNvPr id="1" name=""/>
+        <p:cNvGrpSpPr/>
+        <p:nvPr/>
+      </p:nvGrpSpPr>
+      <p:grpSpPr/>
+      <p:pic>
+        <p:nvPicPr>
+          <p:cNvPr id="2" name="Picture 1" descr="title_slide.jpg"/>
+          <p:cNvPicPr>
+            <a:picLocks noChangeAspect="1"/>
+          </p:cNvPicPr>
+          <p:nvPr/>
+        </p:nvPicPr>
+        <p:blipFill>
+          <a:blip r:embed="rId2"/>
+          <a:stretch>
+            <a:fillRect/>
+          </a:stretch>
+        </p:blipFill>
+        <p:spPr>
+          <a:xfrm>
+            <a:off x="0" y="0"/>
+            <a:ext cx="9144000" cy="6858000"/>
+          </a:xfrm>
+          <a:prstGeom prst="rect">
+            <a:avLst/>
+          </a:prstGeom>
+        </p:spPr>
+      </p:pic>
+      <p:sp>
+        <p:nvSpPr>
+          <p:cNvPr id="3" name="TextBox 2"/>
+          <p:cNvSpPr txBox="1"/>
+          <p:nvPr/>
+        </p:nvSpPr>
+        <p:spPr>
+          <a:xfrm>
+            <a:off x="457200" y="182880"/>
+            <a:ext cx="8229600" cy="960120"/>
+          </a:xfrm>
+          <a:prstGeom prst="rect">
+            <a:avLst/>
+          </a:prstGeom>
+          <a:noFill/>
+        </p:spPr>
+        <p:txBody>
+          <a:bodyPr wrap="none">
+            <a:normAutofit/>
+          </a:bodyPr>
+          <a:lstStyle/>
+          <a:p/>
+          <a:p>
+            <a:pPr algn="l"/>
+            <a:r>
+              <a:rPr sz="3600" b="0">
+                <a:solidFill>
+                  <a:srgbClr val="FFFFFF"/>
+                </a:solidFill>
+              </a:rPr>
+              <a:t/>
+            </a:r>
+          </a:p>
+        </p:txBody>
+      </p:sp>
+      <p:sp>
+        <p:nvSpPr>
+          <p:cNvPr id="4" name="TextBox 3"/>
+          <p:cNvSpPr txBox="1"/>
+          <p:nvPr/>
+        </p:nvSpPr>
+        <p:spPr>
+          <a:xfrm>
+            <a:off x="457200" y="1143000"/>
+            <a:ext cx="8229600" cy="5029200"/>
+          </a:xfrm>
+          <a:prstGeom prst="rect">
+            <a:avLst/>
+          </a:prstGeom>
+          <a:noFill/>
+        </p:spPr>
+        <p:txBody>
+          <a:bodyPr wrap="none">
+            <a:normAutofit/>
+          </a:bodyPr>
+          <a:lstStyle/>
+          <a:p/>
+          <a:p>
+            <a:pPr algn="l"/>
+            <a:r>
+              <a:rPr sz="3200" b="0">
+                <a:solidFill>
+                  <a:srgbClr val="FFFFFF"/>
+                </a:solidFill>
+              </a:rPr>
+              <a:t/>
+            </a:r>
+          </a:p>
+        </p:txBody>
+      </p:sp>
+      <p:sp>
+        <p:nvSpPr>
+          <p:cNvPr id="5" name="TextBox 4"/>
+          <p:cNvSpPr txBox="1"/>
+          <p:nvPr/>
+        </p:nvSpPr>
+        <p:spPr>
+          <a:xfrm>
+            <a:off x="457200" y="5943600"/>
+            <a:ext cx="914400" cy="685800"/>
+          </a:xfrm>
+          <a:prstGeom prst="rect">
+            <a:avLst/>
+          </a:prstGeom>
+          <a:noFill/>
+        </p:spPr>
+        <p:txBody>
+          <a:bodyPr wrap="none">
+            <a:normAutofit/>
+          </a:bodyPr>
+          <a:lstStyle/>
+          <a:p/>
+          <a:p>
+            <a:pPr algn="l"/>
+            <a:r>
+              <a:rPr sz="1600" b="0">
+                <a:solidFill>
+                  <a:srgbClr val="FFFFFF"/>
+                </a:solidFill>
+              </a:rPr>
+              <a:t/>
+            </a:r>
+          </a:p>
+        </p:txBody>
+      </p:sp>
+      <p:sp>
+        <p:nvSpPr>
+          <p:cNvPr id="6" name="TextBox 5"/>
+          <p:cNvSpPr txBox="1"/>
+          <p:nvPr/>
+        </p:nvSpPr>
+        <p:spPr>
+          <a:xfrm>
+            <a:off x="2286000" y="5943600"/>
+            <a:ext cx="3657600" cy="685800"/>
+          </a:xfrm>
+          <a:prstGeom prst="rect">
+            <a:avLst/>
+          </a:prstGeom>
+          <a:noFill/>
+        </p:spPr>
+        <p:txBody>
+          <a:bodyPr wrap="none">
+            <a:normAutofit/>
+          </a:bodyPr>
+          <a:lstStyle/>
+          <a:p/>
+          <a:p>
+            <a:pPr algn="ctr"/>
+            <a:r>
+              <a:rPr sz="1600" b="0">
+                <a:solidFill>
+                  <a:srgbClr val="FFFFFF"/>
+                </a:solidFill>
+              </a:rPr>
+              <a:t/>
+            </a:r>
+          </a:p>
+        </p:txBody>
+      </p:sp>
+      <p:sp>
+        <p:nvSpPr>
+          <p:cNvPr id="7" name="TextBox 6"/>
+          <p:cNvSpPr txBox="1"/>
+          <p:nvPr/>
+        </p:nvSpPr>
+        <p:spPr>
+          <a:xfrm>
+            <a:off x="7315200" y="5943600"/>
+            <a:ext cx="914400" cy="685800"/>
+          </a:xfrm>
+          <a:prstGeom prst="rect">
+            <a:avLst/>
+          </a:prstGeom>
+          <a:noFill/>
+        </p:spPr>
+        <p:txBody>
+          <a:bodyPr wrap="none">
+            <a:normAutofit/>
+          </a:bodyPr>
+          <a:lstStyle/>
+          <a:p/>
+          <a:p>
+            <a:pPr algn="r"/>
+            <a:r>
+              <a:rPr sz="1600" b="0">
+                <a:solidFill>
+                  <a:srgbClr val="FFFFFF"/>
+                </a:solidFill>
+              </a:rPr>
+              <a:t/>
+            </a:r>
+          </a:p>
+        </p:txBody>
+      </p:sp>
+    </p:spTree>
+  </p:cSld>
+  <p:clrMapOvr>
+    <a:masterClrMapping/>
+  </p:clrMapOvr>
+</p:sld>
+</file>
+
+<file path=ppt/slides/slide14.xml><?xml version="1.0" encoding="utf-8"?>
+<p:sld xmlns:a="http://schemas.openxmlformats.org/drawingml/2006/main" xmlns:p="http://schemas.openxmlformats.org/presentationml/2006/main" xmlns:r="http://schemas.openxmlformats.org/officeDocument/2006/relationships">
+  <p:cSld>
+    <p:spTree>
+      <p:nvGrpSpPr>
+        <p:cNvPr id="1" name=""/>
+        <p:cNvGrpSpPr/>
+        <p:nvPr/>
+      </p:nvGrpSpPr>
+      <p:grpSpPr/>
+      <p:pic>
+        <p:nvPicPr>
+          <p:cNvPr id="2" name="Picture 1" descr="title_slide.jpg"/>
+          <p:cNvPicPr>
+            <a:picLocks noChangeAspect="1"/>
+          </p:cNvPicPr>
+          <p:nvPr/>
+        </p:nvPicPr>
+        <p:blipFill>
+          <a:blip r:embed="rId2"/>
+          <a:stretch>
+            <a:fillRect/>
+          </a:stretch>
+        </p:blipFill>
+        <p:spPr>
+          <a:xfrm>
+            <a:off x="0" y="0"/>
+            <a:ext cx="9144000" cy="6858000"/>
+          </a:xfrm>
+          <a:prstGeom prst="rect">
+            <a:avLst/>
+          </a:prstGeom>
+        </p:spPr>
+      </p:pic>
+      <p:sp>
+        <p:nvSpPr>
+          <p:cNvPr id="3" name="TextBox 2"/>
+          <p:cNvSpPr txBox="1"/>
+          <p:nvPr/>
+        </p:nvSpPr>
+        <p:spPr>
+          <a:xfrm>
+            <a:off x="457200" y="182880"/>
+            <a:ext cx="8229600" cy="960120"/>
+          </a:xfrm>
+          <a:prstGeom prst="rect">
+            <a:avLst/>
+          </a:prstGeom>
+          <a:noFill/>
+        </p:spPr>
+        <p:txBody>
+          <a:bodyPr wrap="none">
+            <a:normAutofit/>
+          </a:bodyPr>
+          <a:lstStyle/>
+          <a:p/>
+          <a:p>
+            <a:pPr algn="l"/>
+            <a:r>
+              <a:rPr sz="3600" b="0">
+                <a:solidFill>
+                  <a:srgbClr val="FFFFFF"/>
+                </a:solidFill>
+              </a:rPr>
+              <a:t/>
+            </a:r>
+          </a:p>
+        </p:txBody>
+      </p:sp>
+      <p:sp>
+        <p:nvSpPr>
+          <p:cNvPr id="4" name="TextBox 3"/>
+          <p:cNvSpPr txBox="1"/>
+          <p:nvPr/>
+        </p:nvSpPr>
+        <p:spPr>
+          <a:xfrm>
+            <a:off x="457200" y="1143000"/>
+            <a:ext cx="8229600" cy="5029200"/>
+          </a:xfrm>
+          <a:prstGeom prst="rect">
+            <a:avLst/>
+          </a:prstGeom>
+          <a:noFill/>
+        </p:spPr>
+        <p:txBody>
+          <a:bodyPr wrap="none">
+            <a:normAutofit/>
+          </a:bodyPr>
+          <a:lstStyle/>
+          <a:p/>
+          <a:p>
+            <a:pPr algn="l"/>
+            <a:r>
+              <a:rPr sz="3200" b="0">
+                <a:solidFill>
+                  <a:srgbClr val="FFFFFF"/>
+                </a:solidFill>
+              </a:rPr>
+              <a:t/>
+            </a:r>
+          </a:p>
+        </p:txBody>
+      </p:sp>
+      <p:sp>
+        <p:nvSpPr>
+          <p:cNvPr id="5" name="TextBox 4"/>
+          <p:cNvSpPr txBox="1"/>
+          <p:nvPr/>
+        </p:nvSpPr>
+        <p:spPr>
+          <a:xfrm>
+            <a:off x="457200" y="5943600"/>
+            <a:ext cx="914400" cy="685800"/>
+          </a:xfrm>
+          <a:prstGeom prst="rect">
+            <a:avLst/>
+          </a:prstGeom>
+          <a:noFill/>
+        </p:spPr>
+        <p:txBody>
+          <a:bodyPr wrap="none">
+            <a:normAutofit/>
+          </a:bodyPr>
+          <a:lstStyle/>
+          <a:p/>
+          <a:p>
+            <a:pPr algn="l"/>
+            <a:r>
+              <a:rPr sz="1600" b="0">
+                <a:solidFill>
+                  <a:srgbClr val="FFFFFF"/>
+                </a:solidFill>
+              </a:rPr>
+              <a:t/>
+            </a:r>
+          </a:p>
+        </p:txBody>
+      </p:sp>
+      <p:sp>
+        <p:nvSpPr>
+          <p:cNvPr id="6" name="TextBox 5"/>
+          <p:cNvSpPr txBox="1"/>
+          <p:nvPr/>
+        </p:nvSpPr>
+        <p:spPr>
+          <a:xfrm>
+            <a:off x="2286000" y="5943600"/>
+            <a:ext cx="3657600" cy="685800"/>
+          </a:xfrm>
+          <a:prstGeom prst="rect">
+            <a:avLst/>
+          </a:prstGeom>
+          <a:noFill/>
+        </p:spPr>
+        <p:txBody>
+          <a:bodyPr wrap="none">
+            <a:normAutofit/>
+          </a:bodyPr>
+          <a:lstStyle/>
+          <a:p/>
+          <a:p>
+            <a:pPr algn="ctr"/>
+            <a:r>
+              <a:rPr sz="1600" b="0">
+                <a:solidFill>
+                  <a:srgbClr val="FFFFFF"/>
+                </a:solidFill>
+              </a:rPr>
+              <a:t/>
+            </a:r>
+          </a:p>
+        </p:txBody>
+      </p:sp>
+      <p:sp>
+        <p:nvSpPr>
+          <p:cNvPr id="7" name="TextBox 6"/>
+          <p:cNvSpPr txBox="1"/>
+          <p:nvPr/>
+        </p:nvSpPr>
+        <p:spPr>
+          <a:xfrm>
+            <a:off x="7315200" y="5943600"/>
+            <a:ext cx="914400" cy="685800"/>
+          </a:xfrm>
+          <a:prstGeom prst="rect">
+            <a:avLst/>
+          </a:prstGeom>
+          <a:noFill/>
+        </p:spPr>
+        <p:txBody>
+          <a:bodyPr wrap="none">
+            <a:normAutofit/>
+          </a:bodyPr>
+          <a:lstStyle/>
+          <a:p/>
+          <a:p>
+            <a:pPr algn="r"/>
+            <a:r>
+              <a:rPr sz="1600" b="0">
+                <a:solidFill>
+                  <a:srgbClr val="FFFFFF"/>
+                </a:solidFill>
+              </a:rPr>
+              <a:t/>
             </a:r>
           </a:p>
         </p:txBody>
@@ -3176,7 +4282,7 @@
       <p:grpSpPr/>
       <p:pic>
         <p:nvPicPr>
-          <p:cNvPr id="2" name="Picture 1" descr="image2.gif"/>
+          <p:cNvPr id="2" name="Picture 1" descr="title_slide.jpg"/>
           <p:cNvPicPr>
             <a:picLocks noChangeAspect="1"/>
           </p:cNvPicPr>
@@ -3206,29 +4312,29 @@
         </p:nvSpPr>
         <p:spPr>
           <a:xfrm>
-            <a:off x="457200" y="228600"/>
-            <a:ext cx="8229600" cy="914400"/>
-          </a:xfrm>
-          <a:prstGeom prst="rect">
-            <a:avLst/>
-          </a:prstGeom>
-          <a:noFill/>
-        </p:spPr>
-        <p:txBody>
-          <a:bodyPr wrap="none">
-            <a:normAutofit/>
-          </a:bodyPr>
-          <a:lstStyle/>
-          <a:p/>
-          <a:p>
-            <a:pPr algn="ctr"/>
+            <a:off x="457200" y="182880"/>
+            <a:ext cx="8229600" cy="960120"/>
+          </a:xfrm>
+          <a:prstGeom prst="rect">
+            <a:avLst/>
+          </a:prstGeom>
+          <a:noFill/>
+        </p:spPr>
+        <p:txBody>
+          <a:bodyPr wrap="none">
+            <a:normAutofit/>
+          </a:bodyPr>
+          <a:lstStyle/>
+          <a:p/>
+          <a:p>
+            <a:pPr algn="l"/>
             <a:r>
               <a:rPr sz="3600" b="0">
                 <a:solidFill>
                   <a:srgbClr val="FFFFFF"/>
                 </a:solidFill>
               </a:rPr>
-              <a:t>Aajanubahum Aravindha Nethram</a:t>
+              <a:t/>
             </a:r>
           </a:p>
         </p:txBody>
@@ -3256,17 +4362,14 @@
           <a:lstStyle/>
           <a:p/>
           <a:p>
-            <a:pPr algn="ctr"/>
+            <a:pPr algn="l"/>
             <a:r>
               <a:rPr sz="3200" b="0">
                 <a:solidFill>
                   <a:srgbClr val="FFFFFF"/>
                 </a:solidFill>
               </a:rPr>
-              <a:t>Aajanubahum Aravindha Nethram
-Athmabhi Ramam Manasa Smarami (2)
-Bhoolokha Vaikunta Parthi Nivasam
-Prabhu Sai Ramam Manasa Smarami (2)</a:t>
+              <a:t/>
             </a:r>
           </a:p>
         </p:txBody>
@@ -3301,7 +4404,1526 @@
                   <a:srgbClr val="FFFFFF"/>
                 </a:solidFill>
               </a:rPr>
-              <a:t>A</a:t>
+              <a:t/>
+            </a:r>
+          </a:p>
+        </p:txBody>
+      </p:sp>
+      <p:sp>
+        <p:nvSpPr>
+          <p:cNvPr id="6" name="TextBox 5"/>
+          <p:cNvSpPr txBox="1"/>
+          <p:nvPr/>
+        </p:nvSpPr>
+        <p:spPr>
+          <a:xfrm>
+            <a:off x="2286000" y="5943600"/>
+            <a:ext cx="3657600" cy="685800"/>
+          </a:xfrm>
+          <a:prstGeom prst="rect">
+            <a:avLst/>
+          </a:prstGeom>
+          <a:noFill/>
+        </p:spPr>
+        <p:txBody>
+          <a:bodyPr wrap="none">
+            <a:normAutofit/>
+          </a:bodyPr>
+          <a:lstStyle/>
+          <a:p/>
+          <a:p>
+            <a:pPr algn="ctr"/>
+            <a:r>
+              <a:rPr sz="1600" b="0">
+                <a:solidFill>
+                  <a:srgbClr val="FFFFFF"/>
+                </a:solidFill>
+              </a:rPr>
+              <a:t/>
+            </a:r>
+          </a:p>
+        </p:txBody>
+      </p:sp>
+      <p:sp>
+        <p:nvSpPr>
+          <p:cNvPr id="7" name="TextBox 6"/>
+          <p:cNvSpPr txBox="1"/>
+          <p:nvPr/>
+        </p:nvSpPr>
+        <p:spPr>
+          <a:xfrm>
+            <a:off x="7315200" y="5943600"/>
+            <a:ext cx="914400" cy="685800"/>
+          </a:xfrm>
+          <a:prstGeom prst="rect">
+            <a:avLst/>
+          </a:prstGeom>
+          <a:noFill/>
+        </p:spPr>
+        <p:txBody>
+          <a:bodyPr wrap="none">
+            <a:normAutofit/>
+          </a:bodyPr>
+          <a:lstStyle/>
+          <a:p/>
+          <a:p>
+            <a:pPr algn="r"/>
+            <a:r>
+              <a:rPr sz="1600" b="0">
+                <a:solidFill>
+                  <a:srgbClr val="FFFFFF"/>
+                </a:solidFill>
+              </a:rPr>
+              <a:t/>
+            </a:r>
+          </a:p>
+        </p:txBody>
+      </p:sp>
+    </p:spTree>
+  </p:cSld>
+  <p:clrMapOvr>
+    <a:masterClrMapping/>
+  </p:clrMapOvr>
+</p:sld>
+</file>
+
+<file path=ppt/slides/slide3.xml><?xml version="1.0" encoding="utf-8"?>
+<p:sld xmlns:a="http://schemas.openxmlformats.org/drawingml/2006/main" xmlns:p="http://schemas.openxmlformats.org/presentationml/2006/main" xmlns:r="http://schemas.openxmlformats.org/officeDocument/2006/relationships">
+  <p:cSld>
+    <p:spTree>
+      <p:nvGrpSpPr>
+        <p:cNvPr id="1" name=""/>
+        <p:cNvGrpSpPr/>
+        <p:nvPr/>
+      </p:nvGrpSpPr>
+      <p:grpSpPr/>
+      <p:pic>
+        <p:nvPicPr>
+          <p:cNvPr id="2" name="Picture 1" descr="title_slide.jpg"/>
+          <p:cNvPicPr>
+            <a:picLocks noChangeAspect="1"/>
+          </p:cNvPicPr>
+          <p:nvPr/>
+        </p:nvPicPr>
+        <p:blipFill>
+          <a:blip r:embed="rId2"/>
+          <a:stretch>
+            <a:fillRect/>
+          </a:stretch>
+        </p:blipFill>
+        <p:spPr>
+          <a:xfrm>
+            <a:off x="0" y="0"/>
+            <a:ext cx="9144000" cy="6858000"/>
+          </a:xfrm>
+          <a:prstGeom prst="rect">
+            <a:avLst/>
+          </a:prstGeom>
+        </p:spPr>
+      </p:pic>
+      <p:sp>
+        <p:nvSpPr>
+          <p:cNvPr id="3" name="TextBox 2"/>
+          <p:cNvSpPr txBox="1"/>
+          <p:nvPr/>
+        </p:nvSpPr>
+        <p:spPr>
+          <a:xfrm>
+            <a:off x="457200" y="182880"/>
+            <a:ext cx="8229600" cy="960120"/>
+          </a:xfrm>
+          <a:prstGeom prst="rect">
+            <a:avLst/>
+          </a:prstGeom>
+          <a:noFill/>
+        </p:spPr>
+        <p:txBody>
+          <a:bodyPr wrap="none">
+            <a:normAutofit/>
+          </a:bodyPr>
+          <a:lstStyle/>
+          <a:p/>
+          <a:p>
+            <a:pPr algn="l"/>
+            <a:r>
+              <a:rPr sz="3600" b="0">
+                <a:solidFill>
+                  <a:srgbClr val="FFFFFF"/>
+                </a:solidFill>
+              </a:rPr>
+              <a:t/>
+            </a:r>
+          </a:p>
+        </p:txBody>
+      </p:sp>
+      <p:sp>
+        <p:nvSpPr>
+          <p:cNvPr id="4" name="TextBox 3"/>
+          <p:cNvSpPr txBox="1"/>
+          <p:nvPr/>
+        </p:nvSpPr>
+        <p:spPr>
+          <a:xfrm>
+            <a:off x="457200" y="1143000"/>
+            <a:ext cx="8229600" cy="5029200"/>
+          </a:xfrm>
+          <a:prstGeom prst="rect">
+            <a:avLst/>
+          </a:prstGeom>
+          <a:noFill/>
+        </p:spPr>
+        <p:txBody>
+          <a:bodyPr wrap="none">
+            <a:normAutofit/>
+          </a:bodyPr>
+          <a:lstStyle/>
+          <a:p/>
+          <a:p>
+            <a:pPr algn="l"/>
+            <a:r>
+              <a:rPr sz="3200" b="0">
+                <a:solidFill>
+                  <a:srgbClr val="FFFFFF"/>
+                </a:solidFill>
+              </a:rPr>
+              <a:t/>
+            </a:r>
+          </a:p>
+        </p:txBody>
+      </p:sp>
+      <p:sp>
+        <p:nvSpPr>
+          <p:cNvPr id="5" name="TextBox 4"/>
+          <p:cNvSpPr txBox="1"/>
+          <p:nvPr/>
+        </p:nvSpPr>
+        <p:spPr>
+          <a:xfrm>
+            <a:off x="457200" y="5943600"/>
+            <a:ext cx="914400" cy="685800"/>
+          </a:xfrm>
+          <a:prstGeom prst="rect">
+            <a:avLst/>
+          </a:prstGeom>
+          <a:noFill/>
+        </p:spPr>
+        <p:txBody>
+          <a:bodyPr wrap="none">
+            <a:normAutofit/>
+          </a:bodyPr>
+          <a:lstStyle/>
+          <a:p/>
+          <a:p>
+            <a:pPr algn="l"/>
+            <a:r>
+              <a:rPr sz="1600" b="0">
+                <a:solidFill>
+                  <a:srgbClr val="FFFFFF"/>
+                </a:solidFill>
+              </a:rPr>
+              <a:t/>
+            </a:r>
+          </a:p>
+        </p:txBody>
+      </p:sp>
+      <p:sp>
+        <p:nvSpPr>
+          <p:cNvPr id="6" name="TextBox 5"/>
+          <p:cNvSpPr txBox="1"/>
+          <p:nvPr/>
+        </p:nvSpPr>
+        <p:spPr>
+          <a:xfrm>
+            <a:off x="2286000" y="5943600"/>
+            <a:ext cx="3657600" cy="685800"/>
+          </a:xfrm>
+          <a:prstGeom prst="rect">
+            <a:avLst/>
+          </a:prstGeom>
+          <a:noFill/>
+        </p:spPr>
+        <p:txBody>
+          <a:bodyPr wrap="none">
+            <a:normAutofit/>
+          </a:bodyPr>
+          <a:lstStyle/>
+          <a:p/>
+          <a:p>
+            <a:pPr algn="ctr"/>
+            <a:r>
+              <a:rPr sz="1600" b="0">
+                <a:solidFill>
+                  <a:srgbClr val="FFFFFF"/>
+                </a:solidFill>
+              </a:rPr>
+              <a:t/>
+            </a:r>
+          </a:p>
+        </p:txBody>
+      </p:sp>
+      <p:sp>
+        <p:nvSpPr>
+          <p:cNvPr id="7" name="TextBox 6"/>
+          <p:cNvSpPr txBox="1"/>
+          <p:nvPr/>
+        </p:nvSpPr>
+        <p:spPr>
+          <a:xfrm>
+            <a:off x="7315200" y="5943600"/>
+            <a:ext cx="914400" cy="685800"/>
+          </a:xfrm>
+          <a:prstGeom prst="rect">
+            <a:avLst/>
+          </a:prstGeom>
+          <a:noFill/>
+        </p:spPr>
+        <p:txBody>
+          <a:bodyPr wrap="none">
+            <a:normAutofit/>
+          </a:bodyPr>
+          <a:lstStyle/>
+          <a:p/>
+          <a:p>
+            <a:pPr algn="r"/>
+            <a:r>
+              <a:rPr sz="1600" b="0">
+                <a:solidFill>
+                  <a:srgbClr val="FFFFFF"/>
+                </a:solidFill>
+              </a:rPr>
+              <a:t/>
+            </a:r>
+          </a:p>
+        </p:txBody>
+      </p:sp>
+    </p:spTree>
+  </p:cSld>
+  <p:clrMapOvr>
+    <a:masterClrMapping/>
+  </p:clrMapOvr>
+</p:sld>
+</file>
+
+<file path=ppt/slides/slide4.xml><?xml version="1.0" encoding="utf-8"?>
+<p:sld xmlns:a="http://schemas.openxmlformats.org/drawingml/2006/main" xmlns:p="http://schemas.openxmlformats.org/presentationml/2006/main" xmlns:r="http://schemas.openxmlformats.org/officeDocument/2006/relationships">
+  <p:cSld>
+    <p:spTree>
+      <p:nvGrpSpPr>
+        <p:cNvPr id="1" name=""/>
+        <p:cNvGrpSpPr/>
+        <p:nvPr/>
+      </p:nvGrpSpPr>
+      <p:grpSpPr/>
+      <p:pic>
+        <p:nvPicPr>
+          <p:cNvPr id="2" name="Picture 1" descr="title_slide.jpg"/>
+          <p:cNvPicPr>
+            <a:picLocks noChangeAspect="1"/>
+          </p:cNvPicPr>
+          <p:nvPr/>
+        </p:nvPicPr>
+        <p:blipFill>
+          <a:blip r:embed="rId2"/>
+          <a:stretch>
+            <a:fillRect/>
+          </a:stretch>
+        </p:blipFill>
+        <p:spPr>
+          <a:xfrm>
+            <a:off x="0" y="0"/>
+            <a:ext cx="9144000" cy="6858000"/>
+          </a:xfrm>
+          <a:prstGeom prst="rect">
+            <a:avLst/>
+          </a:prstGeom>
+        </p:spPr>
+      </p:pic>
+      <p:sp>
+        <p:nvSpPr>
+          <p:cNvPr id="3" name="TextBox 2"/>
+          <p:cNvSpPr txBox="1"/>
+          <p:nvPr/>
+        </p:nvSpPr>
+        <p:spPr>
+          <a:xfrm>
+            <a:off x="457200" y="182880"/>
+            <a:ext cx="8229600" cy="960120"/>
+          </a:xfrm>
+          <a:prstGeom prst="rect">
+            <a:avLst/>
+          </a:prstGeom>
+          <a:noFill/>
+        </p:spPr>
+        <p:txBody>
+          <a:bodyPr wrap="none">
+            <a:normAutofit/>
+          </a:bodyPr>
+          <a:lstStyle/>
+          <a:p/>
+          <a:p>
+            <a:pPr algn="l"/>
+            <a:r>
+              <a:rPr sz="3600" b="0">
+                <a:solidFill>
+                  <a:srgbClr val="FFFFFF"/>
+                </a:solidFill>
+              </a:rPr>
+              <a:t/>
+            </a:r>
+          </a:p>
+        </p:txBody>
+      </p:sp>
+      <p:sp>
+        <p:nvSpPr>
+          <p:cNvPr id="4" name="TextBox 3"/>
+          <p:cNvSpPr txBox="1"/>
+          <p:nvPr/>
+        </p:nvSpPr>
+        <p:spPr>
+          <a:xfrm>
+            <a:off x="457200" y="1143000"/>
+            <a:ext cx="8229600" cy="5029200"/>
+          </a:xfrm>
+          <a:prstGeom prst="rect">
+            <a:avLst/>
+          </a:prstGeom>
+          <a:noFill/>
+        </p:spPr>
+        <p:txBody>
+          <a:bodyPr wrap="none">
+            <a:normAutofit/>
+          </a:bodyPr>
+          <a:lstStyle/>
+          <a:p/>
+          <a:p>
+            <a:pPr algn="l"/>
+            <a:r>
+              <a:rPr sz="3200" b="0">
+                <a:solidFill>
+                  <a:srgbClr val="FFFFFF"/>
+                </a:solidFill>
+              </a:rPr>
+              <a:t/>
+            </a:r>
+          </a:p>
+        </p:txBody>
+      </p:sp>
+      <p:sp>
+        <p:nvSpPr>
+          <p:cNvPr id="5" name="TextBox 4"/>
+          <p:cNvSpPr txBox="1"/>
+          <p:nvPr/>
+        </p:nvSpPr>
+        <p:spPr>
+          <a:xfrm>
+            <a:off x="457200" y="5943600"/>
+            <a:ext cx="914400" cy="685800"/>
+          </a:xfrm>
+          <a:prstGeom prst="rect">
+            <a:avLst/>
+          </a:prstGeom>
+          <a:noFill/>
+        </p:spPr>
+        <p:txBody>
+          <a:bodyPr wrap="none">
+            <a:normAutofit/>
+          </a:bodyPr>
+          <a:lstStyle/>
+          <a:p/>
+          <a:p>
+            <a:pPr algn="l"/>
+            <a:r>
+              <a:rPr sz="1600" b="0">
+                <a:solidFill>
+                  <a:srgbClr val="FFFFFF"/>
+                </a:solidFill>
+              </a:rPr>
+              <a:t/>
+            </a:r>
+          </a:p>
+        </p:txBody>
+      </p:sp>
+      <p:sp>
+        <p:nvSpPr>
+          <p:cNvPr id="6" name="TextBox 5"/>
+          <p:cNvSpPr txBox="1"/>
+          <p:nvPr/>
+        </p:nvSpPr>
+        <p:spPr>
+          <a:xfrm>
+            <a:off x="2286000" y="5943600"/>
+            <a:ext cx="3657600" cy="685800"/>
+          </a:xfrm>
+          <a:prstGeom prst="rect">
+            <a:avLst/>
+          </a:prstGeom>
+          <a:noFill/>
+        </p:spPr>
+        <p:txBody>
+          <a:bodyPr wrap="none">
+            <a:normAutofit/>
+          </a:bodyPr>
+          <a:lstStyle/>
+          <a:p/>
+          <a:p>
+            <a:pPr algn="ctr"/>
+            <a:r>
+              <a:rPr sz="1600" b="0">
+                <a:solidFill>
+                  <a:srgbClr val="FFFFFF"/>
+                </a:solidFill>
+              </a:rPr>
+              <a:t/>
+            </a:r>
+          </a:p>
+        </p:txBody>
+      </p:sp>
+      <p:sp>
+        <p:nvSpPr>
+          <p:cNvPr id="7" name="TextBox 6"/>
+          <p:cNvSpPr txBox="1"/>
+          <p:nvPr/>
+        </p:nvSpPr>
+        <p:spPr>
+          <a:xfrm>
+            <a:off x="7315200" y="5943600"/>
+            <a:ext cx="914400" cy="685800"/>
+          </a:xfrm>
+          <a:prstGeom prst="rect">
+            <a:avLst/>
+          </a:prstGeom>
+          <a:noFill/>
+        </p:spPr>
+        <p:txBody>
+          <a:bodyPr wrap="none">
+            <a:normAutofit/>
+          </a:bodyPr>
+          <a:lstStyle/>
+          <a:p/>
+          <a:p>
+            <a:pPr algn="r"/>
+            <a:r>
+              <a:rPr sz="1600" b="0">
+                <a:solidFill>
+                  <a:srgbClr val="FFFFFF"/>
+                </a:solidFill>
+              </a:rPr>
+              <a:t/>
+            </a:r>
+          </a:p>
+        </p:txBody>
+      </p:sp>
+    </p:spTree>
+  </p:cSld>
+  <p:clrMapOvr>
+    <a:masterClrMapping/>
+  </p:clrMapOvr>
+</p:sld>
+</file>
+
+<file path=ppt/slides/slide5.xml><?xml version="1.0" encoding="utf-8"?>
+<p:sld xmlns:a="http://schemas.openxmlformats.org/drawingml/2006/main" xmlns:p="http://schemas.openxmlformats.org/presentationml/2006/main" xmlns:r="http://schemas.openxmlformats.org/officeDocument/2006/relationships">
+  <p:cSld>
+    <p:spTree>
+      <p:nvGrpSpPr>
+        <p:cNvPr id="1" name=""/>
+        <p:cNvGrpSpPr/>
+        <p:nvPr/>
+      </p:nvGrpSpPr>
+      <p:grpSpPr/>
+      <p:pic>
+        <p:nvPicPr>
+          <p:cNvPr id="2" name="Picture 1" descr="title_slide.jpg"/>
+          <p:cNvPicPr>
+            <a:picLocks noChangeAspect="1"/>
+          </p:cNvPicPr>
+          <p:nvPr/>
+        </p:nvPicPr>
+        <p:blipFill>
+          <a:blip r:embed="rId2"/>
+          <a:stretch>
+            <a:fillRect/>
+          </a:stretch>
+        </p:blipFill>
+        <p:spPr>
+          <a:xfrm>
+            <a:off x="0" y="0"/>
+            <a:ext cx="9144000" cy="6858000"/>
+          </a:xfrm>
+          <a:prstGeom prst="rect">
+            <a:avLst/>
+          </a:prstGeom>
+        </p:spPr>
+      </p:pic>
+      <p:sp>
+        <p:nvSpPr>
+          <p:cNvPr id="3" name="TextBox 2"/>
+          <p:cNvSpPr txBox="1"/>
+          <p:nvPr/>
+        </p:nvSpPr>
+        <p:spPr>
+          <a:xfrm>
+            <a:off x="457200" y="182880"/>
+            <a:ext cx="8229600" cy="960120"/>
+          </a:xfrm>
+          <a:prstGeom prst="rect">
+            <a:avLst/>
+          </a:prstGeom>
+          <a:noFill/>
+        </p:spPr>
+        <p:txBody>
+          <a:bodyPr wrap="none">
+            <a:normAutofit/>
+          </a:bodyPr>
+          <a:lstStyle/>
+          <a:p/>
+          <a:p>
+            <a:pPr algn="l"/>
+            <a:r>
+              <a:rPr sz="3600" b="0">
+                <a:solidFill>
+                  <a:srgbClr val="FFFFFF"/>
+                </a:solidFill>
+              </a:rPr>
+              <a:t/>
+            </a:r>
+          </a:p>
+        </p:txBody>
+      </p:sp>
+      <p:sp>
+        <p:nvSpPr>
+          <p:cNvPr id="4" name="TextBox 3"/>
+          <p:cNvSpPr txBox="1"/>
+          <p:nvPr/>
+        </p:nvSpPr>
+        <p:spPr>
+          <a:xfrm>
+            <a:off x="457200" y="1143000"/>
+            <a:ext cx="8229600" cy="5029200"/>
+          </a:xfrm>
+          <a:prstGeom prst="rect">
+            <a:avLst/>
+          </a:prstGeom>
+          <a:noFill/>
+        </p:spPr>
+        <p:txBody>
+          <a:bodyPr wrap="none">
+            <a:normAutofit/>
+          </a:bodyPr>
+          <a:lstStyle/>
+          <a:p/>
+          <a:p>
+            <a:pPr algn="l"/>
+            <a:r>
+              <a:rPr sz="3200" b="0">
+                <a:solidFill>
+                  <a:srgbClr val="FFFFFF"/>
+                </a:solidFill>
+              </a:rPr>
+              <a:t/>
+            </a:r>
+          </a:p>
+        </p:txBody>
+      </p:sp>
+      <p:sp>
+        <p:nvSpPr>
+          <p:cNvPr id="5" name="TextBox 4"/>
+          <p:cNvSpPr txBox="1"/>
+          <p:nvPr/>
+        </p:nvSpPr>
+        <p:spPr>
+          <a:xfrm>
+            <a:off x="457200" y="5943600"/>
+            <a:ext cx="914400" cy="685800"/>
+          </a:xfrm>
+          <a:prstGeom prst="rect">
+            <a:avLst/>
+          </a:prstGeom>
+          <a:noFill/>
+        </p:spPr>
+        <p:txBody>
+          <a:bodyPr wrap="none">
+            <a:normAutofit/>
+          </a:bodyPr>
+          <a:lstStyle/>
+          <a:p/>
+          <a:p>
+            <a:pPr algn="l"/>
+            <a:r>
+              <a:rPr sz="1600" b="0">
+                <a:solidFill>
+                  <a:srgbClr val="FFFFFF"/>
+                </a:solidFill>
+              </a:rPr>
+              <a:t/>
+            </a:r>
+          </a:p>
+        </p:txBody>
+      </p:sp>
+      <p:sp>
+        <p:nvSpPr>
+          <p:cNvPr id="6" name="TextBox 5"/>
+          <p:cNvSpPr txBox="1"/>
+          <p:nvPr/>
+        </p:nvSpPr>
+        <p:spPr>
+          <a:xfrm>
+            <a:off x="2286000" y="5943600"/>
+            <a:ext cx="3657600" cy="685800"/>
+          </a:xfrm>
+          <a:prstGeom prst="rect">
+            <a:avLst/>
+          </a:prstGeom>
+          <a:noFill/>
+        </p:spPr>
+        <p:txBody>
+          <a:bodyPr wrap="none">
+            <a:normAutofit/>
+          </a:bodyPr>
+          <a:lstStyle/>
+          <a:p/>
+          <a:p>
+            <a:pPr algn="ctr"/>
+            <a:r>
+              <a:rPr sz="1600" b="0">
+                <a:solidFill>
+                  <a:srgbClr val="FFFFFF"/>
+                </a:solidFill>
+              </a:rPr>
+              <a:t/>
+            </a:r>
+          </a:p>
+        </p:txBody>
+      </p:sp>
+      <p:sp>
+        <p:nvSpPr>
+          <p:cNvPr id="7" name="TextBox 6"/>
+          <p:cNvSpPr txBox="1"/>
+          <p:nvPr/>
+        </p:nvSpPr>
+        <p:spPr>
+          <a:xfrm>
+            <a:off x="7315200" y="5943600"/>
+            <a:ext cx="914400" cy="685800"/>
+          </a:xfrm>
+          <a:prstGeom prst="rect">
+            <a:avLst/>
+          </a:prstGeom>
+          <a:noFill/>
+        </p:spPr>
+        <p:txBody>
+          <a:bodyPr wrap="none">
+            <a:normAutofit/>
+          </a:bodyPr>
+          <a:lstStyle/>
+          <a:p/>
+          <a:p>
+            <a:pPr algn="r"/>
+            <a:r>
+              <a:rPr sz="1600" b="0">
+                <a:solidFill>
+                  <a:srgbClr val="FFFFFF"/>
+                </a:solidFill>
+              </a:rPr>
+              <a:t/>
+            </a:r>
+          </a:p>
+        </p:txBody>
+      </p:sp>
+    </p:spTree>
+  </p:cSld>
+  <p:clrMapOvr>
+    <a:masterClrMapping/>
+  </p:clrMapOvr>
+</p:sld>
+</file>
+
+<file path=ppt/slides/slide6.xml><?xml version="1.0" encoding="utf-8"?>
+<p:sld xmlns:a="http://schemas.openxmlformats.org/drawingml/2006/main" xmlns:p="http://schemas.openxmlformats.org/presentationml/2006/main" xmlns:r="http://schemas.openxmlformats.org/officeDocument/2006/relationships">
+  <p:cSld>
+    <p:spTree>
+      <p:nvGrpSpPr>
+        <p:cNvPr id="1" name=""/>
+        <p:cNvGrpSpPr/>
+        <p:nvPr/>
+      </p:nvGrpSpPr>
+      <p:grpSpPr/>
+      <p:pic>
+        <p:nvPicPr>
+          <p:cNvPr id="2" name="Picture 1" descr="title_slide.jpg"/>
+          <p:cNvPicPr>
+            <a:picLocks noChangeAspect="1"/>
+          </p:cNvPicPr>
+          <p:nvPr/>
+        </p:nvPicPr>
+        <p:blipFill>
+          <a:blip r:embed="rId2"/>
+          <a:stretch>
+            <a:fillRect/>
+          </a:stretch>
+        </p:blipFill>
+        <p:spPr>
+          <a:xfrm>
+            <a:off x="0" y="0"/>
+            <a:ext cx="9144000" cy="6858000"/>
+          </a:xfrm>
+          <a:prstGeom prst="rect">
+            <a:avLst/>
+          </a:prstGeom>
+        </p:spPr>
+      </p:pic>
+      <p:sp>
+        <p:nvSpPr>
+          <p:cNvPr id="3" name="TextBox 2"/>
+          <p:cNvSpPr txBox="1"/>
+          <p:nvPr/>
+        </p:nvSpPr>
+        <p:spPr>
+          <a:xfrm>
+            <a:off x="457200" y="182880"/>
+            <a:ext cx="8229600" cy="960120"/>
+          </a:xfrm>
+          <a:prstGeom prst="rect">
+            <a:avLst/>
+          </a:prstGeom>
+          <a:noFill/>
+        </p:spPr>
+        <p:txBody>
+          <a:bodyPr wrap="none">
+            <a:normAutofit/>
+          </a:bodyPr>
+          <a:lstStyle/>
+          <a:p/>
+          <a:p>
+            <a:pPr algn="l"/>
+            <a:r>
+              <a:rPr sz="3600" b="0">
+                <a:solidFill>
+                  <a:srgbClr val="FFFFFF"/>
+                </a:solidFill>
+              </a:rPr>
+              <a:t/>
+            </a:r>
+          </a:p>
+        </p:txBody>
+      </p:sp>
+      <p:sp>
+        <p:nvSpPr>
+          <p:cNvPr id="4" name="TextBox 3"/>
+          <p:cNvSpPr txBox="1"/>
+          <p:nvPr/>
+        </p:nvSpPr>
+        <p:spPr>
+          <a:xfrm>
+            <a:off x="457200" y="1143000"/>
+            <a:ext cx="8229600" cy="5029200"/>
+          </a:xfrm>
+          <a:prstGeom prst="rect">
+            <a:avLst/>
+          </a:prstGeom>
+          <a:noFill/>
+        </p:spPr>
+        <p:txBody>
+          <a:bodyPr wrap="none">
+            <a:normAutofit/>
+          </a:bodyPr>
+          <a:lstStyle/>
+          <a:p/>
+          <a:p>
+            <a:pPr algn="l"/>
+            <a:r>
+              <a:rPr sz="3200" b="0">
+                <a:solidFill>
+                  <a:srgbClr val="FFFFFF"/>
+                </a:solidFill>
+              </a:rPr>
+              <a:t/>
+            </a:r>
+          </a:p>
+        </p:txBody>
+      </p:sp>
+      <p:sp>
+        <p:nvSpPr>
+          <p:cNvPr id="5" name="TextBox 4"/>
+          <p:cNvSpPr txBox="1"/>
+          <p:nvPr/>
+        </p:nvSpPr>
+        <p:spPr>
+          <a:xfrm>
+            <a:off x="457200" y="5943600"/>
+            <a:ext cx="914400" cy="685800"/>
+          </a:xfrm>
+          <a:prstGeom prst="rect">
+            <a:avLst/>
+          </a:prstGeom>
+          <a:noFill/>
+        </p:spPr>
+        <p:txBody>
+          <a:bodyPr wrap="none">
+            <a:normAutofit/>
+          </a:bodyPr>
+          <a:lstStyle/>
+          <a:p/>
+          <a:p>
+            <a:pPr algn="l"/>
+            <a:r>
+              <a:rPr sz="1600" b="0">
+                <a:solidFill>
+                  <a:srgbClr val="FFFFFF"/>
+                </a:solidFill>
+              </a:rPr>
+              <a:t/>
+            </a:r>
+          </a:p>
+        </p:txBody>
+      </p:sp>
+      <p:sp>
+        <p:nvSpPr>
+          <p:cNvPr id="6" name="TextBox 5"/>
+          <p:cNvSpPr txBox="1"/>
+          <p:nvPr/>
+        </p:nvSpPr>
+        <p:spPr>
+          <a:xfrm>
+            <a:off x="2286000" y="5943600"/>
+            <a:ext cx="3657600" cy="685800"/>
+          </a:xfrm>
+          <a:prstGeom prst="rect">
+            <a:avLst/>
+          </a:prstGeom>
+          <a:noFill/>
+        </p:spPr>
+        <p:txBody>
+          <a:bodyPr wrap="none">
+            <a:normAutofit/>
+          </a:bodyPr>
+          <a:lstStyle/>
+          <a:p/>
+          <a:p>
+            <a:pPr algn="ctr"/>
+            <a:r>
+              <a:rPr sz="1600" b="0">
+                <a:solidFill>
+                  <a:srgbClr val="FFFFFF"/>
+                </a:solidFill>
+              </a:rPr>
+              <a:t/>
+            </a:r>
+          </a:p>
+        </p:txBody>
+      </p:sp>
+      <p:sp>
+        <p:nvSpPr>
+          <p:cNvPr id="7" name="TextBox 6"/>
+          <p:cNvSpPr txBox="1"/>
+          <p:nvPr/>
+        </p:nvSpPr>
+        <p:spPr>
+          <a:xfrm>
+            <a:off x="7315200" y="5943600"/>
+            <a:ext cx="914400" cy="685800"/>
+          </a:xfrm>
+          <a:prstGeom prst="rect">
+            <a:avLst/>
+          </a:prstGeom>
+          <a:noFill/>
+        </p:spPr>
+        <p:txBody>
+          <a:bodyPr wrap="none">
+            <a:normAutofit/>
+          </a:bodyPr>
+          <a:lstStyle/>
+          <a:p/>
+          <a:p>
+            <a:pPr algn="r"/>
+            <a:r>
+              <a:rPr sz="1600" b="0">
+                <a:solidFill>
+                  <a:srgbClr val="FFFFFF"/>
+                </a:solidFill>
+              </a:rPr>
+              <a:t/>
+            </a:r>
+          </a:p>
+        </p:txBody>
+      </p:sp>
+    </p:spTree>
+  </p:cSld>
+  <p:clrMapOvr>
+    <a:masterClrMapping/>
+  </p:clrMapOvr>
+</p:sld>
+</file>
+
+<file path=ppt/slides/slide7.xml><?xml version="1.0" encoding="utf-8"?>
+<p:sld xmlns:a="http://schemas.openxmlformats.org/drawingml/2006/main" xmlns:p="http://schemas.openxmlformats.org/presentationml/2006/main" xmlns:r="http://schemas.openxmlformats.org/officeDocument/2006/relationships">
+  <p:cSld>
+    <p:spTree>
+      <p:nvGrpSpPr>
+        <p:cNvPr id="1" name=""/>
+        <p:cNvGrpSpPr/>
+        <p:nvPr/>
+      </p:nvGrpSpPr>
+      <p:grpSpPr/>
+      <p:pic>
+        <p:nvPicPr>
+          <p:cNvPr id="2" name="Picture 1" descr="title_slide.jpg"/>
+          <p:cNvPicPr>
+            <a:picLocks noChangeAspect="1"/>
+          </p:cNvPicPr>
+          <p:nvPr/>
+        </p:nvPicPr>
+        <p:blipFill>
+          <a:blip r:embed="rId2"/>
+          <a:stretch>
+            <a:fillRect/>
+          </a:stretch>
+        </p:blipFill>
+        <p:spPr>
+          <a:xfrm>
+            <a:off x="0" y="0"/>
+            <a:ext cx="9144000" cy="6858000"/>
+          </a:xfrm>
+          <a:prstGeom prst="rect">
+            <a:avLst/>
+          </a:prstGeom>
+        </p:spPr>
+      </p:pic>
+      <p:sp>
+        <p:nvSpPr>
+          <p:cNvPr id="3" name="TextBox 2"/>
+          <p:cNvSpPr txBox="1"/>
+          <p:nvPr/>
+        </p:nvSpPr>
+        <p:spPr>
+          <a:xfrm>
+            <a:off x="457200" y="182880"/>
+            <a:ext cx="8229600" cy="960120"/>
+          </a:xfrm>
+          <a:prstGeom prst="rect">
+            <a:avLst/>
+          </a:prstGeom>
+          <a:noFill/>
+        </p:spPr>
+        <p:txBody>
+          <a:bodyPr wrap="none">
+            <a:normAutofit/>
+          </a:bodyPr>
+          <a:lstStyle/>
+          <a:p/>
+          <a:p>
+            <a:pPr algn="l"/>
+            <a:r>
+              <a:rPr sz="3600" b="0">
+                <a:solidFill>
+                  <a:srgbClr val="FFFFFF"/>
+                </a:solidFill>
+              </a:rPr>
+              <a:t/>
+            </a:r>
+          </a:p>
+        </p:txBody>
+      </p:sp>
+      <p:sp>
+        <p:nvSpPr>
+          <p:cNvPr id="4" name="TextBox 3"/>
+          <p:cNvSpPr txBox="1"/>
+          <p:nvPr/>
+        </p:nvSpPr>
+        <p:spPr>
+          <a:xfrm>
+            <a:off x="457200" y="1143000"/>
+            <a:ext cx="8229600" cy="5029200"/>
+          </a:xfrm>
+          <a:prstGeom prst="rect">
+            <a:avLst/>
+          </a:prstGeom>
+          <a:noFill/>
+        </p:spPr>
+        <p:txBody>
+          <a:bodyPr wrap="none">
+            <a:normAutofit/>
+          </a:bodyPr>
+          <a:lstStyle/>
+          <a:p/>
+          <a:p>
+            <a:pPr algn="l"/>
+            <a:r>
+              <a:rPr sz="3200" b="0">
+                <a:solidFill>
+                  <a:srgbClr val="FFFFFF"/>
+                </a:solidFill>
+              </a:rPr>
+              <a:t/>
+            </a:r>
+          </a:p>
+        </p:txBody>
+      </p:sp>
+      <p:sp>
+        <p:nvSpPr>
+          <p:cNvPr id="5" name="TextBox 4"/>
+          <p:cNvSpPr txBox="1"/>
+          <p:nvPr/>
+        </p:nvSpPr>
+        <p:spPr>
+          <a:xfrm>
+            <a:off x="457200" y="5943600"/>
+            <a:ext cx="914400" cy="685800"/>
+          </a:xfrm>
+          <a:prstGeom prst="rect">
+            <a:avLst/>
+          </a:prstGeom>
+          <a:noFill/>
+        </p:spPr>
+        <p:txBody>
+          <a:bodyPr wrap="none">
+            <a:normAutofit/>
+          </a:bodyPr>
+          <a:lstStyle/>
+          <a:p/>
+          <a:p>
+            <a:pPr algn="l"/>
+            <a:r>
+              <a:rPr sz="1600" b="0">
+                <a:solidFill>
+                  <a:srgbClr val="FFFFFF"/>
+                </a:solidFill>
+              </a:rPr>
+              <a:t/>
+            </a:r>
+          </a:p>
+        </p:txBody>
+      </p:sp>
+      <p:sp>
+        <p:nvSpPr>
+          <p:cNvPr id="6" name="TextBox 5"/>
+          <p:cNvSpPr txBox="1"/>
+          <p:nvPr/>
+        </p:nvSpPr>
+        <p:spPr>
+          <a:xfrm>
+            <a:off x="2286000" y="5943600"/>
+            <a:ext cx="3657600" cy="685800"/>
+          </a:xfrm>
+          <a:prstGeom prst="rect">
+            <a:avLst/>
+          </a:prstGeom>
+          <a:noFill/>
+        </p:spPr>
+        <p:txBody>
+          <a:bodyPr wrap="none">
+            <a:normAutofit/>
+          </a:bodyPr>
+          <a:lstStyle/>
+          <a:p/>
+          <a:p>
+            <a:pPr algn="ctr"/>
+            <a:r>
+              <a:rPr sz="1600" b="0">
+                <a:solidFill>
+                  <a:srgbClr val="FFFFFF"/>
+                </a:solidFill>
+              </a:rPr>
+              <a:t/>
+            </a:r>
+          </a:p>
+        </p:txBody>
+      </p:sp>
+      <p:sp>
+        <p:nvSpPr>
+          <p:cNvPr id="7" name="TextBox 6"/>
+          <p:cNvSpPr txBox="1"/>
+          <p:nvPr/>
+        </p:nvSpPr>
+        <p:spPr>
+          <a:xfrm>
+            <a:off x="7315200" y="5943600"/>
+            <a:ext cx="914400" cy="685800"/>
+          </a:xfrm>
+          <a:prstGeom prst="rect">
+            <a:avLst/>
+          </a:prstGeom>
+          <a:noFill/>
+        </p:spPr>
+        <p:txBody>
+          <a:bodyPr wrap="none">
+            <a:normAutofit/>
+          </a:bodyPr>
+          <a:lstStyle/>
+          <a:p/>
+          <a:p>
+            <a:pPr algn="r"/>
+            <a:r>
+              <a:rPr sz="1600" b="0">
+                <a:solidFill>
+                  <a:srgbClr val="FFFFFF"/>
+                </a:solidFill>
+              </a:rPr>
+              <a:t/>
+            </a:r>
+          </a:p>
+        </p:txBody>
+      </p:sp>
+    </p:spTree>
+  </p:cSld>
+  <p:clrMapOvr>
+    <a:masterClrMapping/>
+  </p:clrMapOvr>
+</p:sld>
+</file>
+
+<file path=ppt/slides/slide8.xml><?xml version="1.0" encoding="utf-8"?>
+<p:sld xmlns:a="http://schemas.openxmlformats.org/drawingml/2006/main" xmlns:p="http://schemas.openxmlformats.org/presentationml/2006/main" xmlns:r="http://schemas.openxmlformats.org/officeDocument/2006/relationships">
+  <p:cSld>
+    <p:spTree>
+      <p:nvGrpSpPr>
+        <p:cNvPr id="1" name=""/>
+        <p:cNvGrpSpPr/>
+        <p:nvPr/>
+      </p:nvGrpSpPr>
+      <p:grpSpPr/>
+      <p:pic>
+        <p:nvPicPr>
+          <p:cNvPr id="2" name="Picture 1" descr="title_slide.jpg"/>
+          <p:cNvPicPr>
+            <a:picLocks noChangeAspect="1"/>
+          </p:cNvPicPr>
+          <p:nvPr/>
+        </p:nvPicPr>
+        <p:blipFill>
+          <a:blip r:embed="rId2"/>
+          <a:stretch>
+            <a:fillRect/>
+          </a:stretch>
+        </p:blipFill>
+        <p:spPr>
+          <a:xfrm>
+            <a:off x="0" y="0"/>
+            <a:ext cx="9144000" cy="6858000"/>
+          </a:xfrm>
+          <a:prstGeom prst="rect">
+            <a:avLst/>
+          </a:prstGeom>
+        </p:spPr>
+      </p:pic>
+      <p:sp>
+        <p:nvSpPr>
+          <p:cNvPr id="3" name="TextBox 2"/>
+          <p:cNvSpPr txBox="1"/>
+          <p:nvPr/>
+        </p:nvSpPr>
+        <p:spPr>
+          <a:xfrm>
+            <a:off x="457200" y="182880"/>
+            <a:ext cx="8229600" cy="960120"/>
+          </a:xfrm>
+          <a:prstGeom prst="rect">
+            <a:avLst/>
+          </a:prstGeom>
+          <a:noFill/>
+        </p:spPr>
+        <p:txBody>
+          <a:bodyPr wrap="none">
+            <a:normAutofit/>
+          </a:bodyPr>
+          <a:lstStyle/>
+          <a:p/>
+          <a:p>
+            <a:pPr algn="l"/>
+            <a:r>
+              <a:rPr sz="3600" b="0">
+                <a:solidFill>
+                  <a:srgbClr val="FFFFFF"/>
+                </a:solidFill>
+              </a:rPr>
+              <a:t/>
+            </a:r>
+          </a:p>
+        </p:txBody>
+      </p:sp>
+      <p:sp>
+        <p:nvSpPr>
+          <p:cNvPr id="4" name="TextBox 3"/>
+          <p:cNvSpPr txBox="1"/>
+          <p:nvPr/>
+        </p:nvSpPr>
+        <p:spPr>
+          <a:xfrm>
+            <a:off x="457200" y="1143000"/>
+            <a:ext cx="8229600" cy="5029200"/>
+          </a:xfrm>
+          <a:prstGeom prst="rect">
+            <a:avLst/>
+          </a:prstGeom>
+          <a:noFill/>
+        </p:spPr>
+        <p:txBody>
+          <a:bodyPr wrap="none">
+            <a:normAutofit/>
+          </a:bodyPr>
+          <a:lstStyle/>
+          <a:p/>
+          <a:p>
+            <a:pPr algn="l"/>
+            <a:r>
+              <a:rPr sz="3200" b="0">
+                <a:solidFill>
+                  <a:srgbClr val="FFFFFF"/>
+                </a:solidFill>
+              </a:rPr>
+              <a:t/>
+            </a:r>
+          </a:p>
+        </p:txBody>
+      </p:sp>
+      <p:sp>
+        <p:nvSpPr>
+          <p:cNvPr id="5" name="TextBox 4"/>
+          <p:cNvSpPr txBox="1"/>
+          <p:nvPr/>
+        </p:nvSpPr>
+        <p:spPr>
+          <a:xfrm>
+            <a:off x="457200" y="5943600"/>
+            <a:ext cx="914400" cy="685800"/>
+          </a:xfrm>
+          <a:prstGeom prst="rect">
+            <a:avLst/>
+          </a:prstGeom>
+          <a:noFill/>
+        </p:spPr>
+        <p:txBody>
+          <a:bodyPr wrap="none">
+            <a:normAutofit/>
+          </a:bodyPr>
+          <a:lstStyle/>
+          <a:p/>
+          <a:p>
+            <a:pPr algn="l"/>
+            <a:r>
+              <a:rPr sz="1600" b="0">
+                <a:solidFill>
+                  <a:srgbClr val="FFFFFF"/>
+                </a:solidFill>
+              </a:rPr>
+              <a:t/>
+            </a:r>
+          </a:p>
+        </p:txBody>
+      </p:sp>
+      <p:sp>
+        <p:nvSpPr>
+          <p:cNvPr id="6" name="TextBox 5"/>
+          <p:cNvSpPr txBox="1"/>
+          <p:nvPr/>
+        </p:nvSpPr>
+        <p:spPr>
+          <a:xfrm>
+            <a:off x="2286000" y="5943600"/>
+            <a:ext cx="3657600" cy="685800"/>
+          </a:xfrm>
+          <a:prstGeom prst="rect">
+            <a:avLst/>
+          </a:prstGeom>
+          <a:noFill/>
+        </p:spPr>
+        <p:txBody>
+          <a:bodyPr wrap="none">
+            <a:normAutofit/>
+          </a:bodyPr>
+          <a:lstStyle/>
+          <a:p/>
+          <a:p>
+            <a:pPr algn="ctr"/>
+            <a:r>
+              <a:rPr sz="1600" b="0">
+                <a:solidFill>
+                  <a:srgbClr val="FFFFFF"/>
+                </a:solidFill>
+              </a:rPr>
+              <a:t/>
+            </a:r>
+          </a:p>
+        </p:txBody>
+      </p:sp>
+      <p:sp>
+        <p:nvSpPr>
+          <p:cNvPr id="7" name="TextBox 6"/>
+          <p:cNvSpPr txBox="1"/>
+          <p:nvPr/>
+        </p:nvSpPr>
+        <p:spPr>
+          <a:xfrm>
+            <a:off x="7315200" y="5943600"/>
+            <a:ext cx="914400" cy="685800"/>
+          </a:xfrm>
+          <a:prstGeom prst="rect">
+            <a:avLst/>
+          </a:prstGeom>
+          <a:noFill/>
+        </p:spPr>
+        <p:txBody>
+          <a:bodyPr wrap="none">
+            <a:normAutofit/>
+          </a:bodyPr>
+          <a:lstStyle/>
+          <a:p/>
+          <a:p>
+            <a:pPr algn="r"/>
+            <a:r>
+              <a:rPr sz="1600" b="0">
+                <a:solidFill>
+                  <a:srgbClr val="FFFFFF"/>
+                </a:solidFill>
+              </a:rPr>
+              <a:t/>
+            </a:r>
+          </a:p>
+        </p:txBody>
+      </p:sp>
+    </p:spTree>
+  </p:cSld>
+  <p:clrMapOvr>
+    <a:masterClrMapping/>
+  </p:clrMapOvr>
+</p:sld>
+</file>
+
+<file path=ppt/slides/slide9.xml><?xml version="1.0" encoding="utf-8"?>
+<p:sld xmlns:a="http://schemas.openxmlformats.org/drawingml/2006/main" xmlns:p="http://schemas.openxmlformats.org/presentationml/2006/main" xmlns:r="http://schemas.openxmlformats.org/officeDocument/2006/relationships">
+  <p:cSld>
+    <p:spTree>
+      <p:nvGrpSpPr>
+        <p:cNvPr id="1" name=""/>
+        <p:cNvGrpSpPr/>
+        <p:nvPr/>
+      </p:nvGrpSpPr>
+      <p:grpSpPr/>
+      <p:pic>
+        <p:nvPicPr>
+          <p:cNvPr id="2" name="Picture 1" descr="title_slide.jpg"/>
+          <p:cNvPicPr>
+            <a:picLocks noChangeAspect="1"/>
+          </p:cNvPicPr>
+          <p:nvPr/>
+        </p:nvPicPr>
+        <p:blipFill>
+          <a:blip r:embed="rId2"/>
+          <a:stretch>
+            <a:fillRect/>
+          </a:stretch>
+        </p:blipFill>
+        <p:spPr>
+          <a:xfrm>
+            <a:off x="0" y="0"/>
+            <a:ext cx="9144000" cy="6858000"/>
+          </a:xfrm>
+          <a:prstGeom prst="rect">
+            <a:avLst/>
+          </a:prstGeom>
+        </p:spPr>
+      </p:pic>
+      <p:sp>
+        <p:nvSpPr>
+          <p:cNvPr id="3" name="TextBox 2"/>
+          <p:cNvSpPr txBox="1"/>
+          <p:nvPr/>
+        </p:nvSpPr>
+        <p:spPr>
+          <a:xfrm>
+            <a:off x="457200" y="182880"/>
+            <a:ext cx="8229600" cy="960120"/>
+          </a:xfrm>
+          <a:prstGeom prst="rect">
+            <a:avLst/>
+          </a:prstGeom>
+          <a:noFill/>
+        </p:spPr>
+        <p:txBody>
+          <a:bodyPr wrap="none">
+            <a:normAutofit/>
+          </a:bodyPr>
+          <a:lstStyle/>
+          <a:p/>
+          <a:p>
+            <a:pPr algn="l"/>
+            <a:r>
+              <a:rPr sz="3600" b="0">
+                <a:solidFill>
+                  <a:srgbClr val="FFFFFF"/>
+                </a:solidFill>
+              </a:rPr>
+              <a:t/>
+            </a:r>
+          </a:p>
+        </p:txBody>
+      </p:sp>
+      <p:sp>
+        <p:nvSpPr>
+          <p:cNvPr id="4" name="TextBox 3"/>
+          <p:cNvSpPr txBox="1"/>
+          <p:nvPr/>
+        </p:nvSpPr>
+        <p:spPr>
+          <a:xfrm>
+            <a:off x="457200" y="1143000"/>
+            <a:ext cx="8229600" cy="5029200"/>
+          </a:xfrm>
+          <a:prstGeom prst="rect">
+            <a:avLst/>
+          </a:prstGeom>
+          <a:noFill/>
+        </p:spPr>
+        <p:txBody>
+          <a:bodyPr wrap="none">
+            <a:normAutofit/>
+          </a:bodyPr>
+          <a:lstStyle/>
+          <a:p/>
+          <a:p>
+            <a:pPr algn="l"/>
+            <a:r>
+              <a:rPr sz="3200" b="0">
+                <a:solidFill>
+                  <a:srgbClr val="FFFFFF"/>
+                </a:solidFill>
+              </a:rPr>
+              <a:t/>
+            </a:r>
+          </a:p>
+        </p:txBody>
+      </p:sp>
+      <p:sp>
+        <p:nvSpPr>
+          <p:cNvPr id="5" name="TextBox 4"/>
+          <p:cNvSpPr txBox="1"/>
+          <p:nvPr/>
+        </p:nvSpPr>
+        <p:spPr>
+          <a:xfrm>
+            <a:off x="457200" y="5943600"/>
+            <a:ext cx="914400" cy="685800"/>
+          </a:xfrm>
+          <a:prstGeom prst="rect">
+            <a:avLst/>
+          </a:prstGeom>
+          <a:noFill/>
+        </p:spPr>
+        <p:txBody>
+          <a:bodyPr wrap="none">
+            <a:normAutofit/>
+          </a:bodyPr>
+          <a:lstStyle/>
+          <a:p/>
+          <a:p>
+            <a:pPr algn="l"/>
+            <a:r>
+              <a:rPr sz="1600" b="0">
+                <a:solidFill>
+                  <a:srgbClr val="FFFFFF"/>
+                </a:solidFill>
+              </a:rPr>
+              <a:t/>
             </a:r>
           </a:p>
         </p:txBody>

</xml_diff>

<commit_message>
Introduced a new presentation manager interface.
In this new interface users can add bhajans on the fly, delete them,
reorder them visually and even modify the bhajan.
</commit_message>
<xml_diff>
--- a/generated_ppts/bhajans.pptx
+++ b/generated_ppts/bhajans.pptx
@@ -9,16 +9,6 @@
     <p:sldId r:id="rId8" id="257"/>
     <p:sldId r:id="rId9" id="258"/>
     <p:sldId r:id="rId10" id="259"/>
-    <p:sldId r:id="rId11" id="260"/>
-    <p:sldId r:id="rId12" id="261"/>
-    <p:sldId r:id="rId13" id="262"/>
-    <p:sldId r:id="rId14" id="263"/>
-    <p:sldId r:id="rId15" id="264"/>
-    <p:sldId r:id="rId16" id="265"/>
-    <p:sldId r:id="rId17" id="266"/>
-    <p:sldId r:id="rId18" id="267"/>
-    <p:sldId r:id="rId19" id="268"/>
-    <p:sldId r:id="rId20" id="269"/>
   </p:sldIdLst>
   <p:sldSz cx="9144000" cy="6858000" type="screen4x3"/>
   <p:notesSz cx="6858000" cy="9144000"/>
@@ -3165,1099 +3155,7 @@
                   <a:srgbClr val="FFFF0F"/>
                 </a:solidFill>
               </a:rPr>
-              <a:t>October 09, 2016</a:t>
-            </a:r>
-          </a:p>
-        </p:txBody>
-      </p:sp>
-    </p:spTree>
-  </p:cSld>
-  <p:clrMapOvr>
-    <a:masterClrMapping/>
-  </p:clrMapOvr>
-</p:sld>
-</file>
-
-<file path=ppt/slides/slide10.xml><?xml version="1.0" encoding="utf-8"?>
-<p:sld xmlns:a="http://schemas.openxmlformats.org/drawingml/2006/main" xmlns:p="http://schemas.openxmlformats.org/presentationml/2006/main" xmlns:r="http://schemas.openxmlformats.org/officeDocument/2006/relationships">
-  <p:cSld>
-    <p:spTree>
-      <p:nvGrpSpPr>
-        <p:cNvPr id="1" name=""/>
-        <p:cNvGrpSpPr/>
-        <p:nvPr/>
-      </p:nvGrpSpPr>
-      <p:grpSpPr/>
-      <p:pic>
-        <p:nvPicPr>
-          <p:cNvPr id="2" name="Picture 1" descr="title_slide.jpg"/>
-          <p:cNvPicPr>
-            <a:picLocks noChangeAspect="1"/>
-          </p:cNvPicPr>
-          <p:nvPr/>
-        </p:nvPicPr>
-        <p:blipFill>
-          <a:blip r:embed="rId2"/>
-          <a:stretch>
-            <a:fillRect/>
-          </a:stretch>
-        </p:blipFill>
-        <p:spPr>
-          <a:xfrm>
-            <a:off x="0" y="0"/>
-            <a:ext cx="9144000" cy="6858000"/>
-          </a:xfrm>
-          <a:prstGeom prst="rect">
-            <a:avLst/>
-          </a:prstGeom>
-        </p:spPr>
-      </p:pic>
-      <p:sp>
-        <p:nvSpPr>
-          <p:cNvPr id="3" name="TextBox 2"/>
-          <p:cNvSpPr txBox="1"/>
-          <p:nvPr/>
-        </p:nvSpPr>
-        <p:spPr>
-          <a:xfrm>
-            <a:off x="457200" y="182880"/>
-            <a:ext cx="8229600" cy="960120"/>
-          </a:xfrm>
-          <a:prstGeom prst="rect">
-            <a:avLst/>
-          </a:prstGeom>
-          <a:noFill/>
-        </p:spPr>
-        <p:txBody>
-          <a:bodyPr wrap="none">
-            <a:normAutofit/>
-          </a:bodyPr>
-          <a:lstStyle/>
-          <a:p/>
-          <a:p>
-            <a:pPr algn="l"/>
-            <a:r>
-              <a:rPr sz="3600" b="0">
-                <a:solidFill>
-                  <a:srgbClr val="FFFFFF"/>
-                </a:solidFill>
-              </a:rPr>
-              <a:t/>
-            </a:r>
-          </a:p>
-        </p:txBody>
-      </p:sp>
-      <p:sp>
-        <p:nvSpPr>
-          <p:cNvPr id="4" name="TextBox 3"/>
-          <p:cNvSpPr txBox="1"/>
-          <p:nvPr/>
-        </p:nvSpPr>
-        <p:spPr>
-          <a:xfrm>
-            <a:off x="457200" y="1143000"/>
-            <a:ext cx="8229600" cy="5029200"/>
-          </a:xfrm>
-          <a:prstGeom prst="rect">
-            <a:avLst/>
-          </a:prstGeom>
-          <a:noFill/>
-        </p:spPr>
-        <p:txBody>
-          <a:bodyPr wrap="none">
-            <a:normAutofit/>
-          </a:bodyPr>
-          <a:lstStyle/>
-          <a:p/>
-          <a:p>
-            <a:pPr algn="l"/>
-            <a:r>
-              <a:rPr sz="3200" b="0">
-                <a:solidFill>
-                  <a:srgbClr val="FFFFFF"/>
-                </a:solidFill>
-              </a:rPr>
-              <a:t/>
-            </a:r>
-          </a:p>
-        </p:txBody>
-      </p:sp>
-      <p:sp>
-        <p:nvSpPr>
-          <p:cNvPr id="5" name="TextBox 4"/>
-          <p:cNvSpPr txBox="1"/>
-          <p:nvPr/>
-        </p:nvSpPr>
-        <p:spPr>
-          <a:xfrm>
-            <a:off x="457200" y="5943600"/>
-            <a:ext cx="914400" cy="685800"/>
-          </a:xfrm>
-          <a:prstGeom prst="rect">
-            <a:avLst/>
-          </a:prstGeom>
-          <a:noFill/>
-        </p:spPr>
-        <p:txBody>
-          <a:bodyPr wrap="none">
-            <a:normAutofit/>
-          </a:bodyPr>
-          <a:lstStyle/>
-          <a:p/>
-          <a:p>
-            <a:pPr algn="l"/>
-            <a:r>
-              <a:rPr sz="1600" b="0">
-                <a:solidFill>
-                  <a:srgbClr val="FFFFFF"/>
-                </a:solidFill>
-              </a:rPr>
-              <a:t/>
-            </a:r>
-          </a:p>
-        </p:txBody>
-      </p:sp>
-      <p:sp>
-        <p:nvSpPr>
-          <p:cNvPr id="6" name="TextBox 5"/>
-          <p:cNvSpPr txBox="1"/>
-          <p:nvPr/>
-        </p:nvSpPr>
-        <p:spPr>
-          <a:xfrm>
-            <a:off x="2286000" y="5943600"/>
-            <a:ext cx="3657600" cy="685800"/>
-          </a:xfrm>
-          <a:prstGeom prst="rect">
-            <a:avLst/>
-          </a:prstGeom>
-          <a:noFill/>
-        </p:spPr>
-        <p:txBody>
-          <a:bodyPr wrap="none">
-            <a:normAutofit/>
-          </a:bodyPr>
-          <a:lstStyle/>
-          <a:p/>
-          <a:p>
-            <a:pPr algn="ctr"/>
-            <a:r>
-              <a:rPr sz="1600" b="0">
-                <a:solidFill>
-                  <a:srgbClr val="FFFFFF"/>
-                </a:solidFill>
-              </a:rPr>
-              <a:t/>
-            </a:r>
-          </a:p>
-        </p:txBody>
-      </p:sp>
-      <p:sp>
-        <p:nvSpPr>
-          <p:cNvPr id="7" name="TextBox 6"/>
-          <p:cNvSpPr txBox="1"/>
-          <p:nvPr/>
-        </p:nvSpPr>
-        <p:spPr>
-          <a:xfrm>
-            <a:off x="7315200" y="5943600"/>
-            <a:ext cx="914400" cy="685800"/>
-          </a:xfrm>
-          <a:prstGeom prst="rect">
-            <a:avLst/>
-          </a:prstGeom>
-          <a:noFill/>
-        </p:spPr>
-        <p:txBody>
-          <a:bodyPr wrap="none">
-            <a:normAutofit/>
-          </a:bodyPr>
-          <a:lstStyle/>
-          <a:p/>
-          <a:p>
-            <a:pPr algn="r"/>
-            <a:r>
-              <a:rPr sz="1600" b="0">
-                <a:solidFill>
-                  <a:srgbClr val="FFFFFF"/>
-                </a:solidFill>
-              </a:rPr>
-              <a:t/>
-            </a:r>
-          </a:p>
-        </p:txBody>
-      </p:sp>
-    </p:spTree>
-  </p:cSld>
-  <p:clrMapOvr>
-    <a:masterClrMapping/>
-  </p:clrMapOvr>
-</p:sld>
-</file>
-
-<file path=ppt/slides/slide11.xml><?xml version="1.0" encoding="utf-8"?>
-<p:sld xmlns:a="http://schemas.openxmlformats.org/drawingml/2006/main" xmlns:p="http://schemas.openxmlformats.org/presentationml/2006/main" xmlns:r="http://schemas.openxmlformats.org/officeDocument/2006/relationships">
-  <p:cSld>
-    <p:spTree>
-      <p:nvGrpSpPr>
-        <p:cNvPr id="1" name=""/>
-        <p:cNvGrpSpPr/>
-        <p:nvPr/>
-      </p:nvGrpSpPr>
-      <p:grpSpPr/>
-      <p:pic>
-        <p:nvPicPr>
-          <p:cNvPr id="2" name="Picture 1" descr="title_slide.jpg"/>
-          <p:cNvPicPr>
-            <a:picLocks noChangeAspect="1"/>
-          </p:cNvPicPr>
-          <p:nvPr/>
-        </p:nvPicPr>
-        <p:blipFill>
-          <a:blip r:embed="rId2"/>
-          <a:stretch>
-            <a:fillRect/>
-          </a:stretch>
-        </p:blipFill>
-        <p:spPr>
-          <a:xfrm>
-            <a:off x="0" y="0"/>
-            <a:ext cx="9144000" cy="6858000"/>
-          </a:xfrm>
-          <a:prstGeom prst="rect">
-            <a:avLst/>
-          </a:prstGeom>
-        </p:spPr>
-      </p:pic>
-      <p:sp>
-        <p:nvSpPr>
-          <p:cNvPr id="3" name="TextBox 2"/>
-          <p:cNvSpPr txBox="1"/>
-          <p:nvPr/>
-        </p:nvSpPr>
-        <p:spPr>
-          <a:xfrm>
-            <a:off x="457200" y="182880"/>
-            <a:ext cx="8229600" cy="960120"/>
-          </a:xfrm>
-          <a:prstGeom prst="rect">
-            <a:avLst/>
-          </a:prstGeom>
-          <a:noFill/>
-        </p:spPr>
-        <p:txBody>
-          <a:bodyPr wrap="none">
-            <a:normAutofit/>
-          </a:bodyPr>
-          <a:lstStyle/>
-          <a:p/>
-          <a:p>
-            <a:pPr algn="l"/>
-            <a:r>
-              <a:rPr sz="3600" b="0">
-                <a:solidFill>
-                  <a:srgbClr val="FFFFFF"/>
-                </a:solidFill>
-              </a:rPr>
-              <a:t/>
-            </a:r>
-          </a:p>
-        </p:txBody>
-      </p:sp>
-      <p:sp>
-        <p:nvSpPr>
-          <p:cNvPr id="4" name="TextBox 3"/>
-          <p:cNvSpPr txBox="1"/>
-          <p:nvPr/>
-        </p:nvSpPr>
-        <p:spPr>
-          <a:xfrm>
-            <a:off x="457200" y="1143000"/>
-            <a:ext cx="8229600" cy="5029200"/>
-          </a:xfrm>
-          <a:prstGeom prst="rect">
-            <a:avLst/>
-          </a:prstGeom>
-          <a:noFill/>
-        </p:spPr>
-        <p:txBody>
-          <a:bodyPr wrap="none">
-            <a:normAutofit/>
-          </a:bodyPr>
-          <a:lstStyle/>
-          <a:p/>
-          <a:p>
-            <a:pPr algn="l"/>
-            <a:r>
-              <a:rPr sz="3200" b="0">
-                <a:solidFill>
-                  <a:srgbClr val="FFFFFF"/>
-                </a:solidFill>
-              </a:rPr>
-              <a:t/>
-            </a:r>
-          </a:p>
-        </p:txBody>
-      </p:sp>
-      <p:sp>
-        <p:nvSpPr>
-          <p:cNvPr id="5" name="TextBox 4"/>
-          <p:cNvSpPr txBox="1"/>
-          <p:nvPr/>
-        </p:nvSpPr>
-        <p:spPr>
-          <a:xfrm>
-            <a:off x="457200" y="5943600"/>
-            <a:ext cx="914400" cy="685800"/>
-          </a:xfrm>
-          <a:prstGeom prst="rect">
-            <a:avLst/>
-          </a:prstGeom>
-          <a:noFill/>
-        </p:spPr>
-        <p:txBody>
-          <a:bodyPr wrap="none">
-            <a:normAutofit/>
-          </a:bodyPr>
-          <a:lstStyle/>
-          <a:p/>
-          <a:p>
-            <a:pPr algn="l"/>
-            <a:r>
-              <a:rPr sz="1600" b="0">
-                <a:solidFill>
-                  <a:srgbClr val="FFFFFF"/>
-                </a:solidFill>
-              </a:rPr>
-              <a:t/>
-            </a:r>
-          </a:p>
-        </p:txBody>
-      </p:sp>
-      <p:sp>
-        <p:nvSpPr>
-          <p:cNvPr id="6" name="TextBox 5"/>
-          <p:cNvSpPr txBox="1"/>
-          <p:nvPr/>
-        </p:nvSpPr>
-        <p:spPr>
-          <a:xfrm>
-            <a:off x="2286000" y="5943600"/>
-            <a:ext cx="3657600" cy="685800"/>
-          </a:xfrm>
-          <a:prstGeom prst="rect">
-            <a:avLst/>
-          </a:prstGeom>
-          <a:noFill/>
-        </p:spPr>
-        <p:txBody>
-          <a:bodyPr wrap="none">
-            <a:normAutofit/>
-          </a:bodyPr>
-          <a:lstStyle/>
-          <a:p/>
-          <a:p>
-            <a:pPr algn="ctr"/>
-            <a:r>
-              <a:rPr sz="1600" b="0">
-                <a:solidFill>
-                  <a:srgbClr val="FFFFFF"/>
-                </a:solidFill>
-              </a:rPr>
-              <a:t>Harey Rama Harey Rama Rama Rama Harey Harey</a:t>
-            </a:r>
-          </a:p>
-        </p:txBody>
-      </p:sp>
-      <p:sp>
-        <p:nvSpPr>
-          <p:cNvPr id="7" name="TextBox 6"/>
-          <p:cNvSpPr txBox="1"/>
-          <p:nvPr/>
-        </p:nvSpPr>
-        <p:spPr>
-          <a:xfrm>
-            <a:off x="7315200" y="5943600"/>
-            <a:ext cx="914400" cy="685800"/>
-          </a:xfrm>
-          <a:prstGeom prst="rect">
-            <a:avLst/>
-          </a:prstGeom>
-          <a:noFill/>
-        </p:spPr>
-        <p:txBody>
-          <a:bodyPr wrap="none">
-            <a:normAutofit/>
-          </a:bodyPr>
-          <a:lstStyle/>
-          <a:p/>
-          <a:p>
-            <a:pPr algn="r"/>
-            <a:r>
-              <a:rPr sz="1600" b="0">
-                <a:solidFill>
-                  <a:srgbClr val="FFFFFF"/>
-                </a:solidFill>
-              </a:rPr>
-              <a:t/>
-            </a:r>
-          </a:p>
-        </p:txBody>
-      </p:sp>
-    </p:spTree>
-  </p:cSld>
-  <p:clrMapOvr>
-    <a:masterClrMapping/>
-  </p:clrMapOvr>
-</p:sld>
-</file>
-
-<file path=ppt/slides/slide12.xml><?xml version="1.0" encoding="utf-8"?>
-<p:sld xmlns:a="http://schemas.openxmlformats.org/drawingml/2006/main" xmlns:p="http://schemas.openxmlformats.org/presentationml/2006/main" xmlns:r="http://schemas.openxmlformats.org/officeDocument/2006/relationships">
-  <p:cSld>
-    <p:spTree>
-      <p:nvGrpSpPr>
-        <p:cNvPr id="1" name=""/>
-        <p:cNvGrpSpPr/>
-        <p:nvPr/>
-      </p:nvGrpSpPr>
-      <p:grpSpPr/>
-      <p:pic>
-        <p:nvPicPr>
-          <p:cNvPr id="2" name="Picture 1" descr="image1.gif"/>
-          <p:cNvPicPr>
-            <a:picLocks noChangeAspect="1"/>
-          </p:cNvPicPr>
-          <p:nvPr/>
-        </p:nvPicPr>
-        <p:blipFill>
-          <a:blip r:embed="rId2"/>
-          <a:stretch>
-            <a:fillRect/>
-          </a:stretch>
-        </p:blipFill>
-        <p:spPr>
-          <a:xfrm>
-            <a:off x="0" y="0"/>
-            <a:ext cx="9144000" cy="6858000"/>
-          </a:xfrm>
-          <a:prstGeom prst="rect">
-            <a:avLst/>
-          </a:prstGeom>
-        </p:spPr>
-      </p:pic>
-      <p:sp>
-        <p:nvSpPr>
-          <p:cNvPr id="3" name="TextBox 2"/>
-          <p:cNvSpPr txBox="1"/>
-          <p:nvPr/>
-        </p:nvSpPr>
-        <p:spPr>
-          <a:xfrm>
-            <a:off x="457200" y="182880"/>
-            <a:ext cx="8229600" cy="960120"/>
-          </a:xfrm>
-          <a:prstGeom prst="rect">
-            <a:avLst/>
-          </a:prstGeom>
-          <a:noFill/>
-        </p:spPr>
-        <p:txBody>
-          <a:bodyPr wrap="none">
-            <a:normAutofit/>
-          </a:bodyPr>
-          <a:lstStyle/>
-          <a:p/>
-          <a:p>
-            <a:pPr algn="l"/>
-            <a:r>
-              <a:rPr sz="3600" b="0">
-                <a:solidFill>
-                  <a:srgbClr val="FFFFFF"/>
-                </a:solidFill>
-              </a:rPr>
-              <a:t>Harey Rama Harey Rama Rama Rama
-Harey Harey</a:t>
-            </a:r>
-          </a:p>
-        </p:txBody>
-      </p:sp>
-      <p:sp>
-        <p:nvSpPr>
-          <p:cNvPr id="4" name="TextBox 3"/>
-          <p:cNvSpPr txBox="1"/>
-          <p:nvPr/>
-        </p:nvSpPr>
-        <p:spPr>
-          <a:xfrm>
-            <a:off x="457200" y="1143000"/>
-            <a:ext cx="8229600" cy="5029200"/>
-          </a:xfrm>
-          <a:prstGeom prst="rect">
-            <a:avLst/>
-          </a:prstGeom>
-          <a:noFill/>
-        </p:spPr>
-        <p:txBody>
-          <a:bodyPr wrap="none">
-            <a:normAutofit/>
-          </a:bodyPr>
-          <a:lstStyle/>
-          <a:p/>
-          <a:p>
-            <a:pPr algn="l"/>
-            <a:r>
-              <a:rPr sz="3200" b="0">
-                <a:solidFill>
-                  <a:srgbClr val="FFFFFF"/>
-                </a:solidFill>
-              </a:rPr>
-              <a:t>Harey Rama Harey Rama Rama Rama Harey Harey
-Harey Krishna Harey Krishna Krishna Krishna Harey
-Harey
-Satsangathwey Nithsangathwam Nithsangathwey
-Nirmohathwam
-Nirmohatwey Nischala Thatwam Nischala Thatwey
-Jeevan Mukti</a:t>
-            </a:r>
-          </a:p>
-        </p:txBody>
-      </p:sp>
-      <p:sp>
-        <p:nvSpPr>
-          <p:cNvPr id="5" name="TextBox 4"/>
-          <p:cNvSpPr txBox="1"/>
-          <p:nvPr/>
-        </p:nvSpPr>
-        <p:spPr>
-          <a:xfrm>
-            <a:off x="457200" y="5943600"/>
-            <a:ext cx="914400" cy="685800"/>
-          </a:xfrm>
-          <a:prstGeom prst="rect">
-            <a:avLst/>
-          </a:prstGeom>
-          <a:noFill/>
-        </p:spPr>
-        <p:txBody>
-          <a:bodyPr wrap="none">
-            <a:normAutofit/>
-          </a:bodyPr>
-          <a:lstStyle/>
-          <a:p/>
-          <a:p>
-            <a:pPr algn="l"/>
-            <a:r>
-              <a:rPr sz="1600" b="0">
-                <a:solidFill>
-                  <a:srgbClr val="FFFFFF"/>
-                </a:solidFill>
-              </a:rPr>
-              <a:t/>
-            </a:r>
-          </a:p>
-        </p:txBody>
-      </p:sp>
-      <p:sp>
-        <p:nvSpPr>
-          <p:cNvPr id="6" name="TextBox 5"/>
-          <p:cNvSpPr txBox="1"/>
-          <p:nvPr/>
-        </p:nvSpPr>
-        <p:spPr>
-          <a:xfrm>
-            <a:off x="2286000" y="5943600"/>
-            <a:ext cx="3657600" cy="685800"/>
-          </a:xfrm>
-          <a:prstGeom prst="rect">
-            <a:avLst/>
-          </a:prstGeom>
-          <a:noFill/>
-        </p:spPr>
-        <p:txBody>
-          <a:bodyPr wrap="none">
-            <a:normAutofit/>
-          </a:bodyPr>
-          <a:lstStyle/>
-          <a:p/>
-          <a:p>
-            <a:pPr algn="ctr"/>
-            <a:r>
-              <a:rPr sz="1600" b="0">
-                <a:solidFill>
-                  <a:srgbClr val="FFFFFF"/>
-                </a:solidFill>
-              </a:rPr>
-              <a:t/>
-            </a:r>
-          </a:p>
-        </p:txBody>
-      </p:sp>
-      <p:sp>
-        <p:nvSpPr>
-          <p:cNvPr id="7" name="TextBox 6"/>
-          <p:cNvSpPr txBox="1"/>
-          <p:nvPr/>
-        </p:nvSpPr>
-        <p:spPr>
-          <a:xfrm>
-            <a:off x="7315200" y="5943600"/>
-            <a:ext cx="914400" cy="685800"/>
-          </a:xfrm>
-          <a:prstGeom prst="rect">
-            <a:avLst/>
-          </a:prstGeom>
-          <a:noFill/>
-        </p:spPr>
-        <p:txBody>
-          <a:bodyPr wrap="none">
-            <a:normAutofit/>
-          </a:bodyPr>
-          <a:lstStyle/>
-          <a:p/>
-          <a:p>
-            <a:pPr algn="r"/>
-            <a:r>
-              <a:rPr sz="1600" b="0">
-                <a:solidFill>
-                  <a:srgbClr val="FFFFFF"/>
-                </a:solidFill>
-              </a:rPr>
-              <a:t/>
-            </a:r>
-          </a:p>
-        </p:txBody>
-      </p:sp>
-    </p:spTree>
-  </p:cSld>
-  <p:clrMapOvr>
-    <a:masterClrMapping/>
-  </p:clrMapOvr>
-</p:sld>
-</file>
-
-<file path=ppt/slides/slide13.xml><?xml version="1.0" encoding="utf-8"?>
-<p:sld xmlns:a="http://schemas.openxmlformats.org/drawingml/2006/main" xmlns:p="http://schemas.openxmlformats.org/presentationml/2006/main" xmlns:r="http://schemas.openxmlformats.org/officeDocument/2006/relationships">
-  <p:cSld>
-    <p:spTree>
-      <p:nvGrpSpPr>
-        <p:cNvPr id="1" name=""/>
-        <p:cNvGrpSpPr/>
-        <p:nvPr/>
-      </p:nvGrpSpPr>
-      <p:grpSpPr/>
-      <p:pic>
-        <p:nvPicPr>
-          <p:cNvPr id="2" name="Picture 1" descr="title_slide.jpg"/>
-          <p:cNvPicPr>
-            <a:picLocks noChangeAspect="1"/>
-          </p:cNvPicPr>
-          <p:nvPr/>
-        </p:nvPicPr>
-        <p:blipFill>
-          <a:blip r:embed="rId2"/>
-          <a:stretch>
-            <a:fillRect/>
-          </a:stretch>
-        </p:blipFill>
-        <p:spPr>
-          <a:xfrm>
-            <a:off x="0" y="0"/>
-            <a:ext cx="9144000" cy="6858000"/>
-          </a:xfrm>
-          <a:prstGeom prst="rect">
-            <a:avLst/>
-          </a:prstGeom>
-        </p:spPr>
-      </p:pic>
-      <p:sp>
-        <p:nvSpPr>
-          <p:cNvPr id="3" name="TextBox 2"/>
-          <p:cNvSpPr txBox="1"/>
-          <p:nvPr/>
-        </p:nvSpPr>
-        <p:spPr>
-          <a:xfrm>
-            <a:off x="457200" y="182880"/>
-            <a:ext cx="8229600" cy="960120"/>
-          </a:xfrm>
-          <a:prstGeom prst="rect">
-            <a:avLst/>
-          </a:prstGeom>
-          <a:noFill/>
-        </p:spPr>
-        <p:txBody>
-          <a:bodyPr wrap="none">
-            <a:normAutofit/>
-          </a:bodyPr>
-          <a:lstStyle/>
-          <a:p/>
-          <a:p>
-            <a:pPr algn="l"/>
-            <a:r>
-              <a:rPr sz="3600" b="0">
-                <a:solidFill>
-                  <a:srgbClr val="FFFFFF"/>
-                </a:solidFill>
-              </a:rPr>
-              <a:t/>
-            </a:r>
-          </a:p>
-        </p:txBody>
-      </p:sp>
-      <p:sp>
-        <p:nvSpPr>
-          <p:cNvPr id="4" name="TextBox 3"/>
-          <p:cNvSpPr txBox="1"/>
-          <p:nvPr/>
-        </p:nvSpPr>
-        <p:spPr>
-          <a:xfrm>
-            <a:off x="457200" y="1143000"/>
-            <a:ext cx="8229600" cy="5029200"/>
-          </a:xfrm>
-          <a:prstGeom prst="rect">
-            <a:avLst/>
-          </a:prstGeom>
-          <a:noFill/>
-        </p:spPr>
-        <p:txBody>
-          <a:bodyPr wrap="none">
-            <a:normAutofit/>
-          </a:bodyPr>
-          <a:lstStyle/>
-          <a:p/>
-          <a:p>
-            <a:pPr algn="l"/>
-            <a:r>
-              <a:rPr sz="3200" b="0">
-                <a:solidFill>
-                  <a:srgbClr val="FFFFFF"/>
-                </a:solidFill>
-              </a:rPr>
-              <a:t/>
-            </a:r>
-          </a:p>
-        </p:txBody>
-      </p:sp>
-      <p:sp>
-        <p:nvSpPr>
-          <p:cNvPr id="5" name="TextBox 4"/>
-          <p:cNvSpPr txBox="1"/>
-          <p:nvPr/>
-        </p:nvSpPr>
-        <p:spPr>
-          <a:xfrm>
-            <a:off x="457200" y="5943600"/>
-            <a:ext cx="914400" cy="685800"/>
-          </a:xfrm>
-          <a:prstGeom prst="rect">
-            <a:avLst/>
-          </a:prstGeom>
-          <a:noFill/>
-        </p:spPr>
-        <p:txBody>
-          <a:bodyPr wrap="none">
-            <a:normAutofit/>
-          </a:bodyPr>
-          <a:lstStyle/>
-          <a:p/>
-          <a:p>
-            <a:pPr algn="l"/>
-            <a:r>
-              <a:rPr sz="1600" b="0">
-                <a:solidFill>
-                  <a:srgbClr val="FFFFFF"/>
-                </a:solidFill>
-              </a:rPr>
-              <a:t/>
-            </a:r>
-          </a:p>
-        </p:txBody>
-      </p:sp>
-      <p:sp>
-        <p:nvSpPr>
-          <p:cNvPr id="6" name="TextBox 5"/>
-          <p:cNvSpPr txBox="1"/>
-          <p:nvPr/>
-        </p:nvSpPr>
-        <p:spPr>
-          <a:xfrm>
-            <a:off x="2286000" y="5943600"/>
-            <a:ext cx="3657600" cy="685800"/>
-          </a:xfrm>
-          <a:prstGeom prst="rect">
-            <a:avLst/>
-          </a:prstGeom>
-          <a:noFill/>
-        </p:spPr>
-        <p:txBody>
-          <a:bodyPr wrap="none">
-            <a:normAutofit/>
-          </a:bodyPr>
-          <a:lstStyle/>
-          <a:p/>
-          <a:p>
-            <a:pPr algn="ctr"/>
-            <a:r>
-              <a:rPr sz="1600" b="0">
-                <a:solidFill>
-                  <a:srgbClr val="FFFFFF"/>
-                </a:solidFill>
-              </a:rPr>
-              <a:t/>
-            </a:r>
-          </a:p>
-        </p:txBody>
-      </p:sp>
-      <p:sp>
-        <p:nvSpPr>
-          <p:cNvPr id="7" name="TextBox 6"/>
-          <p:cNvSpPr txBox="1"/>
-          <p:nvPr/>
-        </p:nvSpPr>
-        <p:spPr>
-          <a:xfrm>
-            <a:off x="7315200" y="5943600"/>
-            <a:ext cx="914400" cy="685800"/>
-          </a:xfrm>
-          <a:prstGeom prst="rect">
-            <a:avLst/>
-          </a:prstGeom>
-          <a:noFill/>
-        </p:spPr>
-        <p:txBody>
-          <a:bodyPr wrap="none">
-            <a:normAutofit/>
-          </a:bodyPr>
-          <a:lstStyle/>
-          <a:p/>
-          <a:p>
-            <a:pPr algn="r"/>
-            <a:r>
-              <a:rPr sz="1600" b="0">
-                <a:solidFill>
-                  <a:srgbClr val="FFFFFF"/>
-                </a:solidFill>
-              </a:rPr>
-              <a:t/>
-            </a:r>
-          </a:p>
-        </p:txBody>
-      </p:sp>
-    </p:spTree>
-  </p:cSld>
-  <p:clrMapOvr>
-    <a:masterClrMapping/>
-  </p:clrMapOvr>
-</p:sld>
-</file>
-
-<file path=ppt/slides/slide14.xml><?xml version="1.0" encoding="utf-8"?>
-<p:sld xmlns:a="http://schemas.openxmlformats.org/drawingml/2006/main" xmlns:p="http://schemas.openxmlformats.org/presentationml/2006/main" xmlns:r="http://schemas.openxmlformats.org/officeDocument/2006/relationships">
-  <p:cSld>
-    <p:spTree>
-      <p:nvGrpSpPr>
-        <p:cNvPr id="1" name=""/>
-        <p:cNvGrpSpPr/>
-        <p:nvPr/>
-      </p:nvGrpSpPr>
-      <p:grpSpPr/>
-      <p:pic>
-        <p:nvPicPr>
-          <p:cNvPr id="2" name="Picture 1" descr="title_slide.jpg"/>
-          <p:cNvPicPr>
-            <a:picLocks noChangeAspect="1"/>
-          </p:cNvPicPr>
-          <p:nvPr/>
-        </p:nvPicPr>
-        <p:blipFill>
-          <a:blip r:embed="rId2"/>
-          <a:stretch>
-            <a:fillRect/>
-          </a:stretch>
-        </p:blipFill>
-        <p:spPr>
-          <a:xfrm>
-            <a:off x="0" y="0"/>
-            <a:ext cx="9144000" cy="6858000"/>
-          </a:xfrm>
-          <a:prstGeom prst="rect">
-            <a:avLst/>
-          </a:prstGeom>
-        </p:spPr>
-      </p:pic>
-      <p:sp>
-        <p:nvSpPr>
-          <p:cNvPr id="3" name="TextBox 2"/>
-          <p:cNvSpPr txBox="1"/>
-          <p:nvPr/>
-        </p:nvSpPr>
-        <p:spPr>
-          <a:xfrm>
-            <a:off x="457200" y="182880"/>
-            <a:ext cx="8229600" cy="960120"/>
-          </a:xfrm>
-          <a:prstGeom prst="rect">
-            <a:avLst/>
-          </a:prstGeom>
-          <a:noFill/>
-        </p:spPr>
-        <p:txBody>
-          <a:bodyPr wrap="none">
-            <a:normAutofit/>
-          </a:bodyPr>
-          <a:lstStyle/>
-          <a:p/>
-          <a:p>
-            <a:pPr algn="l"/>
-            <a:r>
-              <a:rPr sz="3600" b="0">
-                <a:solidFill>
-                  <a:srgbClr val="FFFFFF"/>
-                </a:solidFill>
-              </a:rPr>
-              <a:t/>
-            </a:r>
-          </a:p>
-        </p:txBody>
-      </p:sp>
-      <p:sp>
-        <p:nvSpPr>
-          <p:cNvPr id="4" name="TextBox 3"/>
-          <p:cNvSpPr txBox="1"/>
-          <p:nvPr/>
-        </p:nvSpPr>
-        <p:spPr>
-          <a:xfrm>
-            <a:off x="457200" y="1143000"/>
-            <a:ext cx="8229600" cy="5029200"/>
-          </a:xfrm>
-          <a:prstGeom prst="rect">
-            <a:avLst/>
-          </a:prstGeom>
-          <a:noFill/>
-        </p:spPr>
-        <p:txBody>
-          <a:bodyPr wrap="none">
-            <a:normAutofit/>
-          </a:bodyPr>
-          <a:lstStyle/>
-          <a:p/>
-          <a:p>
-            <a:pPr algn="l"/>
-            <a:r>
-              <a:rPr sz="3200" b="0">
-                <a:solidFill>
-                  <a:srgbClr val="FFFFFF"/>
-                </a:solidFill>
-              </a:rPr>
-              <a:t/>
-            </a:r>
-          </a:p>
-        </p:txBody>
-      </p:sp>
-      <p:sp>
-        <p:nvSpPr>
-          <p:cNvPr id="5" name="TextBox 4"/>
-          <p:cNvSpPr txBox="1"/>
-          <p:nvPr/>
-        </p:nvSpPr>
-        <p:spPr>
-          <a:xfrm>
-            <a:off x="457200" y="5943600"/>
-            <a:ext cx="914400" cy="685800"/>
-          </a:xfrm>
-          <a:prstGeom prst="rect">
-            <a:avLst/>
-          </a:prstGeom>
-          <a:noFill/>
-        </p:spPr>
-        <p:txBody>
-          <a:bodyPr wrap="none">
-            <a:normAutofit/>
-          </a:bodyPr>
-          <a:lstStyle/>
-          <a:p/>
-          <a:p>
-            <a:pPr algn="l"/>
-            <a:r>
-              <a:rPr sz="1600" b="0">
-                <a:solidFill>
-                  <a:srgbClr val="FFFFFF"/>
-                </a:solidFill>
-              </a:rPr>
-              <a:t/>
-            </a:r>
-          </a:p>
-        </p:txBody>
-      </p:sp>
-      <p:sp>
-        <p:nvSpPr>
-          <p:cNvPr id="6" name="TextBox 5"/>
-          <p:cNvSpPr txBox="1"/>
-          <p:nvPr/>
-        </p:nvSpPr>
-        <p:spPr>
-          <a:xfrm>
-            <a:off x="2286000" y="5943600"/>
-            <a:ext cx="3657600" cy="685800"/>
-          </a:xfrm>
-          <a:prstGeom prst="rect">
-            <a:avLst/>
-          </a:prstGeom>
-          <a:noFill/>
-        </p:spPr>
-        <p:txBody>
-          <a:bodyPr wrap="none">
-            <a:normAutofit/>
-          </a:bodyPr>
-          <a:lstStyle/>
-          <a:p/>
-          <a:p>
-            <a:pPr algn="ctr"/>
-            <a:r>
-              <a:rPr sz="1600" b="0">
-                <a:solidFill>
-                  <a:srgbClr val="FFFFFF"/>
-                </a:solidFill>
-              </a:rPr>
-              <a:t/>
-            </a:r>
-          </a:p>
-        </p:txBody>
-      </p:sp>
-      <p:sp>
-        <p:nvSpPr>
-          <p:cNvPr id="7" name="TextBox 6"/>
-          <p:cNvSpPr txBox="1"/>
-          <p:nvPr/>
-        </p:nvSpPr>
-        <p:spPr>
-          <a:xfrm>
-            <a:off x="7315200" y="5943600"/>
-            <a:ext cx="914400" cy="685800"/>
-          </a:xfrm>
-          <a:prstGeom prst="rect">
-            <a:avLst/>
-          </a:prstGeom>
-          <a:noFill/>
-        </p:spPr>
-        <p:txBody>
-          <a:bodyPr wrap="none">
-            <a:normAutofit/>
-          </a:bodyPr>
-          <a:lstStyle/>
-          <a:p/>
-          <a:p>
-            <a:pPr algn="r"/>
-            <a:r>
-              <a:rPr sz="1600" b="0">
-                <a:solidFill>
-                  <a:srgbClr val="FFFFFF"/>
-                </a:solidFill>
-              </a:rPr>
-              <a:t/>
+              <a:t>October 15, 2016</a:t>
             </a:r>
           </a:p>
         </p:txBody>
@@ -4282,7 +3180,7 @@
       <p:grpSpPr/>
       <p:pic>
         <p:nvPicPr>
-          <p:cNvPr id="2" name="Picture 1" descr="title_slide.jpg"/>
+          <p:cNvPr id="2" name="Picture 1" descr="image2.gif"/>
           <p:cNvPicPr>
             <a:picLocks noChangeAspect="1"/>
           </p:cNvPicPr>
@@ -4334,7 +3232,7 @@
                   <a:srgbClr val="FFFFFF"/>
                 </a:solidFill>
               </a:rPr>
-              <a:t/>
+              <a:t>Aao Aao Aao Aao </a:t>
             </a:r>
           </a:p>
         </p:txBody>
@@ -4369,7 +3267,9 @@
                   <a:srgbClr val="FFFFFF"/>
                 </a:solidFill>
               </a:rPr>
-              <a:t/>
+              <a:t>Aao Aao Aao Aao 
+Aao Sundara Nanda Gopal
+Navaneetha Chora Manasa Vihara</a:t>
             </a:r>
           </a:p>
         </p:txBody>
@@ -4439,7 +3339,7 @@
                   <a:srgbClr val="FFFFFF"/>
                 </a:solidFill>
               </a:rPr>
-              <a:t/>
+              <a:t>Continued</a:t>
             </a:r>
           </a:p>
         </p:txBody>
@@ -4499,7 +3399,7 @@
       <p:grpSpPr/>
       <p:pic>
         <p:nvPicPr>
-          <p:cNvPr id="2" name="Picture 1" descr="title_slide.jpg"/>
+          <p:cNvPr id="2" name="Picture 1" descr="image2.gif"/>
           <p:cNvPicPr>
             <a:picLocks noChangeAspect="1"/>
           </p:cNvPicPr>
@@ -4551,7 +3451,7 @@
                   <a:srgbClr val="FFFFFF"/>
                 </a:solidFill>
               </a:rPr>
-              <a:t/>
+              <a:t>Aao Aao Aao Aao </a:t>
             </a:r>
           </a:p>
         </p:txBody>
@@ -4586,7 +3486,8 @@
                   <a:srgbClr val="FFFFFF"/>
                 </a:solidFill>
               </a:rPr>
-              <a:t/>
+              <a:t>Darshana Do Nandalala (2)
+Mujhey Darshana Do Nandalala</a:t>
             </a:r>
           </a:p>
         </p:txBody>
@@ -4705,1091 +3606,6 @@
 </file>
 
 <file path=ppt/slides/slide4.xml><?xml version="1.0" encoding="utf-8"?>
-<p:sld xmlns:a="http://schemas.openxmlformats.org/drawingml/2006/main" xmlns:p="http://schemas.openxmlformats.org/presentationml/2006/main" xmlns:r="http://schemas.openxmlformats.org/officeDocument/2006/relationships">
-  <p:cSld>
-    <p:spTree>
-      <p:nvGrpSpPr>
-        <p:cNvPr id="1" name=""/>
-        <p:cNvGrpSpPr/>
-        <p:nvPr/>
-      </p:nvGrpSpPr>
-      <p:grpSpPr/>
-      <p:pic>
-        <p:nvPicPr>
-          <p:cNvPr id="2" name="Picture 1" descr="title_slide.jpg"/>
-          <p:cNvPicPr>
-            <a:picLocks noChangeAspect="1"/>
-          </p:cNvPicPr>
-          <p:nvPr/>
-        </p:nvPicPr>
-        <p:blipFill>
-          <a:blip r:embed="rId2"/>
-          <a:stretch>
-            <a:fillRect/>
-          </a:stretch>
-        </p:blipFill>
-        <p:spPr>
-          <a:xfrm>
-            <a:off x="0" y="0"/>
-            <a:ext cx="9144000" cy="6858000"/>
-          </a:xfrm>
-          <a:prstGeom prst="rect">
-            <a:avLst/>
-          </a:prstGeom>
-        </p:spPr>
-      </p:pic>
-      <p:sp>
-        <p:nvSpPr>
-          <p:cNvPr id="3" name="TextBox 2"/>
-          <p:cNvSpPr txBox="1"/>
-          <p:nvPr/>
-        </p:nvSpPr>
-        <p:spPr>
-          <a:xfrm>
-            <a:off x="457200" y="182880"/>
-            <a:ext cx="8229600" cy="960120"/>
-          </a:xfrm>
-          <a:prstGeom prst="rect">
-            <a:avLst/>
-          </a:prstGeom>
-          <a:noFill/>
-        </p:spPr>
-        <p:txBody>
-          <a:bodyPr wrap="none">
-            <a:normAutofit/>
-          </a:bodyPr>
-          <a:lstStyle/>
-          <a:p/>
-          <a:p>
-            <a:pPr algn="l"/>
-            <a:r>
-              <a:rPr sz="3600" b="0">
-                <a:solidFill>
-                  <a:srgbClr val="FFFFFF"/>
-                </a:solidFill>
-              </a:rPr>
-              <a:t/>
-            </a:r>
-          </a:p>
-        </p:txBody>
-      </p:sp>
-      <p:sp>
-        <p:nvSpPr>
-          <p:cNvPr id="4" name="TextBox 3"/>
-          <p:cNvSpPr txBox="1"/>
-          <p:nvPr/>
-        </p:nvSpPr>
-        <p:spPr>
-          <a:xfrm>
-            <a:off x="457200" y="1143000"/>
-            <a:ext cx="8229600" cy="5029200"/>
-          </a:xfrm>
-          <a:prstGeom prst="rect">
-            <a:avLst/>
-          </a:prstGeom>
-          <a:noFill/>
-        </p:spPr>
-        <p:txBody>
-          <a:bodyPr wrap="none">
-            <a:normAutofit/>
-          </a:bodyPr>
-          <a:lstStyle/>
-          <a:p/>
-          <a:p>
-            <a:pPr algn="l"/>
-            <a:r>
-              <a:rPr sz="3200" b="0">
-                <a:solidFill>
-                  <a:srgbClr val="FFFFFF"/>
-                </a:solidFill>
-              </a:rPr>
-              <a:t/>
-            </a:r>
-          </a:p>
-        </p:txBody>
-      </p:sp>
-      <p:sp>
-        <p:nvSpPr>
-          <p:cNvPr id="5" name="TextBox 4"/>
-          <p:cNvSpPr txBox="1"/>
-          <p:nvPr/>
-        </p:nvSpPr>
-        <p:spPr>
-          <a:xfrm>
-            <a:off x="457200" y="5943600"/>
-            <a:ext cx="914400" cy="685800"/>
-          </a:xfrm>
-          <a:prstGeom prst="rect">
-            <a:avLst/>
-          </a:prstGeom>
-          <a:noFill/>
-        </p:spPr>
-        <p:txBody>
-          <a:bodyPr wrap="none">
-            <a:normAutofit/>
-          </a:bodyPr>
-          <a:lstStyle/>
-          <a:p/>
-          <a:p>
-            <a:pPr algn="l"/>
-            <a:r>
-              <a:rPr sz="1600" b="0">
-                <a:solidFill>
-                  <a:srgbClr val="FFFFFF"/>
-                </a:solidFill>
-              </a:rPr>
-              <a:t/>
-            </a:r>
-          </a:p>
-        </p:txBody>
-      </p:sp>
-      <p:sp>
-        <p:nvSpPr>
-          <p:cNvPr id="6" name="TextBox 5"/>
-          <p:cNvSpPr txBox="1"/>
-          <p:nvPr/>
-        </p:nvSpPr>
-        <p:spPr>
-          <a:xfrm>
-            <a:off x="2286000" y="5943600"/>
-            <a:ext cx="3657600" cy="685800"/>
-          </a:xfrm>
-          <a:prstGeom prst="rect">
-            <a:avLst/>
-          </a:prstGeom>
-          <a:noFill/>
-        </p:spPr>
-        <p:txBody>
-          <a:bodyPr wrap="none">
-            <a:normAutofit/>
-          </a:bodyPr>
-          <a:lstStyle/>
-          <a:p/>
-          <a:p>
-            <a:pPr algn="ctr"/>
-            <a:r>
-              <a:rPr sz="1600" b="0">
-                <a:solidFill>
-                  <a:srgbClr val="FFFFFF"/>
-                </a:solidFill>
-              </a:rPr>
-              <a:t/>
-            </a:r>
-          </a:p>
-        </p:txBody>
-      </p:sp>
-      <p:sp>
-        <p:nvSpPr>
-          <p:cNvPr id="7" name="TextBox 6"/>
-          <p:cNvSpPr txBox="1"/>
-          <p:nvPr/>
-        </p:nvSpPr>
-        <p:spPr>
-          <a:xfrm>
-            <a:off x="7315200" y="5943600"/>
-            <a:ext cx="914400" cy="685800"/>
-          </a:xfrm>
-          <a:prstGeom prst="rect">
-            <a:avLst/>
-          </a:prstGeom>
-          <a:noFill/>
-        </p:spPr>
-        <p:txBody>
-          <a:bodyPr wrap="none">
-            <a:normAutofit/>
-          </a:bodyPr>
-          <a:lstStyle/>
-          <a:p/>
-          <a:p>
-            <a:pPr algn="r"/>
-            <a:r>
-              <a:rPr sz="1600" b="0">
-                <a:solidFill>
-                  <a:srgbClr val="FFFFFF"/>
-                </a:solidFill>
-              </a:rPr>
-              <a:t/>
-            </a:r>
-          </a:p>
-        </p:txBody>
-      </p:sp>
-    </p:spTree>
-  </p:cSld>
-  <p:clrMapOvr>
-    <a:masterClrMapping/>
-  </p:clrMapOvr>
-</p:sld>
-</file>
-
-<file path=ppt/slides/slide5.xml><?xml version="1.0" encoding="utf-8"?>
-<p:sld xmlns:a="http://schemas.openxmlformats.org/drawingml/2006/main" xmlns:p="http://schemas.openxmlformats.org/presentationml/2006/main" xmlns:r="http://schemas.openxmlformats.org/officeDocument/2006/relationships">
-  <p:cSld>
-    <p:spTree>
-      <p:nvGrpSpPr>
-        <p:cNvPr id="1" name=""/>
-        <p:cNvGrpSpPr/>
-        <p:nvPr/>
-      </p:nvGrpSpPr>
-      <p:grpSpPr/>
-      <p:pic>
-        <p:nvPicPr>
-          <p:cNvPr id="2" name="Picture 1" descr="title_slide.jpg"/>
-          <p:cNvPicPr>
-            <a:picLocks noChangeAspect="1"/>
-          </p:cNvPicPr>
-          <p:nvPr/>
-        </p:nvPicPr>
-        <p:blipFill>
-          <a:blip r:embed="rId2"/>
-          <a:stretch>
-            <a:fillRect/>
-          </a:stretch>
-        </p:blipFill>
-        <p:spPr>
-          <a:xfrm>
-            <a:off x="0" y="0"/>
-            <a:ext cx="9144000" cy="6858000"/>
-          </a:xfrm>
-          <a:prstGeom prst="rect">
-            <a:avLst/>
-          </a:prstGeom>
-        </p:spPr>
-      </p:pic>
-      <p:sp>
-        <p:nvSpPr>
-          <p:cNvPr id="3" name="TextBox 2"/>
-          <p:cNvSpPr txBox="1"/>
-          <p:nvPr/>
-        </p:nvSpPr>
-        <p:spPr>
-          <a:xfrm>
-            <a:off x="457200" y="182880"/>
-            <a:ext cx="8229600" cy="960120"/>
-          </a:xfrm>
-          <a:prstGeom prst="rect">
-            <a:avLst/>
-          </a:prstGeom>
-          <a:noFill/>
-        </p:spPr>
-        <p:txBody>
-          <a:bodyPr wrap="none">
-            <a:normAutofit/>
-          </a:bodyPr>
-          <a:lstStyle/>
-          <a:p/>
-          <a:p>
-            <a:pPr algn="l"/>
-            <a:r>
-              <a:rPr sz="3600" b="0">
-                <a:solidFill>
-                  <a:srgbClr val="FFFFFF"/>
-                </a:solidFill>
-              </a:rPr>
-              <a:t/>
-            </a:r>
-          </a:p>
-        </p:txBody>
-      </p:sp>
-      <p:sp>
-        <p:nvSpPr>
-          <p:cNvPr id="4" name="TextBox 3"/>
-          <p:cNvSpPr txBox="1"/>
-          <p:nvPr/>
-        </p:nvSpPr>
-        <p:spPr>
-          <a:xfrm>
-            <a:off x="457200" y="1143000"/>
-            <a:ext cx="8229600" cy="5029200"/>
-          </a:xfrm>
-          <a:prstGeom prst="rect">
-            <a:avLst/>
-          </a:prstGeom>
-          <a:noFill/>
-        </p:spPr>
-        <p:txBody>
-          <a:bodyPr wrap="none">
-            <a:normAutofit/>
-          </a:bodyPr>
-          <a:lstStyle/>
-          <a:p/>
-          <a:p>
-            <a:pPr algn="l"/>
-            <a:r>
-              <a:rPr sz="3200" b="0">
-                <a:solidFill>
-                  <a:srgbClr val="FFFFFF"/>
-                </a:solidFill>
-              </a:rPr>
-              <a:t/>
-            </a:r>
-          </a:p>
-        </p:txBody>
-      </p:sp>
-      <p:sp>
-        <p:nvSpPr>
-          <p:cNvPr id="5" name="TextBox 4"/>
-          <p:cNvSpPr txBox="1"/>
-          <p:nvPr/>
-        </p:nvSpPr>
-        <p:spPr>
-          <a:xfrm>
-            <a:off x="457200" y="5943600"/>
-            <a:ext cx="914400" cy="685800"/>
-          </a:xfrm>
-          <a:prstGeom prst="rect">
-            <a:avLst/>
-          </a:prstGeom>
-          <a:noFill/>
-        </p:spPr>
-        <p:txBody>
-          <a:bodyPr wrap="none">
-            <a:normAutofit/>
-          </a:bodyPr>
-          <a:lstStyle/>
-          <a:p/>
-          <a:p>
-            <a:pPr algn="l"/>
-            <a:r>
-              <a:rPr sz="1600" b="0">
-                <a:solidFill>
-                  <a:srgbClr val="FFFFFF"/>
-                </a:solidFill>
-              </a:rPr>
-              <a:t/>
-            </a:r>
-          </a:p>
-        </p:txBody>
-      </p:sp>
-      <p:sp>
-        <p:nvSpPr>
-          <p:cNvPr id="6" name="TextBox 5"/>
-          <p:cNvSpPr txBox="1"/>
-          <p:nvPr/>
-        </p:nvSpPr>
-        <p:spPr>
-          <a:xfrm>
-            <a:off x="2286000" y="5943600"/>
-            <a:ext cx="3657600" cy="685800"/>
-          </a:xfrm>
-          <a:prstGeom prst="rect">
-            <a:avLst/>
-          </a:prstGeom>
-          <a:noFill/>
-        </p:spPr>
-        <p:txBody>
-          <a:bodyPr wrap="none">
-            <a:normAutofit/>
-          </a:bodyPr>
-          <a:lstStyle/>
-          <a:p/>
-          <a:p>
-            <a:pPr algn="ctr"/>
-            <a:r>
-              <a:rPr sz="1600" b="0">
-                <a:solidFill>
-                  <a:srgbClr val="FFFFFF"/>
-                </a:solidFill>
-              </a:rPr>
-              <a:t/>
-            </a:r>
-          </a:p>
-        </p:txBody>
-      </p:sp>
-      <p:sp>
-        <p:nvSpPr>
-          <p:cNvPr id="7" name="TextBox 6"/>
-          <p:cNvSpPr txBox="1"/>
-          <p:nvPr/>
-        </p:nvSpPr>
-        <p:spPr>
-          <a:xfrm>
-            <a:off x="7315200" y="5943600"/>
-            <a:ext cx="914400" cy="685800"/>
-          </a:xfrm>
-          <a:prstGeom prst="rect">
-            <a:avLst/>
-          </a:prstGeom>
-          <a:noFill/>
-        </p:spPr>
-        <p:txBody>
-          <a:bodyPr wrap="none">
-            <a:normAutofit/>
-          </a:bodyPr>
-          <a:lstStyle/>
-          <a:p/>
-          <a:p>
-            <a:pPr algn="r"/>
-            <a:r>
-              <a:rPr sz="1600" b="0">
-                <a:solidFill>
-                  <a:srgbClr val="FFFFFF"/>
-                </a:solidFill>
-              </a:rPr>
-              <a:t/>
-            </a:r>
-          </a:p>
-        </p:txBody>
-      </p:sp>
-    </p:spTree>
-  </p:cSld>
-  <p:clrMapOvr>
-    <a:masterClrMapping/>
-  </p:clrMapOvr>
-</p:sld>
-</file>
-
-<file path=ppt/slides/slide6.xml><?xml version="1.0" encoding="utf-8"?>
-<p:sld xmlns:a="http://schemas.openxmlformats.org/drawingml/2006/main" xmlns:p="http://schemas.openxmlformats.org/presentationml/2006/main" xmlns:r="http://schemas.openxmlformats.org/officeDocument/2006/relationships">
-  <p:cSld>
-    <p:spTree>
-      <p:nvGrpSpPr>
-        <p:cNvPr id="1" name=""/>
-        <p:cNvGrpSpPr/>
-        <p:nvPr/>
-      </p:nvGrpSpPr>
-      <p:grpSpPr/>
-      <p:pic>
-        <p:nvPicPr>
-          <p:cNvPr id="2" name="Picture 1" descr="title_slide.jpg"/>
-          <p:cNvPicPr>
-            <a:picLocks noChangeAspect="1"/>
-          </p:cNvPicPr>
-          <p:nvPr/>
-        </p:nvPicPr>
-        <p:blipFill>
-          <a:blip r:embed="rId2"/>
-          <a:stretch>
-            <a:fillRect/>
-          </a:stretch>
-        </p:blipFill>
-        <p:spPr>
-          <a:xfrm>
-            <a:off x="0" y="0"/>
-            <a:ext cx="9144000" cy="6858000"/>
-          </a:xfrm>
-          <a:prstGeom prst="rect">
-            <a:avLst/>
-          </a:prstGeom>
-        </p:spPr>
-      </p:pic>
-      <p:sp>
-        <p:nvSpPr>
-          <p:cNvPr id="3" name="TextBox 2"/>
-          <p:cNvSpPr txBox="1"/>
-          <p:nvPr/>
-        </p:nvSpPr>
-        <p:spPr>
-          <a:xfrm>
-            <a:off x="457200" y="182880"/>
-            <a:ext cx="8229600" cy="960120"/>
-          </a:xfrm>
-          <a:prstGeom prst="rect">
-            <a:avLst/>
-          </a:prstGeom>
-          <a:noFill/>
-        </p:spPr>
-        <p:txBody>
-          <a:bodyPr wrap="none">
-            <a:normAutofit/>
-          </a:bodyPr>
-          <a:lstStyle/>
-          <a:p/>
-          <a:p>
-            <a:pPr algn="l"/>
-            <a:r>
-              <a:rPr sz="3600" b="0">
-                <a:solidFill>
-                  <a:srgbClr val="FFFFFF"/>
-                </a:solidFill>
-              </a:rPr>
-              <a:t/>
-            </a:r>
-          </a:p>
-        </p:txBody>
-      </p:sp>
-      <p:sp>
-        <p:nvSpPr>
-          <p:cNvPr id="4" name="TextBox 3"/>
-          <p:cNvSpPr txBox="1"/>
-          <p:nvPr/>
-        </p:nvSpPr>
-        <p:spPr>
-          <a:xfrm>
-            <a:off x="457200" y="1143000"/>
-            <a:ext cx="8229600" cy="5029200"/>
-          </a:xfrm>
-          <a:prstGeom prst="rect">
-            <a:avLst/>
-          </a:prstGeom>
-          <a:noFill/>
-        </p:spPr>
-        <p:txBody>
-          <a:bodyPr wrap="none">
-            <a:normAutofit/>
-          </a:bodyPr>
-          <a:lstStyle/>
-          <a:p/>
-          <a:p>
-            <a:pPr algn="l"/>
-            <a:r>
-              <a:rPr sz="3200" b="0">
-                <a:solidFill>
-                  <a:srgbClr val="FFFFFF"/>
-                </a:solidFill>
-              </a:rPr>
-              <a:t/>
-            </a:r>
-          </a:p>
-        </p:txBody>
-      </p:sp>
-      <p:sp>
-        <p:nvSpPr>
-          <p:cNvPr id="5" name="TextBox 4"/>
-          <p:cNvSpPr txBox="1"/>
-          <p:nvPr/>
-        </p:nvSpPr>
-        <p:spPr>
-          <a:xfrm>
-            <a:off x="457200" y="5943600"/>
-            <a:ext cx="914400" cy="685800"/>
-          </a:xfrm>
-          <a:prstGeom prst="rect">
-            <a:avLst/>
-          </a:prstGeom>
-          <a:noFill/>
-        </p:spPr>
-        <p:txBody>
-          <a:bodyPr wrap="none">
-            <a:normAutofit/>
-          </a:bodyPr>
-          <a:lstStyle/>
-          <a:p/>
-          <a:p>
-            <a:pPr algn="l"/>
-            <a:r>
-              <a:rPr sz="1600" b="0">
-                <a:solidFill>
-                  <a:srgbClr val="FFFFFF"/>
-                </a:solidFill>
-              </a:rPr>
-              <a:t/>
-            </a:r>
-          </a:p>
-        </p:txBody>
-      </p:sp>
-      <p:sp>
-        <p:nvSpPr>
-          <p:cNvPr id="6" name="TextBox 5"/>
-          <p:cNvSpPr txBox="1"/>
-          <p:nvPr/>
-        </p:nvSpPr>
-        <p:spPr>
-          <a:xfrm>
-            <a:off x="2286000" y="5943600"/>
-            <a:ext cx="3657600" cy="685800"/>
-          </a:xfrm>
-          <a:prstGeom prst="rect">
-            <a:avLst/>
-          </a:prstGeom>
-          <a:noFill/>
-        </p:spPr>
-        <p:txBody>
-          <a:bodyPr wrap="none">
-            <a:normAutofit/>
-          </a:bodyPr>
-          <a:lstStyle/>
-          <a:p/>
-          <a:p>
-            <a:pPr algn="ctr"/>
-            <a:r>
-              <a:rPr sz="1600" b="0">
-                <a:solidFill>
-                  <a:srgbClr val="FFFFFF"/>
-                </a:solidFill>
-              </a:rPr>
-              <a:t/>
-            </a:r>
-          </a:p>
-        </p:txBody>
-      </p:sp>
-      <p:sp>
-        <p:nvSpPr>
-          <p:cNvPr id="7" name="TextBox 6"/>
-          <p:cNvSpPr txBox="1"/>
-          <p:nvPr/>
-        </p:nvSpPr>
-        <p:spPr>
-          <a:xfrm>
-            <a:off x="7315200" y="5943600"/>
-            <a:ext cx="914400" cy="685800"/>
-          </a:xfrm>
-          <a:prstGeom prst="rect">
-            <a:avLst/>
-          </a:prstGeom>
-          <a:noFill/>
-        </p:spPr>
-        <p:txBody>
-          <a:bodyPr wrap="none">
-            <a:normAutofit/>
-          </a:bodyPr>
-          <a:lstStyle/>
-          <a:p/>
-          <a:p>
-            <a:pPr algn="r"/>
-            <a:r>
-              <a:rPr sz="1600" b="0">
-                <a:solidFill>
-                  <a:srgbClr val="FFFFFF"/>
-                </a:solidFill>
-              </a:rPr>
-              <a:t/>
-            </a:r>
-          </a:p>
-        </p:txBody>
-      </p:sp>
-    </p:spTree>
-  </p:cSld>
-  <p:clrMapOvr>
-    <a:masterClrMapping/>
-  </p:clrMapOvr>
-</p:sld>
-</file>
-
-<file path=ppt/slides/slide7.xml><?xml version="1.0" encoding="utf-8"?>
-<p:sld xmlns:a="http://schemas.openxmlformats.org/drawingml/2006/main" xmlns:p="http://schemas.openxmlformats.org/presentationml/2006/main" xmlns:r="http://schemas.openxmlformats.org/officeDocument/2006/relationships">
-  <p:cSld>
-    <p:spTree>
-      <p:nvGrpSpPr>
-        <p:cNvPr id="1" name=""/>
-        <p:cNvGrpSpPr/>
-        <p:nvPr/>
-      </p:nvGrpSpPr>
-      <p:grpSpPr/>
-      <p:pic>
-        <p:nvPicPr>
-          <p:cNvPr id="2" name="Picture 1" descr="title_slide.jpg"/>
-          <p:cNvPicPr>
-            <a:picLocks noChangeAspect="1"/>
-          </p:cNvPicPr>
-          <p:nvPr/>
-        </p:nvPicPr>
-        <p:blipFill>
-          <a:blip r:embed="rId2"/>
-          <a:stretch>
-            <a:fillRect/>
-          </a:stretch>
-        </p:blipFill>
-        <p:spPr>
-          <a:xfrm>
-            <a:off x="0" y="0"/>
-            <a:ext cx="9144000" cy="6858000"/>
-          </a:xfrm>
-          <a:prstGeom prst="rect">
-            <a:avLst/>
-          </a:prstGeom>
-        </p:spPr>
-      </p:pic>
-      <p:sp>
-        <p:nvSpPr>
-          <p:cNvPr id="3" name="TextBox 2"/>
-          <p:cNvSpPr txBox="1"/>
-          <p:nvPr/>
-        </p:nvSpPr>
-        <p:spPr>
-          <a:xfrm>
-            <a:off x="457200" y="182880"/>
-            <a:ext cx="8229600" cy="960120"/>
-          </a:xfrm>
-          <a:prstGeom prst="rect">
-            <a:avLst/>
-          </a:prstGeom>
-          <a:noFill/>
-        </p:spPr>
-        <p:txBody>
-          <a:bodyPr wrap="none">
-            <a:normAutofit/>
-          </a:bodyPr>
-          <a:lstStyle/>
-          <a:p/>
-          <a:p>
-            <a:pPr algn="l"/>
-            <a:r>
-              <a:rPr sz="3600" b="0">
-                <a:solidFill>
-                  <a:srgbClr val="FFFFFF"/>
-                </a:solidFill>
-              </a:rPr>
-              <a:t/>
-            </a:r>
-          </a:p>
-        </p:txBody>
-      </p:sp>
-      <p:sp>
-        <p:nvSpPr>
-          <p:cNvPr id="4" name="TextBox 3"/>
-          <p:cNvSpPr txBox="1"/>
-          <p:nvPr/>
-        </p:nvSpPr>
-        <p:spPr>
-          <a:xfrm>
-            <a:off x="457200" y="1143000"/>
-            <a:ext cx="8229600" cy="5029200"/>
-          </a:xfrm>
-          <a:prstGeom prst="rect">
-            <a:avLst/>
-          </a:prstGeom>
-          <a:noFill/>
-        </p:spPr>
-        <p:txBody>
-          <a:bodyPr wrap="none">
-            <a:normAutofit/>
-          </a:bodyPr>
-          <a:lstStyle/>
-          <a:p/>
-          <a:p>
-            <a:pPr algn="l"/>
-            <a:r>
-              <a:rPr sz="3200" b="0">
-                <a:solidFill>
-                  <a:srgbClr val="FFFFFF"/>
-                </a:solidFill>
-              </a:rPr>
-              <a:t/>
-            </a:r>
-          </a:p>
-        </p:txBody>
-      </p:sp>
-      <p:sp>
-        <p:nvSpPr>
-          <p:cNvPr id="5" name="TextBox 4"/>
-          <p:cNvSpPr txBox="1"/>
-          <p:nvPr/>
-        </p:nvSpPr>
-        <p:spPr>
-          <a:xfrm>
-            <a:off x="457200" y="5943600"/>
-            <a:ext cx="914400" cy="685800"/>
-          </a:xfrm>
-          <a:prstGeom prst="rect">
-            <a:avLst/>
-          </a:prstGeom>
-          <a:noFill/>
-        </p:spPr>
-        <p:txBody>
-          <a:bodyPr wrap="none">
-            <a:normAutofit/>
-          </a:bodyPr>
-          <a:lstStyle/>
-          <a:p/>
-          <a:p>
-            <a:pPr algn="l"/>
-            <a:r>
-              <a:rPr sz="1600" b="0">
-                <a:solidFill>
-                  <a:srgbClr val="FFFFFF"/>
-                </a:solidFill>
-              </a:rPr>
-              <a:t/>
-            </a:r>
-          </a:p>
-        </p:txBody>
-      </p:sp>
-      <p:sp>
-        <p:nvSpPr>
-          <p:cNvPr id="6" name="TextBox 5"/>
-          <p:cNvSpPr txBox="1"/>
-          <p:nvPr/>
-        </p:nvSpPr>
-        <p:spPr>
-          <a:xfrm>
-            <a:off x="2286000" y="5943600"/>
-            <a:ext cx="3657600" cy="685800"/>
-          </a:xfrm>
-          <a:prstGeom prst="rect">
-            <a:avLst/>
-          </a:prstGeom>
-          <a:noFill/>
-        </p:spPr>
-        <p:txBody>
-          <a:bodyPr wrap="none">
-            <a:normAutofit/>
-          </a:bodyPr>
-          <a:lstStyle/>
-          <a:p/>
-          <a:p>
-            <a:pPr algn="ctr"/>
-            <a:r>
-              <a:rPr sz="1600" b="0">
-                <a:solidFill>
-                  <a:srgbClr val="FFFFFF"/>
-                </a:solidFill>
-              </a:rPr>
-              <a:t/>
-            </a:r>
-          </a:p>
-        </p:txBody>
-      </p:sp>
-      <p:sp>
-        <p:nvSpPr>
-          <p:cNvPr id="7" name="TextBox 6"/>
-          <p:cNvSpPr txBox="1"/>
-          <p:nvPr/>
-        </p:nvSpPr>
-        <p:spPr>
-          <a:xfrm>
-            <a:off x="7315200" y="5943600"/>
-            <a:ext cx="914400" cy="685800"/>
-          </a:xfrm>
-          <a:prstGeom prst="rect">
-            <a:avLst/>
-          </a:prstGeom>
-          <a:noFill/>
-        </p:spPr>
-        <p:txBody>
-          <a:bodyPr wrap="none">
-            <a:normAutofit/>
-          </a:bodyPr>
-          <a:lstStyle/>
-          <a:p/>
-          <a:p>
-            <a:pPr algn="r"/>
-            <a:r>
-              <a:rPr sz="1600" b="0">
-                <a:solidFill>
-                  <a:srgbClr val="FFFFFF"/>
-                </a:solidFill>
-              </a:rPr>
-              <a:t/>
-            </a:r>
-          </a:p>
-        </p:txBody>
-      </p:sp>
-    </p:spTree>
-  </p:cSld>
-  <p:clrMapOvr>
-    <a:masterClrMapping/>
-  </p:clrMapOvr>
-</p:sld>
-</file>
-
-<file path=ppt/slides/slide8.xml><?xml version="1.0" encoding="utf-8"?>
-<p:sld xmlns:a="http://schemas.openxmlformats.org/drawingml/2006/main" xmlns:p="http://schemas.openxmlformats.org/presentationml/2006/main" xmlns:r="http://schemas.openxmlformats.org/officeDocument/2006/relationships">
-  <p:cSld>
-    <p:spTree>
-      <p:nvGrpSpPr>
-        <p:cNvPr id="1" name=""/>
-        <p:cNvGrpSpPr/>
-        <p:nvPr/>
-      </p:nvGrpSpPr>
-      <p:grpSpPr/>
-      <p:pic>
-        <p:nvPicPr>
-          <p:cNvPr id="2" name="Picture 1" descr="title_slide.jpg"/>
-          <p:cNvPicPr>
-            <a:picLocks noChangeAspect="1"/>
-          </p:cNvPicPr>
-          <p:nvPr/>
-        </p:nvPicPr>
-        <p:blipFill>
-          <a:blip r:embed="rId2"/>
-          <a:stretch>
-            <a:fillRect/>
-          </a:stretch>
-        </p:blipFill>
-        <p:spPr>
-          <a:xfrm>
-            <a:off x="0" y="0"/>
-            <a:ext cx="9144000" cy="6858000"/>
-          </a:xfrm>
-          <a:prstGeom prst="rect">
-            <a:avLst/>
-          </a:prstGeom>
-        </p:spPr>
-      </p:pic>
-      <p:sp>
-        <p:nvSpPr>
-          <p:cNvPr id="3" name="TextBox 2"/>
-          <p:cNvSpPr txBox="1"/>
-          <p:nvPr/>
-        </p:nvSpPr>
-        <p:spPr>
-          <a:xfrm>
-            <a:off x="457200" y="182880"/>
-            <a:ext cx="8229600" cy="960120"/>
-          </a:xfrm>
-          <a:prstGeom prst="rect">
-            <a:avLst/>
-          </a:prstGeom>
-          <a:noFill/>
-        </p:spPr>
-        <p:txBody>
-          <a:bodyPr wrap="none">
-            <a:normAutofit/>
-          </a:bodyPr>
-          <a:lstStyle/>
-          <a:p/>
-          <a:p>
-            <a:pPr algn="l"/>
-            <a:r>
-              <a:rPr sz="3600" b="0">
-                <a:solidFill>
-                  <a:srgbClr val="FFFFFF"/>
-                </a:solidFill>
-              </a:rPr>
-              <a:t/>
-            </a:r>
-          </a:p>
-        </p:txBody>
-      </p:sp>
-      <p:sp>
-        <p:nvSpPr>
-          <p:cNvPr id="4" name="TextBox 3"/>
-          <p:cNvSpPr txBox="1"/>
-          <p:nvPr/>
-        </p:nvSpPr>
-        <p:spPr>
-          <a:xfrm>
-            <a:off x="457200" y="1143000"/>
-            <a:ext cx="8229600" cy="5029200"/>
-          </a:xfrm>
-          <a:prstGeom prst="rect">
-            <a:avLst/>
-          </a:prstGeom>
-          <a:noFill/>
-        </p:spPr>
-        <p:txBody>
-          <a:bodyPr wrap="none">
-            <a:normAutofit/>
-          </a:bodyPr>
-          <a:lstStyle/>
-          <a:p/>
-          <a:p>
-            <a:pPr algn="l"/>
-            <a:r>
-              <a:rPr sz="3200" b="0">
-                <a:solidFill>
-                  <a:srgbClr val="FFFFFF"/>
-                </a:solidFill>
-              </a:rPr>
-              <a:t/>
-            </a:r>
-          </a:p>
-        </p:txBody>
-      </p:sp>
-      <p:sp>
-        <p:nvSpPr>
-          <p:cNvPr id="5" name="TextBox 4"/>
-          <p:cNvSpPr txBox="1"/>
-          <p:nvPr/>
-        </p:nvSpPr>
-        <p:spPr>
-          <a:xfrm>
-            <a:off x="457200" y="5943600"/>
-            <a:ext cx="914400" cy="685800"/>
-          </a:xfrm>
-          <a:prstGeom prst="rect">
-            <a:avLst/>
-          </a:prstGeom>
-          <a:noFill/>
-        </p:spPr>
-        <p:txBody>
-          <a:bodyPr wrap="none">
-            <a:normAutofit/>
-          </a:bodyPr>
-          <a:lstStyle/>
-          <a:p/>
-          <a:p>
-            <a:pPr algn="l"/>
-            <a:r>
-              <a:rPr sz="1600" b="0">
-                <a:solidFill>
-                  <a:srgbClr val="FFFFFF"/>
-                </a:solidFill>
-              </a:rPr>
-              <a:t/>
-            </a:r>
-          </a:p>
-        </p:txBody>
-      </p:sp>
-      <p:sp>
-        <p:nvSpPr>
-          <p:cNvPr id="6" name="TextBox 5"/>
-          <p:cNvSpPr txBox="1"/>
-          <p:nvPr/>
-        </p:nvSpPr>
-        <p:spPr>
-          <a:xfrm>
-            <a:off x="2286000" y="5943600"/>
-            <a:ext cx="3657600" cy="685800"/>
-          </a:xfrm>
-          <a:prstGeom prst="rect">
-            <a:avLst/>
-          </a:prstGeom>
-          <a:noFill/>
-        </p:spPr>
-        <p:txBody>
-          <a:bodyPr wrap="none">
-            <a:normAutofit/>
-          </a:bodyPr>
-          <a:lstStyle/>
-          <a:p/>
-          <a:p>
-            <a:pPr algn="ctr"/>
-            <a:r>
-              <a:rPr sz="1600" b="0">
-                <a:solidFill>
-                  <a:srgbClr val="FFFFFF"/>
-                </a:solidFill>
-              </a:rPr>
-              <a:t/>
-            </a:r>
-          </a:p>
-        </p:txBody>
-      </p:sp>
-      <p:sp>
-        <p:nvSpPr>
-          <p:cNvPr id="7" name="TextBox 6"/>
-          <p:cNvSpPr txBox="1"/>
-          <p:nvPr/>
-        </p:nvSpPr>
-        <p:spPr>
-          <a:xfrm>
-            <a:off x="7315200" y="5943600"/>
-            <a:ext cx="914400" cy="685800"/>
-          </a:xfrm>
-          <a:prstGeom prst="rect">
-            <a:avLst/>
-          </a:prstGeom>
-          <a:noFill/>
-        </p:spPr>
-        <p:txBody>
-          <a:bodyPr wrap="none">
-            <a:normAutofit/>
-          </a:bodyPr>
-          <a:lstStyle/>
-          <a:p/>
-          <a:p>
-            <a:pPr algn="r"/>
-            <a:r>
-              <a:rPr sz="1600" b="0">
-                <a:solidFill>
-                  <a:srgbClr val="FFFFFF"/>
-                </a:solidFill>
-              </a:rPr>
-              <a:t/>
-            </a:r>
-          </a:p>
-        </p:txBody>
-      </p:sp>
-    </p:spTree>
-  </p:cSld>
-  <p:clrMapOvr>
-    <a:masterClrMapping/>
-  </p:clrMapOvr>
-</p:sld>
-</file>
-
-<file path=ppt/slides/slide9.xml><?xml version="1.0" encoding="utf-8"?>
 <p:sld xmlns:a="http://schemas.openxmlformats.org/drawingml/2006/main" xmlns:p="http://schemas.openxmlformats.org/presentationml/2006/main" xmlns:r="http://schemas.openxmlformats.org/officeDocument/2006/relationships">
   <p:cSld>
     <p:spTree>

</xml_diff>

<commit_message>
Fixed line length to 45 instead of 49, no overflows now.
</commit_message>
<xml_diff>
--- a/generated_ppts/bhajans.pptx
+++ b/generated_ppts/bhajans.pptx
@@ -7,8 +7,6 @@
   <p:sldIdLst>
     <p:sldId r:id="rId7" id="256"/>
     <p:sldId r:id="rId8" id="257"/>
-    <p:sldId r:id="rId9" id="258"/>
-    <p:sldId r:id="rId10" id="259"/>
   </p:sldIdLst>
   <p:sldSz cx="9144000" cy="6858000" type="screen4x3"/>
   <p:notesSz cx="6858000" cy="9144000"/>
@@ -3155,7 +3153,7 @@
                   <a:srgbClr val="FFFF0F"/>
                 </a:solidFill>
               </a:rPr>
-              <a:t>October 15, 2016</a:t>
+              <a:t>October 22, 2016</a:t>
             </a:r>
           </a:p>
         </p:txBody>
@@ -3232,7 +3230,7 @@
                   <a:srgbClr val="FFFFFF"/>
                 </a:solidFill>
               </a:rPr>
-              <a:t>Aao Aao Aao Aao </a:t>
+              <a:t>Aao Aao Antaryami</a:t>
             </a:r>
           </a:p>
         </p:txBody>
@@ -3267,444 +3265,10 @@
                   <a:srgbClr val="FFFFFF"/>
                 </a:solidFill>
               </a:rPr>
-              <a:t>Aao Aao Aao Aao 
-Aao Sundara Nanda Gopal
-Navaneetha Chora Manasa Vihara</a:t>
-            </a:r>
-          </a:p>
-        </p:txBody>
-      </p:sp>
-      <p:sp>
-        <p:nvSpPr>
-          <p:cNvPr id="5" name="TextBox 4"/>
-          <p:cNvSpPr txBox="1"/>
-          <p:nvPr/>
-        </p:nvSpPr>
-        <p:spPr>
-          <a:xfrm>
-            <a:off x="457200" y="5943600"/>
-            <a:ext cx="914400" cy="685800"/>
-          </a:xfrm>
-          <a:prstGeom prst="rect">
-            <a:avLst/>
-          </a:prstGeom>
-          <a:noFill/>
-        </p:spPr>
-        <p:txBody>
-          <a:bodyPr wrap="none">
-            <a:normAutofit/>
-          </a:bodyPr>
-          <a:lstStyle/>
-          <a:p/>
-          <a:p>
-            <a:pPr algn="l"/>
-            <a:r>
-              <a:rPr sz="1600" b="0">
-                <a:solidFill>
-                  <a:srgbClr val="FFFFFF"/>
-                </a:solidFill>
-              </a:rPr>
-              <a:t/>
-            </a:r>
-          </a:p>
-        </p:txBody>
-      </p:sp>
-      <p:sp>
-        <p:nvSpPr>
-          <p:cNvPr id="6" name="TextBox 5"/>
-          <p:cNvSpPr txBox="1"/>
-          <p:nvPr/>
-        </p:nvSpPr>
-        <p:spPr>
-          <a:xfrm>
-            <a:off x="2286000" y="5943600"/>
-            <a:ext cx="3657600" cy="685800"/>
-          </a:xfrm>
-          <a:prstGeom prst="rect">
-            <a:avLst/>
-          </a:prstGeom>
-          <a:noFill/>
-        </p:spPr>
-        <p:txBody>
-          <a:bodyPr wrap="none">
-            <a:normAutofit/>
-          </a:bodyPr>
-          <a:lstStyle/>
-          <a:p/>
-          <a:p>
-            <a:pPr algn="ctr"/>
-            <a:r>
-              <a:rPr sz="1600" b="0">
-                <a:solidFill>
-                  <a:srgbClr val="FFFFFF"/>
-                </a:solidFill>
-              </a:rPr>
-              <a:t>Continued</a:t>
-            </a:r>
-          </a:p>
-        </p:txBody>
-      </p:sp>
-      <p:sp>
-        <p:nvSpPr>
-          <p:cNvPr id="7" name="TextBox 6"/>
-          <p:cNvSpPr txBox="1"/>
-          <p:nvPr/>
-        </p:nvSpPr>
-        <p:spPr>
-          <a:xfrm>
-            <a:off x="7315200" y="5943600"/>
-            <a:ext cx="914400" cy="685800"/>
-          </a:xfrm>
-          <a:prstGeom prst="rect">
-            <a:avLst/>
-          </a:prstGeom>
-          <a:noFill/>
-        </p:spPr>
-        <p:txBody>
-          <a:bodyPr wrap="none">
-            <a:normAutofit/>
-          </a:bodyPr>
-          <a:lstStyle/>
-          <a:p/>
-          <a:p>
-            <a:pPr algn="r"/>
-            <a:r>
-              <a:rPr sz="1600" b="0">
-                <a:solidFill>
-                  <a:srgbClr val="FFFFFF"/>
-                </a:solidFill>
-              </a:rPr>
-              <a:t/>
-            </a:r>
-          </a:p>
-        </p:txBody>
-      </p:sp>
-    </p:spTree>
-  </p:cSld>
-  <p:clrMapOvr>
-    <a:masterClrMapping/>
-  </p:clrMapOvr>
-</p:sld>
-</file>
-
-<file path=ppt/slides/slide3.xml><?xml version="1.0" encoding="utf-8"?>
-<p:sld xmlns:a="http://schemas.openxmlformats.org/drawingml/2006/main" xmlns:p="http://schemas.openxmlformats.org/presentationml/2006/main" xmlns:r="http://schemas.openxmlformats.org/officeDocument/2006/relationships">
-  <p:cSld>
-    <p:spTree>
-      <p:nvGrpSpPr>
-        <p:cNvPr id="1" name=""/>
-        <p:cNvGrpSpPr/>
-        <p:nvPr/>
-      </p:nvGrpSpPr>
-      <p:grpSpPr/>
-      <p:pic>
-        <p:nvPicPr>
-          <p:cNvPr id="2" name="Picture 1" descr="image2.gif"/>
-          <p:cNvPicPr>
-            <a:picLocks noChangeAspect="1"/>
-          </p:cNvPicPr>
-          <p:nvPr/>
-        </p:nvPicPr>
-        <p:blipFill>
-          <a:blip r:embed="rId2"/>
-          <a:stretch>
-            <a:fillRect/>
-          </a:stretch>
-        </p:blipFill>
-        <p:spPr>
-          <a:xfrm>
-            <a:off x="0" y="0"/>
-            <a:ext cx="9144000" cy="6858000"/>
-          </a:xfrm>
-          <a:prstGeom prst="rect">
-            <a:avLst/>
-          </a:prstGeom>
-        </p:spPr>
-      </p:pic>
-      <p:sp>
-        <p:nvSpPr>
-          <p:cNvPr id="3" name="TextBox 2"/>
-          <p:cNvSpPr txBox="1"/>
-          <p:nvPr/>
-        </p:nvSpPr>
-        <p:spPr>
-          <a:xfrm>
-            <a:off x="457200" y="182880"/>
-            <a:ext cx="8229600" cy="960120"/>
-          </a:xfrm>
-          <a:prstGeom prst="rect">
-            <a:avLst/>
-          </a:prstGeom>
-          <a:noFill/>
-        </p:spPr>
-        <p:txBody>
-          <a:bodyPr wrap="none">
-            <a:normAutofit/>
-          </a:bodyPr>
-          <a:lstStyle/>
-          <a:p/>
-          <a:p>
-            <a:pPr algn="l"/>
-            <a:r>
-              <a:rPr sz="3600" b="0">
-                <a:solidFill>
-                  <a:srgbClr val="FFFFFF"/>
-                </a:solidFill>
-              </a:rPr>
-              <a:t>Aao Aao Aao Aao </a:t>
-            </a:r>
-          </a:p>
-        </p:txBody>
-      </p:sp>
-      <p:sp>
-        <p:nvSpPr>
-          <p:cNvPr id="4" name="TextBox 3"/>
-          <p:cNvSpPr txBox="1"/>
-          <p:nvPr/>
-        </p:nvSpPr>
-        <p:spPr>
-          <a:xfrm>
-            <a:off x="457200" y="1143000"/>
-            <a:ext cx="8229600" cy="5029200"/>
-          </a:xfrm>
-          <a:prstGeom prst="rect">
-            <a:avLst/>
-          </a:prstGeom>
-          <a:noFill/>
-        </p:spPr>
-        <p:txBody>
-          <a:bodyPr wrap="none">
-            <a:normAutofit/>
-          </a:bodyPr>
-          <a:lstStyle/>
-          <a:p/>
-          <a:p>
-            <a:pPr algn="l"/>
-            <a:r>
-              <a:rPr sz="3200" b="0">
-                <a:solidFill>
-                  <a:srgbClr val="FFFFFF"/>
-                </a:solidFill>
-              </a:rPr>
-              <a:t>Darshana Do Nandalala (2)
-Mujhey Darshana Do Nandalala</a:t>
-            </a:r>
-          </a:p>
-        </p:txBody>
-      </p:sp>
-      <p:sp>
-        <p:nvSpPr>
-          <p:cNvPr id="5" name="TextBox 4"/>
-          <p:cNvSpPr txBox="1"/>
-          <p:nvPr/>
-        </p:nvSpPr>
-        <p:spPr>
-          <a:xfrm>
-            <a:off x="457200" y="5943600"/>
-            <a:ext cx="914400" cy="685800"/>
-          </a:xfrm>
-          <a:prstGeom prst="rect">
-            <a:avLst/>
-          </a:prstGeom>
-          <a:noFill/>
-        </p:spPr>
-        <p:txBody>
-          <a:bodyPr wrap="none">
-            <a:normAutofit/>
-          </a:bodyPr>
-          <a:lstStyle/>
-          <a:p/>
-          <a:p>
-            <a:pPr algn="l"/>
-            <a:r>
-              <a:rPr sz="1600" b="0">
-                <a:solidFill>
-                  <a:srgbClr val="FFFFFF"/>
-                </a:solidFill>
-              </a:rPr>
-              <a:t/>
-            </a:r>
-          </a:p>
-        </p:txBody>
-      </p:sp>
-      <p:sp>
-        <p:nvSpPr>
-          <p:cNvPr id="6" name="TextBox 5"/>
-          <p:cNvSpPr txBox="1"/>
-          <p:nvPr/>
-        </p:nvSpPr>
-        <p:spPr>
-          <a:xfrm>
-            <a:off x="2286000" y="5943600"/>
-            <a:ext cx="3657600" cy="685800"/>
-          </a:xfrm>
-          <a:prstGeom prst="rect">
-            <a:avLst/>
-          </a:prstGeom>
-          <a:noFill/>
-        </p:spPr>
-        <p:txBody>
-          <a:bodyPr wrap="none">
-            <a:normAutofit/>
-          </a:bodyPr>
-          <a:lstStyle/>
-          <a:p/>
-          <a:p>
-            <a:pPr algn="ctr"/>
-            <a:r>
-              <a:rPr sz="1600" b="0">
-                <a:solidFill>
-                  <a:srgbClr val="FFFFFF"/>
-                </a:solidFill>
-              </a:rPr>
-              <a:t/>
-            </a:r>
-          </a:p>
-        </p:txBody>
-      </p:sp>
-      <p:sp>
-        <p:nvSpPr>
-          <p:cNvPr id="7" name="TextBox 6"/>
-          <p:cNvSpPr txBox="1"/>
-          <p:nvPr/>
-        </p:nvSpPr>
-        <p:spPr>
-          <a:xfrm>
-            <a:off x="7315200" y="5943600"/>
-            <a:ext cx="914400" cy="685800"/>
-          </a:xfrm>
-          <a:prstGeom prst="rect">
-            <a:avLst/>
-          </a:prstGeom>
-          <a:noFill/>
-        </p:spPr>
-        <p:txBody>
-          <a:bodyPr wrap="none">
-            <a:normAutofit/>
-          </a:bodyPr>
-          <a:lstStyle/>
-          <a:p/>
-          <a:p>
-            <a:pPr algn="r"/>
-            <a:r>
-              <a:rPr sz="1600" b="0">
-                <a:solidFill>
-                  <a:srgbClr val="FFFFFF"/>
-                </a:solidFill>
-              </a:rPr>
-              <a:t/>
-            </a:r>
-          </a:p>
-        </p:txBody>
-      </p:sp>
-    </p:spTree>
-  </p:cSld>
-  <p:clrMapOvr>
-    <a:masterClrMapping/>
-  </p:clrMapOvr>
-</p:sld>
-</file>
-
-<file path=ppt/slides/slide4.xml><?xml version="1.0" encoding="utf-8"?>
-<p:sld xmlns:a="http://schemas.openxmlformats.org/drawingml/2006/main" xmlns:p="http://schemas.openxmlformats.org/presentationml/2006/main" xmlns:r="http://schemas.openxmlformats.org/officeDocument/2006/relationships">
-  <p:cSld>
-    <p:spTree>
-      <p:nvGrpSpPr>
-        <p:cNvPr id="1" name=""/>
-        <p:cNvGrpSpPr/>
-        <p:nvPr/>
-      </p:nvGrpSpPr>
-      <p:grpSpPr/>
-      <p:pic>
-        <p:nvPicPr>
-          <p:cNvPr id="2" name="Picture 1" descr="title_slide.jpg"/>
-          <p:cNvPicPr>
-            <a:picLocks noChangeAspect="1"/>
-          </p:cNvPicPr>
-          <p:nvPr/>
-        </p:nvPicPr>
-        <p:blipFill>
-          <a:blip r:embed="rId2"/>
-          <a:stretch>
-            <a:fillRect/>
-          </a:stretch>
-        </p:blipFill>
-        <p:spPr>
-          <a:xfrm>
-            <a:off x="0" y="0"/>
-            <a:ext cx="9144000" cy="6858000"/>
-          </a:xfrm>
-          <a:prstGeom prst="rect">
-            <a:avLst/>
-          </a:prstGeom>
-        </p:spPr>
-      </p:pic>
-      <p:sp>
-        <p:nvSpPr>
-          <p:cNvPr id="3" name="TextBox 2"/>
-          <p:cNvSpPr txBox="1"/>
-          <p:nvPr/>
-        </p:nvSpPr>
-        <p:spPr>
-          <a:xfrm>
-            <a:off x="457200" y="182880"/>
-            <a:ext cx="8229600" cy="960120"/>
-          </a:xfrm>
-          <a:prstGeom prst="rect">
-            <a:avLst/>
-          </a:prstGeom>
-          <a:noFill/>
-        </p:spPr>
-        <p:txBody>
-          <a:bodyPr wrap="none">
-            <a:normAutofit/>
-          </a:bodyPr>
-          <a:lstStyle/>
-          <a:p/>
-          <a:p>
-            <a:pPr algn="l"/>
-            <a:r>
-              <a:rPr sz="3600" b="0">
-                <a:solidFill>
-                  <a:srgbClr val="FFFFFF"/>
-                </a:solidFill>
-              </a:rPr>
-              <a:t/>
-            </a:r>
-          </a:p>
-        </p:txBody>
-      </p:sp>
-      <p:sp>
-        <p:nvSpPr>
-          <p:cNvPr id="4" name="TextBox 3"/>
-          <p:cNvSpPr txBox="1"/>
-          <p:nvPr/>
-        </p:nvSpPr>
-        <p:spPr>
-          <a:xfrm>
-            <a:off x="457200" y="1143000"/>
-            <a:ext cx="8229600" cy="5029200"/>
-          </a:xfrm>
-          <a:prstGeom prst="rect">
-            <a:avLst/>
-          </a:prstGeom>
-          <a:noFill/>
-        </p:spPr>
-        <p:txBody>
-          <a:bodyPr wrap="none">
-            <a:normAutofit/>
-          </a:bodyPr>
-          <a:lstStyle/>
-          <a:p/>
-          <a:p>
-            <a:pPr algn="l"/>
-            <a:r>
-              <a:rPr sz="3200" b="0">
-                <a:solidFill>
-                  <a:srgbClr val="FFFFFF"/>
-                </a:solidFill>
-              </a:rPr>
-              <a:t/>
+              <a:t>Aao Aao Antaryami Adi Narayana Sai Narayana  
+|Aao Aao...| Hrudaya Vihari Hey Giridhari
+Hey Giridhari Hey Giridhari
+Hari Hari Sri Hari Sai Murari</a:t>
             </a:r>
           </a:p>
         </p:txBody>

</xml_diff>

<commit_message>
Change experimental presentation manager templating to be more specific.
Fixes bug where text was being cut off it it included braces (escaping
issue)
</commit_message>
<xml_diff>
--- a/generated_ppts/bhajans.pptx
+++ b/generated_ppts/bhajans.pptx
@@ -8,6 +8,8 @@
     <p:sldId r:id="rId7" id="256"/>
     <p:sldId r:id="rId8" id="257"/>
     <p:sldId r:id="rId9" id="258"/>
+    <p:sldId r:id="rId10" id="259"/>
+    <p:sldId r:id="rId11" id="260"/>
   </p:sldIdLst>
   <p:sldSz cx="9144000" cy="6858000" type="screen4x3"/>
   <p:notesSz cx="6858000" cy="9144000"/>
@@ -3231,7 +3233,7 @@
                   <a:srgbClr val="FFFFFF"/>
                 </a:solidFill>
               </a:rPr>
-              <a:t>Adi Poojita Gajanana</a:t>
+              <a:t>Bolo Rey Hari Naam</a:t>
             </a:r>
           </a:p>
         </p:txBody>
@@ -3266,9 +3268,11 @@
                   <a:srgbClr val="FFFFFF"/>
                 </a:solidFill>
               </a:rPr>
-              <a:t>Adi Poojita Gajanana Mangala Kari Maha Ganadhipa   |Adi Poojita...| Ambika Tanaya Gajanana
-Amba Bhavani Shiva Shambho Kumara
-Jaya Jaya Jaya Hey Gajanana</a:t>
+              <a:t>Bolo Rey Hari Naam
+Bolo Rey Shiva Naam   |Bolo Rey...|
+Bhaktha Janon Ke Baba Naam
+Sai Naam Sai Baba Naam   |Bhaktha Janon|
+Parthi Pureeshwara Sai Ram</a:t>
             </a:r>
           </a:p>
         </p:txBody>
@@ -3338,7 +3342,7 @@
                   <a:srgbClr val="FFFFFF"/>
                 </a:solidFill>
               </a:rPr>
-              <a:t>Aao Pyaarey Nayana Hamarey Sai Hamarey Aao</a:t>
+              <a:t>Ganapathi Prarthana</a:t>
             </a:r>
           </a:p>
         </p:txBody>
@@ -3450,7 +3454,7 @@
                   <a:srgbClr val="FFFFFF"/>
                 </a:solidFill>
               </a:rPr>
-              <a:t>Aao Pyaarey Nayana Hamarey Sai Hamarey Aao</a:t>
+              <a:t>Ganapathi Prarthana</a:t>
             </a:r>
           </a:p>
         </p:txBody>
@@ -3485,9 +3489,449 @@
                   <a:srgbClr val="FFFFFF"/>
                 </a:solidFill>
               </a:rPr>
-              <a:t>Aao Pyaarey Nayana Hamarey Sai Hamarey Aao Tum Bin Koi Nahin Rakhwaley Tum Bin Kaun Saharey (Baba)
-Tum Bin Kaun Saharey Aao Sai Pyaarey
-Sai Hamarey Aao (3)</a:t>
+              <a:t>oṃ gaṇānā”m tvā gaṇapa’tigṃ havāmahe 
+kaviṃ ka’vīnām upamaśra’vastavam | 
+jyeṣṭharājaṃ brahma’ṇāṃ brahmaṇaspata 
+ā na’ḥ śṛṇvannūtibhi’ssīda sāda’nam ||</a:t>
+            </a:r>
+          </a:p>
+        </p:txBody>
+      </p:sp>
+      <p:sp>
+        <p:nvSpPr>
+          <p:cNvPr id="5" name="TextBox 4"/>
+          <p:cNvSpPr txBox="1"/>
+          <p:nvPr/>
+        </p:nvSpPr>
+        <p:spPr>
+          <a:xfrm>
+            <a:off x="457200" y="5943600"/>
+            <a:ext cx="914400" cy="685800"/>
+          </a:xfrm>
+          <a:prstGeom prst="rect">
+            <a:avLst/>
+          </a:prstGeom>
+          <a:noFill/>
+        </p:spPr>
+        <p:txBody>
+          <a:bodyPr wrap="square">
+            <a:normAutofit/>
+          </a:bodyPr>
+          <a:lstStyle/>
+          <a:p/>
+          <a:p>
+            <a:pPr algn="l"/>
+            <a:r>
+              <a:rPr sz="1600" b="0">
+                <a:solidFill>
+                  <a:srgbClr val="FFFFFF"/>
+                </a:solidFill>
+              </a:rPr>
+              <a:t/>
+            </a:r>
+          </a:p>
+        </p:txBody>
+      </p:sp>
+      <p:sp>
+        <p:nvSpPr>
+          <p:cNvPr id="6" name="TextBox 5"/>
+          <p:cNvSpPr txBox="1"/>
+          <p:nvPr/>
+        </p:nvSpPr>
+        <p:spPr>
+          <a:xfrm>
+            <a:off x="2286000" y="5943600"/>
+            <a:ext cx="3657600" cy="685800"/>
+          </a:xfrm>
+          <a:prstGeom prst="rect">
+            <a:avLst/>
+          </a:prstGeom>
+          <a:noFill/>
+        </p:spPr>
+        <p:txBody>
+          <a:bodyPr wrap="square">
+            <a:normAutofit/>
+          </a:bodyPr>
+          <a:lstStyle/>
+          <a:p/>
+          <a:p>
+            <a:pPr algn="ctr"/>
+            <a:r>
+              <a:rPr sz="1600" b="0">
+                <a:solidFill>
+                  <a:srgbClr val="FFFFFF"/>
+                </a:solidFill>
+              </a:rPr>
+              <a:t>Continued</a:t>
+            </a:r>
+          </a:p>
+        </p:txBody>
+      </p:sp>
+      <p:sp>
+        <p:nvSpPr>
+          <p:cNvPr id="7" name="TextBox 6"/>
+          <p:cNvSpPr txBox="1"/>
+          <p:nvPr/>
+        </p:nvSpPr>
+        <p:spPr>
+          <a:xfrm>
+            <a:off x="7315200" y="5943600"/>
+            <a:ext cx="914400" cy="685800"/>
+          </a:xfrm>
+          <a:prstGeom prst="rect">
+            <a:avLst/>
+          </a:prstGeom>
+          <a:noFill/>
+        </p:spPr>
+        <p:txBody>
+          <a:bodyPr wrap="square">
+            <a:normAutofit/>
+          </a:bodyPr>
+          <a:lstStyle/>
+          <a:p/>
+          <a:p>
+            <a:pPr algn="r"/>
+            <a:r>
+              <a:rPr sz="1600" b="0">
+                <a:solidFill>
+                  <a:srgbClr val="FFFFFF"/>
+                </a:solidFill>
+              </a:rPr>
+              <a:t/>
+            </a:r>
+          </a:p>
+        </p:txBody>
+      </p:sp>
+    </p:spTree>
+  </p:cSld>
+  <p:clrMapOvr>
+    <a:masterClrMapping/>
+  </p:clrMapOvr>
+</p:sld>
+</file>
+
+<file path=ppt/slides/slide4.xml><?xml version="1.0" encoding="utf-8"?>
+<p:sld xmlns:a="http://schemas.openxmlformats.org/drawingml/2006/main" xmlns:p="http://schemas.openxmlformats.org/presentationml/2006/main" xmlns:r="http://schemas.openxmlformats.org/officeDocument/2006/relationships">
+  <p:cSld>
+    <p:spTree>
+      <p:nvGrpSpPr>
+        <p:cNvPr id="1" name=""/>
+        <p:cNvGrpSpPr/>
+        <p:nvPr/>
+      </p:nvGrpSpPr>
+      <p:grpSpPr/>
+      <p:pic>
+        <p:nvPicPr>
+          <p:cNvPr id="2" name="Picture 1" descr="image1.gif"/>
+          <p:cNvPicPr>
+            <a:picLocks noChangeAspect="1"/>
+          </p:cNvPicPr>
+          <p:nvPr/>
+        </p:nvPicPr>
+        <p:blipFill>
+          <a:blip r:embed="rId2"/>
+          <a:stretch>
+            <a:fillRect/>
+          </a:stretch>
+        </p:blipFill>
+        <p:spPr>
+          <a:xfrm>
+            <a:off x="0" y="0"/>
+            <a:ext cx="9144000" cy="6858000"/>
+          </a:xfrm>
+          <a:prstGeom prst="rect">
+            <a:avLst/>
+          </a:prstGeom>
+        </p:spPr>
+      </p:pic>
+      <p:sp>
+        <p:nvSpPr>
+          <p:cNvPr id="3" name="TextBox 2"/>
+          <p:cNvSpPr txBox="1"/>
+          <p:nvPr/>
+        </p:nvSpPr>
+        <p:spPr>
+          <a:xfrm>
+            <a:off x="457200" y="182880"/>
+            <a:ext cx="8229600" cy="960120"/>
+          </a:xfrm>
+          <a:prstGeom prst="rect">
+            <a:avLst/>
+          </a:prstGeom>
+          <a:noFill/>
+        </p:spPr>
+        <p:txBody>
+          <a:bodyPr wrap="square">
+            <a:normAutofit/>
+          </a:bodyPr>
+          <a:lstStyle/>
+          <a:p/>
+          <a:p>
+            <a:pPr algn="l"/>
+            <a:r>
+              <a:rPr sz="3600" b="0">
+                <a:solidFill>
+                  <a:srgbClr val="FFFFFF"/>
+                </a:solidFill>
+              </a:rPr>
+              <a:t>Ganapathi Prarthana</a:t>
+            </a:r>
+          </a:p>
+        </p:txBody>
+      </p:sp>
+      <p:sp>
+        <p:nvSpPr>
+          <p:cNvPr id="4" name="TextBox 3"/>
+          <p:cNvSpPr txBox="1"/>
+          <p:nvPr/>
+        </p:nvSpPr>
+        <p:spPr>
+          <a:xfrm>
+            <a:off x="457200" y="1143000"/>
+            <a:ext cx="8229600" cy="5029200"/>
+          </a:xfrm>
+          <a:prstGeom prst="rect">
+            <a:avLst/>
+          </a:prstGeom>
+          <a:noFill/>
+        </p:spPr>
+        <p:txBody>
+          <a:bodyPr wrap="square">
+            <a:normAutofit/>
+          </a:bodyPr>
+          <a:lstStyle/>
+          <a:p/>
+          <a:p>
+            <a:pPr algn="l"/>
+            <a:r>
+              <a:rPr sz="3200" b="0">
+                <a:solidFill>
+                  <a:srgbClr val="FFFFFF"/>
+                </a:solidFill>
+              </a:rPr>
+              <a:t>praṇo’ devī sara’svatī | vāje’bhir vājinīvatī |
+dhīnāma’vitrya’vatu || 
+gaṇeśāya’ namaḥ | 
+sarasvatyai namaḥ | 
+śrī gurubhyo namaḥ |</a:t>
+            </a:r>
+          </a:p>
+        </p:txBody>
+      </p:sp>
+      <p:sp>
+        <p:nvSpPr>
+          <p:cNvPr id="5" name="TextBox 4"/>
+          <p:cNvSpPr txBox="1"/>
+          <p:nvPr/>
+        </p:nvSpPr>
+        <p:spPr>
+          <a:xfrm>
+            <a:off x="457200" y="5943600"/>
+            <a:ext cx="914400" cy="685800"/>
+          </a:xfrm>
+          <a:prstGeom prst="rect">
+            <a:avLst/>
+          </a:prstGeom>
+          <a:noFill/>
+        </p:spPr>
+        <p:txBody>
+          <a:bodyPr wrap="square">
+            <a:normAutofit/>
+          </a:bodyPr>
+          <a:lstStyle/>
+          <a:p/>
+          <a:p>
+            <a:pPr algn="l"/>
+            <a:r>
+              <a:rPr sz="1600" b="0">
+                <a:solidFill>
+                  <a:srgbClr val="FFFFFF"/>
+                </a:solidFill>
+              </a:rPr>
+              <a:t/>
+            </a:r>
+          </a:p>
+        </p:txBody>
+      </p:sp>
+      <p:sp>
+        <p:nvSpPr>
+          <p:cNvPr id="6" name="TextBox 5"/>
+          <p:cNvSpPr txBox="1"/>
+          <p:nvPr/>
+        </p:nvSpPr>
+        <p:spPr>
+          <a:xfrm>
+            <a:off x="2286000" y="5943600"/>
+            <a:ext cx="3657600" cy="685800"/>
+          </a:xfrm>
+          <a:prstGeom prst="rect">
+            <a:avLst/>
+          </a:prstGeom>
+          <a:noFill/>
+        </p:spPr>
+        <p:txBody>
+          <a:bodyPr wrap="square">
+            <a:normAutofit/>
+          </a:bodyPr>
+          <a:lstStyle/>
+          <a:p/>
+          <a:p>
+            <a:pPr algn="ctr"/>
+            <a:r>
+              <a:rPr sz="1600" b="0">
+                <a:solidFill>
+                  <a:srgbClr val="FFFFFF"/>
+                </a:solidFill>
+              </a:rPr>
+              <a:t>Continued</a:t>
+            </a:r>
+          </a:p>
+        </p:txBody>
+      </p:sp>
+      <p:sp>
+        <p:nvSpPr>
+          <p:cNvPr id="7" name="TextBox 6"/>
+          <p:cNvSpPr txBox="1"/>
+          <p:nvPr/>
+        </p:nvSpPr>
+        <p:spPr>
+          <a:xfrm>
+            <a:off x="7315200" y="5943600"/>
+            <a:ext cx="914400" cy="685800"/>
+          </a:xfrm>
+          <a:prstGeom prst="rect">
+            <a:avLst/>
+          </a:prstGeom>
+          <a:noFill/>
+        </p:spPr>
+        <p:txBody>
+          <a:bodyPr wrap="square">
+            <a:normAutofit/>
+          </a:bodyPr>
+          <a:lstStyle/>
+          <a:p/>
+          <a:p>
+            <a:pPr algn="r"/>
+            <a:r>
+              <a:rPr sz="1600" b="0">
+                <a:solidFill>
+                  <a:srgbClr val="FFFFFF"/>
+                </a:solidFill>
+              </a:rPr>
+              <a:t/>
+            </a:r>
+          </a:p>
+        </p:txBody>
+      </p:sp>
+    </p:spTree>
+  </p:cSld>
+  <p:clrMapOvr>
+    <a:masterClrMapping/>
+  </p:clrMapOvr>
+</p:sld>
+</file>
+
+<file path=ppt/slides/slide5.xml><?xml version="1.0" encoding="utf-8"?>
+<p:sld xmlns:a="http://schemas.openxmlformats.org/drawingml/2006/main" xmlns:p="http://schemas.openxmlformats.org/presentationml/2006/main" xmlns:r="http://schemas.openxmlformats.org/officeDocument/2006/relationships">
+  <p:cSld>
+    <p:spTree>
+      <p:nvGrpSpPr>
+        <p:cNvPr id="1" name=""/>
+        <p:cNvGrpSpPr/>
+        <p:nvPr/>
+      </p:nvGrpSpPr>
+      <p:grpSpPr/>
+      <p:pic>
+        <p:nvPicPr>
+          <p:cNvPr id="2" name="Picture 1" descr="image1.gif"/>
+          <p:cNvPicPr>
+            <a:picLocks noChangeAspect="1"/>
+          </p:cNvPicPr>
+          <p:nvPr/>
+        </p:nvPicPr>
+        <p:blipFill>
+          <a:blip r:embed="rId2"/>
+          <a:stretch>
+            <a:fillRect/>
+          </a:stretch>
+        </p:blipFill>
+        <p:spPr>
+          <a:xfrm>
+            <a:off x="0" y="0"/>
+            <a:ext cx="9144000" cy="6858000"/>
+          </a:xfrm>
+          <a:prstGeom prst="rect">
+            <a:avLst/>
+          </a:prstGeom>
+        </p:spPr>
+      </p:pic>
+      <p:sp>
+        <p:nvSpPr>
+          <p:cNvPr id="3" name="TextBox 2"/>
+          <p:cNvSpPr txBox="1"/>
+          <p:nvPr/>
+        </p:nvSpPr>
+        <p:spPr>
+          <a:xfrm>
+            <a:off x="457200" y="182880"/>
+            <a:ext cx="8229600" cy="960120"/>
+          </a:xfrm>
+          <a:prstGeom prst="rect">
+            <a:avLst/>
+          </a:prstGeom>
+          <a:noFill/>
+        </p:spPr>
+        <p:txBody>
+          <a:bodyPr wrap="square">
+            <a:normAutofit/>
+          </a:bodyPr>
+          <a:lstStyle/>
+          <a:p/>
+          <a:p>
+            <a:pPr algn="l"/>
+            <a:r>
+              <a:rPr sz="3600" b="0">
+                <a:solidFill>
+                  <a:srgbClr val="FFFFFF"/>
+                </a:solidFill>
+              </a:rPr>
+              <a:t>Ganapathi Prarthana</a:t>
+            </a:r>
+          </a:p>
+        </p:txBody>
+      </p:sp>
+      <p:sp>
+        <p:nvSpPr>
+          <p:cNvPr id="4" name="TextBox 3"/>
+          <p:cNvSpPr txBox="1"/>
+          <p:nvPr/>
+        </p:nvSpPr>
+        <p:spPr>
+          <a:xfrm>
+            <a:off x="457200" y="1143000"/>
+            <a:ext cx="8229600" cy="5029200"/>
+          </a:xfrm>
+          <a:prstGeom prst="rect">
+            <a:avLst/>
+          </a:prstGeom>
+          <a:noFill/>
+        </p:spPr>
+        <p:txBody>
+          <a:bodyPr wrap="square">
+            <a:normAutofit/>
+          </a:bodyPr>
+          <a:lstStyle/>
+          <a:p/>
+          <a:p>
+            <a:pPr algn="l"/>
+            <a:r>
+              <a:rPr sz="3200" b="0">
+                <a:solidFill>
+                  <a:srgbClr val="FFFFFF"/>
+                </a:solidFill>
+              </a:rPr>
+              <a:t>hariḥ oṃ ||
+oṃ śāntiḥ śāntiḥ śāntiḥ ||</a:t>
             </a:r>
           </a:p>
         </p:txBody>

</xml_diff>

<commit_message>
Fixed rudram anuvaka 1 bhajany
</commit_message>
<xml_diff>
--- a/generated_ppts/bhajans.pptx
+++ b/generated_ppts/bhajans.pptx
@@ -15,6 +15,7 @@
     <p:sldId r:id="rId14" id="263"/>
     <p:sldId r:id="rId15" id="264"/>
     <p:sldId r:id="rId16" id="265"/>
+    <p:sldId r:id="rId17" id="266"/>
   </p:sldIdLst>
   <p:sldSz cx="9144000" cy="6858000" type="screen4x3"/>
   <p:notesSz cx="6858000" cy="9144000"/>
@@ -3161,7 +3162,7 @@
                   <a:srgbClr val="FFFF0F"/>
                 </a:solidFill>
               </a:rPr>
-              <a:t>October 23, 2016</a:t>
+              <a:t>October 24, 2016</a:t>
             </a:r>
           </a:p>
         </p:txBody>
@@ -3186,7 +3187,7 @@
       <p:grpSpPr/>
       <p:pic>
         <p:nvPicPr>
-          <p:cNvPr id="2" name="Picture 1" descr="image1.gif"/>
+          <p:cNvPr id="2" name="Picture 1" descr="image2.gif"/>
           <p:cNvPicPr>
             <a:picLocks noChangeAspect="1"/>
           </p:cNvPicPr>
@@ -3273,7 +3274,232 @@
                   <a:srgbClr val="FFFFFF"/>
                 </a:solidFill>
               </a:rPr>
+              <a:t>Yadakșarapadabhrașțam mātrāheīnam tu yad bhavet| 
+tatsarvam kșamyatām̀ deva nārāyaņa namostute 
+Visargabindumātrāņi padapādākșarāņi ca| 
+nyūnāni cātiriktāni kșamasva sāiiśvara| 
+aparādha sahasrāņi kriyante’harniśam mayā|</a:t>
+            </a:r>
+          </a:p>
+        </p:txBody>
+      </p:sp>
+      <p:sp>
+        <p:nvSpPr>
+          <p:cNvPr id="5" name="TextBox 4"/>
+          <p:cNvSpPr txBox="1"/>
+          <p:nvPr/>
+        </p:nvSpPr>
+        <p:spPr>
+          <a:xfrm>
+            <a:off x="457200" y="5943600"/>
+            <a:ext cx="914400" cy="685800"/>
+          </a:xfrm>
+          <a:prstGeom prst="rect">
+            <a:avLst/>
+          </a:prstGeom>
+          <a:noFill/>
+        </p:spPr>
+        <p:txBody>
+          <a:bodyPr wrap="square">
+            <a:normAutofit/>
+          </a:bodyPr>
+          <a:lstStyle/>
+          <a:p/>
+          <a:p>
+            <a:pPr algn="l"/>
+            <a:r>
+              <a:rPr sz="1600" b="0">
+                <a:solidFill>
+                  <a:srgbClr val="FFFFFF"/>
+                </a:solidFill>
+              </a:rPr>
               <a:t/>
+            </a:r>
+          </a:p>
+        </p:txBody>
+      </p:sp>
+      <p:sp>
+        <p:nvSpPr>
+          <p:cNvPr id="6" name="TextBox 5"/>
+          <p:cNvSpPr txBox="1"/>
+          <p:nvPr/>
+        </p:nvSpPr>
+        <p:spPr>
+          <a:xfrm>
+            <a:off x="2286000" y="5943600"/>
+            <a:ext cx="3657600" cy="685800"/>
+          </a:xfrm>
+          <a:prstGeom prst="rect">
+            <a:avLst/>
+          </a:prstGeom>
+          <a:noFill/>
+        </p:spPr>
+        <p:txBody>
+          <a:bodyPr wrap="square">
+            <a:normAutofit/>
+          </a:bodyPr>
+          <a:lstStyle/>
+          <a:p/>
+          <a:p>
+            <a:pPr algn="ctr"/>
+            <a:r>
+              <a:rPr sz="1600" b="0">
+                <a:solidFill>
+                  <a:srgbClr val="FFFFFF"/>
+                </a:solidFill>
+              </a:rPr>
+              <a:t>Continued</a:t>
+            </a:r>
+          </a:p>
+        </p:txBody>
+      </p:sp>
+      <p:sp>
+        <p:nvSpPr>
+          <p:cNvPr id="7" name="TextBox 6"/>
+          <p:cNvSpPr txBox="1"/>
+          <p:nvPr/>
+        </p:nvSpPr>
+        <p:spPr>
+          <a:xfrm>
+            <a:off x="7315200" y="5943600"/>
+            <a:ext cx="914400" cy="685800"/>
+          </a:xfrm>
+          <a:prstGeom prst="rect">
+            <a:avLst/>
+          </a:prstGeom>
+          <a:noFill/>
+        </p:spPr>
+        <p:txBody>
+          <a:bodyPr wrap="square">
+            <a:normAutofit/>
+          </a:bodyPr>
+          <a:lstStyle/>
+          <a:p/>
+          <a:p>
+            <a:pPr algn="r"/>
+            <a:r>
+              <a:rPr sz="1600" b="0">
+                <a:solidFill>
+                  <a:srgbClr val="FFFFFF"/>
+                </a:solidFill>
+              </a:rPr>
+              <a:t/>
+            </a:r>
+          </a:p>
+        </p:txBody>
+      </p:sp>
+    </p:spTree>
+  </p:cSld>
+  <p:clrMapOvr>
+    <a:masterClrMapping/>
+  </p:clrMapOvr>
+</p:sld>
+</file>
+
+<file path=ppt/slides/slide11.xml><?xml version="1.0" encoding="utf-8"?>
+<p:sld xmlns:a="http://schemas.openxmlformats.org/drawingml/2006/main" xmlns:p="http://schemas.openxmlformats.org/presentationml/2006/main" xmlns:r="http://schemas.openxmlformats.org/officeDocument/2006/relationships">
+  <p:cSld>
+    <p:spTree>
+      <p:nvGrpSpPr>
+        <p:cNvPr id="1" name=""/>
+        <p:cNvGrpSpPr/>
+        <p:nvPr/>
+      </p:nvGrpSpPr>
+      <p:grpSpPr/>
+      <p:pic>
+        <p:nvPicPr>
+          <p:cNvPr id="2" name="Picture 1" descr="image2.gif"/>
+          <p:cNvPicPr>
+            <a:picLocks noChangeAspect="1"/>
+          </p:cNvPicPr>
+          <p:nvPr/>
+        </p:nvPicPr>
+        <p:blipFill>
+          <a:blip r:embed="rId2"/>
+          <a:stretch>
+            <a:fillRect/>
+          </a:stretch>
+        </p:blipFill>
+        <p:spPr>
+          <a:xfrm>
+            <a:off x="0" y="0"/>
+            <a:ext cx="9144000" cy="6858000"/>
+          </a:xfrm>
+          <a:prstGeom prst="rect">
+            <a:avLst/>
+          </a:prstGeom>
+        </p:spPr>
+      </p:pic>
+      <p:sp>
+        <p:nvSpPr>
+          <p:cNvPr id="3" name="TextBox 2"/>
+          <p:cNvSpPr txBox="1"/>
+          <p:nvPr/>
+        </p:nvSpPr>
+        <p:spPr>
+          <a:xfrm>
+            <a:off x="457200" y="182880"/>
+            <a:ext cx="8229600" cy="960120"/>
+          </a:xfrm>
+          <a:prstGeom prst="rect">
+            <a:avLst/>
+          </a:prstGeom>
+          <a:noFill/>
+        </p:spPr>
+        <p:txBody>
+          <a:bodyPr wrap="square">
+            <a:normAutofit/>
+          </a:bodyPr>
+          <a:lstStyle/>
+          <a:p/>
+          <a:p>
+            <a:pPr algn="l"/>
+            <a:r>
+              <a:rPr sz="3600" b="0">
+                <a:solidFill>
+                  <a:srgbClr val="FFFFFF"/>
+                </a:solidFill>
+              </a:rPr>
+              <a:t>Kshamaa Prarthana</a:t>
+            </a:r>
+          </a:p>
+        </p:txBody>
+      </p:sp>
+      <p:sp>
+        <p:nvSpPr>
+          <p:cNvPr id="4" name="TextBox 3"/>
+          <p:cNvSpPr txBox="1"/>
+          <p:nvPr/>
+        </p:nvSpPr>
+        <p:spPr>
+          <a:xfrm>
+            <a:off x="457200" y="1143000"/>
+            <a:ext cx="8229600" cy="5029200"/>
+          </a:xfrm>
+          <a:prstGeom prst="rect">
+            <a:avLst/>
+          </a:prstGeom>
+          <a:noFill/>
+        </p:spPr>
+        <p:txBody>
+          <a:bodyPr wrap="square">
+            <a:normAutofit/>
+          </a:bodyPr>
+          <a:lstStyle/>
+          <a:p/>
+          <a:p>
+            <a:pPr algn="l"/>
+            <a:r>
+              <a:rPr sz="3200" b="0">
+                <a:solidFill>
+                  <a:srgbClr val="FFFFFF"/>
+                </a:solidFill>
+              </a:rPr>
+              <a:t>dāso’yamiti mām matvā kșamasva sāyīśvara| 
+anyathā śaraņam nāsti tvameva śaraņam mama. 
+tasmāt kāruņya bhāvena rakșa rakșa sāyīśvara| 
+harih om tatst śrī sāīśvarārpaņamastu| 
+oṃ śāntiḥ śāntiḥ śāntiḥ ||</a:t>
             </a:r>
           </a:p>
         </p:txBody>
@@ -3403,7 +3629,7 @@
       <p:grpSpPr/>
       <p:pic>
         <p:nvPicPr>
-          <p:cNvPr id="2" name="Picture 1" descr="image2.gif"/>
+          <p:cNvPr id="2" name="Picture 1" descr="image1.gif"/>
           <p:cNvPicPr>
             <a:picLocks noChangeAspect="1"/>
           </p:cNvPicPr>
@@ -3494,7 +3720,8 @@
 kaviṃ ka’vīnām upamaśra’vastavam | 
 jyeṣṭharājaṃ brahma’ṇāṃ brahmaṇaspata 
 ā na’ḥ śṛṇvannūtibhi’ssīda sāda’nam || 
-�</a:t>
+praṇo’ devī sara’svatī | vāje’bhir vājinīvatī |
+dhīnāma’vitrya’vatu ||</a:t>
             </a:r>
           </a:p>
         </p:txBody>
@@ -3624,7 +3851,7 @@
       <p:grpSpPr/>
       <p:pic>
         <p:nvPicPr>
-          <p:cNvPr id="2" name="Picture 1" descr="image2.gif"/>
+          <p:cNvPr id="2" name="Picture 1" descr="image1.gif"/>
           <p:cNvPicPr>
             <a:picLocks noChangeAspect="1"/>
           </p:cNvPicPr>
@@ -3711,11 +3938,11 @@
                   <a:srgbClr val="FFFFFF"/>
                 </a:solidFill>
               </a:rPr>
-              <a:t>praṇo’ devī sara’svatī | vāje’bhir vājinīvatī |
-dhīnāma’vitrya’vatu || 
-gaṇeśāya’ namaḥ | 
+              <a:t>gaṇeśāya’ namaḥ | 
 sarasvatyai namaḥ | 
-śrī gurubhyo namaḥ |</a:t>
+śrī gurubhyo namaḥ |
+hariḥ oṃ ||
+oṃ śāntiḥ śāntiḥ śāntiḥ ||</a:t>
             </a:r>
           </a:p>
         </p:txBody>
@@ -3785,7 +4012,7 @@
                   <a:srgbClr val="FFFFFF"/>
                 </a:solidFill>
               </a:rPr>
-              <a:t>Continued</a:t>
+              <a:t>Rudram - 1st Anuvaka</a:t>
             </a:r>
           </a:p>
         </p:txBody>
@@ -3897,7 +4124,7 @@
                   <a:srgbClr val="FFFFFF"/>
                 </a:solidFill>
               </a:rPr>
-              <a:t>Ganapathi Prarthana</a:t>
+              <a:t>Rudram - 1st Anuvaka</a:t>
             </a:r>
           </a:p>
         </p:txBody>
@@ -3932,8 +4159,13 @@
                   <a:srgbClr val="FFFFFF"/>
                 </a:solidFill>
               </a:rPr>
-              <a:t>hariḥ oṃ ||
-oṃ śāntiḥ śāntiḥ śāntiḥ ||�</a:t>
+              <a:t>Om Namo Bhagavate̍ Rudrā̱ya 
+Om Nama̍ste Rudra Ma̱nyava̍ U̱tota̱ Iṣa̍ve̱ Namaḥ̍
+Namas̍te Astu̱ Dhanvan̍e Bā̱hubhyā̍mu̱ta Te̱ Namaḥ̍
+Yā Ta̱ Iṣu̍ḥ Śi̱vata̍mā Śi̱vaṁ Baḇhūva̍ Te̱ Dhanuḥ̍ 
+Śi̱vā Śa̍ra̱vyā̍ Yā Tava̱ Tayā̍ No Rudra Mṛḍaya 
+Yā Te̍ Rudra Śi̱vā Ta̱nūragho̱rā'pā̍pakāśinī
+Tayā̍ Nasta̱nuvā̱ Śanta̍mayā̱ Giri̍śaṁtā̱bhicā̍kaśīhi</a:t>
             </a:r>
           </a:p>
         </p:txBody>
@@ -4003,7 +4235,7 @@
                   <a:srgbClr val="FFFFFF"/>
                 </a:solidFill>
               </a:rPr>
-              <a:t>Rudram - 1st Anuvaka</a:t>
+              <a:t>Continued</a:t>
             </a:r>
           </a:p>
         </p:txBody>
@@ -4063,7 +4295,7 @@
       <p:grpSpPr/>
       <p:pic>
         <p:nvPicPr>
-          <p:cNvPr id="2" name="Picture 1" descr="image1.gif"/>
+          <p:cNvPr id="2" name="Picture 1" descr="image2.gif"/>
           <p:cNvPicPr>
             <a:picLocks noChangeAspect="1"/>
           </p:cNvPicPr>
@@ -4150,10 +4382,12 @@
                   <a:srgbClr val="FFFFFF"/>
                 </a:solidFill>
               </a:rPr>
-              <a:t>Om Namo Bhagavate̍ Rudrā̱ya 
-Om Nama̍ste Rudra Ma̱nyava̍ U̱tota̱ Iṣa̍ve̱ Namaḥ̍
-Namas̍te Astu̱ Dhanvan̍e Bā̱hubhyā̍mu̱ta Te̱ Namaḥ̍
-Yā Ta̱ Iṣu̍ḥ Śi̱vata̍mā Śi̱vaṁ Baḇhūva̍ Te̱ Dhanuḥ̍</a:t>
+              <a:t>Yāmiṣuṁ̍ Giriśaṁta̱ Haste̱ Bibhaṟṣyasta̍ve 
+Śi̱vāṁ Gi̍ritra̱ Tāṁ Kur̍u̱ Mā Higṁ̍sī̱ḥ Puru̍ṣaṁ̱ Jagat̍
+Śi̱vena̱ Vaca̍sā Tvā̱ Giri̱śācchā̍vadāmasi 
+Yathā̍ Na̱ḥ Sarvam̱ijjagad̍ayaḵṣmagṁ Sum̱anā̱ Asat̍
+Adhya̍vocadadhiva̱ktā Pra̍tham̱o Daivyo̍ Bhiṣ̱ak 
+Ahīg̍sca̱ Sarvā̎ñja̱mbhaya̱ntsarvā̎śca Yātudhā̱nya̍ḥ</a:t>
             </a:r>
           </a:p>
         </p:txBody>
@@ -4283,7 +4517,7 @@
       <p:grpSpPr/>
       <p:pic>
         <p:nvPicPr>
-          <p:cNvPr id="2" name="Picture 1" descr="image1.gif"/>
+          <p:cNvPr id="2" name="Picture 1" descr="image2.gif"/>
           <p:cNvPicPr>
             <a:picLocks noChangeAspect="1"/>
           </p:cNvPicPr>
@@ -4370,8 +4604,12 @@
                   <a:srgbClr val="FFFFFF"/>
                 </a:solidFill>
               </a:rPr>
-              <a:t>Śi̱vā Śa̍ra̱vyā̍ Yā Tava̱ Tayā̍ No Rudra Mṛḍaya 
-Yā Te̍ Rudra Śi̱vā Ta̱nūragho̱rā</a:t>
+              <a:t>A̱sau Yastam̱ro A̍ru̱ṇa U̱ta Ba̱bhruḥ Su̍ma̱ṅgalaḥ̍ 
+Ye Ce̱māgṁ Ru̱drā Aḇhito̍ Diḵṣu Śri̱tāḥ Sa̍hasra̱śo'vaiṣ̍ā̱gṁ̱ Heḍa̍ İ̄mahe 
+A̱sau Yo̍'vas̱ Arpa̍ti̱ Nīla̍grīvo̱ Viloh̍itaḥ
+Uṯainaṁ ̍ Gop̱ā Adṛśa̱nnadṛś̍annudahā̱rya̍h
+U̱tainaṁ̱ Viśvā̍ Bhū̱tāni̱ Sa Dṛ̱ṣṭo Mṛ̍ḍayāti Naḥ 
+Namo̍ Astu̱ Nīlag̍rīvāya Sahasrā̱kṣāya̍ Mī̱ḍhuṣe̎</a:t>
             </a:r>
           </a:p>
         </p:txBody>
@@ -4441,7 +4679,7 @@
                   <a:srgbClr val="FFFFFF"/>
                 </a:solidFill>
               </a:rPr>
-              <a:t>Kshamaa Prarthana </a:t>
+              <a:t>Continued</a:t>
             </a:r>
           </a:p>
         </p:txBody>
@@ -4501,7 +4739,7 @@
       <p:grpSpPr/>
       <p:pic>
         <p:nvPicPr>
-          <p:cNvPr id="2" name="Picture 1" descr="image1.gif"/>
+          <p:cNvPr id="2" name="Picture 1" descr="image2.gif"/>
           <p:cNvPicPr>
             <a:picLocks noChangeAspect="1"/>
           </p:cNvPicPr>
@@ -4553,7 +4791,7 @@
                   <a:srgbClr val="FFFFFF"/>
                 </a:solidFill>
               </a:rPr>
-              <a:t>Kshamaa Prarthana</a:t>
+              <a:t>Rudram - 1st Anuvaka</a:t>
             </a:r>
           </a:p>
         </p:txBody>
@@ -4588,10 +4826,13 @@
                   <a:srgbClr val="FFFFFF"/>
                 </a:solidFill>
               </a:rPr>
-              <a:t>Yadakșarapadabhrașțam mātrāheīnam tu yad bhavet| 
-tatsarvam kșamyatām̀ deva nārāyaņa namostute 
-Visargabindumātrāņi padapādākșarāņi ca| 
-nyūnāni cātiriktāni kșamasva sāiiśvara|</a:t>
+              <a:t>Atho̱ Ye A̍sya̱ Satvā̍no'̱ Haṁ Tebhyo̍'kara̱nnamaḥ̍ 
+Pramuñ̍ca̱ Dhanvan̍as̱tvamu̱bhayoṟārtni̍ Yo̱rjyām 
+Yāśca̍ Te̱ Hasta̱ İṣa̍vaḥ̱ Parā̱ Tā Bha̍gavo Vapa 
+A̱va̱tatya̱ Dhanu̱stvagṁ Sahas̍rākṣa̱ Śateṣ̍udhe 
+Ni̱śīrya̍ Śaḻyānāṁ̱ Mukhā̍ Śi̱vo Na̍ḥ Sum̱anā̍ Bhava 
+Vijyaṁ̱ Dhanuḥ̍ Kapa̱rdino̱ Viśa̍lyo̱ Bāṇa̍vāgṁ U̱ta 
+Ane̍śanna̱syeṣa̍va Āḇhura̍sya Niṣaṁ̱gathiḥ̍</a:t>
             </a:r>
           </a:p>
         </p:txBody>
@@ -4721,7 +4962,7 @@
       <p:grpSpPr/>
       <p:pic>
         <p:nvPicPr>
-          <p:cNvPr id="2" name="Picture 1" descr="image1.gif"/>
+          <p:cNvPr id="2" name="Picture 1" descr="image2.gif"/>
           <p:cNvPicPr>
             <a:picLocks noChangeAspect="1"/>
           </p:cNvPicPr>
@@ -4773,7 +5014,7 @@
                   <a:srgbClr val="FFFFFF"/>
                 </a:solidFill>
               </a:rPr>
-              <a:t>Kshamaa Prarthana</a:t>
+              <a:t>Rudram - 1st Anuvaka</a:t>
             </a:r>
           </a:p>
         </p:txBody>
@@ -4808,10 +5049,10 @@
                   <a:srgbClr val="FFFFFF"/>
                 </a:solidFill>
               </a:rPr>
-              <a:t>aparādha sahasrāņi kriyante’harniśam mayā|
-dāso’yamiti mām matvā kșamasva sāyīśvara| 
-anyathā śaraņam nāsti tvameva śaraņam mama. 
-tasmāt kāruņya bhāvena rakșa rakșa sāyīśvara|</a:t>
+              <a:t>Yā Te̍ He̱tirmī̍ḍhuṣṭama̱ Haste̍ Baḇhūva̍ Te̱ Dhanuḥ̍ 
+Tayā̱'smān Vi̱śvata̱stvama̍yaḵṣmayā̱ Pari̍bbhuja 
+Namas̍te As̱tvāyud̍hā̱yānā̍tatāya Dhṛ̱ṣṇave̎
+U̱bhābhyā̍muṯa Te̱ Namo̍ Bā̱hubhyām̱ ̱ Tava̱ Dhanva̍ne</a:t>
             </a:r>
           </a:p>
         </p:txBody>
@@ -4941,7 +5182,7 @@
       <p:grpSpPr/>
       <p:pic>
         <p:nvPicPr>
-          <p:cNvPr id="2" name="Picture 1" descr="image1.gif"/>
+          <p:cNvPr id="2" name="Picture 1" descr="image2.gif"/>
           <p:cNvPicPr>
             <a:picLocks noChangeAspect="1"/>
           </p:cNvPicPr>
@@ -4993,7 +5234,7 @@
                   <a:srgbClr val="FFFFFF"/>
                 </a:solidFill>
               </a:rPr>
-              <a:t>Kshamaa Prarthana</a:t>
+              <a:t>Rudram - 1st Anuvaka</a:t>
             </a:r>
           </a:p>
         </p:txBody>
@@ -5028,8 +5269,13 @@
                   <a:srgbClr val="FFFFFF"/>
                 </a:solidFill>
               </a:rPr>
-              <a:t>harih om tatst śrī sāīśvarārpaņamastu| 
-oṃ śāntiḥ śāntiḥ śāntiḥ ||</a:t>
+              <a:t>Pari̍ Te̱ Dhanvan̍o Heṯiras̱mānvṛṇ̍aktu Vi̱śvata̍ḥ
+Atho̱ Ya İṣ̍u̱dhistavā̱re A̱smannidheh̍i̱ Tam 
+Nama̍ste Astu Bhagavan Viśveśva̱rāya̍ 
+Mahāde̱vāya̍ Tryamba̱kāya̍ Tripurānta̱kāya̍ 
+Trikāgnikā̱lāya̍ Kālāgniru̱drāya̍ Nīlaka̱ṇṭhāya̍ 
+Mṛtyuñja̱yāya̍ Sarveśva̱rāya̍ Sadāśi̱vāya̍
+Śrīmanmahāde̱vāya̱ Nama̍ḥ</a:t>
             </a:r>
           </a:p>
         </p:txBody>
@@ -5099,7 +5345,7 @@
                   <a:srgbClr val="FFFFFF"/>
                 </a:solidFill>
               </a:rPr>
-              <a:t>Continued</a:t>
+              <a:t>Kshamaa Prarthana </a:t>
             </a:r>
           </a:p>
         </p:txBody>

</xml_diff>

<commit_message>
Can now customize title and subtitle of presentation.
</commit_message>
<xml_diff>
--- a/generated_ppts/bhajans.pptx
+++ b/generated_ppts/bhajans.pptx
@@ -6,16 +6,6 @@
   </p:sldMasterIdLst>
   <p:sldIdLst>
     <p:sldId r:id="rId7" id="256"/>
-    <p:sldId r:id="rId8" id="257"/>
-    <p:sldId r:id="rId9" id="258"/>
-    <p:sldId r:id="rId10" id="259"/>
-    <p:sldId r:id="rId11" id="260"/>
-    <p:sldId r:id="rId12" id="261"/>
-    <p:sldId r:id="rId13" id="262"/>
-    <p:sldId r:id="rId14" id="263"/>
-    <p:sldId r:id="rId15" id="264"/>
-    <p:sldId r:id="rId16" id="265"/>
-    <p:sldId r:id="rId17" id="266"/>
   </p:sldIdLst>
   <p:sldSz cx="9144000" cy="6858000" type="screen4x3"/>
   <p:notesSz cx="6858000" cy="9144000"/>
@@ -3130,8 +3120,8 @@
         </p:nvSpPr>
         <p:spPr>
           <a:xfrm>
-            <a:off x="2286000" y="2926080"/>
-            <a:ext cx="4572000" cy="914400"/>
+            <a:off x="2286000" y="2011680"/>
+            <a:ext cx="4572000" cy="3657600"/>
           </a:xfrm>
           <a:prstGeom prst="rect">
             <a:avLst/>
@@ -3152,8 +3142,10 @@
                   <a:srgbClr val="FFFFFF"/>
                 </a:solidFill>
               </a:rPr>
-              <a:t>Central London 
- Sai Center
+              <a:t>Central London Sai Centre</a:t>
+            </a:r>
+            <a:r>
+              <a:t>
 </a:t>
             </a:r>
             <a:r>
@@ -3162,2225 +3154,7 @@
                   <a:srgbClr val="FFFF0F"/>
                 </a:solidFill>
               </a:rPr>
-              <a:t>October 24, 2016</a:t>
-            </a:r>
-          </a:p>
-        </p:txBody>
-      </p:sp>
-    </p:spTree>
-  </p:cSld>
-  <p:clrMapOvr>
-    <a:masterClrMapping/>
-  </p:clrMapOvr>
-</p:sld>
-</file>
-
-<file path=ppt/slides/slide10.xml><?xml version="1.0" encoding="utf-8"?>
-<p:sld xmlns:a="http://schemas.openxmlformats.org/drawingml/2006/main" xmlns:p="http://schemas.openxmlformats.org/presentationml/2006/main" xmlns:r="http://schemas.openxmlformats.org/officeDocument/2006/relationships">
-  <p:cSld>
-    <p:spTree>
-      <p:nvGrpSpPr>
-        <p:cNvPr id="1" name=""/>
-        <p:cNvGrpSpPr/>
-        <p:nvPr/>
-      </p:nvGrpSpPr>
-      <p:grpSpPr/>
-      <p:pic>
-        <p:nvPicPr>
-          <p:cNvPr id="2" name="Picture 1" descr="image2.gif"/>
-          <p:cNvPicPr>
-            <a:picLocks noChangeAspect="1"/>
-          </p:cNvPicPr>
-          <p:nvPr/>
-        </p:nvPicPr>
-        <p:blipFill>
-          <a:blip r:embed="rId2"/>
-          <a:stretch>
-            <a:fillRect/>
-          </a:stretch>
-        </p:blipFill>
-        <p:spPr>
-          <a:xfrm>
-            <a:off x="0" y="0"/>
-            <a:ext cx="9144000" cy="6858000"/>
-          </a:xfrm>
-          <a:prstGeom prst="rect">
-            <a:avLst/>
-          </a:prstGeom>
-        </p:spPr>
-      </p:pic>
-      <p:sp>
-        <p:nvSpPr>
-          <p:cNvPr id="3" name="TextBox 2"/>
-          <p:cNvSpPr txBox="1"/>
-          <p:nvPr/>
-        </p:nvSpPr>
-        <p:spPr>
-          <a:xfrm>
-            <a:off x="457200" y="182880"/>
-            <a:ext cx="8229600" cy="960120"/>
-          </a:xfrm>
-          <a:prstGeom prst="rect">
-            <a:avLst/>
-          </a:prstGeom>
-          <a:noFill/>
-        </p:spPr>
-        <p:txBody>
-          <a:bodyPr wrap="square">
-            <a:normAutofit/>
-          </a:bodyPr>
-          <a:lstStyle/>
-          <a:p/>
-          <a:p>
-            <a:pPr algn="l"/>
-            <a:r>
-              <a:rPr sz="3600" b="0">
-                <a:solidFill>
-                  <a:srgbClr val="FFFFFF"/>
-                </a:solidFill>
-              </a:rPr>
-              <a:t>Kshamaa Prarthana</a:t>
-            </a:r>
-          </a:p>
-        </p:txBody>
-      </p:sp>
-      <p:sp>
-        <p:nvSpPr>
-          <p:cNvPr id="4" name="TextBox 3"/>
-          <p:cNvSpPr txBox="1"/>
-          <p:nvPr/>
-        </p:nvSpPr>
-        <p:spPr>
-          <a:xfrm>
-            <a:off x="457200" y="1143000"/>
-            <a:ext cx="8229600" cy="5029200"/>
-          </a:xfrm>
-          <a:prstGeom prst="rect">
-            <a:avLst/>
-          </a:prstGeom>
-          <a:noFill/>
-        </p:spPr>
-        <p:txBody>
-          <a:bodyPr wrap="square">
-            <a:normAutofit/>
-          </a:bodyPr>
-          <a:lstStyle/>
-          <a:p/>
-          <a:p>
-            <a:pPr algn="l"/>
-            <a:r>
-              <a:rPr sz="3200" b="0">
-                <a:solidFill>
-                  <a:srgbClr val="FFFFFF"/>
-                </a:solidFill>
-              </a:rPr>
-              <a:t>Yadakșarapadabhrașțam mātrāheīnam tu yad bhavet| 
-tatsarvam kșamyatām̀ deva nārāyaņa namostute 
-Visargabindumātrāņi padapādākșarāņi ca| 
-nyūnāni cātiriktāni kșamasva sāiiśvara| 
-aparādha sahasrāņi kriyante’harniśam mayā|</a:t>
-            </a:r>
-          </a:p>
-        </p:txBody>
-      </p:sp>
-      <p:sp>
-        <p:nvSpPr>
-          <p:cNvPr id="5" name="TextBox 4"/>
-          <p:cNvSpPr txBox="1"/>
-          <p:nvPr/>
-        </p:nvSpPr>
-        <p:spPr>
-          <a:xfrm>
-            <a:off x="457200" y="5943600"/>
-            <a:ext cx="914400" cy="685800"/>
-          </a:xfrm>
-          <a:prstGeom prst="rect">
-            <a:avLst/>
-          </a:prstGeom>
-          <a:noFill/>
-        </p:spPr>
-        <p:txBody>
-          <a:bodyPr wrap="square">
-            <a:normAutofit/>
-          </a:bodyPr>
-          <a:lstStyle/>
-          <a:p/>
-          <a:p>
-            <a:pPr algn="l"/>
-            <a:r>
-              <a:rPr sz="1600" b="0">
-                <a:solidFill>
-                  <a:srgbClr val="FFFFFF"/>
-                </a:solidFill>
-              </a:rPr>
-              <a:t/>
-            </a:r>
-          </a:p>
-        </p:txBody>
-      </p:sp>
-      <p:sp>
-        <p:nvSpPr>
-          <p:cNvPr id="6" name="TextBox 5"/>
-          <p:cNvSpPr txBox="1"/>
-          <p:nvPr/>
-        </p:nvSpPr>
-        <p:spPr>
-          <a:xfrm>
-            <a:off x="2286000" y="5943600"/>
-            <a:ext cx="3657600" cy="685800"/>
-          </a:xfrm>
-          <a:prstGeom prst="rect">
-            <a:avLst/>
-          </a:prstGeom>
-          <a:noFill/>
-        </p:spPr>
-        <p:txBody>
-          <a:bodyPr wrap="square">
-            <a:normAutofit/>
-          </a:bodyPr>
-          <a:lstStyle/>
-          <a:p/>
-          <a:p>
-            <a:pPr algn="ctr"/>
-            <a:r>
-              <a:rPr sz="1600" b="0">
-                <a:solidFill>
-                  <a:srgbClr val="FFFFFF"/>
-                </a:solidFill>
-              </a:rPr>
-              <a:t>Continued</a:t>
-            </a:r>
-          </a:p>
-        </p:txBody>
-      </p:sp>
-      <p:sp>
-        <p:nvSpPr>
-          <p:cNvPr id="7" name="TextBox 6"/>
-          <p:cNvSpPr txBox="1"/>
-          <p:nvPr/>
-        </p:nvSpPr>
-        <p:spPr>
-          <a:xfrm>
-            <a:off x="7315200" y="5943600"/>
-            <a:ext cx="914400" cy="685800"/>
-          </a:xfrm>
-          <a:prstGeom prst="rect">
-            <a:avLst/>
-          </a:prstGeom>
-          <a:noFill/>
-        </p:spPr>
-        <p:txBody>
-          <a:bodyPr wrap="square">
-            <a:normAutofit/>
-          </a:bodyPr>
-          <a:lstStyle/>
-          <a:p/>
-          <a:p>
-            <a:pPr algn="r"/>
-            <a:r>
-              <a:rPr sz="1600" b="0">
-                <a:solidFill>
-                  <a:srgbClr val="FFFFFF"/>
-                </a:solidFill>
-              </a:rPr>
-              <a:t/>
-            </a:r>
-          </a:p>
-        </p:txBody>
-      </p:sp>
-    </p:spTree>
-  </p:cSld>
-  <p:clrMapOvr>
-    <a:masterClrMapping/>
-  </p:clrMapOvr>
-</p:sld>
-</file>
-
-<file path=ppt/slides/slide11.xml><?xml version="1.0" encoding="utf-8"?>
-<p:sld xmlns:a="http://schemas.openxmlformats.org/drawingml/2006/main" xmlns:p="http://schemas.openxmlformats.org/presentationml/2006/main" xmlns:r="http://schemas.openxmlformats.org/officeDocument/2006/relationships">
-  <p:cSld>
-    <p:spTree>
-      <p:nvGrpSpPr>
-        <p:cNvPr id="1" name=""/>
-        <p:cNvGrpSpPr/>
-        <p:nvPr/>
-      </p:nvGrpSpPr>
-      <p:grpSpPr/>
-      <p:pic>
-        <p:nvPicPr>
-          <p:cNvPr id="2" name="Picture 1" descr="image2.gif"/>
-          <p:cNvPicPr>
-            <a:picLocks noChangeAspect="1"/>
-          </p:cNvPicPr>
-          <p:nvPr/>
-        </p:nvPicPr>
-        <p:blipFill>
-          <a:blip r:embed="rId2"/>
-          <a:stretch>
-            <a:fillRect/>
-          </a:stretch>
-        </p:blipFill>
-        <p:spPr>
-          <a:xfrm>
-            <a:off x="0" y="0"/>
-            <a:ext cx="9144000" cy="6858000"/>
-          </a:xfrm>
-          <a:prstGeom prst="rect">
-            <a:avLst/>
-          </a:prstGeom>
-        </p:spPr>
-      </p:pic>
-      <p:sp>
-        <p:nvSpPr>
-          <p:cNvPr id="3" name="TextBox 2"/>
-          <p:cNvSpPr txBox="1"/>
-          <p:nvPr/>
-        </p:nvSpPr>
-        <p:spPr>
-          <a:xfrm>
-            <a:off x="457200" y="182880"/>
-            <a:ext cx="8229600" cy="960120"/>
-          </a:xfrm>
-          <a:prstGeom prst="rect">
-            <a:avLst/>
-          </a:prstGeom>
-          <a:noFill/>
-        </p:spPr>
-        <p:txBody>
-          <a:bodyPr wrap="square">
-            <a:normAutofit/>
-          </a:bodyPr>
-          <a:lstStyle/>
-          <a:p/>
-          <a:p>
-            <a:pPr algn="l"/>
-            <a:r>
-              <a:rPr sz="3600" b="0">
-                <a:solidFill>
-                  <a:srgbClr val="FFFFFF"/>
-                </a:solidFill>
-              </a:rPr>
-              <a:t>Kshamaa Prarthana</a:t>
-            </a:r>
-          </a:p>
-        </p:txBody>
-      </p:sp>
-      <p:sp>
-        <p:nvSpPr>
-          <p:cNvPr id="4" name="TextBox 3"/>
-          <p:cNvSpPr txBox="1"/>
-          <p:nvPr/>
-        </p:nvSpPr>
-        <p:spPr>
-          <a:xfrm>
-            <a:off x="457200" y="1143000"/>
-            <a:ext cx="8229600" cy="5029200"/>
-          </a:xfrm>
-          <a:prstGeom prst="rect">
-            <a:avLst/>
-          </a:prstGeom>
-          <a:noFill/>
-        </p:spPr>
-        <p:txBody>
-          <a:bodyPr wrap="square">
-            <a:normAutofit/>
-          </a:bodyPr>
-          <a:lstStyle/>
-          <a:p/>
-          <a:p>
-            <a:pPr algn="l"/>
-            <a:r>
-              <a:rPr sz="3200" b="0">
-                <a:solidFill>
-                  <a:srgbClr val="FFFFFF"/>
-                </a:solidFill>
-              </a:rPr>
-              <a:t>dāso’yamiti mām matvā kșamasva sāyīśvara| 
-anyathā śaraņam nāsti tvameva śaraņam mama. 
-tasmāt kāruņya bhāvena rakșa rakșa sāyīśvara| 
-harih om tatst śrī sāīśvarārpaņamastu| 
-oṃ śāntiḥ śāntiḥ śāntiḥ ||</a:t>
-            </a:r>
-          </a:p>
-        </p:txBody>
-      </p:sp>
-      <p:sp>
-        <p:nvSpPr>
-          <p:cNvPr id="5" name="TextBox 4"/>
-          <p:cNvSpPr txBox="1"/>
-          <p:nvPr/>
-        </p:nvSpPr>
-        <p:spPr>
-          <a:xfrm>
-            <a:off x="457200" y="5943600"/>
-            <a:ext cx="914400" cy="685800"/>
-          </a:xfrm>
-          <a:prstGeom prst="rect">
-            <a:avLst/>
-          </a:prstGeom>
-          <a:noFill/>
-        </p:spPr>
-        <p:txBody>
-          <a:bodyPr wrap="square">
-            <a:normAutofit/>
-          </a:bodyPr>
-          <a:lstStyle/>
-          <a:p/>
-          <a:p>
-            <a:pPr algn="l"/>
-            <a:r>
-              <a:rPr sz="1600" b="0">
-                <a:solidFill>
-                  <a:srgbClr val="FFFFFF"/>
-                </a:solidFill>
-              </a:rPr>
-              <a:t/>
-            </a:r>
-          </a:p>
-        </p:txBody>
-      </p:sp>
-      <p:sp>
-        <p:nvSpPr>
-          <p:cNvPr id="6" name="TextBox 5"/>
-          <p:cNvSpPr txBox="1"/>
-          <p:nvPr/>
-        </p:nvSpPr>
-        <p:spPr>
-          <a:xfrm>
-            <a:off x="2286000" y="5943600"/>
-            <a:ext cx="3657600" cy="685800"/>
-          </a:xfrm>
-          <a:prstGeom prst="rect">
-            <a:avLst/>
-          </a:prstGeom>
-          <a:noFill/>
-        </p:spPr>
-        <p:txBody>
-          <a:bodyPr wrap="square">
-            <a:normAutofit/>
-          </a:bodyPr>
-          <a:lstStyle/>
-          <a:p/>
-          <a:p>
-            <a:pPr algn="ctr"/>
-            <a:r>
-              <a:rPr sz="1600" b="0">
-                <a:solidFill>
-                  <a:srgbClr val="FFFFFF"/>
-                </a:solidFill>
-              </a:rPr>
-              <a:t/>
-            </a:r>
-          </a:p>
-        </p:txBody>
-      </p:sp>
-      <p:sp>
-        <p:nvSpPr>
-          <p:cNvPr id="7" name="TextBox 6"/>
-          <p:cNvSpPr txBox="1"/>
-          <p:nvPr/>
-        </p:nvSpPr>
-        <p:spPr>
-          <a:xfrm>
-            <a:off x="7315200" y="5943600"/>
-            <a:ext cx="914400" cy="685800"/>
-          </a:xfrm>
-          <a:prstGeom prst="rect">
-            <a:avLst/>
-          </a:prstGeom>
-          <a:noFill/>
-        </p:spPr>
-        <p:txBody>
-          <a:bodyPr wrap="square">
-            <a:normAutofit/>
-          </a:bodyPr>
-          <a:lstStyle/>
-          <a:p/>
-          <a:p>
-            <a:pPr algn="r"/>
-            <a:r>
-              <a:rPr sz="1600" b="0">
-                <a:solidFill>
-                  <a:srgbClr val="FFFFFF"/>
-                </a:solidFill>
-              </a:rPr>
-              <a:t/>
-            </a:r>
-          </a:p>
-        </p:txBody>
-      </p:sp>
-    </p:spTree>
-  </p:cSld>
-  <p:clrMapOvr>
-    <a:masterClrMapping/>
-  </p:clrMapOvr>
-</p:sld>
-</file>
-
-<file path=ppt/slides/slide2.xml><?xml version="1.0" encoding="utf-8"?>
-<p:sld xmlns:a="http://schemas.openxmlformats.org/drawingml/2006/main" xmlns:p="http://schemas.openxmlformats.org/presentationml/2006/main" xmlns:r="http://schemas.openxmlformats.org/officeDocument/2006/relationships">
-  <p:cSld>
-    <p:spTree>
-      <p:nvGrpSpPr>
-        <p:cNvPr id="1" name=""/>
-        <p:cNvGrpSpPr/>
-        <p:nvPr/>
-      </p:nvGrpSpPr>
-      <p:grpSpPr/>
-      <p:pic>
-        <p:nvPicPr>
-          <p:cNvPr id="2" name="Picture 1" descr="image1.gif"/>
-          <p:cNvPicPr>
-            <a:picLocks noChangeAspect="1"/>
-          </p:cNvPicPr>
-          <p:nvPr/>
-        </p:nvPicPr>
-        <p:blipFill>
-          <a:blip r:embed="rId2"/>
-          <a:stretch>
-            <a:fillRect/>
-          </a:stretch>
-        </p:blipFill>
-        <p:spPr>
-          <a:xfrm>
-            <a:off x="0" y="0"/>
-            <a:ext cx="9144000" cy="6858000"/>
-          </a:xfrm>
-          <a:prstGeom prst="rect">
-            <a:avLst/>
-          </a:prstGeom>
-        </p:spPr>
-      </p:pic>
-      <p:sp>
-        <p:nvSpPr>
-          <p:cNvPr id="3" name="TextBox 2"/>
-          <p:cNvSpPr txBox="1"/>
-          <p:nvPr/>
-        </p:nvSpPr>
-        <p:spPr>
-          <a:xfrm>
-            <a:off x="457200" y="182880"/>
-            <a:ext cx="8229600" cy="960120"/>
-          </a:xfrm>
-          <a:prstGeom prst="rect">
-            <a:avLst/>
-          </a:prstGeom>
-          <a:noFill/>
-        </p:spPr>
-        <p:txBody>
-          <a:bodyPr wrap="square">
-            <a:normAutofit/>
-          </a:bodyPr>
-          <a:lstStyle/>
-          <a:p/>
-          <a:p>
-            <a:pPr algn="l"/>
-            <a:r>
-              <a:rPr sz="3600" b="0">
-                <a:solidFill>
-                  <a:srgbClr val="FFFFFF"/>
-                </a:solidFill>
-              </a:rPr>
-              <a:t>Ganapathi Prarthana</a:t>
-            </a:r>
-          </a:p>
-        </p:txBody>
-      </p:sp>
-      <p:sp>
-        <p:nvSpPr>
-          <p:cNvPr id="4" name="TextBox 3"/>
-          <p:cNvSpPr txBox="1"/>
-          <p:nvPr/>
-        </p:nvSpPr>
-        <p:spPr>
-          <a:xfrm>
-            <a:off x="457200" y="1143000"/>
-            <a:ext cx="8229600" cy="5029200"/>
-          </a:xfrm>
-          <a:prstGeom prst="rect">
-            <a:avLst/>
-          </a:prstGeom>
-          <a:noFill/>
-        </p:spPr>
-        <p:txBody>
-          <a:bodyPr wrap="square">
-            <a:normAutofit/>
-          </a:bodyPr>
-          <a:lstStyle/>
-          <a:p/>
-          <a:p>
-            <a:pPr algn="l"/>
-            <a:r>
-              <a:rPr sz="3200" b="0">
-                <a:solidFill>
-                  <a:srgbClr val="FFFFFF"/>
-                </a:solidFill>
-              </a:rPr>
-              <a:t>oṃ gaṇānā”m tvā gaṇapa’tigṃ havāmahe 
-kaviṃ ka’vīnām upamaśra’vastavam | 
-jyeṣṭharājaṃ brahma’ṇāṃ brahmaṇaspata 
-ā na’ḥ śṛṇvannūtibhi’ssīda sāda’nam || 
-praṇo’ devī sara’svatī | vāje’bhir vājinīvatī |
-dhīnāma’vitrya’vatu ||</a:t>
-            </a:r>
-          </a:p>
-        </p:txBody>
-      </p:sp>
-      <p:sp>
-        <p:nvSpPr>
-          <p:cNvPr id="5" name="TextBox 4"/>
-          <p:cNvSpPr txBox="1"/>
-          <p:nvPr/>
-        </p:nvSpPr>
-        <p:spPr>
-          <a:xfrm>
-            <a:off x="457200" y="5943600"/>
-            <a:ext cx="914400" cy="685800"/>
-          </a:xfrm>
-          <a:prstGeom prst="rect">
-            <a:avLst/>
-          </a:prstGeom>
-          <a:noFill/>
-        </p:spPr>
-        <p:txBody>
-          <a:bodyPr wrap="square">
-            <a:normAutofit/>
-          </a:bodyPr>
-          <a:lstStyle/>
-          <a:p/>
-          <a:p>
-            <a:pPr algn="l"/>
-            <a:r>
-              <a:rPr sz="1600" b="0">
-                <a:solidFill>
-                  <a:srgbClr val="FFFFFF"/>
-                </a:solidFill>
-              </a:rPr>
-              <a:t/>
-            </a:r>
-          </a:p>
-        </p:txBody>
-      </p:sp>
-      <p:sp>
-        <p:nvSpPr>
-          <p:cNvPr id="6" name="TextBox 5"/>
-          <p:cNvSpPr txBox="1"/>
-          <p:nvPr/>
-        </p:nvSpPr>
-        <p:spPr>
-          <a:xfrm>
-            <a:off x="2286000" y="5943600"/>
-            <a:ext cx="3657600" cy="685800"/>
-          </a:xfrm>
-          <a:prstGeom prst="rect">
-            <a:avLst/>
-          </a:prstGeom>
-          <a:noFill/>
-        </p:spPr>
-        <p:txBody>
-          <a:bodyPr wrap="square">
-            <a:normAutofit/>
-          </a:bodyPr>
-          <a:lstStyle/>
-          <a:p/>
-          <a:p>
-            <a:pPr algn="ctr"/>
-            <a:r>
-              <a:rPr sz="1600" b="0">
-                <a:solidFill>
-                  <a:srgbClr val="FFFFFF"/>
-                </a:solidFill>
-              </a:rPr>
-              <a:t>Continued</a:t>
-            </a:r>
-          </a:p>
-        </p:txBody>
-      </p:sp>
-      <p:sp>
-        <p:nvSpPr>
-          <p:cNvPr id="7" name="TextBox 6"/>
-          <p:cNvSpPr txBox="1"/>
-          <p:nvPr/>
-        </p:nvSpPr>
-        <p:spPr>
-          <a:xfrm>
-            <a:off x="7315200" y="5943600"/>
-            <a:ext cx="914400" cy="685800"/>
-          </a:xfrm>
-          <a:prstGeom prst="rect">
-            <a:avLst/>
-          </a:prstGeom>
-          <a:noFill/>
-        </p:spPr>
-        <p:txBody>
-          <a:bodyPr wrap="square">
-            <a:normAutofit/>
-          </a:bodyPr>
-          <a:lstStyle/>
-          <a:p/>
-          <a:p>
-            <a:pPr algn="r"/>
-            <a:r>
-              <a:rPr sz="1600" b="0">
-                <a:solidFill>
-                  <a:srgbClr val="FFFFFF"/>
-                </a:solidFill>
-              </a:rPr>
-              <a:t/>
-            </a:r>
-          </a:p>
-        </p:txBody>
-      </p:sp>
-    </p:spTree>
-  </p:cSld>
-  <p:clrMapOvr>
-    <a:masterClrMapping/>
-  </p:clrMapOvr>
-</p:sld>
-</file>
-
-<file path=ppt/slides/slide3.xml><?xml version="1.0" encoding="utf-8"?>
-<p:sld xmlns:a="http://schemas.openxmlformats.org/drawingml/2006/main" xmlns:p="http://schemas.openxmlformats.org/presentationml/2006/main" xmlns:r="http://schemas.openxmlformats.org/officeDocument/2006/relationships">
-  <p:cSld>
-    <p:spTree>
-      <p:nvGrpSpPr>
-        <p:cNvPr id="1" name=""/>
-        <p:cNvGrpSpPr/>
-        <p:nvPr/>
-      </p:nvGrpSpPr>
-      <p:grpSpPr/>
-      <p:pic>
-        <p:nvPicPr>
-          <p:cNvPr id="2" name="Picture 1" descr="image1.gif"/>
-          <p:cNvPicPr>
-            <a:picLocks noChangeAspect="1"/>
-          </p:cNvPicPr>
-          <p:nvPr/>
-        </p:nvPicPr>
-        <p:blipFill>
-          <a:blip r:embed="rId2"/>
-          <a:stretch>
-            <a:fillRect/>
-          </a:stretch>
-        </p:blipFill>
-        <p:spPr>
-          <a:xfrm>
-            <a:off x="0" y="0"/>
-            <a:ext cx="9144000" cy="6858000"/>
-          </a:xfrm>
-          <a:prstGeom prst="rect">
-            <a:avLst/>
-          </a:prstGeom>
-        </p:spPr>
-      </p:pic>
-      <p:sp>
-        <p:nvSpPr>
-          <p:cNvPr id="3" name="TextBox 2"/>
-          <p:cNvSpPr txBox="1"/>
-          <p:nvPr/>
-        </p:nvSpPr>
-        <p:spPr>
-          <a:xfrm>
-            <a:off x="457200" y="182880"/>
-            <a:ext cx="8229600" cy="960120"/>
-          </a:xfrm>
-          <a:prstGeom prst="rect">
-            <a:avLst/>
-          </a:prstGeom>
-          <a:noFill/>
-        </p:spPr>
-        <p:txBody>
-          <a:bodyPr wrap="square">
-            <a:normAutofit/>
-          </a:bodyPr>
-          <a:lstStyle/>
-          <a:p/>
-          <a:p>
-            <a:pPr algn="l"/>
-            <a:r>
-              <a:rPr sz="3600" b="0">
-                <a:solidFill>
-                  <a:srgbClr val="FFFFFF"/>
-                </a:solidFill>
-              </a:rPr>
-              <a:t>Ganapathi Prarthana</a:t>
-            </a:r>
-          </a:p>
-        </p:txBody>
-      </p:sp>
-      <p:sp>
-        <p:nvSpPr>
-          <p:cNvPr id="4" name="TextBox 3"/>
-          <p:cNvSpPr txBox="1"/>
-          <p:nvPr/>
-        </p:nvSpPr>
-        <p:spPr>
-          <a:xfrm>
-            <a:off x="457200" y="1143000"/>
-            <a:ext cx="8229600" cy="5029200"/>
-          </a:xfrm>
-          <a:prstGeom prst="rect">
-            <a:avLst/>
-          </a:prstGeom>
-          <a:noFill/>
-        </p:spPr>
-        <p:txBody>
-          <a:bodyPr wrap="square">
-            <a:normAutofit/>
-          </a:bodyPr>
-          <a:lstStyle/>
-          <a:p/>
-          <a:p>
-            <a:pPr algn="l"/>
-            <a:r>
-              <a:rPr sz="3200" b="0">
-                <a:solidFill>
-                  <a:srgbClr val="FFFFFF"/>
-                </a:solidFill>
-              </a:rPr>
-              <a:t>gaṇeśāya’ namaḥ | 
-sarasvatyai namaḥ | 
-śrī gurubhyo namaḥ |
-hariḥ oṃ ||
-oṃ śāntiḥ śāntiḥ śāntiḥ ||</a:t>
-            </a:r>
-          </a:p>
-        </p:txBody>
-      </p:sp>
-      <p:sp>
-        <p:nvSpPr>
-          <p:cNvPr id="5" name="TextBox 4"/>
-          <p:cNvSpPr txBox="1"/>
-          <p:nvPr/>
-        </p:nvSpPr>
-        <p:spPr>
-          <a:xfrm>
-            <a:off x="457200" y="5943600"/>
-            <a:ext cx="914400" cy="685800"/>
-          </a:xfrm>
-          <a:prstGeom prst="rect">
-            <a:avLst/>
-          </a:prstGeom>
-          <a:noFill/>
-        </p:spPr>
-        <p:txBody>
-          <a:bodyPr wrap="square">
-            <a:normAutofit/>
-          </a:bodyPr>
-          <a:lstStyle/>
-          <a:p/>
-          <a:p>
-            <a:pPr algn="l"/>
-            <a:r>
-              <a:rPr sz="1600" b="0">
-                <a:solidFill>
-                  <a:srgbClr val="FFFFFF"/>
-                </a:solidFill>
-              </a:rPr>
-              <a:t/>
-            </a:r>
-          </a:p>
-        </p:txBody>
-      </p:sp>
-      <p:sp>
-        <p:nvSpPr>
-          <p:cNvPr id="6" name="TextBox 5"/>
-          <p:cNvSpPr txBox="1"/>
-          <p:nvPr/>
-        </p:nvSpPr>
-        <p:spPr>
-          <a:xfrm>
-            <a:off x="2286000" y="5943600"/>
-            <a:ext cx="3657600" cy="685800"/>
-          </a:xfrm>
-          <a:prstGeom prst="rect">
-            <a:avLst/>
-          </a:prstGeom>
-          <a:noFill/>
-        </p:spPr>
-        <p:txBody>
-          <a:bodyPr wrap="square">
-            <a:normAutofit/>
-          </a:bodyPr>
-          <a:lstStyle/>
-          <a:p/>
-          <a:p>
-            <a:pPr algn="ctr"/>
-            <a:r>
-              <a:rPr sz="1600" b="0">
-                <a:solidFill>
-                  <a:srgbClr val="FFFFFF"/>
-                </a:solidFill>
-              </a:rPr>
-              <a:t>Rudram - 1st Anuvaka</a:t>
-            </a:r>
-          </a:p>
-        </p:txBody>
-      </p:sp>
-      <p:sp>
-        <p:nvSpPr>
-          <p:cNvPr id="7" name="TextBox 6"/>
-          <p:cNvSpPr txBox="1"/>
-          <p:nvPr/>
-        </p:nvSpPr>
-        <p:spPr>
-          <a:xfrm>
-            <a:off x="7315200" y="5943600"/>
-            <a:ext cx="914400" cy="685800"/>
-          </a:xfrm>
-          <a:prstGeom prst="rect">
-            <a:avLst/>
-          </a:prstGeom>
-          <a:noFill/>
-        </p:spPr>
-        <p:txBody>
-          <a:bodyPr wrap="square">
-            <a:normAutofit/>
-          </a:bodyPr>
-          <a:lstStyle/>
-          <a:p/>
-          <a:p>
-            <a:pPr algn="r"/>
-            <a:r>
-              <a:rPr sz="1600" b="0">
-                <a:solidFill>
-                  <a:srgbClr val="FFFFFF"/>
-                </a:solidFill>
-              </a:rPr>
-              <a:t/>
-            </a:r>
-          </a:p>
-        </p:txBody>
-      </p:sp>
-    </p:spTree>
-  </p:cSld>
-  <p:clrMapOvr>
-    <a:masterClrMapping/>
-  </p:clrMapOvr>
-</p:sld>
-</file>
-
-<file path=ppt/slides/slide4.xml><?xml version="1.0" encoding="utf-8"?>
-<p:sld xmlns:a="http://schemas.openxmlformats.org/drawingml/2006/main" xmlns:p="http://schemas.openxmlformats.org/presentationml/2006/main" xmlns:r="http://schemas.openxmlformats.org/officeDocument/2006/relationships">
-  <p:cSld>
-    <p:spTree>
-      <p:nvGrpSpPr>
-        <p:cNvPr id="1" name=""/>
-        <p:cNvGrpSpPr/>
-        <p:nvPr/>
-      </p:nvGrpSpPr>
-      <p:grpSpPr/>
-      <p:pic>
-        <p:nvPicPr>
-          <p:cNvPr id="2" name="Picture 1" descr="image2.gif"/>
-          <p:cNvPicPr>
-            <a:picLocks noChangeAspect="1"/>
-          </p:cNvPicPr>
-          <p:nvPr/>
-        </p:nvPicPr>
-        <p:blipFill>
-          <a:blip r:embed="rId2"/>
-          <a:stretch>
-            <a:fillRect/>
-          </a:stretch>
-        </p:blipFill>
-        <p:spPr>
-          <a:xfrm>
-            <a:off x="0" y="0"/>
-            <a:ext cx="9144000" cy="6858000"/>
-          </a:xfrm>
-          <a:prstGeom prst="rect">
-            <a:avLst/>
-          </a:prstGeom>
-        </p:spPr>
-      </p:pic>
-      <p:sp>
-        <p:nvSpPr>
-          <p:cNvPr id="3" name="TextBox 2"/>
-          <p:cNvSpPr txBox="1"/>
-          <p:nvPr/>
-        </p:nvSpPr>
-        <p:spPr>
-          <a:xfrm>
-            <a:off x="457200" y="182880"/>
-            <a:ext cx="8229600" cy="960120"/>
-          </a:xfrm>
-          <a:prstGeom prst="rect">
-            <a:avLst/>
-          </a:prstGeom>
-          <a:noFill/>
-        </p:spPr>
-        <p:txBody>
-          <a:bodyPr wrap="square">
-            <a:normAutofit/>
-          </a:bodyPr>
-          <a:lstStyle/>
-          <a:p/>
-          <a:p>
-            <a:pPr algn="l"/>
-            <a:r>
-              <a:rPr sz="3600" b="0">
-                <a:solidFill>
-                  <a:srgbClr val="FFFFFF"/>
-                </a:solidFill>
-              </a:rPr>
-              <a:t>Rudram - 1st Anuvaka</a:t>
-            </a:r>
-          </a:p>
-        </p:txBody>
-      </p:sp>
-      <p:sp>
-        <p:nvSpPr>
-          <p:cNvPr id="4" name="TextBox 3"/>
-          <p:cNvSpPr txBox="1"/>
-          <p:nvPr/>
-        </p:nvSpPr>
-        <p:spPr>
-          <a:xfrm>
-            <a:off x="457200" y="1143000"/>
-            <a:ext cx="8229600" cy="5029200"/>
-          </a:xfrm>
-          <a:prstGeom prst="rect">
-            <a:avLst/>
-          </a:prstGeom>
-          <a:noFill/>
-        </p:spPr>
-        <p:txBody>
-          <a:bodyPr wrap="square">
-            <a:normAutofit/>
-          </a:bodyPr>
-          <a:lstStyle/>
-          <a:p/>
-          <a:p>
-            <a:pPr algn="l"/>
-            <a:r>
-              <a:rPr sz="3200" b="0">
-                <a:solidFill>
-                  <a:srgbClr val="FFFFFF"/>
-                </a:solidFill>
-              </a:rPr>
-              <a:t>Om Namo Bhagavate̍ Rudrā̱ya 
-Om Nama̍ste Rudra Ma̱nyava̍ U̱tota̱ Iṣa̍ve̱ Namaḥ̍
-Namas̍te Astu̱ Dhanvan̍e Bā̱hubhyā̍mu̱ta Te̱ Namaḥ̍
-Yā Ta̱ Iṣu̍ḥ Śi̱vata̍mā Śi̱vaṁ Baḇhūva̍ Te̱ Dhanuḥ̍ 
-Śi̱vā Śa̍ra̱vyā̍ Yā Tava̱ Tayā̍ No Rudra Mṛḍaya 
-Yā Te̍ Rudra Śi̱vā Ta̱nūragho̱rā'pā̍pakāśinī
-Tayā̍ Nasta̱nuvā̱ Śanta̍mayā̱ Giri̍śaṁtā̱bhicā̍kaśīhi</a:t>
-            </a:r>
-          </a:p>
-        </p:txBody>
-      </p:sp>
-      <p:sp>
-        <p:nvSpPr>
-          <p:cNvPr id="5" name="TextBox 4"/>
-          <p:cNvSpPr txBox="1"/>
-          <p:nvPr/>
-        </p:nvSpPr>
-        <p:spPr>
-          <a:xfrm>
-            <a:off x="457200" y="5943600"/>
-            <a:ext cx="914400" cy="685800"/>
-          </a:xfrm>
-          <a:prstGeom prst="rect">
-            <a:avLst/>
-          </a:prstGeom>
-          <a:noFill/>
-        </p:spPr>
-        <p:txBody>
-          <a:bodyPr wrap="square">
-            <a:normAutofit/>
-          </a:bodyPr>
-          <a:lstStyle/>
-          <a:p/>
-          <a:p>
-            <a:pPr algn="l"/>
-            <a:r>
-              <a:rPr sz="1600" b="0">
-                <a:solidFill>
-                  <a:srgbClr val="FFFFFF"/>
-                </a:solidFill>
-              </a:rPr>
-              <a:t/>
-            </a:r>
-          </a:p>
-        </p:txBody>
-      </p:sp>
-      <p:sp>
-        <p:nvSpPr>
-          <p:cNvPr id="6" name="TextBox 5"/>
-          <p:cNvSpPr txBox="1"/>
-          <p:nvPr/>
-        </p:nvSpPr>
-        <p:spPr>
-          <a:xfrm>
-            <a:off x="2286000" y="5943600"/>
-            <a:ext cx="3657600" cy="685800"/>
-          </a:xfrm>
-          <a:prstGeom prst="rect">
-            <a:avLst/>
-          </a:prstGeom>
-          <a:noFill/>
-        </p:spPr>
-        <p:txBody>
-          <a:bodyPr wrap="square">
-            <a:normAutofit/>
-          </a:bodyPr>
-          <a:lstStyle/>
-          <a:p/>
-          <a:p>
-            <a:pPr algn="ctr"/>
-            <a:r>
-              <a:rPr sz="1600" b="0">
-                <a:solidFill>
-                  <a:srgbClr val="FFFFFF"/>
-                </a:solidFill>
-              </a:rPr>
-              <a:t>Continued</a:t>
-            </a:r>
-          </a:p>
-        </p:txBody>
-      </p:sp>
-      <p:sp>
-        <p:nvSpPr>
-          <p:cNvPr id="7" name="TextBox 6"/>
-          <p:cNvSpPr txBox="1"/>
-          <p:nvPr/>
-        </p:nvSpPr>
-        <p:spPr>
-          <a:xfrm>
-            <a:off x="7315200" y="5943600"/>
-            <a:ext cx="914400" cy="685800"/>
-          </a:xfrm>
-          <a:prstGeom prst="rect">
-            <a:avLst/>
-          </a:prstGeom>
-          <a:noFill/>
-        </p:spPr>
-        <p:txBody>
-          <a:bodyPr wrap="square">
-            <a:normAutofit/>
-          </a:bodyPr>
-          <a:lstStyle/>
-          <a:p/>
-          <a:p>
-            <a:pPr algn="r"/>
-            <a:r>
-              <a:rPr sz="1600" b="0">
-                <a:solidFill>
-                  <a:srgbClr val="FFFFFF"/>
-                </a:solidFill>
-              </a:rPr>
-              <a:t/>
-            </a:r>
-          </a:p>
-        </p:txBody>
-      </p:sp>
-    </p:spTree>
-  </p:cSld>
-  <p:clrMapOvr>
-    <a:masterClrMapping/>
-  </p:clrMapOvr>
-</p:sld>
-</file>
-
-<file path=ppt/slides/slide5.xml><?xml version="1.0" encoding="utf-8"?>
-<p:sld xmlns:a="http://schemas.openxmlformats.org/drawingml/2006/main" xmlns:p="http://schemas.openxmlformats.org/presentationml/2006/main" xmlns:r="http://schemas.openxmlformats.org/officeDocument/2006/relationships">
-  <p:cSld>
-    <p:spTree>
-      <p:nvGrpSpPr>
-        <p:cNvPr id="1" name=""/>
-        <p:cNvGrpSpPr/>
-        <p:nvPr/>
-      </p:nvGrpSpPr>
-      <p:grpSpPr/>
-      <p:pic>
-        <p:nvPicPr>
-          <p:cNvPr id="2" name="Picture 1" descr="image2.gif"/>
-          <p:cNvPicPr>
-            <a:picLocks noChangeAspect="1"/>
-          </p:cNvPicPr>
-          <p:nvPr/>
-        </p:nvPicPr>
-        <p:blipFill>
-          <a:blip r:embed="rId2"/>
-          <a:stretch>
-            <a:fillRect/>
-          </a:stretch>
-        </p:blipFill>
-        <p:spPr>
-          <a:xfrm>
-            <a:off x="0" y="0"/>
-            <a:ext cx="9144000" cy="6858000"/>
-          </a:xfrm>
-          <a:prstGeom prst="rect">
-            <a:avLst/>
-          </a:prstGeom>
-        </p:spPr>
-      </p:pic>
-      <p:sp>
-        <p:nvSpPr>
-          <p:cNvPr id="3" name="TextBox 2"/>
-          <p:cNvSpPr txBox="1"/>
-          <p:nvPr/>
-        </p:nvSpPr>
-        <p:spPr>
-          <a:xfrm>
-            <a:off x="457200" y="182880"/>
-            <a:ext cx="8229600" cy="960120"/>
-          </a:xfrm>
-          <a:prstGeom prst="rect">
-            <a:avLst/>
-          </a:prstGeom>
-          <a:noFill/>
-        </p:spPr>
-        <p:txBody>
-          <a:bodyPr wrap="square">
-            <a:normAutofit/>
-          </a:bodyPr>
-          <a:lstStyle/>
-          <a:p/>
-          <a:p>
-            <a:pPr algn="l"/>
-            <a:r>
-              <a:rPr sz="3600" b="0">
-                <a:solidFill>
-                  <a:srgbClr val="FFFFFF"/>
-                </a:solidFill>
-              </a:rPr>
-              <a:t>Rudram - 1st Anuvaka</a:t>
-            </a:r>
-          </a:p>
-        </p:txBody>
-      </p:sp>
-      <p:sp>
-        <p:nvSpPr>
-          <p:cNvPr id="4" name="TextBox 3"/>
-          <p:cNvSpPr txBox="1"/>
-          <p:nvPr/>
-        </p:nvSpPr>
-        <p:spPr>
-          <a:xfrm>
-            <a:off x="457200" y="1143000"/>
-            <a:ext cx="8229600" cy="5029200"/>
-          </a:xfrm>
-          <a:prstGeom prst="rect">
-            <a:avLst/>
-          </a:prstGeom>
-          <a:noFill/>
-        </p:spPr>
-        <p:txBody>
-          <a:bodyPr wrap="square">
-            <a:normAutofit/>
-          </a:bodyPr>
-          <a:lstStyle/>
-          <a:p/>
-          <a:p>
-            <a:pPr algn="l"/>
-            <a:r>
-              <a:rPr sz="3200" b="0">
-                <a:solidFill>
-                  <a:srgbClr val="FFFFFF"/>
-                </a:solidFill>
-              </a:rPr>
-              <a:t>Yāmiṣuṁ̍ Giriśaṁta̱ Haste̱ Bibhaṟṣyasta̍ve 
-Śi̱vāṁ Gi̍ritra̱ Tāṁ Kur̍u̱ Mā Higṁ̍sī̱ḥ Puru̍ṣaṁ̱ Jagat̍
-Śi̱vena̱ Vaca̍sā Tvā̱ Giri̱śācchā̍vadāmasi 
-Yathā̍ Na̱ḥ Sarvam̱ijjagad̍ayaḵṣmagṁ Sum̱anā̱ Asat̍
-Adhya̍vocadadhiva̱ktā Pra̍tham̱o Daivyo̍ Bhiṣ̱ak 
-Ahīg̍sca̱ Sarvā̎ñja̱mbhaya̱ntsarvā̎śca Yātudhā̱nya̍ḥ</a:t>
-            </a:r>
-          </a:p>
-        </p:txBody>
-      </p:sp>
-      <p:sp>
-        <p:nvSpPr>
-          <p:cNvPr id="5" name="TextBox 4"/>
-          <p:cNvSpPr txBox="1"/>
-          <p:nvPr/>
-        </p:nvSpPr>
-        <p:spPr>
-          <a:xfrm>
-            <a:off x="457200" y="5943600"/>
-            <a:ext cx="914400" cy="685800"/>
-          </a:xfrm>
-          <a:prstGeom prst="rect">
-            <a:avLst/>
-          </a:prstGeom>
-          <a:noFill/>
-        </p:spPr>
-        <p:txBody>
-          <a:bodyPr wrap="square">
-            <a:normAutofit/>
-          </a:bodyPr>
-          <a:lstStyle/>
-          <a:p/>
-          <a:p>
-            <a:pPr algn="l"/>
-            <a:r>
-              <a:rPr sz="1600" b="0">
-                <a:solidFill>
-                  <a:srgbClr val="FFFFFF"/>
-                </a:solidFill>
-              </a:rPr>
-              <a:t/>
-            </a:r>
-          </a:p>
-        </p:txBody>
-      </p:sp>
-      <p:sp>
-        <p:nvSpPr>
-          <p:cNvPr id="6" name="TextBox 5"/>
-          <p:cNvSpPr txBox="1"/>
-          <p:nvPr/>
-        </p:nvSpPr>
-        <p:spPr>
-          <a:xfrm>
-            <a:off x="2286000" y="5943600"/>
-            <a:ext cx="3657600" cy="685800"/>
-          </a:xfrm>
-          <a:prstGeom prst="rect">
-            <a:avLst/>
-          </a:prstGeom>
-          <a:noFill/>
-        </p:spPr>
-        <p:txBody>
-          <a:bodyPr wrap="square">
-            <a:normAutofit/>
-          </a:bodyPr>
-          <a:lstStyle/>
-          <a:p/>
-          <a:p>
-            <a:pPr algn="ctr"/>
-            <a:r>
-              <a:rPr sz="1600" b="0">
-                <a:solidFill>
-                  <a:srgbClr val="FFFFFF"/>
-                </a:solidFill>
-              </a:rPr>
-              <a:t>Continued</a:t>
-            </a:r>
-          </a:p>
-        </p:txBody>
-      </p:sp>
-      <p:sp>
-        <p:nvSpPr>
-          <p:cNvPr id="7" name="TextBox 6"/>
-          <p:cNvSpPr txBox="1"/>
-          <p:nvPr/>
-        </p:nvSpPr>
-        <p:spPr>
-          <a:xfrm>
-            <a:off x="7315200" y="5943600"/>
-            <a:ext cx="914400" cy="685800"/>
-          </a:xfrm>
-          <a:prstGeom prst="rect">
-            <a:avLst/>
-          </a:prstGeom>
-          <a:noFill/>
-        </p:spPr>
-        <p:txBody>
-          <a:bodyPr wrap="square">
-            <a:normAutofit/>
-          </a:bodyPr>
-          <a:lstStyle/>
-          <a:p/>
-          <a:p>
-            <a:pPr algn="r"/>
-            <a:r>
-              <a:rPr sz="1600" b="0">
-                <a:solidFill>
-                  <a:srgbClr val="FFFFFF"/>
-                </a:solidFill>
-              </a:rPr>
-              <a:t/>
-            </a:r>
-          </a:p>
-        </p:txBody>
-      </p:sp>
-    </p:spTree>
-  </p:cSld>
-  <p:clrMapOvr>
-    <a:masterClrMapping/>
-  </p:clrMapOvr>
-</p:sld>
-</file>
-
-<file path=ppt/slides/slide6.xml><?xml version="1.0" encoding="utf-8"?>
-<p:sld xmlns:a="http://schemas.openxmlformats.org/drawingml/2006/main" xmlns:p="http://schemas.openxmlformats.org/presentationml/2006/main" xmlns:r="http://schemas.openxmlformats.org/officeDocument/2006/relationships">
-  <p:cSld>
-    <p:spTree>
-      <p:nvGrpSpPr>
-        <p:cNvPr id="1" name=""/>
-        <p:cNvGrpSpPr/>
-        <p:nvPr/>
-      </p:nvGrpSpPr>
-      <p:grpSpPr/>
-      <p:pic>
-        <p:nvPicPr>
-          <p:cNvPr id="2" name="Picture 1" descr="image2.gif"/>
-          <p:cNvPicPr>
-            <a:picLocks noChangeAspect="1"/>
-          </p:cNvPicPr>
-          <p:nvPr/>
-        </p:nvPicPr>
-        <p:blipFill>
-          <a:blip r:embed="rId2"/>
-          <a:stretch>
-            <a:fillRect/>
-          </a:stretch>
-        </p:blipFill>
-        <p:spPr>
-          <a:xfrm>
-            <a:off x="0" y="0"/>
-            <a:ext cx="9144000" cy="6858000"/>
-          </a:xfrm>
-          <a:prstGeom prst="rect">
-            <a:avLst/>
-          </a:prstGeom>
-        </p:spPr>
-      </p:pic>
-      <p:sp>
-        <p:nvSpPr>
-          <p:cNvPr id="3" name="TextBox 2"/>
-          <p:cNvSpPr txBox="1"/>
-          <p:nvPr/>
-        </p:nvSpPr>
-        <p:spPr>
-          <a:xfrm>
-            <a:off x="457200" y="182880"/>
-            <a:ext cx="8229600" cy="960120"/>
-          </a:xfrm>
-          <a:prstGeom prst="rect">
-            <a:avLst/>
-          </a:prstGeom>
-          <a:noFill/>
-        </p:spPr>
-        <p:txBody>
-          <a:bodyPr wrap="square">
-            <a:normAutofit/>
-          </a:bodyPr>
-          <a:lstStyle/>
-          <a:p/>
-          <a:p>
-            <a:pPr algn="l"/>
-            <a:r>
-              <a:rPr sz="3600" b="0">
-                <a:solidFill>
-                  <a:srgbClr val="FFFFFF"/>
-                </a:solidFill>
-              </a:rPr>
-              <a:t>Rudram - 1st Anuvaka</a:t>
-            </a:r>
-          </a:p>
-        </p:txBody>
-      </p:sp>
-      <p:sp>
-        <p:nvSpPr>
-          <p:cNvPr id="4" name="TextBox 3"/>
-          <p:cNvSpPr txBox="1"/>
-          <p:nvPr/>
-        </p:nvSpPr>
-        <p:spPr>
-          <a:xfrm>
-            <a:off x="457200" y="1143000"/>
-            <a:ext cx="8229600" cy="5029200"/>
-          </a:xfrm>
-          <a:prstGeom prst="rect">
-            <a:avLst/>
-          </a:prstGeom>
-          <a:noFill/>
-        </p:spPr>
-        <p:txBody>
-          <a:bodyPr wrap="square">
-            <a:normAutofit/>
-          </a:bodyPr>
-          <a:lstStyle/>
-          <a:p/>
-          <a:p>
-            <a:pPr algn="l"/>
-            <a:r>
-              <a:rPr sz="3200" b="0">
-                <a:solidFill>
-                  <a:srgbClr val="FFFFFF"/>
-                </a:solidFill>
-              </a:rPr>
-              <a:t>A̱sau Yastam̱ro A̍ru̱ṇa U̱ta Ba̱bhruḥ Su̍ma̱ṅgalaḥ̍ 
-Ye Ce̱māgṁ Ru̱drā Aḇhito̍ Diḵṣu Śri̱tāḥ Sa̍hasra̱śo'vaiṣ̍ā̱gṁ̱ Heḍa̍ İ̄mahe 
-A̱sau Yo̍'vas̱ Arpa̍ti̱ Nīla̍grīvo̱ Viloh̍itaḥ
-Uṯainaṁ ̍ Gop̱ā Adṛśa̱nnadṛś̍annudahā̱rya̍h
-U̱tainaṁ̱ Viśvā̍ Bhū̱tāni̱ Sa Dṛ̱ṣṭo Mṛ̍ḍayāti Naḥ 
-Namo̍ Astu̱ Nīlag̍rīvāya Sahasrā̱kṣāya̍ Mī̱ḍhuṣe̎</a:t>
-            </a:r>
-          </a:p>
-        </p:txBody>
-      </p:sp>
-      <p:sp>
-        <p:nvSpPr>
-          <p:cNvPr id="5" name="TextBox 4"/>
-          <p:cNvSpPr txBox="1"/>
-          <p:nvPr/>
-        </p:nvSpPr>
-        <p:spPr>
-          <a:xfrm>
-            <a:off x="457200" y="5943600"/>
-            <a:ext cx="914400" cy="685800"/>
-          </a:xfrm>
-          <a:prstGeom prst="rect">
-            <a:avLst/>
-          </a:prstGeom>
-          <a:noFill/>
-        </p:spPr>
-        <p:txBody>
-          <a:bodyPr wrap="square">
-            <a:normAutofit/>
-          </a:bodyPr>
-          <a:lstStyle/>
-          <a:p/>
-          <a:p>
-            <a:pPr algn="l"/>
-            <a:r>
-              <a:rPr sz="1600" b="0">
-                <a:solidFill>
-                  <a:srgbClr val="FFFFFF"/>
-                </a:solidFill>
-              </a:rPr>
-              <a:t/>
-            </a:r>
-          </a:p>
-        </p:txBody>
-      </p:sp>
-      <p:sp>
-        <p:nvSpPr>
-          <p:cNvPr id="6" name="TextBox 5"/>
-          <p:cNvSpPr txBox="1"/>
-          <p:nvPr/>
-        </p:nvSpPr>
-        <p:spPr>
-          <a:xfrm>
-            <a:off x="2286000" y="5943600"/>
-            <a:ext cx="3657600" cy="685800"/>
-          </a:xfrm>
-          <a:prstGeom prst="rect">
-            <a:avLst/>
-          </a:prstGeom>
-          <a:noFill/>
-        </p:spPr>
-        <p:txBody>
-          <a:bodyPr wrap="square">
-            <a:normAutofit/>
-          </a:bodyPr>
-          <a:lstStyle/>
-          <a:p/>
-          <a:p>
-            <a:pPr algn="ctr"/>
-            <a:r>
-              <a:rPr sz="1600" b="0">
-                <a:solidFill>
-                  <a:srgbClr val="FFFFFF"/>
-                </a:solidFill>
-              </a:rPr>
-              <a:t>Continued</a:t>
-            </a:r>
-          </a:p>
-        </p:txBody>
-      </p:sp>
-      <p:sp>
-        <p:nvSpPr>
-          <p:cNvPr id="7" name="TextBox 6"/>
-          <p:cNvSpPr txBox="1"/>
-          <p:nvPr/>
-        </p:nvSpPr>
-        <p:spPr>
-          <a:xfrm>
-            <a:off x="7315200" y="5943600"/>
-            <a:ext cx="914400" cy="685800"/>
-          </a:xfrm>
-          <a:prstGeom prst="rect">
-            <a:avLst/>
-          </a:prstGeom>
-          <a:noFill/>
-        </p:spPr>
-        <p:txBody>
-          <a:bodyPr wrap="square">
-            <a:normAutofit/>
-          </a:bodyPr>
-          <a:lstStyle/>
-          <a:p/>
-          <a:p>
-            <a:pPr algn="r"/>
-            <a:r>
-              <a:rPr sz="1600" b="0">
-                <a:solidFill>
-                  <a:srgbClr val="FFFFFF"/>
-                </a:solidFill>
-              </a:rPr>
-              <a:t/>
-            </a:r>
-          </a:p>
-        </p:txBody>
-      </p:sp>
-    </p:spTree>
-  </p:cSld>
-  <p:clrMapOvr>
-    <a:masterClrMapping/>
-  </p:clrMapOvr>
-</p:sld>
-</file>
-
-<file path=ppt/slides/slide7.xml><?xml version="1.0" encoding="utf-8"?>
-<p:sld xmlns:a="http://schemas.openxmlformats.org/drawingml/2006/main" xmlns:p="http://schemas.openxmlformats.org/presentationml/2006/main" xmlns:r="http://schemas.openxmlformats.org/officeDocument/2006/relationships">
-  <p:cSld>
-    <p:spTree>
-      <p:nvGrpSpPr>
-        <p:cNvPr id="1" name=""/>
-        <p:cNvGrpSpPr/>
-        <p:nvPr/>
-      </p:nvGrpSpPr>
-      <p:grpSpPr/>
-      <p:pic>
-        <p:nvPicPr>
-          <p:cNvPr id="2" name="Picture 1" descr="image2.gif"/>
-          <p:cNvPicPr>
-            <a:picLocks noChangeAspect="1"/>
-          </p:cNvPicPr>
-          <p:nvPr/>
-        </p:nvPicPr>
-        <p:blipFill>
-          <a:blip r:embed="rId2"/>
-          <a:stretch>
-            <a:fillRect/>
-          </a:stretch>
-        </p:blipFill>
-        <p:spPr>
-          <a:xfrm>
-            <a:off x="0" y="0"/>
-            <a:ext cx="9144000" cy="6858000"/>
-          </a:xfrm>
-          <a:prstGeom prst="rect">
-            <a:avLst/>
-          </a:prstGeom>
-        </p:spPr>
-      </p:pic>
-      <p:sp>
-        <p:nvSpPr>
-          <p:cNvPr id="3" name="TextBox 2"/>
-          <p:cNvSpPr txBox="1"/>
-          <p:nvPr/>
-        </p:nvSpPr>
-        <p:spPr>
-          <a:xfrm>
-            <a:off x="457200" y="182880"/>
-            <a:ext cx="8229600" cy="960120"/>
-          </a:xfrm>
-          <a:prstGeom prst="rect">
-            <a:avLst/>
-          </a:prstGeom>
-          <a:noFill/>
-        </p:spPr>
-        <p:txBody>
-          <a:bodyPr wrap="square">
-            <a:normAutofit/>
-          </a:bodyPr>
-          <a:lstStyle/>
-          <a:p/>
-          <a:p>
-            <a:pPr algn="l"/>
-            <a:r>
-              <a:rPr sz="3600" b="0">
-                <a:solidFill>
-                  <a:srgbClr val="FFFFFF"/>
-                </a:solidFill>
-              </a:rPr>
-              <a:t>Rudram - 1st Anuvaka</a:t>
-            </a:r>
-          </a:p>
-        </p:txBody>
-      </p:sp>
-      <p:sp>
-        <p:nvSpPr>
-          <p:cNvPr id="4" name="TextBox 3"/>
-          <p:cNvSpPr txBox="1"/>
-          <p:nvPr/>
-        </p:nvSpPr>
-        <p:spPr>
-          <a:xfrm>
-            <a:off x="457200" y="1143000"/>
-            <a:ext cx="8229600" cy="5029200"/>
-          </a:xfrm>
-          <a:prstGeom prst="rect">
-            <a:avLst/>
-          </a:prstGeom>
-          <a:noFill/>
-        </p:spPr>
-        <p:txBody>
-          <a:bodyPr wrap="square">
-            <a:normAutofit/>
-          </a:bodyPr>
-          <a:lstStyle/>
-          <a:p/>
-          <a:p>
-            <a:pPr algn="l"/>
-            <a:r>
-              <a:rPr sz="3200" b="0">
-                <a:solidFill>
-                  <a:srgbClr val="FFFFFF"/>
-                </a:solidFill>
-              </a:rPr>
-              <a:t>Atho̱ Ye A̍sya̱ Satvā̍no'̱ Haṁ Tebhyo̍'kara̱nnamaḥ̍ 
-Pramuñ̍ca̱ Dhanvan̍as̱tvamu̱bhayoṟārtni̍ Yo̱rjyām 
-Yāśca̍ Te̱ Hasta̱ İṣa̍vaḥ̱ Parā̱ Tā Bha̍gavo Vapa 
-A̱va̱tatya̱ Dhanu̱stvagṁ Sahas̍rākṣa̱ Śateṣ̍udhe 
-Ni̱śīrya̍ Śaḻyānāṁ̱ Mukhā̍ Śi̱vo Na̍ḥ Sum̱anā̍ Bhava 
-Vijyaṁ̱ Dhanuḥ̍ Kapa̱rdino̱ Viśa̍lyo̱ Bāṇa̍vāgṁ U̱ta 
-Ane̍śanna̱syeṣa̍va Āḇhura̍sya Niṣaṁ̱gathiḥ̍</a:t>
-            </a:r>
-          </a:p>
-        </p:txBody>
-      </p:sp>
-      <p:sp>
-        <p:nvSpPr>
-          <p:cNvPr id="5" name="TextBox 4"/>
-          <p:cNvSpPr txBox="1"/>
-          <p:nvPr/>
-        </p:nvSpPr>
-        <p:spPr>
-          <a:xfrm>
-            <a:off x="457200" y="5943600"/>
-            <a:ext cx="914400" cy="685800"/>
-          </a:xfrm>
-          <a:prstGeom prst="rect">
-            <a:avLst/>
-          </a:prstGeom>
-          <a:noFill/>
-        </p:spPr>
-        <p:txBody>
-          <a:bodyPr wrap="square">
-            <a:normAutofit/>
-          </a:bodyPr>
-          <a:lstStyle/>
-          <a:p/>
-          <a:p>
-            <a:pPr algn="l"/>
-            <a:r>
-              <a:rPr sz="1600" b="0">
-                <a:solidFill>
-                  <a:srgbClr val="FFFFFF"/>
-                </a:solidFill>
-              </a:rPr>
-              <a:t/>
-            </a:r>
-          </a:p>
-        </p:txBody>
-      </p:sp>
-      <p:sp>
-        <p:nvSpPr>
-          <p:cNvPr id="6" name="TextBox 5"/>
-          <p:cNvSpPr txBox="1"/>
-          <p:nvPr/>
-        </p:nvSpPr>
-        <p:spPr>
-          <a:xfrm>
-            <a:off x="2286000" y="5943600"/>
-            <a:ext cx="3657600" cy="685800"/>
-          </a:xfrm>
-          <a:prstGeom prst="rect">
-            <a:avLst/>
-          </a:prstGeom>
-          <a:noFill/>
-        </p:spPr>
-        <p:txBody>
-          <a:bodyPr wrap="square">
-            <a:normAutofit/>
-          </a:bodyPr>
-          <a:lstStyle/>
-          <a:p/>
-          <a:p>
-            <a:pPr algn="ctr"/>
-            <a:r>
-              <a:rPr sz="1600" b="0">
-                <a:solidFill>
-                  <a:srgbClr val="FFFFFF"/>
-                </a:solidFill>
-              </a:rPr>
-              <a:t>Continued</a:t>
-            </a:r>
-          </a:p>
-        </p:txBody>
-      </p:sp>
-      <p:sp>
-        <p:nvSpPr>
-          <p:cNvPr id="7" name="TextBox 6"/>
-          <p:cNvSpPr txBox="1"/>
-          <p:nvPr/>
-        </p:nvSpPr>
-        <p:spPr>
-          <a:xfrm>
-            <a:off x="7315200" y="5943600"/>
-            <a:ext cx="914400" cy="685800"/>
-          </a:xfrm>
-          <a:prstGeom prst="rect">
-            <a:avLst/>
-          </a:prstGeom>
-          <a:noFill/>
-        </p:spPr>
-        <p:txBody>
-          <a:bodyPr wrap="square">
-            <a:normAutofit/>
-          </a:bodyPr>
-          <a:lstStyle/>
-          <a:p/>
-          <a:p>
-            <a:pPr algn="r"/>
-            <a:r>
-              <a:rPr sz="1600" b="0">
-                <a:solidFill>
-                  <a:srgbClr val="FFFFFF"/>
-                </a:solidFill>
-              </a:rPr>
-              <a:t/>
-            </a:r>
-          </a:p>
-        </p:txBody>
-      </p:sp>
-    </p:spTree>
-  </p:cSld>
-  <p:clrMapOvr>
-    <a:masterClrMapping/>
-  </p:clrMapOvr>
-</p:sld>
-</file>
-
-<file path=ppt/slides/slide8.xml><?xml version="1.0" encoding="utf-8"?>
-<p:sld xmlns:a="http://schemas.openxmlformats.org/drawingml/2006/main" xmlns:p="http://schemas.openxmlformats.org/presentationml/2006/main" xmlns:r="http://schemas.openxmlformats.org/officeDocument/2006/relationships">
-  <p:cSld>
-    <p:spTree>
-      <p:nvGrpSpPr>
-        <p:cNvPr id="1" name=""/>
-        <p:cNvGrpSpPr/>
-        <p:nvPr/>
-      </p:nvGrpSpPr>
-      <p:grpSpPr/>
-      <p:pic>
-        <p:nvPicPr>
-          <p:cNvPr id="2" name="Picture 1" descr="image2.gif"/>
-          <p:cNvPicPr>
-            <a:picLocks noChangeAspect="1"/>
-          </p:cNvPicPr>
-          <p:nvPr/>
-        </p:nvPicPr>
-        <p:blipFill>
-          <a:blip r:embed="rId2"/>
-          <a:stretch>
-            <a:fillRect/>
-          </a:stretch>
-        </p:blipFill>
-        <p:spPr>
-          <a:xfrm>
-            <a:off x="0" y="0"/>
-            <a:ext cx="9144000" cy="6858000"/>
-          </a:xfrm>
-          <a:prstGeom prst="rect">
-            <a:avLst/>
-          </a:prstGeom>
-        </p:spPr>
-      </p:pic>
-      <p:sp>
-        <p:nvSpPr>
-          <p:cNvPr id="3" name="TextBox 2"/>
-          <p:cNvSpPr txBox="1"/>
-          <p:nvPr/>
-        </p:nvSpPr>
-        <p:spPr>
-          <a:xfrm>
-            <a:off x="457200" y="182880"/>
-            <a:ext cx="8229600" cy="960120"/>
-          </a:xfrm>
-          <a:prstGeom prst="rect">
-            <a:avLst/>
-          </a:prstGeom>
-          <a:noFill/>
-        </p:spPr>
-        <p:txBody>
-          <a:bodyPr wrap="square">
-            <a:normAutofit/>
-          </a:bodyPr>
-          <a:lstStyle/>
-          <a:p/>
-          <a:p>
-            <a:pPr algn="l"/>
-            <a:r>
-              <a:rPr sz="3600" b="0">
-                <a:solidFill>
-                  <a:srgbClr val="FFFFFF"/>
-                </a:solidFill>
-              </a:rPr>
-              <a:t>Rudram - 1st Anuvaka</a:t>
-            </a:r>
-          </a:p>
-        </p:txBody>
-      </p:sp>
-      <p:sp>
-        <p:nvSpPr>
-          <p:cNvPr id="4" name="TextBox 3"/>
-          <p:cNvSpPr txBox="1"/>
-          <p:nvPr/>
-        </p:nvSpPr>
-        <p:spPr>
-          <a:xfrm>
-            <a:off x="457200" y="1143000"/>
-            <a:ext cx="8229600" cy="5029200"/>
-          </a:xfrm>
-          <a:prstGeom prst="rect">
-            <a:avLst/>
-          </a:prstGeom>
-          <a:noFill/>
-        </p:spPr>
-        <p:txBody>
-          <a:bodyPr wrap="square">
-            <a:normAutofit/>
-          </a:bodyPr>
-          <a:lstStyle/>
-          <a:p/>
-          <a:p>
-            <a:pPr algn="l"/>
-            <a:r>
-              <a:rPr sz="3200" b="0">
-                <a:solidFill>
-                  <a:srgbClr val="FFFFFF"/>
-                </a:solidFill>
-              </a:rPr>
-              <a:t>Yā Te̍ He̱tirmī̍ḍhuṣṭama̱ Haste̍ Baḇhūva̍ Te̱ Dhanuḥ̍ 
-Tayā̱'smān Vi̱śvata̱stvama̍yaḵṣmayā̱ Pari̍bbhuja 
-Namas̍te As̱tvāyud̍hā̱yānā̍tatāya Dhṛ̱ṣṇave̎
-U̱bhābhyā̍muṯa Te̱ Namo̍ Bā̱hubhyām̱ ̱ Tava̱ Dhanva̍ne</a:t>
-            </a:r>
-          </a:p>
-        </p:txBody>
-      </p:sp>
-      <p:sp>
-        <p:nvSpPr>
-          <p:cNvPr id="5" name="TextBox 4"/>
-          <p:cNvSpPr txBox="1"/>
-          <p:nvPr/>
-        </p:nvSpPr>
-        <p:spPr>
-          <a:xfrm>
-            <a:off x="457200" y="5943600"/>
-            <a:ext cx="914400" cy="685800"/>
-          </a:xfrm>
-          <a:prstGeom prst="rect">
-            <a:avLst/>
-          </a:prstGeom>
-          <a:noFill/>
-        </p:spPr>
-        <p:txBody>
-          <a:bodyPr wrap="square">
-            <a:normAutofit/>
-          </a:bodyPr>
-          <a:lstStyle/>
-          <a:p/>
-          <a:p>
-            <a:pPr algn="l"/>
-            <a:r>
-              <a:rPr sz="1600" b="0">
-                <a:solidFill>
-                  <a:srgbClr val="FFFFFF"/>
-                </a:solidFill>
-              </a:rPr>
-              <a:t/>
-            </a:r>
-          </a:p>
-        </p:txBody>
-      </p:sp>
-      <p:sp>
-        <p:nvSpPr>
-          <p:cNvPr id="6" name="TextBox 5"/>
-          <p:cNvSpPr txBox="1"/>
-          <p:nvPr/>
-        </p:nvSpPr>
-        <p:spPr>
-          <a:xfrm>
-            <a:off x="2286000" y="5943600"/>
-            <a:ext cx="3657600" cy="685800"/>
-          </a:xfrm>
-          <a:prstGeom prst="rect">
-            <a:avLst/>
-          </a:prstGeom>
-          <a:noFill/>
-        </p:spPr>
-        <p:txBody>
-          <a:bodyPr wrap="square">
-            <a:normAutofit/>
-          </a:bodyPr>
-          <a:lstStyle/>
-          <a:p/>
-          <a:p>
-            <a:pPr algn="ctr"/>
-            <a:r>
-              <a:rPr sz="1600" b="0">
-                <a:solidFill>
-                  <a:srgbClr val="FFFFFF"/>
-                </a:solidFill>
-              </a:rPr>
-              <a:t>Continued</a:t>
-            </a:r>
-          </a:p>
-        </p:txBody>
-      </p:sp>
-      <p:sp>
-        <p:nvSpPr>
-          <p:cNvPr id="7" name="TextBox 6"/>
-          <p:cNvSpPr txBox="1"/>
-          <p:nvPr/>
-        </p:nvSpPr>
-        <p:spPr>
-          <a:xfrm>
-            <a:off x="7315200" y="5943600"/>
-            <a:ext cx="914400" cy="685800"/>
-          </a:xfrm>
-          <a:prstGeom prst="rect">
-            <a:avLst/>
-          </a:prstGeom>
-          <a:noFill/>
-        </p:spPr>
-        <p:txBody>
-          <a:bodyPr wrap="square">
-            <a:normAutofit/>
-          </a:bodyPr>
-          <a:lstStyle/>
-          <a:p/>
-          <a:p>
-            <a:pPr algn="r"/>
-            <a:r>
-              <a:rPr sz="1600" b="0">
-                <a:solidFill>
-                  <a:srgbClr val="FFFFFF"/>
-                </a:solidFill>
-              </a:rPr>
-              <a:t/>
-            </a:r>
-          </a:p>
-        </p:txBody>
-      </p:sp>
-    </p:spTree>
-  </p:cSld>
-  <p:clrMapOvr>
-    <a:masterClrMapping/>
-  </p:clrMapOvr>
-</p:sld>
-</file>
-
-<file path=ppt/slides/slide9.xml><?xml version="1.0" encoding="utf-8"?>
-<p:sld xmlns:a="http://schemas.openxmlformats.org/drawingml/2006/main" xmlns:p="http://schemas.openxmlformats.org/presentationml/2006/main" xmlns:r="http://schemas.openxmlformats.org/officeDocument/2006/relationships">
-  <p:cSld>
-    <p:spTree>
-      <p:nvGrpSpPr>
-        <p:cNvPr id="1" name=""/>
-        <p:cNvGrpSpPr/>
-        <p:nvPr/>
-      </p:nvGrpSpPr>
-      <p:grpSpPr/>
-      <p:pic>
-        <p:nvPicPr>
-          <p:cNvPr id="2" name="Picture 1" descr="image2.gif"/>
-          <p:cNvPicPr>
-            <a:picLocks noChangeAspect="1"/>
-          </p:cNvPicPr>
-          <p:nvPr/>
-        </p:nvPicPr>
-        <p:blipFill>
-          <a:blip r:embed="rId2"/>
-          <a:stretch>
-            <a:fillRect/>
-          </a:stretch>
-        </p:blipFill>
-        <p:spPr>
-          <a:xfrm>
-            <a:off x="0" y="0"/>
-            <a:ext cx="9144000" cy="6858000"/>
-          </a:xfrm>
-          <a:prstGeom prst="rect">
-            <a:avLst/>
-          </a:prstGeom>
-        </p:spPr>
-      </p:pic>
-      <p:sp>
-        <p:nvSpPr>
-          <p:cNvPr id="3" name="TextBox 2"/>
-          <p:cNvSpPr txBox="1"/>
-          <p:nvPr/>
-        </p:nvSpPr>
-        <p:spPr>
-          <a:xfrm>
-            <a:off x="457200" y="182880"/>
-            <a:ext cx="8229600" cy="960120"/>
-          </a:xfrm>
-          <a:prstGeom prst="rect">
-            <a:avLst/>
-          </a:prstGeom>
-          <a:noFill/>
-        </p:spPr>
-        <p:txBody>
-          <a:bodyPr wrap="square">
-            <a:normAutofit/>
-          </a:bodyPr>
-          <a:lstStyle/>
-          <a:p/>
-          <a:p>
-            <a:pPr algn="l"/>
-            <a:r>
-              <a:rPr sz="3600" b="0">
-                <a:solidFill>
-                  <a:srgbClr val="FFFFFF"/>
-                </a:solidFill>
-              </a:rPr>
-              <a:t>Rudram - 1st Anuvaka</a:t>
-            </a:r>
-          </a:p>
-        </p:txBody>
-      </p:sp>
-      <p:sp>
-        <p:nvSpPr>
-          <p:cNvPr id="4" name="TextBox 3"/>
-          <p:cNvSpPr txBox="1"/>
-          <p:nvPr/>
-        </p:nvSpPr>
-        <p:spPr>
-          <a:xfrm>
-            <a:off x="457200" y="1143000"/>
-            <a:ext cx="8229600" cy="5029200"/>
-          </a:xfrm>
-          <a:prstGeom prst="rect">
-            <a:avLst/>
-          </a:prstGeom>
-          <a:noFill/>
-        </p:spPr>
-        <p:txBody>
-          <a:bodyPr wrap="square">
-            <a:normAutofit/>
-          </a:bodyPr>
-          <a:lstStyle/>
-          <a:p/>
-          <a:p>
-            <a:pPr algn="l"/>
-            <a:r>
-              <a:rPr sz="3200" b="0">
-                <a:solidFill>
-                  <a:srgbClr val="FFFFFF"/>
-                </a:solidFill>
-              </a:rPr>
-              <a:t>Pari̍ Te̱ Dhanvan̍o Heṯiras̱mānvṛṇ̍aktu Vi̱śvata̍ḥ
-Atho̱ Ya İṣ̍u̱dhistavā̱re A̱smannidheh̍i̱ Tam 
-Nama̍ste Astu Bhagavan Viśveśva̱rāya̍ 
-Mahāde̱vāya̍ Tryamba̱kāya̍ Tripurānta̱kāya̍ 
-Trikāgnikā̱lāya̍ Kālāgniru̱drāya̍ Nīlaka̱ṇṭhāya̍ 
-Mṛtyuñja̱yāya̍ Sarveśva̱rāya̍ Sadāśi̱vāya̍
-Śrīmanmahāde̱vāya̱ Nama̍ḥ</a:t>
-            </a:r>
-          </a:p>
-        </p:txBody>
-      </p:sp>
-      <p:sp>
-        <p:nvSpPr>
-          <p:cNvPr id="5" name="TextBox 4"/>
-          <p:cNvSpPr txBox="1"/>
-          <p:nvPr/>
-        </p:nvSpPr>
-        <p:spPr>
-          <a:xfrm>
-            <a:off x="457200" y="5943600"/>
-            <a:ext cx="914400" cy="685800"/>
-          </a:xfrm>
-          <a:prstGeom prst="rect">
-            <a:avLst/>
-          </a:prstGeom>
-          <a:noFill/>
-        </p:spPr>
-        <p:txBody>
-          <a:bodyPr wrap="square">
-            <a:normAutofit/>
-          </a:bodyPr>
-          <a:lstStyle/>
-          <a:p/>
-          <a:p>
-            <a:pPr algn="l"/>
-            <a:r>
-              <a:rPr sz="1600" b="0">
-                <a:solidFill>
-                  <a:srgbClr val="FFFFFF"/>
-                </a:solidFill>
-              </a:rPr>
-              <a:t/>
-            </a:r>
-          </a:p>
-        </p:txBody>
-      </p:sp>
-      <p:sp>
-        <p:nvSpPr>
-          <p:cNvPr id="6" name="TextBox 5"/>
-          <p:cNvSpPr txBox="1"/>
-          <p:nvPr/>
-        </p:nvSpPr>
-        <p:spPr>
-          <a:xfrm>
-            <a:off x="2286000" y="5943600"/>
-            <a:ext cx="3657600" cy="685800"/>
-          </a:xfrm>
-          <a:prstGeom prst="rect">
-            <a:avLst/>
-          </a:prstGeom>
-          <a:noFill/>
-        </p:spPr>
-        <p:txBody>
-          <a:bodyPr wrap="square">
-            <a:normAutofit/>
-          </a:bodyPr>
-          <a:lstStyle/>
-          <a:p/>
-          <a:p>
-            <a:pPr algn="ctr"/>
-            <a:r>
-              <a:rPr sz="1600" b="0">
-                <a:solidFill>
-                  <a:srgbClr val="FFFFFF"/>
-                </a:solidFill>
-              </a:rPr>
-              <a:t>Kshamaa Prarthana </a:t>
-            </a:r>
-          </a:p>
-        </p:txBody>
-      </p:sp>
-      <p:sp>
-        <p:nvSpPr>
-          <p:cNvPr id="7" name="TextBox 6"/>
-          <p:cNvSpPr txBox="1"/>
-          <p:nvPr/>
-        </p:nvSpPr>
-        <p:spPr>
-          <a:xfrm>
-            <a:off x="7315200" y="5943600"/>
-            <a:ext cx="914400" cy="685800"/>
-          </a:xfrm>
-          <a:prstGeom prst="rect">
-            <a:avLst/>
-          </a:prstGeom>
-          <a:noFill/>
-        </p:spPr>
-        <p:txBody>
-          <a:bodyPr wrap="square">
-            <a:normAutofit/>
-          </a:bodyPr>
-          <a:lstStyle/>
-          <a:p/>
-          <a:p>
-            <a:pPr algn="r"/>
-            <a:r>
-              <a:rPr sz="1600" b="0">
-                <a:solidFill>
-                  <a:srgbClr val="FFFFFF"/>
-                </a:solidFill>
-              </a:rPr>
-              <a:t/>
+              <a:t>November 05, 2016</a:t>
             </a:r>
           </a:p>
         </p:txBody>

</xml_diff>